<commit_message>
edits to section 2
</commit_message>
<xml_diff>
--- a/paper/abstraction/figures/examples.pptx
+++ b/paper/abstraction/figures/examples.pptx
@@ -3040,8 +3040,8 @@
         </p:nvSpPr>
         <p:spPr>
           <a:xfrm>
-            <a:off x="2800354" y="4573704"/>
-            <a:ext cx="5103836" cy="2046714"/>
+            <a:off x="2800353" y="4573704"/>
+            <a:ext cx="5433551" cy="2046714"/>
           </a:xfrm>
           <a:prstGeom prst="rect">
             <a:avLst/>
@@ -3063,13 +3063,8 @@
           <a:p>
             <a:r>
               <a:rPr lang="en-US" sz="2000" dirty="0" smtClean="0"/>
-              <a:t>All </a:t>
+              <a:t>All-to-all internal connectivity</a:t>
             </a:r>
-            <a:r>
-              <a:rPr lang="en-US" sz="2000" dirty="0" err="1" smtClean="0"/>
-              <a:t>switc</a:t>
-            </a:r>
-            <a:endParaRPr lang="en-US" sz="2000" dirty="0" smtClean="0"/>
           </a:p>
           <a:p>
             <a:r>

</xml_diff>

<commit_message>
first full draft of section 2
</commit_message>
<xml_diff>
--- a/paper/abstraction/figures/examples.pptx
+++ b/paper/abstraction/figures/examples.pptx
@@ -3029,67 +3029,6 @@
                 </a:schemeClr>
               </a:solidFill>
             </a:endParaRPr>
-          </a:p>
-        </p:txBody>
-      </p:sp>
-      <p:sp>
-        <p:nvSpPr>
-          <p:cNvPr id="47" name="TextBox 46"/>
-          <p:cNvSpPr txBox="1"/>
-          <p:nvPr/>
-        </p:nvSpPr>
-        <p:spPr>
-          <a:xfrm>
-            <a:off x="2800353" y="4573704"/>
-            <a:ext cx="5433551" cy="2046714"/>
-          </a:xfrm>
-          <a:prstGeom prst="rect">
-            <a:avLst/>
-          </a:prstGeom>
-          <a:noFill/>
-        </p:spPr>
-        <p:txBody>
-          <a:bodyPr wrap="square" rtlCol="0">
-            <a:spAutoFit/>
-          </a:bodyPr>
-          <a:lstStyle/>
-          <a:p>
-            <a:pPr algn="ctr"/>
-            <a:r>
-              <a:rPr lang="en-US" sz="2000" b="1" dirty="0" smtClean="0"/>
-              <a:t>Policy</a:t>
-            </a:r>
-          </a:p>
-          <a:p>
-            <a:r>
-              <a:rPr lang="en-US" sz="2000" dirty="0" smtClean="0"/>
-              <a:t>All-to-all internal connectivity</a:t>
-            </a:r>
-          </a:p>
-          <a:p>
-            <a:r>
-              <a:rPr lang="en-US" sz="2000" dirty="0" smtClean="0"/>
-              <a:t>Pods 1 and 2 hold global services, which should be advertised externally </a:t>
-            </a:r>
-            <a:r>
-              <a:rPr lang="en-US" sz="2000" dirty="0" smtClean="0"/>
-              <a:t>as an aggregate PG</a:t>
-            </a:r>
-            <a:endParaRPr lang="en-US" sz="2000" baseline="-25000" dirty="0"/>
-          </a:p>
-          <a:p>
-            <a:endParaRPr lang="en-US" sz="1050" baseline="-25000" dirty="0" smtClean="0"/>
-          </a:p>
-          <a:p>
-            <a:r>
-              <a:rPr lang="en-US" sz="2000" dirty="0" smtClean="0"/>
-              <a:t>Pods 3 and 4 hold local services, which </a:t>
-            </a:r>
-            <a:r>
-              <a:rPr lang="en-US" sz="2000" dirty="0" smtClean="0"/>
-              <a:t>should not be announced externally</a:t>
-            </a:r>
-            <a:endParaRPr lang="en-US" sz="2000" dirty="0"/>
           </a:p>
         </p:txBody>
       </p:sp>

</xml_diff>

<commit_message>
Update section 3 with abstractions
</commit_message>
<xml_diff>
--- a/paper/abstraction/figures/examples.pptx
+++ b/paper/abstraction/figures/examples.pptx
@@ -4,9 +4,13 @@
   <p:sldMasterIdLst>
     <p:sldMasterId id="2147483648" r:id="rId1"/>
   </p:sldMasterIdLst>
+  <p:notesMasterIdLst>
+    <p:notesMasterId r:id="rId5"/>
+  </p:notesMasterIdLst>
   <p:sldIdLst>
     <p:sldId id="412" r:id="rId2"/>
     <p:sldId id="413" r:id="rId3"/>
+    <p:sldId id="414" r:id="rId4"/>
   </p:sldIdLst>
   <p:sldSz cx="12192000" cy="6858000"/>
   <p:notesSz cx="6858000" cy="9144000"/>
@@ -113,6 +117,356 @@
 </p:presentation>
 </file>
 
+<file path=ppt/notesMasters/notesMaster1.xml><?xml version="1.0" encoding="utf-8"?>
+<p:notesMaster xmlns:a="http://schemas.openxmlformats.org/drawingml/2006/main" xmlns:r="http://schemas.openxmlformats.org/officeDocument/2006/relationships" xmlns:p="http://schemas.openxmlformats.org/presentationml/2006/main">
+  <p:cSld>
+    <p:bg>
+      <p:bgRef idx="1001">
+        <a:schemeClr val="bg1"/>
+      </p:bgRef>
+    </p:bg>
+    <p:spTree>
+      <p:nvGrpSpPr>
+        <p:cNvPr id="1" name=""/>
+        <p:cNvGrpSpPr/>
+        <p:nvPr/>
+      </p:nvGrpSpPr>
+      <p:grpSpPr>
+        <a:xfrm>
+          <a:off x="0" y="0"/>
+          <a:ext cx="0" cy="0"/>
+          <a:chOff x="0" y="0"/>
+          <a:chExt cx="0" cy="0"/>
+        </a:xfrm>
+      </p:grpSpPr>
+      <p:sp>
+        <p:nvSpPr>
+          <p:cNvPr id="2" name="Header Placeholder 1"/>
+          <p:cNvSpPr>
+            <a:spLocks noGrp="1"/>
+          </p:cNvSpPr>
+          <p:nvPr>
+            <p:ph type="hdr" sz="quarter"/>
+          </p:nvPr>
+        </p:nvSpPr>
+        <p:spPr>
+          <a:xfrm>
+            <a:off x="0" y="0"/>
+            <a:ext cx="2971800" cy="458788"/>
+          </a:xfrm>
+          <a:prstGeom prst="rect">
+            <a:avLst/>
+          </a:prstGeom>
+        </p:spPr>
+        <p:txBody>
+          <a:bodyPr vert="horz" lIns="91440" tIns="45720" rIns="91440" bIns="45720" rtlCol="0"/>
+          <a:lstStyle>
+            <a:lvl1pPr algn="l">
+              <a:defRPr sz="1200"/>
+            </a:lvl1pPr>
+          </a:lstStyle>
+          <a:p>
+            <a:endParaRPr lang="en-US"/>
+          </a:p>
+        </p:txBody>
+      </p:sp>
+      <p:sp>
+        <p:nvSpPr>
+          <p:cNvPr id="3" name="Date Placeholder 2"/>
+          <p:cNvSpPr>
+            <a:spLocks noGrp="1"/>
+          </p:cNvSpPr>
+          <p:nvPr>
+            <p:ph type="dt" idx="1"/>
+          </p:nvPr>
+        </p:nvSpPr>
+        <p:spPr>
+          <a:xfrm>
+            <a:off x="3884613" y="0"/>
+            <a:ext cx="2971800" cy="458788"/>
+          </a:xfrm>
+          <a:prstGeom prst="rect">
+            <a:avLst/>
+          </a:prstGeom>
+        </p:spPr>
+        <p:txBody>
+          <a:bodyPr vert="horz" lIns="91440" tIns="45720" rIns="91440" bIns="45720" rtlCol="0"/>
+          <a:lstStyle>
+            <a:lvl1pPr algn="r">
+              <a:defRPr sz="1200"/>
+            </a:lvl1pPr>
+          </a:lstStyle>
+          <a:p>
+            <a:fld id="{0CCB65A4-74BE-2E49-B697-B48CA3DADDCF}" type="datetimeFigureOut">
+              <a:rPr lang="en-US" smtClean="0"/>
+              <a:t>10/31/16</a:t>
+            </a:fld>
+            <a:endParaRPr lang="en-US"/>
+          </a:p>
+        </p:txBody>
+      </p:sp>
+      <p:sp>
+        <p:nvSpPr>
+          <p:cNvPr id="4" name="Slide Image Placeholder 3"/>
+          <p:cNvSpPr>
+            <a:spLocks noGrp="1" noRot="1" noChangeAspect="1"/>
+          </p:cNvSpPr>
+          <p:nvPr>
+            <p:ph type="sldImg" idx="2"/>
+          </p:nvPr>
+        </p:nvSpPr>
+        <p:spPr>
+          <a:xfrm>
+            <a:off x="685800" y="1143000"/>
+            <a:ext cx="5486400" cy="3086100"/>
+          </a:xfrm>
+          <a:prstGeom prst="rect">
+            <a:avLst/>
+          </a:prstGeom>
+          <a:noFill/>
+          <a:ln w="12700">
+            <a:solidFill>
+              <a:prstClr val="black"/>
+            </a:solidFill>
+          </a:ln>
+        </p:spPr>
+        <p:txBody>
+          <a:bodyPr vert="horz" lIns="91440" tIns="45720" rIns="91440" bIns="45720" rtlCol="0" anchor="ctr"/>
+          <a:lstStyle/>
+          <a:p>
+            <a:endParaRPr lang="en-US"/>
+          </a:p>
+        </p:txBody>
+      </p:sp>
+      <p:sp>
+        <p:nvSpPr>
+          <p:cNvPr id="5" name="Notes Placeholder 4"/>
+          <p:cNvSpPr>
+            <a:spLocks noGrp="1"/>
+          </p:cNvSpPr>
+          <p:nvPr>
+            <p:ph type="body" sz="quarter" idx="3"/>
+          </p:nvPr>
+        </p:nvSpPr>
+        <p:spPr>
+          <a:xfrm>
+            <a:off x="685800" y="4400550"/>
+            <a:ext cx="5486400" cy="3600450"/>
+          </a:xfrm>
+          <a:prstGeom prst="rect">
+            <a:avLst/>
+          </a:prstGeom>
+        </p:spPr>
+        <p:txBody>
+          <a:bodyPr vert="horz" lIns="91440" tIns="45720" rIns="91440" bIns="45720" rtlCol="0"/>
+          <a:lstStyle/>
+          <a:p>
+            <a:pPr lvl="0"/>
+            <a:r>
+              <a:rPr lang="en-US" smtClean="0"/>
+              <a:t>Click to edit Master text styles</a:t>
+            </a:r>
+          </a:p>
+          <a:p>
+            <a:pPr lvl="1"/>
+            <a:r>
+              <a:rPr lang="en-US" smtClean="0"/>
+              <a:t>Second level</a:t>
+            </a:r>
+          </a:p>
+          <a:p>
+            <a:pPr lvl="2"/>
+            <a:r>
+              <a:rPr lang="en-US" smtClean="0"/>
+              <a:t>Third level</a:t>
+            </a:r>
+          </a:p>
+          <a:p>
+            <a:pPr lvl="3"/>
+            <a:r>
+              <a:rPr lang="en-US" smtClean="0"/>
+              <a:t>Fourth level</a:t>
+            </a:r>
+          </a:p>
+          <a:p>
+            <a:pPr lvl="4"/>
+            <a:r>
+              <a:rPr lang="en-US" smtClean="0"/>
+              <a:t>Fifth level</a:t>
+            </a:r>
+            <a:endParaRPr lang="en-US"/>
+          </a:p>
+        </p:txBody>
+      </p:sp>
+      <p:sp>
+        <p:nvSpPr>
+          <p:cNvPr id="6" name="Footer Placeholder 5"/>
+          <p:cNvSpPr>
+            <a:spLocks noGrp="1"/>
+          </p:cNvSpPr>
+          <p:nvPr>
+            <p:ph type="ftr" sz="quarter" idx="4"/>
+          </p:nvPr>
+        </p:nvSpPr>
+        <p:spPr>
+          <a:xfrm>
+            <a:off x="0" y="8685213"/>
+            <a:ext cx="2971800" cy="458787"/>
+          </a:xfrm>
+          <a:prstGeom prst="rect">
+            <a:avLst/>
+          </a:prstGeom>
+        </p:spPr>
+        <p:txBody>
+          <a:bodyPr vert="horz" lIns="91440" tIns="45720" rIns="91440" bIns="45720" rtlCol="0" anchor="b"/>
+          <a:lstStyle>
+            <a:lvl1pPr algn="l">
+              <a:defRPr sz="1200"/>
+            </a:lvl1pPr>
+          </a:lstStyle>
+          <a:p>
+            <a:endParaRPr lang="en-US"/>
+          </a:p>
+        </p:txBody>
+      </p:sp>
+      <p:sp>
+        <p:nvSpPr>
+          <p:cNvPr id="7" name="Slide Number Placeholder 6"/>
+          <p:cNvSpPr>
+            <a:spLocks noGrp="1"/>
+          </p:cNvSpPr>
+          <p:nvPr>
+            <p:ph type="sldNum" sz="quarter" idx="5"/>
+          </p:nvPr>
+        </p:nvSpPr>
+        <p:spPr>
+          <a:xfrm>
+            <a:off x="3884613" y="8685213"/>
+            <a:ext cx="2971800" cy="458787"/>
+          </a:xfrm>
+          <a:prstGeom prst="rect">
+            <a:avLst/>
+          </a:prstGeom>
+        </p:spPr>
+        <p:txBody>
+          <a:bodyPr vert="horz" lIns="91440" tIns="45720" rIns="91440" bIns="45720" rtlCol="0" anchor="b"/>
+          <a:lstStyle>
+            <a:lvl1pPr algn="r">
+              <a:defRPr sz="1200"/>
+            </a:lvl1pPr>
+          </a:lstStyle>
+          <a:p>
+            <a:fld id="{D7574437-4189-E14E-8E73-0C93B1A92DE9}" type="slidenum">
+              <a:rPr lang="en-US" smtClean="0"/>
+              <a:t>‹#›</a:t>
+            </a:fld>
+            <a:endParaRPr lang="en-US"/>
+          </a:p>
+        </p:txBody>
+      </p:sp>
+    </p:spTree>
+    <p:extLst>
+      <p:ext uri="{BB962C8B-B14F-4D97-AF65-F5344CB8AC3E}">
+        <p14:creationId xmlns:p14="http://schemas.microsoft.com/office/powerpoint/2010/main" val="1152424069"/>
+      </p:ext>
+    </p:extLst>
+  </p:cSld>
+  <p:clrMap bg1="lt1" tx1="dk1" bg2="lt2" tx2="dk2" accent1="accent1" accent2="accent2" accent3="accent3" accent4="accent4" accent5="accent5" accent6="accent6" hlink="hlink" folHlink="folHlink"/>
+  <p:notesStyle>
+    <a:lvl1pPr marL="0" algn="l" defTabSz="914400" rtl="0" eaLnBrk="1" latinLnBrk="0" hangingPunct="1">
+      <a:defRPr sz="1200" kern="1200">
+        <a:solidFill>
+          <a:schemeClr val="tx1"/>
+        </a:solidFill>
+        <a:latin typeface="+mn-lt"/>
+        <a:ea typeface="+mn-ea"/>
+        <a:cs typeface="+mn-cs"/>
+      </a:defRPr>
+    </a:lvl1pPr>
+    <a:lvl2pPr marL="457200" algn="l" defTabSz="914400" rtl="0" eaLnBrk="1" latinLnBrk="0" hangingPunct="1">
+      <a:defRPr sz="1200" kern="1200">
+        <a:solidFill>
+          <a:schemeClr val="tx1"/>
+        </a:solidFill>
+        <a:latin typeface="+mn-lt"/>
+        <a:ea typeface="+mn-ea"/>
+        <a:cs typeface="+mn-cs"/>
+      </a:defRPr>
+    </a:lvl2pPr>
+    <a:lvl3pPr marL="914400" algn="l" defTabSz="914400" rtl="0" eaLnBrk="1" latinLnBrk="0" hangingPunct="1">
+      <a:defRPr sz="1200" kern="1200">
+        <a:solidFill>
+          <a:schemeClr val="tx1"/>
+        </a:solidFill>
+        <a:latin typeface="+mn-lt"/>
+        <a:ea typeface="+mn-ea"/>
+        <a:cs typeface="+mn-cs"/>
+      </a:defRPr>
+    </a:lvl3pPr>
+    <a:lvl4pPr marL="1371600" algn="l" defTabSz="914400" rtl="0" eaLnBrk="1" latinLnBrk="0" hangingPunct="1">
+      <a:defRPr sz="1200" kern="1200">
+        <a:solidFill>
+          <a:schemeClr val="tx1"/>
+        </a:solidFill>
+        <a:latin typeface="+mn-lt"/>
+        <a:ea typeface="+mn-ea"/>
+        <a:cs typeface="+mn-cs"/>
+      </a:defRPr>
+    </a:lvl4pPr>
+    <a:lvl5pPr marL="1828800" algn="l" defTabSz="914400" rtl="0" eaLnBrk="1" latinLnBrk="0" hangingPunct="1">
+      <a:defRPr sz="1200" kern="1200">
+        <a:solidFill>
+          <a:schemeClr val="tx1"/>
+        </a:solidFill>
+        <a:latin typeface="+mn-lt"/>
+        <a:ea typeface="+mn-ea"/>
+        <a:cs typeface="+mn-cs"/>
+      </a:defRPr>
+    </a:lvl5pPr>
+    <a:lvl6pPr marL="2286000" algn="l" defTabSz="914400" rtl="0" eaLnBrk="1" latinLnBrk="0" hangingPunct="1">
+      <a:defRPr sz="1200" kern="1200">
+        <a:solidFill>
+          <a:schemeClr val="tx1"/>
+        </a:solidFill>
+        <a:latin typeface="+mn-lt"/>
+        <a:ea typeface="+mn-ea"/>
+        <a:cs typeface="+mn-cs"/>
+      </a:defRPr>
+    </a:lvl6pPr>
+    <a:lvl7pPr marL="2743200" algn="l" defTabSz="914400" rtl="0" eaLnBrk="1" latinLnBrk="0" hangingPunct="1">
+      <a:defRPr sz="1200" kern="1200">
+        <a:solidFill>
+          <a:schemeClr val="tx1"/>
+        </a:solidFill>
+        <a:latin typeface="+mn-lt"/>
+        <a:ea typeface="+mn-ea"/>
+        <a:cs typeface="+mn-cs"/>
+      </a:defRPr>
+    </a:lvl7pPr>
+    <a:lvl8pPr marL="3200400" algn="l" defTabSz="914400" rtl="0" eaLnBrk="1" latinLnBrk="0" hangingPunct="1">
+      <a:defRPr sz="1200" kern="1200">
+        <a:solidFill>
+          <a:schemeClr val="tx1"/>
+        </a:solidFill>
+        <a:latin typeface="+mn-lt"/>
+        <a:ea typeface="+mn-ea"/>
+        <a:cs typeface="+mn-cs"/>
+      </a:defRPr>
+    </a:lvl8pPr>
+    <a:lvl9pPr marL="3657600" algn="l" defTabSz="914400" rtl="0" eaLnBrk="1" latinLnBrk="0" hangingPunct="1">
+      <a:defRPr sz="1200" kern="1200">
+        <a:solidFill>
+          <a:schemeClr val="tx1"/>
+        </a:solidFill>
+        <a:latin typeface="+mn-lt"/>
+        <a:ea typeface="+mn-ea"/>
+        <a:cs typeface="+mn-cs"/>
+      </a:defRPr>
+    </a:lvl9pPr>
+  </p:notesStyle>
+</p:notesMaster>
+</file>
+
 <file path=ppt/slideLayouts/slideLayout1.xml><?xml version="1.0" encoding="utf-8"?>
 <p:sldLayout xmlns:a="http://schemas.openxmlformats.org/drawingml/2006/main" xmlns:r="http://schemas.openxmlformats.org/officeDocument/2006/relationships" xmlns:p="http://schemas.openxmlformats.org/presentationml/2006/main" type="title" preserve="1">
   <p:cSld name="Title Slide">
@@ -244,7 +598,7 @@
           <a:p>
             <a:fld id="{D1C2FE12-02FD-40D2-9E73-08CF8D46514A}" type="datetimeFigureOut">
               <a:rPr lang="en-US" smtClean="0"/>
-              <a:t>10/26/2016</a:t>
+              <a:t>10/31/16</a:t>
             </a:fld>
             <a:endParaRPr lang="en-US"/>
           </a:p>
@@ -414,7 +768,7 @@
           <a:p>
             <a:fld id="{D1C2FE12-02FD-40D2-9E73-08CF8D46514A}" type="datetimeFigureOut">
               <a:rPr lang="en-US" smtClean="0"/>
-              <a:t>10/26/2016</a:t>
+              <a:t>10/31/16</a:t>
             </a:fld>
             <a:endParaRPr lang="en-US"/>
           </a:p>
@@ -594,7 +948,7 @@
           <a:p>
             <a:fld id="{D1C2FE12-02FD-40D2-9E73-08CF8D46514A}" type="datetimeFigureOut">
               <a:rPr lang="en-US" smtClean="0"/>
-              <a:t>10/26/2016</a:t>
+              <a:t>10/31/16</a:t>
             </a:fld>
             <a:endParaRPr lang="en-US"/>
           </a:p>
@@ -764,7 +1118,7 @@
           <a:p>
             <a:fld id="{D1C2FE12-02FD-40D2-9E73-08CF8D46514A}" type="datetimeFigureOut">
               <a:rPr lang="en-US" smtClean="0"/>
-              <a:t>10/26/2016</a:t>
+              <a:t>10/31/16</a:t>
             </a:fld>
             <a:endParaRPr lang="en-US"/>
           </a:p>
@@ -1010,7 +1364,7 @@
           <a:p>
             <a:fld id="{D1C2FE12-02FD-40D2-9E73-08CF8D46514A}" type="datetimeFigureOut">
               <a:rPr lang="en-US" smtClean="0"/>
-              <a:t>10/26/2016</a:t>
+              <a:t>10/31/16</a:t>
             </a:fld>
             <a:endParaRPr lang="en-US"/>
           </a:p>
@@ -1242,7 +1596,7 @@
           <a:p>
             <a:fld id="{D1C2FE12-02FD-40D2-9E73-08CF8D46514A}" type="datetimeFigureOut">
               <a:rPr lang="en-US" smtClean="0"/>
-              <a:t>10/26/2016</a:t>
+              <a:t>10/31/16</a:t>
             </a:fld>
             <a:endParaRPr lang="en-US"/>
           </a:p>
@@ -1609,7 +1963,7 @@
           <a:p>
             <a:fld id="{D1C2FE12-02FD-40D2-9E73-08CF8D46514A}" type="datetimeFigureOut">
               <a:rPr lang="en-US" smtClean="0"/>
-              <a:t>10/26/2016</a:t>
+              <a:t>10/31/16</a:t>
             </a:fld>
             <a:endParaRPr lang="en-US"/>
           </a:p>
@@ -1727,7 +2081,7 @@
           <a:p>
             <a:fld id="{D1C2FE12-02FD-40D2-9E73-08CF8D46514A}" type="datetimeFigureOut">
               <a:rPr lang="en-US" smtClean="0"/>
-              <a:t>10/26/2016</a:t>
+              <a:t>10/31/16</a:t>
             </a:fld>
             <a:endParaRPr lang="en-US"/>
           </a:p>
@@ -1822,7 +2176,7 @@
           <a:p>
             <a:fld id="{D1C2FE12-02FD-40D2-9E73-08CF8D46514A}" type="datetimeFigureOut">
               <a:rPr lang="en-US" smtClean="0"/>
-              <a:t>10/26/2016</a:t>
+              <a:t>10/31/16</a:t>
             </a:fld>
             <a:endParaRPr lang="en-US"/>
           </a:p>
@@ -2099,7 +2453,7 @@
           <a:p>
             <a:fld id="{D1C2FE12-02FD-40D2-9E73-08CF8D46514A}" type="datetimeFigureOut">
               <a:rPr lang="en-US" smtClean="0"/>
-              <a:t>10/26/2016</a:t>
+              <a:t>10/31/16</a:t>
             </a:fld>
             <a:endParaRPr lang="en-US"/>
           </a:p>
@@ -2352,7 +2706,7 @@
           <a:p>
             <a:fld id="{D1C2FE12-02FD-40D2-9E73-08CF8D46514A}" type="datetimeFigureOut">
               <a:rPr lang="en-US" smtClean="0"/>
-              <a:t>10/26/2016</a:t>
+              <a:t>10/31/16</a:t>
             </a:fld>
             <a:endParaRPr lang="en-US"/>
           </a:p>
@@ -2565,7 +2919,7 @@
           <a:p>
             <a:fld id="{D1C2FE12-02FD-40D2-9E73-08CF8D46514A}" type="datetimeFigureOut">
               <a:rPr lang="en-US" smtClean="0"/>
-              <a:t>10/26/2016</a:t>
+              <a:t>10/31/16</a:t>
             </a:fld>
             <a:endParaRPr lang="en-US"/>
           </a:p>
@@ -9687,6 +10041,866 @@
 </p:sld>
 </file>
 
+<file path=ppt/slides/slide3.xml><?xml version="1.0" encoding="utf-8"?>
+<p:sld xmlns:a="http://schemas.openxmlformats.org/drawingml/2006/main" xmlns:r="http://schemas.openxmlformats.org/officeDocument/2006/relationships" xmlns:p="http://schemas.openxmlformats.org/presentationml/2006/main">
+  <p:cSld>
+    <p:spTree>
+      <p:nvGrpSpPr>
+        <p:cNvPr id="1" name=""/>
+        <p:cNvGrpSpPr/>
+        <p:nvPr/>
+      </p:nvGrpSpPr>
+      <p:grpSpPr>
+        <a:xfrm>
+          <a:off x="0" y="0"/>
+          <a:ext cx="0" cy="0"/>
+          <a:chOff x="0" y="0"/>
+          <a:chExt cx="0" cy="0"/>
+        </a:xfrm>
+      </p:grpSpPr>
+      <p:sp>
+        <p:nvSpPr>
+          <p:cNvPr id="4" name="Title 1"/>
+          <p:cNvSpPr txBox="1">
+            <a:spLocks/>
+          </p:cNvSpPr>
+          <p:nvPr/>
+        </p:nvSpPr>
+        <p:spPr>
+          <a:xfrm>
+            <a:off x="-7637" y="-44719"/>
+            <a:ext cx="6007995" cy="852891"/>
+          </a:xfrm>
+          <a:prstGeom prst="rect">
+            <a:avLst/>
+          </a:prstGeom>
+        </p:spPr>
+        <p:txBody>
+          <a:bodyPr vert="horz" lIns="91440" tIns="45720" rIns="91440" bIns="45720" rtlCol="0" anchor="b">
+            <a:normAutofit/>
+          </a:bodyPr>
+          <a:lstStyle>
+            <a:lvl1pPr algn="ctr" defTabSz="914400" rtl="0" eaLnBrk="1" latinLnBrk="0" hangingPunct="1">
+              <a:lnSpc>
+                <a:spcPct val="90000"/>
+              </a:lnSpc>
+              <a:spcBef>
+                <a:spcPct val="0"/>
+              </a:spcBef>
+              <a:buNone/>
+              <a:defRPr sz="6000" kern="1200">
+                <a:solidFill>
+                  <a:schemeClr val="tx1"/>
+                </a:solidFill>
+                <a:latin typeface="+mj-lt"/>
+                <a:ea typeface="+mj-ea"/>
+                <a:cs typeface="+mj-cs"/>
+              </a:defRPr>
+            </a:lvl1pPr>
+          </a:lstStyle>
+          <a:p>
+            <a:pPr algn="l"/>
+            <a:r>
+              <a:rPr lang="en-US" sz="4000" dirty="0" smtClean="0">
+                <a:solidFill>
+                  <a:schemeClr val="accent1">
+                    <a:lumMod val="50000"/>
+                  </a:schemeClr>
+                </a:solidFill>
+              </a:rPr>
+              <a:t>Example</a:t>
+            </a:r>
+            <a:endParaRPr lang="en-US" sz="4000" dirty="0">
+              <a:solidFill>
+                <a:schemeClr val="accent1">
+                  <a:lumMod val="50000"/>
+                </a:schemeClr>
+              </a:solidFill>
+            </a:endParaRPr>
+          </a:p>
+        </p:txBody>
+      </p:sp>
+      <p:sp>
+        <p:nvSpPr>
+          <p:cNvPr id="59" name="Rectangle 58"/>
+          <p:cNvSpPr/>
+          <p:nvPr/>
+        </p:nvSpPr>
+        <p:spPr>
+          <a:xfrm>
+            <a:off x="5671026" y="1734130"/>
+            <a:ext cx="504684" cy="326113"/>
+          </a:xfrm>
+          <a:prstGeom prst="rect">
+            <a:avLst/>
+          </a:prstGeom>
+          <a:solidFill>
+            <a:schemeClr val="bg2">
+              <a:lumMod val="90000"/>
+            </a:schemeClr>
+          </a:solidFill>
+          <a:ln>
+            <a:solidFill>
+              <a:schemeClr val="tx1"/>
+            </a:solidFill>
+          </a:ln>
+        </p:spPr>
+        <p:style>
+          <a:lnRef idx="2">
+            <a:schemeClr val="accent1">
+              <a:shade val="50000"/>
+            </a:schemeClr>
+          </a:lnRef>
+          <a:fillRef idx="1">
+            <a:schemeClr val="accent1"/>
+          </a:fillRef>
+          <a:effectRef idx="0">
+            <a:schemeClr val="accent1"/>
+          </a:effectRef>
+          <a:fontRef idx="minor">
+            <a:schemeClr val="lt1"/>
+          </a:fontRef>
+        </p:style>
+        <p:txBody>
+          <a:bodyPr rtlCol="0" anchor="ctr"/>
+          <a:lstStyle/>
+          <a:p>
+            <a:pPr algn="ctr"/>
+            <a:r>
+              <a:rPr lang="en-US" sz="2000" dirty="0" smtClean="0">
+                <a:solidFill>
+                  <a:schemeClr val="tx1"/>
+                </a:solidFill>
+              </a:rPr>
+              <a:t>S</a:t>
+            </a:r>
+            <a:endParaRPr lang="en-US" sz="2000" dirty="0">
+              <a:solidFill>
+                <a:schemeClr val="tx1"/>
+              </a:solidFill>
+            </a:endParaRPr>
+          </a:p>
+        </p:txBody>
+      </p:sp>
+      <p:cxnSp>
+        <p:nvCxnSpPr>
+          <p:cNvPr id="121" name="Straight Connector 120"/>
+          <p:cNvCxnSpPr>
+            <a:stCxn id="59" idx="2"/>
+            <a:endCxn id="114" idx="0"/>
+          </p:cNvCxnSpPr>
+          <p:nvPr/>
+        </p:nvCxnSpPr>
+        <p:spPr>
+          <a:xfrm>
+            <a:off x="5923368" y="2060243"/>
+            <a:ext cx="972761" cy="651123"/>
+          </a:xfrm>
+          <a:prstGeom prst="line">
+            <a:avLst/>
+          </a:prstGeom>
+          <a:ln w="19050">
+            <a:solidFill>
+              <a:schemeClr val="tx1"/>
+            </a:solidFill>
+          </a:ln>
+        </p:spPr>
+        <p:style>
+          <a:lnRef idx="1">
+            <a:schemeClr val="accent1"/>
+          </a:lnRef>
+          <a:fillRef idx="0">
+            <a:schemeClr val="accent1"/>
+          </a:fillRef>
+          <a:effectRef idx="0">
+            <a:schemeClr val="accent1"/>
+          </a:effectRef>
+          <a:fontRef idx="minor">
+            <a:schemeClr val="tx1"/>
+          </a:fontRef>
+        </p:style>
+      </p:cxnSp>
+      <p:grpSp>
+        <p:nvGrpSpPr>
+          <p:cNvPr id="106" name="Group 105"/>
+          <p:cNvGrpSpPr/>
+          <p:nvPr/>
+        </p:nvGrpSpPr>
+        <p:grpSpPr>
+          <a:xfrm>
+            <a:off x="6643787" y="2711366"/>
+            <a:ext cx="504684" cy="938289"/>
+            <a:chOff x="4422388" y="3788229"/>
+            <a:chExt cx="825651" cy="1785257"/>
+          </a:xfrm>
+        </p:grpSpPr>
+        <p:sp>
+          <p:nvSpPr>
+            <p:cNvPr id="112" name="Rectangle 111"/>
+            <p:cNvSpPr/>
+            <p:nvPr/>
+          </p:nvSpPr>
+          <p:spPr>
+            <a:xfrm>
+              <a:off x="4422388" y="4953000"/>
+              <a:ext cx="825651" cy="620486"/>
+            </a:xfrm>
+            <a:prstGeom prst="rect">
+              <a:avLst/>
+            </a:prstGeom>
+            <a:solidFill>
+              <a:schemeClr val="bg2">
+                <a:lumMod val="90000"/>
+              </a:schemeClr>
+            </a:solidFill>
+            <a:ln>
+              <a:solidFill>
+                <a:schemeClr val="tx1"/>
+              </a:solidFill>
+            </a:ln>
+          </p:spPr>
+          <p:style>
+            <a:lnRef idx="2">
+              <a:schemeClr val="accent1">
+                <a:shade val="50000"/>
+              </a:schemeClr>
+            </a:lnRef>
+            <a:fillRef idx="1">
+              <a:schemeClr val="accent1"/>
+            </a:fillRef>
+            <a:effectRef idx="0">
+              <a:schemeClr val="accent1"/>
+            </a:effectRef>
+            <a:fontRef idx="minor">
+              <a:schemeClr val="lt1"/>
+            </a:fontRef>
+          </p:style>
+          <p:txBody>
+            <a:bodyPr rtlCol="0" anchor="ctr"/>
+            <a:lstStyle/>
+            <a:p>
+              <a:pPr algn="ctr"/>
+              <a:r>
+                <a:rPr lang="en-US" sz="2000" dirty="0" smtClean="0">
+                  <a:solidFill>
+                    <a:schemeClr val="tx1"/>
+                  </a:solidFill>
+                </a:rPr>
+                <a:t>TL</a:t>
+              </a:r>
+              <a:endParaRPr lang="en-US" sz="2000" dirty="0">
+                <a:solidFill>
+                  <a:schemeClr val="tx1"/>
+                </a:solidFill>
+              </a:endParaRPr>
+            </a:p>
+          </p:txBody>
+        </p:sp>
+        <p:sp>
+          <p:nvSpPr>
+            <p:cNvPr id="114" name="Rectangle 113"/>
+            <p:cNvSpPr/>
+            <p:nvPr/>
+          </p:nvSpPr>
+          <p:spPr>
+            <a:xfrm>
+              <a:off x="4422388" y="3788229"/>
+              <a:ext cx="825651" cy="620486"/>
+            </a:xfrm>
+            <a:prstGeom prst="rect">
+              <a:avLst/>
+            </a:prstGeom>
+            <a:solidFill>
+              <a:schemeClr val="bg2">
+                <a:lumMod val="90000"/>
+              </a:schemeClr>
+            </a:solidFill>
+            <a:ln>
+              <a:solidFill>
+                <a:schemeClr val="tx1"/>
+              </a:solidFill>
+            </a:ln>
+          </p:spPr>
+          <p:style>
+            <a:lnRef idx="2">
+              <a:schemeClr val="accent1">
+                <a:shade val="50000"/>
+              </a:schemeClr>
+            </a:lnRef>
+            <a:fillRef idx="1">
+              <a:schemeClr val="accent1"/>
+            </a:fillRef>
+            <a:effectRef idx="0">
+              <a:schemeClr val="accent1"/>
+            </a:effectRef>
+            <a:fontRef idx="minor">
+              <a:schemeClr val="lt1"/>
+            </a:fontRef>
+          </p:style>
+          <p:txBody>
+            <a:bodyPr rtlCol="0" anchor="ctr"/>
+            <a:lstStyle/>
+            <a:p>
+              <a:pPr algn="ctr"/>
+              <a:r>
+                <a:rPr lang="en-US" sz="2000" dirty="0" smtClean="0">
+                  <a:solidFill>
+                    <a:schemeClr val="tx1"/>
+                  </a:solidFill>
+                </a:rPr>
+                <a:t>AL</a:t>
+              </a:r>
+              <a:endParaRPr lang="en-US" sz="2000" dirty="0">
+                <a:solidFill>
+                  <a:schemeClr val="tx1"/>
+                </a:solidFill>
+              </a:endParaRPr>
+            </a:p>
+          </p:txBody>
+        </p:sp>
+      </p:grpSp>
+      <p:cxnSp>
+        <p:nvCxnSpPr>
+          <p:cNvPr id="108" name="Straight Connector 107"/>
+          <p:cNvCxnSpPr>
+            <a:stCxn id="114" idx="2"/>
+            <a:endCxn id="112" idx="0"/>
+          </p:cNvCxnSpPr>
+          <p:nvPr/>
+        </p:nvCxnSpPr>
+        <p:spPr>
+          <a:xfrm>
+            <a:off x="6896130" y="3037479"/>
+            <a:ext cx="0" cy="286063"/>
+          </a:xfrm>
+          <a:prstGeom prst="line">
+            <a:avLst/>
+          </a:prstGeom>
+          <a:ln w="19050">
+            <a:solidFill>
+              <a:schemeClr val="tx1"/>
+            </a:solidFill>
+          </a:ln>
+        </p:spPr>
+        <p:style>
+          <a:lnRef idx="1">
+            <a:schemeClr val="accent1"/>
+          </a:lnRef>
+          <a:fillRef idx="0">
+            <a:schemeClr val="accent1"/>
+          </a:fillRef>
+          <a:effectRef idx="0">
+            <a:schemeClr val="accent1"/>
+          </a:effectRef>
+          <a:fontRef idx="minor">
+            <a:schemeClr val="tx1"/>
+          </a:fontRef>
+        </p:style>
+      </p:cxnSp>
+      <p:sp>
+        <p:nvSpPr>
+          <p:cNvPr id="38" name="TextBox 37"/>
+          <p:cNvSpPr txBox="1"/>
+          <p:nvPr/>
+        </p:nvSpPr>
+        <p:spPr>
+          <a:xfrm>
+            <a:off x="6559203" y="3615327"/>
+            <a:ext cx="633611" cy="400110"/>
+          </a:xfrm>
+          <a:prstGeom prst="rect">
+            <a:avLst/>
+          </a:prstGeom>
+          <a:noFill/>
+        </p:spPr>
+        <p:txBody>
+          <a:bodyPr wrap="square" rtlCol="0">
+            <a:spAutoFit/>
+          </a:bodyPr>
+          <a:lstStyle/>
+          <a:p>
+            <a:pPr algn="ctr"/>
+            <a:r>
+              <a:rPr lang="en-US" sz="2000" smtClean="0"/>
+              <a:t>P</a:t>
+            </a:r>
+            <a:r>
+              <a:rPr lang="en-US" sz="2000" dirty="0"/>
+              <a:t>L</a:t>
+            </a:r>
+            <a:endParaRPr lang="en-US" sz="2000" baseline="-25000" dirty="0"/>
+          </a:p>
+        </p:txBody>
+      </p:sp>
+      <p:sp>
+        <p:nvSpPr>
+          <p:cNvPr id="49" name="Rectangle 48"/>
+          <p:cNvSpPr/>
+          <p:nvPr/>
+        </p:nvSpPr>
+        <p:spPr>
+          <a:xfrm>
+            <a:off x="6518107" y="2548080"/>
+            <a:ext cx="749534" cy="1465330"/>
+          </a:xfrm>
+          <a:prstGeom prst="rect">
+            <a:avLst/>
+          </a:prstGeom>
+          <a:noFill/>
+          <a:ln>
+            <a:solidFill>
+              <a:schemeClr val="tx1"/>
+            </a:solidFill>
+            <a:prstDash val="dashDot"/>
+          </a:ln>
+        </p:spPr>
+        <p:style>
+          <a:lnRef idx="2">
+            <a:schemeClr val="accent1">
+              <a:shade val="50000"/>
+            </a:schemeClr>
+          </a:lnRef>
+          <a:fillRef idx="1">
+            <a:schemeClr val="accent1"/>
+          </a:fillRef>
+          <a:effectRef idx="0">
+            <a:schemeClr val="accent1"/>
+          </a:effectRef>
+          <a:fontRef idx="minor">
+            <a:schemeClr val="lt1"/>
+          </a:fontRef>
+        </p:style>
+        <p:txBody>
+          <a:bodyPr rtlCol="0" anchor="ctr"/>
+          <a:lstStyle/>
+          <a:p>
+            <a:pPr algn="ctr"/>
+            <a:endParaRPr lang="en-US" sz="1600"/>
+          </a:p>
+        </p:txBody>
+      </p:sp>
+      <p:cxnSp>
+        <p:nvCxnSpPr>
+          <p:cNvPr id="64" name="Straight Connector 63"/>
+          <p:cNvCxnSpPr>
+            <a:endCxn id="59" idx="0"/>
+          </p:cNvCxnSpPr>
+          <p:nvPr/>
+        </p:nvCxnSpPr>
+        <p:spPr>
+          <a:xfrm>
+            <a:off x="5923368" y="1423607"/>
+            <a:ext cx="0" cy="310523"/>
+          </a:xfrm>
+          <a:prstGeom prst="line">
+            <a:avLst/>
+          </a:prstGeom>
+          <a:ln w="38100">
+            <a:solidFill>
+              <a:schemeClr val="tx1"/>
+            </a:solidFill>
+            <a:headEnd type="triangle" w="med" len="med"/>
+            <a:tailEnd type="triangle" w="med" len="med"/>
+          </a:ln>
+        </p:spPr>
+        <p:style>
+          <a:lnRef idx="1">
+            <a:schemeClr val="accent1"/>
+          </a:lnRef>
+          <a:fillRef idx="0">
+            <a:schemeClr val="accent1"/>
+          </a:fillRef>
+          <a:effectRef idx="0">
+            <a:schemeClr val="accent1"/>
+          </a:effectRef>
+          <a:fontRef idx="minor">
+            <a:schemeClr val="tx1"/>
+          </a:fontRef>
+        </p:style>
+      </p:cxnSp>
+      <p:grpSp>
+        <p:nvGrpSpPr>
+          <p:cNvPr id="99" name="Group 98"/>
+          <p:cNvGrpSpPr/>
+          <p:nvPr/>
+        </p:nvGrpSpPr>
+        <p:grpSpPr>
+          <a:xfrm>
+            <a:off x="4722355" y="2700590"/>
+            <a:ext cx="504684" cy="938289"/>
+            <a:chOff x="4422388" y="3788229"/>
+            <a:chExt cx="825651" cy="1785257"/>
+          </a:xfrm>
+        </p:grpSpPr>
+        <p:grpSp>
+          <p:nvGrpSpPr>
+            <p:cNvPr id="124" name="Group 123"/>
+            <p:cNvGrpSpPr/>
+            <p:nvPr/>
+          </p:nvGrpSpPr>
+          <p:grpSpPr>
+            <a:xfrm>
+              <a:off x="4422388" y="3788229"/>
+              <a:ext cx="825651" cy="1785257"/>
+              <a:chOff x="4422388" y="3788229"/>
+              <a:chExt cx="825651" cy="1785257"/>
+            </a:xfrm>
+          </p:grpSpPr>
+          <p:sp>
+            <p:nvSpPr>
+              <p:cNvPr id="130" name="Rectangle 129"/>
+              <p:cNvSpPr/>
+              <p:nvPr/>
+            </p:nvSpPr>
+            <p:spPr>
+              <a:xfrm>
+                <a:off x="4422388" y="4953000"/>
+                <a:ext cx="825651" cy="620486"/>
+              </a:xfrm>
+              <a:prstGeom prst="rect">
+                <a:avLst/>
+              </a:prstGeom>
+              <a:solidFill>
+                <a:schemeClr val="bg2">
+                  <a:lumMod val="90000"/>
+                </a:schemeClr>
+              </a:solidFill>
+              <a:ln>
+                <a:solidFill>
+                  <a:schemeClr val="tx1"/>
+                </a:solidFill>
+              </a:ln>
+            </p:spPr>
+            <p:style>
+              <a:lnRef idx="2">
+                <a:schemeClr val="accent1">
+                  <a:shade val="50000"/>
+                </a:schemeClr>
+              </a:lnRef>
+              <a:fillRef idx="1">
+                <a:schemeClr val="accent1"/>
+              </a:fillRef>
+              <a:effectRef idx="0">
+                <a:schemeClr val="accent1"/>
+              </a:effectRef>
+              <a:fontRef idx="minor">
+                <a:schemeClr val="lt1"/>
+              </a:fontRef>
+            </p:style>
+            <p:txBody>
+              <a:bodyPr rtlCol="0" anchor="ctr"/>
+              <a:lstStyle/>
+              <a:p>
+                <a:pPr algn="ctr"/>
+                <a:r>
+                  <a:rPr lang="en-US" sz="2000" dirty="0" smtClean="0">
+                    <a:solidFill>
+                      <a:schemeClr val="tx1"/>
+                    </a:solidFill>
+                  </a:rPr>
+                  <a:t>TG</a:t>
+                </a:r>
+                <a:endParaRPr lang="en-US" sz="2000" dirty="0">
+                  <a:solidFill>
+                    <a:schemeClr val="tx1"/>
+                  </a:solidFill>
+                </a:endParaRPr>
+              </a:p>
+            </p:txBody>
+          </p:sp>
+          <p:sp>
+            <p:nvSpPr>
+              <p:cNvPr id="132" name="Rectangle 131"/>
+              <p:cNvSpPr/>
+              <p:nvPr/>
+            </p:nvSpPr>
+            <p:spPr>
+              <a:xfrm>
+                <a:off x="4422388" y="3788229"/>
+                <a:ext cx="825651" cy="620486"/>
+              </a:xfrm>
+              <a:prstGeom prst="rect">
+                <a:avLst/>
+              </a:prstGeom>
+              <a:solidFill>
+                <a:schemeClr val="bg2">
+                  <a:lumMod val="90000"/>
+                </a:schemeClr>
+              </a:solidFill>
+              <a:ln>
+                <a:solidFill>
+                  <a:schemeClr val="tx1"/>
+                </a:solidFill>
+              </a:ln>
+            </p:spPr>
+            <p:style>
+              <a:lnRef idx="2">
+                <a:schemeClr val="accent1">
+                  <a:shade val="50000"/>
+                </a:schemeClr>
+              </a:lnRef>
+              <a:fillRef idx="1">
+                <a:schemeClr val="accent1"/>
+              </a:fillRef>
+              <a:effectRef idx="0">
+                <a:schemeClr val="accent1"/>
+              </a:effectRef>
+              <a:fontRef idx="minor">
+                <a:schemeClr val="lt1"/>
+              </a:fontRef>
+            </p:style>
+            <p:txBody>
+              <a:bodyPr rtlCol="0" anchor="ctr"/>
+              <a:lstStyle/>
+              <a:p>
+                <a:pPr algn="ctr"/>
+                <a:r>
+                  <a:rPr lang="en-US" sz="2000" dirty="0" smtClean="0">
+                    <a:solidFill>
+                      <a:schemeClr val="tx1"/>
+                    </a:solidFill>
+                  </a:rPr>
+                  <a:t>AG</a:t>
+                </a:r>
+                <a:endParaRPr lang="en-US" sz="2000" dirty="0">
+                  <a:solidFill>
+                    <a:schemeClr val="tx1"/>
+                  </a:solidFill>
+                </a:endParaRPr>
+              </a:p>
+            </p:txBody>
+          </p:sp>
+        </p:grpSp>
+        <p:cxnSp>
+          <p:nvCxnSpPr>
+            <p:cNvPr id="126" name="Straight Connector 125"/>
+            <p:cNvCxnSpPr>
+              <a:stCxn id="132" idx="2"/>
+              <a:endCxn id="130" idx="0"/>
+            </p:cNvCxnSpPr>
+            <p:nvPr/>
+          </p:nvCxnSpPr>
+          <p:spPr>
+            <a:xfrm>
+              <a:off x="4835214" y="4408715"/>
+              <a:ext cx="0" cy="544284"/>
+            </a:xfrm>
+            <a:prstGeom prst="line">
+              <a:avLst/>
+            </a:prstGeom>
+            <a:ln w="19050">
+              <a:solidFill>
+                <a:schemeClr val="tx1"/>
+              </a:solidFill>
+            </a:ln>
+          </p:spPr>
+          <p:style>
+            <a:lnRef idx="1">
+              <a:schemeClr val="accent1"/>
+            </a:lnRef>
+            <a:fillRef idx="0">
+              <a:schemeClr val="accent1"/>
+            </a:fillRef>
+            <a:effectRef idx="0">
+              <a:schemeClr val="accent1"/>
+            </a:effectRef>
+            <a:fontRef idx="minor">
+              <a:schemeClr val="tx1"/>
+            </a:fontRef>
+          </p:style>
+        </p:cxnSp>
+      </p:grpSp>
+      <p:sp>
+        <p:nvSpPr>
+          <p:cNvPr id="102" name="TextBox 101"/>
+          <p:cNvSpPr txBox="1"/>
+          <p:nvPr/>
+        </p:nvSpPr>
+        <p:spPr>
+          <a:xfrm>
+            <a:off x="4603685" y="3604551"/>
+            <a:ext cx="703121" cy="400110"/>
+          </a:xfrm>
+          <a:prstGeom prst="rect">
+            <a:avLst/>
+          </a:prstGeom>
+          <a:noFill/>
+        </p:spPr>
+        <p:txBody>
+          <a:bodyPr wrap="square" rtlCol="0">
+            <a:spAutoFit/>
+          </a:bodyPr>
+          <a:lstStyle/>
+          <a:p>
+            <a:pPr algn="ctr"/>
+            <a:r>
+              <a:rPr lang="en-US" sz="2000" dirty="0" smtClean="0"/>
+              <a:t>PG</a:t>
+            </a:r>
+            <a:endParaRPr lang="en-US" sz="2000" baseline="-25000" dirty="0"/>
+          </a:p>
+        </p:txBody>
+      </p:sp>
+      <p:sp>
+        <p:nvSpPr>
+          <p:cNvPr id="123" name="Rectangle 122"/>
+          <p:cNvSpPr/>
+          <p:nvPr/>
+        </p:nvSpPr>
+        <p:spPr>
+          <a:xfrm>
+            <a:off x="4563032" y="2537304"/>
+            <a:ext cx="786870" cy="1465218"/>
+          </a:xfrm>
+          <a:prstGeom prst="rect">
+            <a:avLst/>
+          </a:prstGeom>
+          <a:noFill/>
+          <a:ln>
+            <a:solidFill>
+              <a:schemeClr val="tx1"/>
+            </a:solidFill>
+            <a:prstDash val="dashDot"/>
+          </a:ln>
+        </p:spPr>
+        <p:style>
+          <a:lnRef idx="2">
+            <a:schemeClr val="accent1">
+              <a:shade val="50000"/>
+            </a:schemeClr>
+          </a:lnRef>
+          <a:fillRef idx="1">
+            <a:schemeClr val="accent1"/>
+          </a:fillRef>
+          <a:effectRef idx="0">
+            <a:schemeClr val="accent1"/>
+          </a:effectRef>
+          <a:fontRef idx="minor">
+            <a:schemeClr val="lt1"/>
+          </a:fontRef>
+        </p:style>
+        <p:txBody>
+          <a:bodyPr rtlCol="0" anchor="ctr"/>
+          <a:lstStyle/>
+          <a:p>
+            <a:pPr algn="ctr"/>
+            <a:endParaRPr lang="en-US" sz="1600"/>
+          </a:p>
+        </p:txBody>
+      </p:sp>
+      <p:cxnSp>
+        <p:nvCxnSpPr>
+          <p:cNvPr id="148" name="Straight Connector 147"/>
+          <p:cNvCxnSpPr>
+            <a:stCxn id="59" idx="2"/>
+            <a:endCxn id="132" idx="0"/>
+          </p:cNvCxnSpPr>
+          <p:nvPr/>
+        </p:nvCxnSpPr>
+        <p:spPr>
+          <a:xfrm flipH="1">
+            <a:off x="4974697" y="2060243"/>
+            <a:ext cx="948671" cy="640347"/>
+          </a:xfrm>
+          <a:prstGeom prst="line">
+            <a:avLst/>
+          </a:prstGeom>
+          <a:ln w="19050">
+            <a:solidFill>
+              <a:schemeClr val="tx1"/>
+            </a:solidFill>
+          </a:ln>
+        </p:spPr>
+        <p:style>
+          <a:lnRef idx="1">
+            <a:schemeClr val="accent1"/>
+          </a:lnRef>
+          <a:fillRef idx="0">
+            <a:schemeClr val="accent1"/>
+          </a:fillRef>
+          <a:effectRef idx="0">
+            <a:schemeClr val="accent1"/>
+          </a:effectRef>
+          <a:fontRef idx="minor">
+            <a:schemeClr val="tx1"/>
+          </a:fontRef>
+        </p:style>
+      </p:cxnSp>
+      <p:sp>
+        <p:nvSpPr>
+          <p:cNvPr id="153" name="TextBox 152"/>
+          <p:cNvSpPr txBox="1"/>
+          <p:nvPr/>
+        </p:nvSpPr>
+        <p:spPr>
+          <a:xfrm>
+            <a:off x="3949714" y="4362580"/>
+            <a:ext cx="1987313" cy="400110"/>
+          </a:xfrm>
+          <a:prstGeom prst="rect">
+            <a:avLst/>
+          </a:prstGeom>
+          <a:noFill/>
+        </p:spPr>
+        <p:txBody>
+          <a:bodyPr wrap="square" rtlCol="0">
+            <a:spAutoFit/>
+          </a:bodyPr>
+          <a:lstStyle/>
+          <a:p>
+            <a:pPr algn="ctr"/>
+            <a:r>
+              <a:rPr lang="en-US" sz="2000" dirty="0" smtClean="0"/>
+              <a:t>Global services</a:t>
+            </a:r>
+            <a:endParaRPr lang="en-US" sz="2000" baseline="-25000" dirty="0"/>
+          </a:p>
+        </p:txBody>
+      </p:sp>
+      <p:sp>
+        <p:nvSpPr>
+          <p:cNvPr id="154" name="TextBox 153"/>
+          <p:cNvSpPr txBox="1"/>
+          <p:nvPr/>
+        </p:nvSpPr>
+        <p:spPr>
+          <a:xfrm>
+            <a:off x="5937027" y="4391203"/>
+            <a:ext cx="1987313" cy="400110"/>
+          </a:xfrm>
+          <a:prstGeom prst="rect">
+            <a:avLst/>
+          </a:prstGeom>
+          <a:noFill/>
+        </p:spPr>
+        <p:txBody>
+          <a:bodyPr wrap="square" rtlCol="0">
+            <a:spAutoFit/>
+          </a:bodyPr>
+          <a:lstStyle/>
+          <a:p>
+            <a:pPr algn="ctr"/>
+            <a:r>
+              <a:rPr lang="en-US" sz="2000" dirty="0" smtClean="0"/>
+              <a:t>Local services</a:t>
+            </a:r>
+            <a:endParaRPr lang="en-US" sz="2000" baseline="-25000" dirty="0"/>
+          </a:p>
+        </p:txBody>
+      </p:sp>
+    </p:spTree>
+    <p:extLst>
+      <p:ext uri="{BB962C8B-B14F-4D97-AF65-F5344CB8AC3E}">
+        <p14:creationId xmlns:p14="http://schemas.microsoft.com/office/powerpoint/2010/main" val="356119335"/>
+      </p:ext>
+    </p:extLst>
+  </p:cSld>
+  <p:clrMapOvr>
+    <a:masterClrMapping/>
+  </p:clrMapOvr>
+</p:sld>
+</file>
+
 <file path=ppt/theme/theme1.xml><?xml version="1.0" encoding="utf-8"?>
 <a:theme xmlns:a="http://schemas.openxmlformats.org/drawingml/2006/main" name="Office Theme">
   <a:themeElements>
@@ -9946,4 +11160,265 @@
     </a:ext>
   </a:extLst>
 </a:theme>
+</file>
+
+<file path=ppt/theme/theme2.xml><?xml version="1.0" encoding="utf-8"?>
+<a:theme xmlns:a="http://schemas.openxmlformats.org/drawingml/2006/main" name="Office Theme">
+  <a:themeElements>
+    <a:clrScheme name="Office">
+      <a:dk1>
+        <a:sysClr val="windowText" lastClr="000000"/>
+      </a:dk1>
+      <a:lt1>
+        <a:sysClr val="window" lastClr="FFFFFF"/>
+      </a:lt1>
+      <a:dk2>
+        <a:srgbClr val="44546A"/>
+      </a:dk2>
+      <a:lt2>
+        <a:srgbClr val="E7E6E6"/>
+      </a:lt2>
+      <a:accent1>
+        <a:srgbClr val="5B9BD5"/>
+      </a:accent1>
+      <a:accent2>
+        <a:srgbClr val="ED7D31"/>
+      </a:accent2>
+      <a:accent3>
+        <a:srgbClr val="A5A5A5"/>
+      </a:accent3>
+      <a:accent4>
+        <a:srgbClr val="FFC000"/>
+      </a:accent4>
+      <a:accent5>
+        <a:srgbClr val="4472C4"/>
+      </a:accent5>
+      <a:accent6>
+        <a:srgbClr val="70AD47"/>
+      </a:accent6>
+      <a:hlink>
+        <a:srgbClr val="0563C1"/>
+      </a:hlink>
+      <a:folHlink>
+        <a:srgbClr val="954F72"/>
+      </a:folHlink>
+    </a:clrScheme>
+    <a:fontScheme name="Office">
+      <a:majorFont>
+        <a:latin typeface="Calibri Light" panose="020F0302020204030204"/>
+        <a:ea typeface=""/>
+        <a:cs typeface=""/>
+        <a:font script="Jpan" typeface="Yu Gothic Light"/>
+        <a:font script="Hang" typeface="맑은 고딕"/>
+        <a:font script="Hans" typeface="DengXian Light"/>
+        <a:font script="Hant" typeface="新細明體"/>
+        <a:font script="Arab" typeface="Times New Roman"/>
+        <a:font script="Hebr" typeface="Times New Roman"/>
+        <a:font script="Thai" typeface="Angsana New"/>
+        <a:font script="Ethi" typeface="Nyala"/>
+        <a:font script="Beng" typeface="Vrinda"/>
+        <a:font script="Gujr" typeface="Shruti"/>
+        <a:font script="Khmr" typeface="MoolBoran"/>
+        <a:font script="Knda" typeface="Tunga"/>
+        <a:font script="Guru" typeface="Raavi"/>
+        <a:font script="Cans" typeface="Euphemia"/>
+        <a:font script="Cher" typeface="Plantagenet Cherokee"/>
+        <a:font script="Yiii" typeface="Microsoft Yi Baiti"/>
+        <a:font script="Tibt" typeface="Microsoft Himalaya"/>
+        <a:font script="Thaa" typeface="MV Boli"/>
+        <a:font script="Deva" typeface="Mangal"/>
+        <a:font script="Telu" typeface="Gautami"/>
+        <a:font script="Taml" typeface="Latha"/>
+        <a:font script="Syrc" typeface="Estrangelo Edessa"/>
+        <a:font script="Orya" typeface="Kalinga"/>
+        <a:font script="Mlym" typeface="Kartika"/>
+        <a:font script="Laoo" typeface="DokChampa"/>
+        <a:font script="Sinh" typeface="Iskoola Pota"/>
+        <a:font script="Mong" typeface="Mongolian Baiti"/>
+        <a:font script="Viet" typeface="Times New Roman"/>
+        <a:font script="Uigh" typeface="Microsoft Uighur"/>
+        <a:font script="Geor" typeface="Sylfaen"/>
+      </a:majorFont>
+      <a:minorFont>
+        <a:latin typeface="Calibri" panose="020F0502020204030204"/>
+        <a:ea typeface=""/>
+        <a:cs typeface=""/>
+        <a:font script="Jpan" typeface="Yu Gothic"/>
+        <a:font script="Hang" typeface="맑은 고딕"/>
+        <a:font script="Hans" typeface="DengXian"/>
+        <a:font script="Hant" typeface="新細明體"/>
+        <a:font script="Arab" typeface="Arial"/>
+        <a:font script="Hebr" typeface="Arial"/>
+        <a:font script="Thai" typeface="Cordia New"/>
+        <a:font script="Ethi" typeface="Nyala"/>
+        <a:font script="Beng" typeface="Vrinda"/>
+        <a:font script="Gujr" typeface="Shruti"/>
+        <a:font script="Khmr" typeface="DaunPenh"/>
+        <a:font script="Knda" typeface="Tunga"/>
+        <a:font script="Guru" typeface="Raavi"/>
+        <a:font script="Cans" typeface="Euphemia"/>
+        <a:font script="Cher" typeface="Plantagenet Cherokee"/>
+        <a:font script="Yiii" typeface="Microsoft Yi Baiti"/>
+        <a:font script="Tibt" typeface="Microsoft Himalaya"/>
+        <a:font script="Thaa" typeface="MV Boli"/>
+        <a:font script="Deva" typeface="Mangal"/>
+        <a:font script="Telu" typeface="Gautami"/>
+        <a:font script="Taml" typeface="Latha"/>
+        <a:font script="Syrc" typeface="Estrangelo Edessa"/>
+        <a:font script="Orya" typeface="Kalinga"/>
+        <a:font script="Mlym" typeface="Kartika"/>
+        <a:font script="Laoo" typeface="DokChampa"/>
+        <a:font script="Sinh" typeface="Iskoola Pota"/>
+        <a:font script="Mong" typeface="Mongolian Baiti"/>
+        <a:font script="Viet" typeface="Arial"/>
+        <a:font script="Uigh" typeface="Microsoft Uighur"/>
+        <a:font script="Geor" typeface="Sylfaen"/>
+      </a:minorFont>
+    </a:fontScheme>
+    <a:fmtScheme name="Office">
+      <a:fillStyleLst>
+        <a:solidFill>
+          <a:schemeClr val="phClr"/>
+        </a:solidFill>
+        <a:gradFill rotWithShape="1">
+          <a:gsLst>
+            <a:gs pos="0">
+              <a:schemeClr val="phClr">
+                <a:lumMod val="110000"/>
+                <a:satMod val="105000"/>
+                <a:tint val="67000"/>
+              </a:schemeClr>
+            </a:gs>
+            <a:gs pos="50000">
+              <a:schemeClr val="phClr">
+                <a:lumMod val="105000"/>
+                <a:satMod val="103000"/>
+                <a:tint val="73000"/>
+              </a:schemeClr>
+            </a:gs>
+            <a:gs pos="100000">
+              <a:schemeClr val="phClr">
+                <a:lumMod val="105000"/>
+                <a:satMod val="109000"/>
+                <a:tint val="81000"/>
+              </a:schemeClr>
+            </a:gs>
+          </a:gsLst>
+          <a:lin ang="5400000" scaled="0"/>
+        </a:gradFill>
+        <a:gradFill rotWithShape="1">
+          <a:gsLst>
+            <a:gs pos="0">
+              <a:schemeClr val="phClr">
+                <a:satMod val="103000"/>
+                <a:lumMod val="102000"/>
+                <a:tint val="94000"/>
+              </a:schemeClr>
+            </a:gs>
+            <a:gs pos="50000">
+              <a:schemeClr val="phClr">
+                <a:satMod val="110000"/>
+                <a:lumMod val="100000"/>
+                <a:shade val="100000"/>
+              </a:schemeClr>
+            </a:gs>
+            <a:gs pos="100000">
+              <a:schemeClr val="phClr">
+                <a:lumMod val="99000"/>
+                <a:satMod val="120000"/>
+                <a:shade val="78000"/>
+              </a:schemeClr>
+            </a:gs>
+          </a:gsLst>
+          <a:lin ang="5400000" scaled="0"/>
+        </a:gradFill>
+      </a:fillStyleLst>
+      <a:lnStyleLst>
+        <a:ln w="6350" cap="flat" cmpd="sng" algn="ctr">
+          <a:solidFill>
+            <a:schemeClr val="phClr"/>
+          </a:solidFill>
+          <a:prstDash val="solid"/>
+          <a:miter lim="800000"/>
+        </a:ln>
+        <a:ln w="12700" cap="flat" cmpd="sng" algn="ctr">
+          <a:solidFill>
+            <a:schemeClr val="phClr"/>
+          </a:solidFill>
+          <a:prstDash val="solid"/>
+          <a:miter lim="800000"/>
+        </a:ln>
+        <a:ln w="19050" cap="flat" cmpd="sng" algn="ctr">
+          <a:solidFill>
+            <a:schemeClr val="phClr"/>
+          </a:solidFill>
+          <a:prstDash val="solid"/>
+          <a:miter lim="800000"/>
+        </a:ln>
+      </a:lnStyleLst>
+      <a:effectStyleLst>
+        <a:effectStyle>
+          <a:effectLst/>
+        </a:effectStyle>
+        <a:effectStyle>
+          <a:effectLst/>
+        </a:effectStyle>
+        <a:effectStyle>
+          <a:effectLst>
+            <a:outerShdw blurRad="57150" dist="19050" dir="5400000" algn="ctr" rotWithShape="0">
+              <a:srgbClr val="000000">
+                <a:alpha val="63000"/>
+              </a:srgbClr>
+            </a:outerShdw>
+          </a:effectLst>
+        </a:effectStyle>
+      </a:effectStyleLst>
+      <a:bgFillStyleLst>
+        <a:solidFill>
+          <a:schemeClr val="phClr"/>
+        </a:solidFill>
+        <a:solidFill>
+          <a:schemeClr val="phClr">
+            <a:tint val="95000"/>
+            <a:satMod val="170000"/>
+          </a:schemeClr>
+        </a:solidFill>
+        <a:gradFill rotWithShape="1">
+          <a:gsLst>
+            <a:gs pos="0">
+              <a:schemeClr val="phClr">
+                <a:tint val="93000"/>
+                <a:satMod val="150000"/>
+                <a:shade val="98000"/>
+                <a:lumMod val="102000"/>
+              </a:schemeClr>
+            </a:gs>
+            <a:gs pos="50000">
+              <a:schemeClr val="phClr">
+                <a:tint val="98000"/>
+                <a:satMod val="130000"/>
+                <a:shade val="90000"/>
+                <a:lumMod val="103000"/>
+              </a:schemeClr>
+            </a:gs>
+            <a:gs pos="100000">
+              <a:schemeClr val="phClr">
+                <a:shade val="63000"/>
+                <a:satMod val="120000"/>
+              </a:schemeClr>
+            </a:gs>
+          </a:gsLst>
+          <a:lin ang="5400000" scaled="0"/>
+        </a:gradFill>
+      </a:bgFillStyleLst>
+    </a:fmtScheme>
+  </a:themeElements>
+  <a:objectDefaults/>
+  <a:extraClrSchemeLst/>
+  <a:extLst>
+    <a:ext uri="{05A4C25C-085E-4340-85A3-A5531E510DB2}">
+      <thm15:themeFamily xmlns:thm15="http://schemas.microsoft.com/office/thememl/2012/main" name="Office Theme" id="{62F939B6-93AF-4DB8-9C6B-D6C7DFDC589F}" vid="{4A3C46E8-61CC-4603-A589-7422A47A8E4A}"/>
+    </a:ext>
+  </a:extLst>
+</a:theme>
 </file>
</xml_diff>

<commit_message>
update compilation image to use smaller concrete topology
</commit_message>
<xml_diff>
--- a/paper/abstraction/figures/examples.pptx
+++ b/paper/abstraction/figures/examples.pptx
@@ -5,12 +5,14 @@
     <p:sldMasterId id="2147483648" r:id="rId1"/>
   </p:sldMasterIdLst>
   <p:notesMasterIdLst>
-    <p:notesMasterId r:id="rId5"/>
+    <p:notesMasterId r:id="rId7"/>
   </p:notesMasterIdLst>
   <p:sldIdLst>
     <p:sldId id="412" r:id="rId2"/>
     <p:sldId id="413" r:id="rId3"/>
     <p:sldId id="414" r:id="rId4"/>
+    <p:sldId id="415" r:id="rId5"/>
+    <p:sldId id="416" r:id="rId6"/>
   </p:sldIdLst>
   <p:sldSz cx="12192000" cy="6858000"/>
   <p:notesSz cx="6858000" cy="9144000"/>
@@ -10060,68 +10062,6 @@
       </p:grpSpPr>
       <p:sp>
         <p:nvSpPr>
-          <p:cNvPr id="4" name="Title 1"/>
-          <p:cNvSpPr txBox="1">
-            <a:spLocks/>
-          </p:cNvSpPr>
-          <p:nvPr/>
-        </p:nvSpPr>
-        <p:spPr>
-          <a:xfrm>
-            <a:off x="-7637" y="-44719"/>
-            <a:ext cx="6007995" cy="852891"/>
-          </a:xfrm>
-          <a:prstGeom prst="rect">
-            <a:avLst/>
-          </a:prstGeom>
-        </p:spPr>
-        <p:txBody>
-          <a:bodyPr vert="horz" lIns="91440" tIns="45720" rIns="91440" bIns="45720" rtlCol="0" anchor="b">
-            <a:normAutofit/>
-          </a:bodyPr>
-          <a:lstStyle>
-            <a:lvl1pPr algn="ctr" defTabSz="914400" rtl="0" eaLnBrk="1" latinLnBrk="0" hangingPunct="1">
-              <a:lnSpc>
-                <a:spcPct val="90000"/>
-              </a:lnSpc>
-              <a:spcBef>
-                <a:spcPct val="0"/>
-              </a:spcBef>
-              <a:buNone/>
-              <a:defRPr sz="6000" kern="1200">
-                <a:solidFill>
-                  <a:schemeClr val="tx1"/>
-                </a:solidFill>
-                <a:latin typeface="+mj-lt"/>
-                <a:ea typeface="+mj-ea"/>
-                <a:cs typeface="+mj-cs"/>
-              </a:defRPr>
-            </a:lvl1pPr>
-          </a:lstStyle>
-          <a:p>
-            <a:pPr algn="l"/>
-            <a:r>
-              <a:rPr lang="en-US" sz="4000" dirty="0" smtClean="0">
-                <a:solidFill>
-                  <a:schemeClr val="accent1">
-                    <a:lumMod val="50000"/>
-                  </a:schemeClr>
-                </a:solidFill>
-              </a:rPr>
-              <a:t>Example</a:t>
-            </a:r>
-            <a:endParaRPr lang="en-US" sz="4000" dirty="0">
-              <a:solidFill>
-                <a:schemeClr val="accent1">
-                  <a:lumMod val="50000"/>
-                </a:schemeClr>
-              </a:solidFill>
-            </a:endParaRPr>
-          </a:p>
-        </p:txBody>
-      </p:sp>
-      <p:sp>
-        <p:nvSpPr>
           <p:cNvPr id="154" name="TextBox 153"/>
           <p:cNvSpPr txBox="1"/>
           <p:nvPr/>
@@ -13538,6 +13478,1807 @@
 </p:sld>
 </file>
 
+<file path=ppt/slides/slide4.xml><?xml version="1.0" encoding="utf-8"?>
+<p:sld xmlns:a="http://schemas.openxmlformats.org/drawingml/2006/main" xmlns:r="http://schemas.openxmlformats.org/officeDocument/2006/relationships" xmlns:p="http://schemas.openxmlformats.org/presentationml/2006/main">
+  <p:cSld>
+    <p:spTree>
+      <p:nvGrpSpPr>
+        <p:cNvPr id="1" name=""/>
+        <p:cNvGrpSpPr/>
+        <p:nvPr/>
+      </p:nvGrpSpPr>
+      <p:grpSpPr>
+        <a:xfrm>
+          <a:off x="0" y="0"/>
+          <a:ext cx="0" cy="0"/>
+          <a:chOff x="0" y="0"/>
+          <a:chExt cx="0" cy="0"/>
+        </a:xfrm>
+      </p:grpSpPr>
+    </p:spTree>
+    <p:extLst>
+      <p:ext uri="{BB962C8B-B14F-4D97-AF65-F5344CB8AC3E}">
+        <p14:creationId xmlns:p14="http://schemas.microsoft.com/office/powerpoint/2010/main" val="2057084932"/>
+      </p:ext>
+    </p:extLst>
+  </p:cSld>
+  <p:clrMapOvr>
+    <a:masterClrMapping/>
+  </p:clrMapOvr>
+</p:sld>
+</file>
+
+<file path=ppt/slides/slide5.xml><?xml version="1.0" encoding="utf-8"?>
+<p:sld xmlns:a="http://schemas.openxmlformats.org/drawingml/2006/main" xmlns:r="http://schemas.openxmlformats.org/officeDocument/2006/relationships" xmlns:p="http://schemas.openxmlformats.org/presentationml/2006/main">
+  <p:cSld>
+    <p:spTree>
+      <p:nvGrpSpPr>
+        <p:cNvPr id="1" name=""/>
+        <p:cNvGrpSpPr/>
+        <p:nvPr/>
+      </p:nvGrpSpPr>
+      <p:grpSpPr>
+        <a:xfrm>
+          <a:off x="0" y="0"/>
+          <a:ext cx="0" cy="0"/>
+          <a:chOff x="0" y="0"/>
+          <a:chExt cx="0" cy="0"/>
+        </a:xfrm>
+      </p:grpSpPr>
+      <p:cxnSp>
+        <p:nvCxnSpPr>
+          <p:cNvPr id="115" name="Straight Connector 114"/>
+          <p:cNvCxnSpPr/>
+          <p:nvPr/>
+        </p:nvCxnSpPr>
+        <p:spPr>
+          <a:xfrm flipH="1">
+            <a:off x="4100785" y="1956333"/>
+            <a:ext cx="451454" cy="640345"/>
+          </a:xfrm>
+          <a:prstGeom prst="line">
+            <a:avLst/>
+          </a:prstGeom>
+          <a:ln w="19050">
+            <a:solidFill>
+              <a:schemeClr val="tx1"/>
+            </a:solidFill>
+          </a:ln>
+        </p:spPr>
+        <p:style>
+          <a:lnRef idx="1">
+            <a:schemeClr val="accent1"/>
+          </a:lnRef>
+          <a:fillRef idx="0">
+            <a:schemeClr val="accent1"/>
+          </a:fillRef>
+          <a:effectRef idx="0">
+            <a:schemeClr val="accent1"/>
+          </a:effectRef>
+          <a:fontRef idx="minor">
+            <a:schemeClr val="tx1"/>
+          </a:fontRef>
+        </p:style>
+      </p:cxnSp>
+      <p:cxnSp>
+        <p:nvCxnSpPr>
+          <p:cNvPr id="116" name="Straight Connector 115"/>
+          <p:cNvCxnSpPr/>
+          <p:nvPr/>
+        </p:nvCxnSpPr>
+        <p:spPr>
+          <a:xfrm flipH="1">
+            <a:off x="4100785" y="1995050"/>
+            <a:ext cx="2029689" cy="601628"/>
+          </a:xfrm>
+          <a:prstGeom prst="line">
+            <a:avLst/>
+          </a:prstGeom>
+          <a:ln w="19050">
+            <a:solidFill>
+              <a:schemeClr val="tx1"/>
+            </a:solidFill>
+          </a:ln>
+        </p:spPr>
+        <p:style>
+          <a:lnRef idx="1">
+            <a:schemeClr val="accent1"/>
+          </a:lnRef>
+          <a:fillRef idx="0">
+            <a:schemeClr val="accent1"/>
+          </a:fillRef>
+          <a:effectRef idx="0">
+            <a:schemeClr val="accent1"/>
+          </a:effectRef>
+          <a:fontRef idx="minor">
+            <a:schemeClr val="tx1"/>
+          </a:fontRef>
+        </p:style>
+      </p:cxnSp>
+      <p:cxnSp>
+        <p:nvCxnSpPr>
+          <p:cNvPr id="117" name="Straight Connector 116"/>
+          <p:cNvCxnSpPr/>
+          <p:nvPr/>
+        </p:nvCxnSpPr>
+        <p:spPr>
+          <a:xfrm>
+            <a:off x="4552239" y="1956333"/>
+            <a:ext cx="307097" cy="640345"/>
+          </a:xfrm>
+          <a:prstGeom prst="line">
+            <a:avLst/>
+          </a:prstGeom>
+          <a:ln w="19050">
+            <a:solidFill>
+              <a:schemeClr val="tx1"/>
+            </a:solidFill>
+          </a:ln>
+        </p:spPr>
+        <p:style>
+          <a:lnRef idx="1">
+            <a:schemeClr val="accent1"/>
+          </a:lnRef>
+          <a:fillRef idx="0">
+            <a:schemeClr val="accent1"/>
+          </a:fillRef>
+          <a:effectRef idx="0">
+            <a:schemeClr val="accent1"/>
+          </a:effectRef>
+          <a:fontRef idx="minor">
+            <a:schemeClr val="tx1"/>
+          </a:fontRef>
+        </p:style>
+      </p:cxnSp>
+      <p:cxnSp>
+        <p:nvCxnSpPr>
+          <p:cNvPr id="118" name="Straight Connector 117"/>
+          <p:cNvCxnSpPr/>
+          <p:nvPr/>
+        </p:nvCxnSpPr>
+        <p:spPr>
+          <a:xfrm>
+            <a:off x="6130474" y="1995050"/>
+            <a:ext cx="432214" cy="612406"/>
+          </a:xfrm>
+          <a:prstGeom prst="line">
+            <a:avLst/>
+          </a:prstGeom>
+          <a:ln w="19050">
+            <a:solidFill>
+              <a:schemeClr val="tx1"/>
+            </a:solidFill>
+          </a:ln>
+        </p:spPr>
+        <p:style>
+          <a:lnRef idx="1">
+            <a:schemeClr val="accent1"/>
+          </a:lnRef>
+          <a:fillRef idx="0">
+            <a:schemeClr val="accent1"/>
+          </a:fillRef>
+          <a:effectRef idx="0">
+            <a:schemeClr val="accent1"/>
+          </a:effectRef>
+          <a:fontRef idx="minor">
+            <a:schemeClr val="tx1"/>
+          </a:fontRef>
+        </p:style>
+      </p:cxnSp>
+      <p:cxnSp>
+        <p:nvCxnSpPr>
+          <p:cNvPr id="119" name="Straight Connector 118"/>
+          <p:cNvCxnSpPr/>
+          <p:nvPr/>
+        </p:nvCxnSpPr>
+        <p:spPr>
+          <a:xfrm flipH="1">
+            <a:off x="5804137" y="1995050"/>
+            <a:ext cx="326337" cy="612406"/>
+          </a:xfrm>
+          <a:prstGeom prst="line">
+            <a:avLst/>
+          </a:prstGeom>
+          <a:ln w="19050">
+            <a:solidFill>
+              <a:schemeClr val="tx1"/>
+            </a:solidFill>
+          </a:ln>
+        </p:spPr>
+        <p:style>
+          <a:lnRef idx="1">
+            <a:schemeClr val="accent1"/>
+          </a:lnRef>
+          <a:fillRef idx="0">
+            <a:schemeClr val="accent1"/>
+          </a:fillRef>
+          <a:effectRef idx="0">
+            <a:schemeClr val="accent1"/>
+          </a:effectRef>
+          <a:fontRef idx="minor">
+            <a:schemeClr val="tx1"/>
+          </a:fontRef>
+        </p:style>
+      </p:cxnSp>
+      <p:cxnSp>
+        <p:nvCxnSpPr>
+          <p:cNvPr id="120" name="Straight Connector 119"/>
+          <p:cNvCxnSpPr/>
+          <p:nvPr/>
+        </p:nvCxnSpPr>
+        <p:spPr>
+          <a:xfrm flipH="1">
+            <a:off x="4859336" y="1995050"/>
+            <a:ext cx="1271138" cy="601628"/>
+          </a:xfrm>
+          <a:prstGeom prst="line">
+            <a:avLst/>
+          </a:prstGeom>
+          <a:ln w="19050">
+            <a:solidFill>
+              <a:schemeClr val="tx1"/>
+            </a:solidFill>
+          </a:ln>
+        </p:spPr>
+        <p:style>
+          <a:lnRef idx="1">
+            <a:schemeClr val="accent1"/>
+          </a:lnRef>
+          <a:fillRef idx="0">
+            <a:schemeClr val="accent1"/>
+          </a:fillRef>
+          <a:effectRef idx="0">
+            <a:schemeClr val="accent1"/>
+          </a:effectRef>
+          <a:fontRef idx="minor">
+            <a:schemeClr val="tx1"/>
+          </a:fontRef>
+        </p:style>
+      </p:cxnSp>
+      <p:cxnSp>
+        <p:nvCxnSpPr>
+          <p:cNvPr id="121" name="Straight Connector 120"/>
+          <p:cNvCxnSpPr/>
+          <p:nvPr/>
+        </p:nvCxnSpPr>
+        <p:spPr>
+          <a:xfrm>
+            <a:off x="4552239" y="1956333"/>
+            <a:ext cx="2010449" cy="651123"/>
+          </a:xfrm>
+          <a:prstGeom prst="line">
+            <a:avLst/>
+          </a:prstGeom>
+          <a:ln w="19050">
+            <a:solidFill>
+              <a:schemeClr val="tx1"/>
+            </a:solidFill>
+          </a:ln>
+        </p:spPr>
+        <p:style>
+          <a:lnRef idx="1">
+            <a:schemeClr val="accent1"/>
+          </a:lnRef>
+          <a:fillRef idx="0">
+            <a:schemeClr val="accent1"/>
+          </a:fillRef>
+          <a:effectRef idx="0">
+            <a:schemeClr val="accent1"/>
+          </a:effectRef>
+          <a:fontRef idx="minor">
+            <a:schemeClr val="tx1"/>
+          </a:fontRef>
+        </p:style>
+      </p:cxnSp>
+      <p:cxnSp>
+        <p:nvCxnSpPr>
+          <p:cNvPr id="122" name="Straight Connector 121"/>
+          <p:cNvCxnSpPr/>
+          <p:nvPr/>
+        </p:nvCxnSpPr>
+        <p:spPr>
+          <a:xfrm>
+            <a:off x="4552239" y="1956333"/>
+            <a:ext cx="1251898" cy="651123"/>
+          </a:xfrm>
+          <a:prstGeom prst="line">
+            <a:avLst/>
+          </a:prstGeom>
+          <a:ln w="19050">
+            <a:solidFill>
+              <a:schemeClr val="tx1"/>
+            </a:solidFill>
+          </a:ln>
+        </p:spPr>
+        <p:style>
+          <a:lnRef idx="1">
+            <a:schemeClr val="accent1"/>
+          </a:lnRef>
+          <a:fillRef idx="0">
+            <a:schemeClr val="accent1"/>
+          </a:fillRef>
+          <a:effectRef idx="0">
+            <a:schemeClr val="accent1"/>
+          </a:effectRef>
+          <a:fontRef idx="minor">
+            <a:schemeClr val="tx1"/>
+          </a:fontRef>
+        </p:style>
+      </p:cxnSp>
+      <p:cxnSp>
+        <p:nvCxnSpPr>
+          <p:cNvPr id="73" name="Straight Connector 72"/>
+          <p:cNvCxnSpPr/>
+          <p:nvPr/>
+        </p:nvCxnSpPr>
+        <p:spPr>
+          <a:xfrm>
+            <a:off x="4100785" y="2922791"/>
+            <a:ext cx="0" cy="286063"/>
+          </a:xfrm>
+          <a:prstGeom prst="line">
+            <a:avLst/>
+          </a:prstGeom>
+          <a:ln w="19050">
+            <a:solidFill>
+              <a:schemeClr val="tx1"/>
+            </a:solidFill>
+          </a:ln>
+        </p:spPr>
+        <p:style>
+          <a:lnRef idx="1">
+            <a:schemeClr val="accent1"/>
+          </a:lnRef>
+          <a:fillRef idx="0">
+            <a:schemeClr val="accent1"/>
+          </a:fillRef>
+          <a:effectRef idx="0">
+            <a:schemeClr val="accent1"/>
+          </a:effectRef>
+          <a:fontRef idx="minor">
+            <a:schemeClr val="tx1"/>
+          </a:fontRef>
+        </p:style>
+      </p:cxnSp>
+      <p:cxnSp>
+        <p:nvCxnSpPr>
+          <p:cNvPr id="100" name="Straight Connector 99"/>
+          <p:cNvCxnSpPr/>
+          <p:nvPr/>
+        </p:nvCxnSpPr>
+        <p:spPr>
+          <a:xfrm>
+            <a:off x="4859336" y="2922791"/>
+            <a:ext cx="0" cy="286063"/>
+          </a:xfrm>
+          <a:prstGeom prst="line">
+            <a:avLst/>
+          </a:prstGeom>
+          <a:ln w="19050">
+            <a:solidFill>
+              <a:schemeClr val="tx1"/>
+            </a:solidFill>
+          </a:ln>
+        </p:spPr>
+        <p:style>
+          <a:lnRef idx="1">
+            <a:schemeClr val="accent1"/>
+          </a:lnRef>
+          <a:fillRef idx="0">
+            <a:schemeClr val="accent1"/>
+          </a:fillRef>
+          <a:effectRef idx="0">
+            <a:schemeClr val="accent1"/>
+          </a:effectRef>
+          <a:fontRef idx="minor">
+            <a:schemeClr val="tx1"/>
+          </a:fontRef>
+        </p:style>
+      </p:cxnSp>
+      <p:cxnSp>
+        <p:nvCxnSpPr>
+          <p:cNvPr id="103" name="Straight Connector 102"/>
+          <p:cNvCxnSpPr/>
+          <p:nvPr/>
+        </p:nvCxnSpPr>
+        <p:spPr>
+          <a:xfrm flipH="1">
+            <a:off x="4234373" y="2928512"/>
+            <a:ext cx="375949" cy="280341"/>
+          </a:xfrm>
+          <a:prstGeom prst="line">
+            <a:avLst/>
+          </a:prstGeom>
+          <a:ln w="19050">
+            <a:solidFill>
+              <a:schemeClr val="tx1"/>
+            </a:solidFill>
+          </a:ln>
+        </p:spPr>
+        <p:style>
+          <a:lnRef idx="1">
+            <a:schemeClr val="accent1"/>
+          </a:lnRef>
+          <a:fillRef idx="0">
+            <a:schemeClr val="accent1"/>
+          </a:fillRef>
+          <a:effectRef idx="0">
+            <a:schemeClr val="accent1"/>
+          </a:effectRef>
+          <a:fontRef idx="minor">
+            <a:schemeClr val="tx1"/>
+          </a:fontRef>
+        </p:style>
+      </p:cxnSp>
+      <p:cxnSp>
+        <p:nvCxnSpPr>
+          <p:cNvPr id="104" name="Straight Connector 103"/>
+          <p:cNvCxnSpPr/>
+          <p:nvPr/>
+        </p:nvCxnSpPr>
+        <p:spPr>
+          <a:xfrm>
+            <a:off x="4234373" y="2928512"/>
+            <a:ext cx="372621" cy="286063"/>
+          </a:xfrm>
+          <a:prstGeom prst="line">
+            <a:avLst/>
+          </a:prstGeom>
+          <a:ln w="19050">
+            <a:solidFill>
+              <a:schemeClr val="tx1"/>
+            </a:solidFill>
+          </a:ln>
+        </p:spPr>
+        <p:style>
+          <a:lnRef idx="1">
+            <a:schemeClr val="accent1"/>
+          </a:lnRef>
+          <a:fillRef idx="0">
+            <a:schemeClr val="accent1"/>
+          </a:fillRef>
+          <a:effectRef idx="0">
+            <a:schemeClr val="accent1"/>
+          </a:effectRef>
+          <a:fontRef idx="minor">
+            <a:schemeClr val="tx1"/>
+          </a:fontRef>
+        </p:style>
+      </p:cxnSp>
+      <p:cxnSp>
+        <p:nvCxnSpPr>
+          <p:cNvPr id="46" name="Straight Connector 45"/>
+          <p:cNvCxnSpPr/>
+          <p:nvPr/>
+        </p:nvCxnSpPr>
+        <p:spPr>
+          <a:xfrm>
+            <a:off x="6136621" y="1344207"/>
+            <a:ext cx="0" cy="324730"/>
+          </a:xfrm>
+          <a:prstGeom prst="line">
+            <a:avLst/>
+          </a:prstGeom>
+          <a:ln w="38100">
+            <a:solidFill>
+              <a:schemeClr val="tx1"/>
+            </a:solidFill>
+            <a:headEnd type="triangle" w="med" len="med"/>
+            <a:tailEnd type="triangle" w="med" len="med"/>
+          </a:ln>
+        </p:spPr>
+        <p:style>
+          <a:lnRef idx="1">
+            <a:schemeClr val="accent1"/>
+          </a:lnRef>
+          <a:fillRef idx="0">
+            <a:schemeClr val="accent1"/>
+          </a:fillRef>
+          <a:effectRef idx="0">
+            <a:schemeClr val="accent1"/>
+          </a:effectRef>
+          <a:fontRef idx="minor">
+            <a:schemeClr val="tx1"/>
+          </a:fontRef>
+        </p:style>
+      </p:cxnSp>
+      <p:cxnSp>
+        <p:nvCxnSpPr>
+          <p:cNvPr id="107" name="Straight Connector 106"/>
+          <p:cNvCxnSpPr/>
+          <p:nvPr/>
+        </p:nvCxnSpPr>
+        <p:spPr>
+          <a:xfrm>
+            <a:off x="5804137" y="2933569"/>
+            <a:ext cx="0" cy="286063"/>
+          </a:xfrm>
+          <a:prstGeom prst="line">
+            <a:avLst/>
+          </a:prstGeom>
+          <a:ln w="19050">
+            <a:solidFill>
+              <a:schemeClr val="tx1"/>
+            </a:solidFill>
+          </a:ln>
+        </p:spPr>
+        <p:style>
+          <a:lnRef idx="1">
+            <a:schemeClr val="accent1"/>
+          </a:lnRef>
+          <a:fillRef idx="0">
+            <a:schemeClr val="accent1"/>
+          </a:fillRef>
+          <a:effectRef idx="0">
+            <a:schemeClr val="accent1"/>
+          </a:effectRef>
+          <a:fontRef idx="minor">
+            <a:schemeClr val="tx1"/>
+          </a:fontRef>
+        </p:style>
+      </p:cxnSp>
+      <p:cxnSp>
+        <p:nvCxnSpPr>
+          <p:cNvPr id="108" name="Straight Connector 107"/>
+          <p:cNvCxnSpPr/>
+          <p:nvPr/>
+        </p:nvCxnSpPr>
+        <p:spPr>
+          <a:xfrm>
+            <a:off x="6562688" y="2933569"/>
+            <a:ext cx="0" cy="286063"/>
+          </a:xfrm>
+          <a:prstGeom prst="line">
+            <a:avLst/>
+          </a:prstGeom>
+          <a:ln w="19050">
+            <a:solidFill>
+              <a:schemeClr val="tx1"/>
+            </a:solidFill>
+          </a:ln>
+        </p:spPr>
+        <p:style>
+          <a:lnRef idx="1">
+            <a:schemeClr val="accent1"/>
+          </a:lnRef>
+          <a:fillRef idx="0">
+            <a:schemeClr val="accent1"/>
+          </a:fillRef>
+          <a:effectRef idx="0">
+            <a:schemeClr val="accent1"/>
+          </a:effectRef>
+          <a:fontRef idx="minor">
+            <a:schemeClr val="tx1"/>
+          </a:fontRef>
+        </p:style>
+      </p:cxnSp>
+      <p:cxnSp>
+        <p:nvCxnSpPr>
+          <p:cNvPr id="109" name="Straight Connector 108"/>
+          <p:cNvCxnSpPr/>
+          <p:nvPr/>
+        </p:nvCxnSpPr>
+        <p:spPr>
+          <a:xfrm flipH="1">
+            <a:off x="5937725" y="2939290"/>
+            <a:ext cx="375949" cy="280341"/>
+          </a:xfrm>
+          <a:prstGeom prst="line">
+            <a:avLst/>
+          </a:prstGeom>
+          <a:ln w="19050">
+            <a:solidFill>
+              <a:schemeClr val="tx1"/>
+            </a:solidFill>
+          </a:ln>
+        </p:spPr>
+        <p:style>
+          <a:lnRef idx="1">
+            <a:schemeClr val="accent1"/>
+          </a:lnRef>
+          <a:fillRef idx="0">
+            <a:schemeClr val="accent1"/>
+          </a:fillRef>
+          <a:effectRef idx="0">
+            <a:schemeClr val="accent1"/>
+          </a:effectRef>
+          <a:fontRef idx="minor">
+            <a:schemeClr val="tx1"/>
+          </a:fontRef>
+        </p:style>
+      </p:cxnSp>
+      <p:cxnSp>
+        <p:nvCxnSpPr>
+          <p:cNvPr id="110" name="Straight Connector 109"/>
+          <p:cNvCxnSpPr/>
+          <p:nvPr/>
+        </p:nvCxnSpPr>
+        <p:spPr>
+          <a:xfrm>
+            <a:off x="5937725" y="2939290"/>
+            <a:ext cx="372621" cy="286063"/>
+          </a:xfrm>
+          <a:prstGeom prst="line">
+            <a:avLst/>
+          </a:prstGeom>
+          <a:ln w="19050">
+            <a:solidFill>
+              <a:schemeClr val="tx1"/>
+            </a:solidFill>
+          </a:ln>
+        </p:spPr>
+        <p:style>
+          <a:lnRef idx="1">
+            <a:schemeClr val="accent1"/>
+          </a:lnRef>
+          <a:fillRef idx="0">
+            <a:schemeClr val="accent1"/>
+          </a:fillRef>
+          <a:effectRef idx="0">
+            <a:schemeClr val="accent1"/>
+          </a:effectRef>
+          <a:fontRef idx="minor">
+            <a:schemeClr val="tx1"/>
+          </a:fontRef>
+        </p:style>
+      </p:cxnSp>
+      <p:cxnSp>
+        <p:nvCxnSpPr>
+          <p:cNvPr id="64" name="Straight Connector 63"/>
+          <p:cNvCxnSpPr/>
+          <p:nvPr/>
+        </p:nvCxnSpPr>
+        <p:spPr>
+          <a:xfrm>
+            <a:off x="4552239" y="1319697"/>
+            <a:ext cx="0" cy="310523"/>
+          </a:xfrm>
+          <a:prstGeom prst="line">
+            <a:avLst/>
+          </a:prstGeom>
+          <a:ln w="38100">
+            <a:solidFill>
+              <a:schemeClr val="tx1"/>
+            </a:solidFill>
+            <a:headEnd type="triangle" w="med" len="med"/>
+            <a:tailEnd type="triangle" w="med" len="med"/>
+          </a:ln>
+        </p:spPr>
+        <p:style>
+          <a:lnRef idx="1">
+            <a:schemeClr val="accent1"/>
+          </a:lnRef>
+          <a:fillRef idx="0">
+            <a:schemeClr val="accent1"/>
+          </a:fillRef>
+          <a:effectRef idx="0">
+            <a:schemeClr val="accent1"/>
+          </a:effectRef>
+          <a:fontRef idx="minor">
+            <a:schemeClr val="tx1"/>
+          </a:fontRef>
+        </p:style>
+      </p:cxnSp>
+      <p:cxnSp>
+        <p:nvCxnSpPr>
+          <p:cNvPr id="35" name="Straight Connector 34"/>
+          <p:cNvCxnSpPr/>
+          <p:nvPr/>
+        </p:nvCxnSpPr>
+        <p:spPr>
+          <a:xfrm>
+            <a:off x="8402214" y="1956333"/>
+            <a:ext cx="977609" cy="658782"/>
+          </a:xfrm>
+          <a:prstGeom prst="line">
+            <a:avLst/>
+          </a:prstGeom>
+          <a:ln w="19050">
+            <a:solidFill>
+              <a:schemeClr val="tx1"/>
+            </a:solidFill>
+          </a:ln>
+        </p:spPr>
+        <p:style>
+          <a:lnRef idx="1">
+            <a:schemeClr val="accent1"/>
+          </a:lnRef>
+          <a:fillRef idx="0">
+            <a:schemeClr val="accent1"/>
+          </a:fillRef>
+          <a:effectRef idx="0">
+            <a:schemeClr val="accent1"/>
+          </a:effectRef>
+          <a:fontRef idx="minor">
+            <a:schemeClr val="tx1"/>
+          </a:fontRef>
+        </p:style>
+      </p:cxnSp>
+      <p:cxnSp>
+        <p:nvCxnSpPr>
+          <p:cNvPr id="36" name="Straight Connector 35"/>
+          <p:cNvCxnSpPr/>
+          <p:nvPr/>
+        </p:nvCxnSpPr>
+        <p:spPr>
+          <a:xfrm>
+            <a:off x="8402212" y="1315169"/>
+            <a:ext cx="0" cy="310523"/>
+          </a:xfrm>
+          <a:prstGeom prst="line">
+            <a:avLst/>
+          </a:prstGeom>
+          <a:ln w="38100">
+            <a:solidFill>
+              <a:schemeClr val="tx1"/>
+            </a:solidFill>
+            <a:headEnd type="triangle" w="med" len="med"/>
+            <a:tailEnd type="triangle" w="med" len="med"/>
+          </a:ln>
+        </p:spPr>
+        <p:style>
+          <a:lnRef idx="1">
+            <a:schemeClr val="accent1"/>
+          </a:lnRef>
+          <a:fillRef idx="0">
+            <a:schemeClr val="accent1"/>
+          </a:fillRef>
+          <a:effectRef idx="0">
+            <a:schemeClr val="accent1"/>
+          </a:effectRef>
+          <a:fontRef idx="minor">
+            <a:schemeClr val="tx1"/>
+          </a:fontRef>
+        </p:style>
+      </p:cxnSp>
+      <p:cxnSp>
+        <p:nvCxnSpPr>
+          <p:cNvPr id="37" name="Straight Connector 36"/>
+          <p:cNvCxnSpPr/>
+          <p:nvPr/>
+        </p:nvCxnSpPr>
+        <p:spPr>
+          <a:xfrm flipH="1">
+            <a:off x="7456367" y="1956333"/>
+            <a:ext cx="945847" cy="640345"/>
+          </a:xfrm>
+          <a:prstGeom prst="line">
+            <a:avLst/>
+          </a:prstGeom>
+          <a:ln w="19050">
+            <a:solidFill>
+              <a:schemeClr val="tx1"/>
+            </a:solidFill>
+          </a:ln>
+        </p:spPr>
+        <p:style>
+          <a:lnRef idx="1">
+            <a:schemeClr val="accent1"/>
+          </a:lnRef>
+          <a:fillRef idx="0">
+            <a:schemeClr val="accent1"/>
+          </a:fillRef>
+          <a:effectRef idx="0">
+            <a:schemeClr val="accent1"/>
+          </a:effectRef>
+          <a:fontRef idx="minor">
+            <a:schemeClr val="tx1"/>
+          </a:fontRef>
+        </p:style>
+      </p:cxnSp>
+      <p:cxnSp>
+        <p:nvCxnSpPr>
+          <p:cNvPr id="41" name="Straight Connector 40"/>
+          <p:cNvCxnSpPr/>
+          <p:nvPr/>
+        </p:nvCxnSpPr>
+        <p:spPr>
+          <a:xfrm>
+            <a:off x="9379823" y="2941228"/>
+            <a:ext cx="0" cy="258469"/>
+          </a:xfrm>
+          <a:prstGeom prst="line">
+            <a:avLst/>
+          </a:prstGeom>
+          <a:ln w="19050">
+            <a:solidFill>
+              <a:schemeClr val="tx1"/>
+            </a:solidFill>
+          </a:ln>
+        </p:spPr>
+        <p:style>
+          <a:lnRef idx="1">
+            <a:schemeClr val="accent1"/>
+          </a:lnRef>
+          <a:fillRef idx="0">
+            <a:schemeClr val="accent1"/>
+          </a:fillRef>
+          <a:effectRef idx="0">
+            <a:schemeClr val="accent1"/>
+          </a:effectRef>
+          <a:fontRef idx="minor">
+            <a:schemeClr val="tx1"/>
+          </a:fontRef>
+        </p:style>
+      </p:cxnSp>
+      <p:cxnSp>
+        <p:nvCxnSpPr>
+          <p:cNvPr id="44" name="Straight Connector 43"/>
+          <p:cNvCxnSpPr/>
+          <p:nvPr/>
+        </p:nvCxnSpPr>
+        <p:spPr>
+          <a:xfrm>
+            <a:off x="7456367" y="2922791"/>
+            <a:ext cx="0" cy="304775"/>
+          </a:xfrm>
+          <a:prstGeom prst="line">
+            <a:avLst/>
+          </a:prstGeom>
+          <a:ln w="19050">
+            <a:solidFill>
+              <a:schemeClr val="tx1"/>
+            </a:solidFill>
+          </a:ln>
+        </p:spPr>
+        <p:style>
+          <a:lnRef idx="1">
+            <a:schemeClr val="accent1"/>
+          </a:lnRef>
+          <a:fillRef idx="0">
+            <a:schemeClr val="accent1"/>
+          </a:fillRef>
+          <a:effectRef idx="0">
+            <a:schemeClr val="accent1"/>
+          </a:effectRef>
+          <a:fontRef idx="minor">
+            <a:schemeClr val="tx1"/>
+          </a:fontRef>
+        </p:style>
+      </p:cxnSp>
+      <p:sp>
+        <p:nvSpPr>
+          <p:cNvPr id="57" name="Rectangle 56"/>
+          <p:cNvSpPr/>
+          <p:nvPr/>
+        </p:nvSpPr>
+        <p:spPr>
+          <a:xfrm>
+            <a:off x="8149872" y="1630220"/>
+            <a:ext cx="504684" cy="326113"/>
+          </a:xfrm>
+          <a:prstGeom prst="rect">
+            <a:avLst/>
+          </a:prstGeom>
+          <a:solidFill>
+            <a:schemeClr val="bg2">
+              <a:lumMod val="90000"/>
+            </a:schemeClr>
+          </a:solidFill>
+          <a:ln>
+            <a:solidFill>
+              <a:schemeClr val="tx1"/>
+            </a:solidFill>
+          </a:ln>
+        </p:spPr>
+        <p:style>
+          <a:lnRef idx="2">
+            <a:schemeClr val="accent1">
+              <a:shade val="50000"/>
+            </a:schemeClr>
+          </a:lnRef>
+          <a:fillRef idx="1">
+            <a:schemeClr val="accent1"/>
+          </a:fillRef>
+          <a:effectRef idx="0">
+            <a:schemeClr val="accent1"/>
+          </a:effectRef>
+          <a:fontRef idx="minor">
+            <a:schemeClr val="lt1"/>
+          </a:fontRef>
+        </p:style>
+        <p:txBody>
+          <a:bodyPr rtlCol="0" anchor="ctr"/>
+          <a:lstStyle/>
+          <a:p>
+            <a:pPr algn="ctr"/>
+            <a:r>
+              <a:rPr lang="en-US" sz="2000" dirty="0" smtClean="0">
+                <a:solidFill>
+                  <a:schemeClr val="tx1"/>
+                </a:solidFill>
+              </a:rPr>
+              <a:t>S</a:t>
+            </a:r>
+            <a:endParaRPr lang="en-US" sz="2000" dirty="0">
+              <a:solidFill>
+                <a:schemeClr val="tx1"/>
+              </a:solidFill>
+            </a:endParaRPr>
+          </a:p>
+        </p:txBody>
+      </p:sp>
+      <p:sp>
+        <p:nvSpPr>
+          <p:cNvPr id="58" name="Rectangle 57"/>
+          <p:cNvSpPr/>
+          <p:nvPr/>
+        </p:nvSpPr>
+        <p:spPr>
+          <a:xfrm>
+            <a:off x="9127481" y="2615115"/>
+            <a:ext cx="504684" cy="326113"/>
+          </a:xfrm>
+          <a:prstGeom prst="rect">
+            <a:avLst/>
+          </a:prstGeom>
+          <a:solidFill>
+            <a:schemeClr val="bg2">
+              <a:lumMod val="90000"/>
+            </a:schemeClr>
+          </a:solidFill>
+          <a:ln>
+            <a:solidFill>
+              <a:schemeClr val="tx1"/>
+            </a:solidFill>
+          </a:ln>
+        </p:spPr>
+        <p:style>
+          <a:lnRef idx="2">
+            <a:schemeClr val="accent1">
+              <a:shade val="50000"/>
+            </a:schemeClr>
+          </a:lnRef>
+          <a:fillRef idx="1">
+            <a:schemeClr val="accent1"/>
+          </a:fillRef>
+          <a:effectRef idx="0">
+            <a:schemeClr val="accent1"/>
+          </a:effectRef>
+          <a:fontRef idx="minor">
+            <a:schemeClr val="lt1"/>
+          </a:fontRef>
+        </p:style>
+        <p:txBody>
+          <a:bodyPr rtlCol="0" anchor="ctr"/>
+          <a:lstStyle/>
+          <a:p>
+            <a:pPr algn="ctr"/>
+            <a:r>
+              <a:rPr lang="en-US" sz="2000" dirty="0" smtClean="0">
+                <a:solidFill>
+                  <a:schemeClr val="tx1"/>
+                </a:solidFill>
+              </a:rPr>
+              <a:t>AL</a:t>
+            </a:r>
+            <a:endParaRPr lang="en-US" sz="2000" dirty="0">
+              <a:solidFill>
+                <a:schemeClr val="tx1"/>
+              </a:solidFill>
+            </a:endParaRPr>
+          </a:p>
+        </p:txBody>
+      </p:sp>
+      <p:sp>
+        <p:nvSpPr>
+          <p:cNvPr id="60" name="Rectangle 59"/>
+          <p:cNvSpPr/>
+          <p:nvPr/>
+        </p:nvSpPr>
+        <p:spPr>
+          <a:xfrm>
+            <a:off x="7204025" y="2596678"/>
+            <a:ext cx="504684" cy="326113"/>
+          </a:xfrm>
+          <a:prstGeom prst="rect">
+            <a:avLst/>
+          </a:prstGeom>
+          <a:solidFill>
+            <a:schemeClr val="bg2">
+              <a:lumMod val="90000"/>
+            </a:schemeClr>
+          </a:solidFill>
+          <a:ln>
+            <a:solidFill>
+              <a:schemeClr val="tx1"/>
+            </a:solidFill>
+          </a:ln>
+        </p:spPr>
+        <p:style>
+          <a:lnRef idx="2">
+            <a:schemeClr val="accent1">
+              <a:shade val="50000"/>
+            </a:schemeClr>
+          </a:lnRef>
+          <a:fillRef idx="1">
+            <a:schemeClr val="accent1"/>
+          </a:fillRef>
+          <a:effectRef idx="0">
+            <a:schemeClr val="accent1"/>
+          </a:effectRef>
+          <a:fontRef idx="minor">
+            <a:schemeClr val="lt1"/>
+          </a:fontRef>
+        </p:style>
+        <p:txBody>
+          <a:bodyPr rtlCol="0" anchor="ctr"/>
+          <a:lstStyle/>
+          <a:p>
+            <a:pPr algn="ctr"/>
+            <a:r>
+              <a:rPr lang="en-US" sz="2000" dirty="0" smtClean="0">
+                <a:solidFill>
+                  <a:schemeClr val="tx1"/>
+                </a:solidFill>
+              </a:rPr>
+              <a:t>AG</a:t>
+            </a:r>
+            <a:endParaRPr lang="en-US" sz="2000" dirty="0">
+              <a:solidFill>
+                <a:schemeClr val="tx1"/>
+              </a:solidFill>
+            </a:endParaRPr>
+          </a:p>
+        </p:txBody>
+      </p:sp>
+      <p:sp>
+        <p:nvSpPr>
+          <p:cNvPr id="61" name="Rectangle 60"/>
+          <p:cNvSpPr/>
+          <p:nvPr/>
+        </p:nvSpPr>
+        <p:spPr>
+          <a:xfrm>
+            <a:off x="9127481" y="3199697"/>
+            <a:ext cx="504684" cy="326113"/>
+          </a:xfrm>
+          <a:prstGeom prst="rect">
+            <a:avLst/>
+          </a:prstGeom>
+          <a:solidFill>
+            <a:schemeClr val="bg2">
+              <a:lumMod val="90000"/>
+            </a:schemeClr>
+          </a:solidFill>
+          <a:ln>
+            <a:solidFill>
+              <a:schemeClr val="tx1"/>
+            </a:solidFill>
+          </a:ln>
+        </p:spPr>
+        <p:style>
+          <a:lnRef idx="2">
+            <a:schemeClr val="accent1">
+              <a:shade val="50000"/>
+            </a:schemeClr>
+          </a:lnRef>
+          <a:fillRef idx="1">
+            <a:schemeClr val="accent1"/>
+          </a:fillRef>
+          <a:effectRef idx="0">
+            <a:schemeClr val="accent1"/>
+          </a:effectRef>
+          <a:fontRef idx="minor">
+            <a:schemeClr val="lt1"/>
+          </a:fontRef>
+        </p:style>
+        <p:txBody>
+          <a:bodyPr rtlCol="0" anchor="ctr"/>
+          <a:lstStyle/>
+          <a:p>
+            <a:pPr algn="ctr"/>
+            <a:r>
+              <a:rPr lang="en-US" sz="2000" dirty="0" smtClean="0">
+                <a:solidFill>
+                  <a:schemeClr val="tx1"/>
+                </a:solidFill>
+              </a:rPr>
+              <a:t>TL</a:t>
+            </a:r>
+            <a:endParaRPr lang="en-US" sz="2000" dirty="0">
+              <a:solidFill>
+                <a:schemeClr val="tx1"/>
+              </a:solidFill>
+            </a:endParaRPr>
+          </a:p>
+        </p:txBody>
+      </p:sp>
+      <p:sp>
+        <p:nvSpPr>
+          <p:cNvPr id="62" name="Rectangle 61"/>
+          <p:cNvSpPr/>
+          <p:nvPr/>
+        </p:nvSpPr>
+        <p:spPr>
+          <a:xfrm>
+            <a:off x="7204025" y="3227566"/>
+            <a:ext cx="504684" cy="326113"/>
+          </a:xfrm>
+          <a:prstGeom prst="rect">
+            <a:avLst/>
+          </a:prstGeom>
+          <a:solidFill>
+            <a:schemeClr val="bg2">
+              <a:lumMod val="90000"/>
+            </a:schemeClr>
+          </a:solidFill>
+          <a:ln>
+            <a:solidFill>
+              <a:schemeClr val="tx1"/>
+            </a:solidFill>
+          </a:ln>
+        </p:spPr>
+        <p:style>
+          <a:lnRef idx="2">
+            <a:schemeClr val="accent1">
+              <a:shade val="50000"/>
+            </a:schemeClr>
+          </a:lnRef>
+          <a:fillRef idx="1">
+            <a:schemeClr val="accent1"/>
+          </a:fillRef>
+          <a:effectRef idx="0">
+            <a:schemeClr val="accent1"/>
+          </a:effectRef>
+          <a:fontRef idx="minor">
+            <a:schemeClr val="lt1"/>
+          </a:fontRef>
+        </p:style>
+        <p:txBody>
+          <a:bodyPr rtlCol="0" anchor="ctr"/>
+          <a:lstStyle/>
+          <a:p>
+            <a:pPr algn="ctr"/>
+            <a:r>
+              <a:rPr lang="en-US" sz="2000" dirty="0" smtClean="0">
+                <a:solidFill>
+                  <a:schemeClr val="tx1"/>
+                </a:solidFill>
+              </a:rPr>
+              <a:t>TG</a:t>
+            </a:r>
+            <a:endParaRPr lang="en-US" sz="2000" dirty="0">
+              <a:solidFill>
+                <a:schemeClr val="tx1"/>
+              </a:solidFill>
+            </a:endParaRPr>
+          </a:p>
+        </p:txBody>
+      </p:sp>
+      <p:sp>
+        <p:nvSpPr>
+          <p:cNvPr id="63" name="Rectangle 62"/>
+          <p:cNvSpPr/>
+          <p:nvPr/>
+        </p:nvSpPr>
+        <p:spPr>
+          <a:xfrm>
+            <a:off x="4299897" y="1630220"/>
+            <a:ext cx="504684" cy="326113"/>
+          </a:xfrm>
+          <a:prstGeom prst="rect">
+            <a:avLst/>
+          </a:prstGeom>
+          <a:solidFill>
+            <a:schemeClr val="bg2">
+              <a:lumMod val="90000"/>
+            </a:schemeClr>
+          </a:solidFill>
+          <a:ln>
+            <a:solidFill>
+              <a:schemeClr val="tx1"/>
+            </a:solidFill>
+          </a:ln>
+        </p:spPr>
+        <p:style>
+          <a:lnRef idx="2">
+            <a:schemeClr val="accent1">
+              <a:shade val="50000"/>
+            </a:schemeClr>
+          </a:lnRef>
+          <a:fillRef idx="1">
+            <a:schemeClr val="accent1"/>
+          </a:fillRef>
+          <a:effectRef idx="0">
+            <a:schemeClr val="accent1"/>
+          </a:effectRef>
+          <a:fontRef idx="minor">
+            <a:schemeClr val="lt1"/>
+          </a:fontRef>
+        </p:style>
+        <p:txBody>
+          <a:bodyPr rtlCol="0" anchor="ctr"/>
+          <a:lstStyle/>
+          <a:p>
+            <a:pPr algn="ctr"/>
+            <a:r>
+              <a:rPr lang="en-US" sz="2000" dirty="0" smtClean="0">
+                <a:solidFill>
+                  <a:schemeClr val="tx1"/>
+                </a:solidFill>
+              </a:rPr>
+              <a:t>S1</a:t>
+            </a:r>
+            <a:endParaRPr lang="en-US" sz="2000" dirty="0">
+              <a:solidFill>
+                <a:schemeClr val="tx1"/>
+              </a:solidFill>
+            </a:endParaRPr>
+          </a:p>
+        </p:txBody>
+      </p:sp>
+      <p:sp>
+        <p:nvSpPr>
+          <p:cNvPr id="65" name="Rectangle 64"/>
+          <p:cNvSpPr/>
+          <p:nvPr/>
+        </p:nvSpPr>
+        <p:spPr>
+          <a:xfrm>
+            <a:off x="5878132" y="1668937"/>
+            <a:ext cx="504684" cy="326113"/>
+          </a:xfrm>
+          <a:prstGeom prst="rect">
+            <a:avLst/>
+          </a:prstGeom>
+          <a:solidFill>
+            <a:schemeClr val="bg2">
+              <a:lumMod val="90000"/>
+            </a:schemeClr>
+          </a:solidFill>
+          <a:ln>
+            <a:solidFill>
+              <a:schemeClr val="tx1"/>
+            </a:solidFill>
+          </a:ln>
+        </p:spPr>
+        <p:style>
+          <a:lnRef idx="2">
+            <a:schemeClr val="accent1">
+              <a:shade val="50000"/>
+            </a:schemeClr>
+          </a:lnRef>
+          <a:fillRef idx="1">
+            <a:schemeClr val="accent1"/>
+          </a:fillRef>
+          <a:effectRef idx="0">
+            <a:schemeClr val="accent1"/>
+          </a:effectRef>
+          <a:fontRef idx="minor">
+            <a:schemeClr val="lt1"/>
+          </a:fontRef>
+        </p:style>
+        <p:txBody>
+          <a:bodyPr rtlCol="0" anchor="ctr"/>
+          <a:lstStyle/>
+          <a:p>
+            <a:pPr algn="ctr"/>
+            <a:r>
+              <a:rPr lang="en-US" sz="2000" dirty="0" smtClean="0">
+                <a:solidFill>
+                  <a:schemeClr val="tx1"/>
+                </a:solidFill>
+              </a:rPr>
+              <a:t>S2</a:t>
+            </a:r>
+            <a:endParaRPr lang="en-US" sz="2000" dirty="0">
+              <a:solidFill>
+                <a:schemeClr val="tx1"/>
+              </a:solidFill>
+            </a:endParaRPr>
+          </a:p>
+        </p:txBody>
+      </p:sp>
+      <p:sp>
+        <p:nvSpPr>
+          <p:cNvPr id="66" name="Rectangle 65"/>
+          <p:cNvSpPr/>
+          <p:nvPr/>
+        </p:nvSpPr>
+        <p:spPr>
+          <a:xfrm>
+            <a:off x="3848443" y="3208854"/>
+            <a:ext cx="504684" cy="326113"/>
+          </a:xfrm>
+          <a:prstGeom prst="rect">
+            <a:avLst/>
+          </a:prstGeom>
+          <a:solidFill>
+            <a:schemeClr val="bg2">
+              <a:lumMod val="90000"/>
+            </a:schemeClr>
+          </a:solidFill>
+          <a:ln>
+            <a:solidFill>
+              <a:schemeClr val="tx1"/>
+            </a:solidFill>
+          </a:ln>
+        </p:spPr>
+        <p:style>
+          <a:lnRef idx="2">
+            <a:schemeClr val="accent1">
+              <a:shade val="50000"/>
+            </a:schemeClr>
+          </a:lnRef>
+          <a:fillRef idx="1">
+            <a:schemeClr val="accent1"/>
+          </a:fillRef>
+          <a:effectRef idx="0">
+            <a:schemeClr val="accent1"/>
+          </a:effectRef>
+          <a:fontRef idx="minor">
+            <a:schemeClr val="lt1"/>
+          </a:fontRef>
+        </p:style>
+        <p:txBody>
+          <a:bodyPr rtlCol="0" anchor="ctr"/>
+          <a:lstStyle/>
+          <a:p>
+            <a:pPr algn="ctr"/>
+            <a:r>
+              <a:rPr lang="en-US" sz="2000" dirty="0" smtClean="0">
+                <a:solidFill>
+                  <a:schemeClr val="tx1"/>
+                </a:solidFill>
+              </a:rPr>
+              <a:t>T1</a:t>
+            </a:r>
+            <a:endParaRPr lang="en-US" sz="2000" dirty="0">
+              <a:solidFill>
+                <a:schemeClr val="tx1"/>
+              </a:solidFill>
+            </a:endParaRPr>
+          </a:p>
+        </p:txBody>
+      </p:sp>
+      <p:sp>
+        <p:nvSpPr>
+          <p:cNvPr id="68" name="Rectangle 67"/>
+          <p:cNvSpPr/>
+          <p:nvPr/>
+        </p:nvSpPr>
+        <p:spPr>
+          <a:xfrm>
+            <a:off x="4606994" y="3208854"/>
+            <a:ext cx="504684" cy="326113"/>
+          </a:xfrm>
+          <a:prstGeom prst="rect">
+            <a:avLst/>
+          </a:prstGeom>
+          <a:solidFill>
+            <a:schemeClr val="bg2">
+              <a:lumMod val="90000"/>
+            </a:schemeClr>
+          </a:solidFill>
+          <a:ln>
+            <a:solidFill>
+              <a:schemeClr val="tx1"/>
+            </a:solidFill>
+          </a:ln>
+        </p:spPr>
+        <p:style>
+          <a:lnRef idx="2">
+            <a:schemeClr val="accent1">
+              <a:shade val="50000"/>
+            </a:schemeClr>
+          </a:lnRef>
+          <a:fillRef idx="1">
+            <a:schemeClr val="accent1"/>
+          </a:fillRef>
+          <a:effectRef idx="0">
+            <a:schemeClr val="accent1"/>
+          </a:effectRef>
+          <a:fontRef idx="minor">
+            <a:schemeClr val="lt1"/>
+          </a:fontRef>
+        </p:style>
+        <p:txBody>
+          <a:bodyPr rtlCol="0" anchor="ctr"/>
+          <a:lstStyle/>
+          <a:p>
+            <a:pPr algn="ctr"/>
+            <a:r>
+              <a:rPr lang="en-US" sz="2000" dirty="0" smtClean="0">
+                <a:solidFill>
+                  <a:schemeClr val="tx1"/>
+                </a:solidFill>
+              </a:rPr>
+              <a:t>T2</a:t>
+            </a:r>
+            <a:endParaRPr lang="en-US" sz="2000" dirty="0">
+              <a:solidFill>
+                <a:schemeClr val="tx1"/>
+              </a:solidFill>
+            </a:endParaRPr>
+          </a:p>
+        </p:txBody>
+      </p:sp>
+      <p:sp>
+        <p:nvSpPr>
+          <p:cNvPr id="69" name="Rectangle 68"/>
+          <p:cNvSpPr/>
+          <p:nvPr/>
+        </p:nvSpPr>
+        <p:spPr>
+          <a:xfrm>
+            <a:off x="3848443" y="2596678"/>
+            <a:ext cx="504684" cy="326113"/>
+          </a:xfrm>
+          <a:prstGeom prst="rect">
+            <a:avLst/>
+          </a:prstGeom>
+          <a:solidFill>
+            <a:schemeClr val="bg2">
+              <a:lumMod val="90000"/>
+            </a:schemeClr>
+          </a:solidFill>
+          <a:ln>
+            <a:solidFill>
+              <a:schemeClr val="tx1"/>
+            </a:solidFill>
+          </a:ln>
+        </p:spPr>
+        <p:style>
+          <a:lnRef idx="2">
+            <a:schemeClr val="accent1">
+              <a:shade val="50000"/>
+            </a:schemeClr>
+          </a:lnRef>
+          <a:fillRef idx="1">
+            <a:schemeClr val="accent1"/>
+          </a:fillRef>
+          <a:effectRef idx="0">
+            <a:schemeClr val="accent1"/>
+          </a:effectRef>
+          <a:fontRef idx="minor">
+            <a:schemeClr val="lt1"/>
+          </a:fontRef>
+        </p:style>
+        <p:txBody>
+          <a:bodyPr rtlCol="0" anchor="ctr"/>
+          <a:lstStyle/>
+          <a:p>
+            <a:pPr algn="ctr"/>
+            <a:r>
+              <a:rPr lang="en-US" sz="2000" dirty="0" smtClean="0">
+                <a:solidFill>
+                  <a:schemeClr val="tx1"/>
+                </a:solidFill>
+              </a:rPr>
+              <a:t>A1</a:t>
+            </a:r>
+            <a:endParaRPr lang="en-US" sz="2000" dirty="0">
+              <a:solidFill>
+                <a:schemeClr val="tx1"/>
+              </a:solidFill>
+            </a:endParaRPr>
+          </a:p>
+        </p:txBody>
+      </p:sp>
+      <p:sp>
+        <p:nvSpPr>
+          <p:cNvPr id="70" name="Rectangle 69"/>
+          <p:cNvSpPr/>
+          <p:nvPr/>
+        </p:nvSpPr>
+        <p:spPr>
+          <a:xfrm>
+            <a:off x="4606994" y="2596678"/>
+            <a:ext cx="504684" cy="326113"/>
+          </a:xfrm>
+          <a:prstGeom prst="rect">
+            <a:avLst/>
+          </a:prstGeom>
+          <a:solidFill>
+            <a:schemeClr val="bg2">
+              <a:lumMod val="90000"/>
+            </a:schemeClr>
+          </a:solidFill>
+          <a:ln>
+            <a:solidFill>
+              <a:schemeClr val="tx1"/>
+            </a:solidFill>
+          </a:ln>
+        </p:spPr>
+        <p:style>
+          <a:lnRef idx="2">
+            <a:schemeClr val="accent1">
+              <a:shade val="50000"/>
+            </a:schemeClr>
+          </a:lnRef>
+          <a:fillRef idx="1">
+            <a:schemeClr val="accent1"/>
+          </a:fillRef>
+          <a:effectRef idx="0">
+            <a:schemeClr val="accent1"/>
+          </a:effectRef>
+          <a:fontRef idx="minor">
+            <a:schemeClr val="lt1"/>
+          </a:fontRef>
+        </p:style>
+        <p:txBody>
+          <a:bodyPr rtlCol="0" anchor="ctr"/>
+          <a:lstStyle/>
+          <a:p>
+            <a:pPr algn="ctr"/>
+            <a:r>
+              <a:rPr lang="en-US" sz="2000" dirty="0" smtClean="0">
+                <a:solidFill>
+                  <a:schemeClr val="tx1"/>
+                </a:solidFill>
+              </a:rPr>
+              <a:t>A2</a:t>
+            </a:r>
+            <a:endParaRPr lang="en-US" sz="2000" dirty="0">
+              <a:solidFill>
+                <a:schemeClr val="tx1"/>
+              </a:solidFill>
+            </a:endParaRPr>
+          </a:p>
+        </p:txBody>
+      </p:sp>
+      <p:sp>
+        <p:nvSpPr>
+          <p:cNvPr id="71" name="Rectangle 70"/>
+          <p:cNvSpPr/>
+          <p:nvPr/>
+        </p:nvSpPr>
+        <p:spPr>
+          <a:xfrm>
+            <a:off x="5551795" y="3219632"/>
+            <a:ext cx="504684" cy="326113"/>
+          </a:xfrm>
+          <a:prstGeom prst="rect">
+            <a:avLst/>
+          </a:prstGeom>
+          <a:solidFill>
+            <a:schemeClr val="bg2">
+              <a:lumMod val="90000"/>
+            </a:schemeClr>
+          </a:solidFill>
+          <a:ln>
+            <a:solidFill>
+              <a:schemeClr val="tx1"/>
+            </a:solidFill>
+          </a:ln>
+        </p:spPr>
+        <p:style>
+          <a:lnRef idx="2">
+            <a:schemeClr val="accent1">
+              <a:shade val="50000"/>
+            </a:schemeClr>
+          </a:lnRef>
+          <a:fillRef idx="1">
+            <a:schemeClr val="accent1"/>
+          </a:fillRef>
+          <a:effectRef idx="0">
+            <a:schemeClr val="accent1"/>
+          </a:effectRef>
+          <a:fontRef idx="minor">
+            <a:schemeClr val="lt1"/>
+          </a:fontRef>
+        </p:style>
+        <p:txBody>
+          <a:bodyPr rtlCol="0" anchor="ctr"/>
+          <a:lstStyle/>
+          <a:p>
+            <a:pPr algn="ctr"/>
+            <a:r>
+              <a:rPr lang="en-US" sz="2000" dirty="0" smtClean="0">
+                <a:solidFill>
+                  <a:schemeClr val="tx1"/>
+                </a:solidFill>
+              </a:rPr>
+              <a:t>T3</a:t>
+            </a:r>
+            <a:endParaRPr lang="en-US" sz="2000" dirty="0">
+              <a:solidFill>
+                <a:schemeClr val="tx1"/>
+              </a:solidFill>
+            </a:endParaRPr>
+          </a:p>
+        </p:txBody>
+      </p:sp>
+      <p:sp>
+        <p:nvSpPr>
+          <p:cNvPr id="72" name="Rectangle 71"/>
+          <p:cNvSpPr/>
+          <p:nvPr/>
+        </p:nvSpPr>
+        <p:spPr>
+          <a:xfrm>
+            <a:off x="6310346" y="3219632"/>
+            <a:ext cx="504684" cy="326113"/>
+          </a:xfrm>
+          <a:prstGeom prst="rect">
+            <a:avLst/>
+          </a:prstGeom>
+          <a:solidFill>
+            <a:schemeClr val="bg2">
+              <a:lumMod val="90000"/>
+            </a:schemeClr>
+          </a:solidFill>
+          <a:ln>
+            <a:solidFill>
+              <a:schemeClr val="tx1"/>
+            </a:solidFill>
+          </a:ln>
+        </p:spPr>
+        <p:style>
+          <a:lnRef idx="2">
+            <a:schemeClr val="accent1">
+              <a:shade val="50000"/>
+            </a:schemeClr>
+          </a:lnRef>
+          <a:fillRef idx="1">
+            <a:schemeClr val="accent1"/>
+          </a:fillRef>
+          <a:effectRef idx="0">
+            <a:schemeClr val="accent1"/>
+          </a:effectRef>
+          <a:fontRef idx="minor">
+            <a:schemeClr val="lt1"/>
+          </a:fontRef>
+        </p:style>
+        <p:txBody>
+          <a:bodyPr rtlCol="0" anchor="ctr"/>
+          <a:lstStyle/>
+          <a:p>
+            <a:pPr algn="ctr"/>
+            <a:r>
+              <a:rPr lang="en-US" sz="2000" dirty="0" smtClean="0">
+                <a:solidFill>
+                  <a:schemeClr val="tx1"/>
+                </a:solidFill>
+              </a:rPr>
+              <a:t>T4</a:t>
+            </a:r>
+            <a:endParaRPr lang="en-US" sz="2000" dirty="0">
+              <a:solidFill>
+                <a:schemeClr val="tx1"/>
+              </a:solidFill>
+            </a:endParaRPr>
+          </a:p>
+        </p:txBody>
+      </p:sp>
+      <p:sp>
+        <p:nvSpPr>
+          <p:cNvPr id="74" name="Rectangle 73"/>
+          <p:cNvSpPr/>
+          <p:nvPr/>
+        </p:nvSpPr>
+        <p:spPr>
+          <a:xfrm>
+            <a:off x="5551795" y="2607456"/>
+            <a:ext cx="504684" cy="326113"/>
+          </a:xfrm>
+          <a:prstGeom prst="rect">
+            <a:avLst/>
+          </a:prstGeom>
+          <a:solidFill>
+            <a:schemeClr val="bg2">
+              <a:lumMod val="90000"/>
+            </a:schemeClr>
+          </a:solidFill>
+          <a:ln>
+            <a:solidFill>
+              <a:schemeClr val="tx1"/>
+            </a:solidFill>
+          </a:ln>
+        </p:spPr>
+        <p:style>
+          <a:lnRef idx="2">
+            <a:schemeClr val="accent1">
+              <a:shade val="50000"/>
+            </a:schemeClr>
+          </a:lnRef>
+          <a:fillRef idx="1">
+            <a:schemeClr val="accent1"/>
+          </a:fillRef>
+          <a:effectRef idx="0">
+            <a:schemeClr val="accent1"/>
+          </a:effectRef>
+          <a:fontRef idx="minor">
+            <a:schemeClr val="lt1"/>
+          </a:fontRef>
+        </p:style>
+        <p:txBody>
+          <a:bodyPr rtlCol="0" anchor="ctr"/>
+          <a:lstStyle/>
+          <a:p>
+            <a:pPr algn="ctr"/>
+            <a:r>
+              <a:rPr lang="en-US" sz="2000" dirty="0" smtClean="0">
+                <a:solidFill>
+                  <a:schemeClr val="tx1"/>
+                </a:solidFill>
+              </a:rPr>
+              <a:t>A3</a:t>
+            </a:r>
+            <a:endParaRPr lang="en-US" sz="2000" dirty="0">
+              <a:solidFill>
+                <a:schemeClr val="tx1"/>
+              </a:solidFill>
+            </a:endParaRPr>
+          </a:p>
+        </p:txBody>
+      </p:sp>
+      <p:sp>
+        <p:nvSpPr>
+          <p:cNvPr id="75" name="Rectangle 74"/>
+          <p:cNvSpPr/>
+          <p:nvPr/>
+        </p:nvSpPr>
+        <p:spPr>
+          <a:xfrm>
+            <a:off x="6310346" y="2607456"/>
+            <a:ext cx="504684" cy="326113"/>
+          </a:xfrm>
+          <a:prstGeom prst="rect">
+            <a:avLst/>
+          </a:prstGeom>
+          <a:solidFill>
+            <a:schemeClr val="bg2">
+              <a:lumMod val="90000"/>
+            </a:schemeClr>
+          </a:solidFill>
+          <a:ln>
+            <a:solidFill>
+              <a:schemeClr val="tx1"/>
+            </a:solidFill>
+          </a:ln>
+        </p:spPr>
+        <p:style>
+          <a:lnRef idx="2">
+            <a:schemeClr val="accent1">
+              <a:shade val="50000"/>
+            </a:schemeClr>
+          </a:lnRef>
+          <a:fillRef idx="1">
+            <a:schemeClr val="accent1"/>
+          </a:fillRef>
+          <a:effectRef idx="0">
+            <a:schemeClr val="accent1"/>
+          </a:effectRef>
+          <a:fontRef idx="minor">
+            <a:schemeClr val="lt1"/>
+          </a:fontRef>
+        </p:style>
+        <p:txBody>
+          <a:bodyPr rtlCol="0" anchor="ctr"/>
+          <a:lstStyle/>
+          <a:p>
+            <a:pPr algn="ctr"/>
+            <a:r>
+              <a:rPr lang="en-US" sz="2000" dirty="0" smtClean="0">
+                <a:solidFill>
+                  <a:schemeClr val="tx1"/>
+                </a:solidFill>
+              </a:rPr>
+              <a:t>A4</a:t>
+            </a:r>
+            <a:endParaRPr lang="en-US" sz="2000" dirty="0">
+              <a:solidFill>
+                <a:schemeClr val="tx1"/>
+              </a:solidFill>
+            </a:endParaRPr>
+          </a:p>
+        </p:txBody>
+      </p:sp>
+    </p:spTree>
+    <p:extLst>
+      <p:ext uri="{BB962C8B-B14F-4D97-AF65-F5344CB8AC3E}">
+        <p14:creationId xmlns:p14="http://schemas.microsoft.com/office/powerpoint/2010/main" val="1433883102"/>
+      </p:ext>
+    </p:extLst>
+  </p:cSld>
+  <p:clrMapOvr>
+    <a:masterClrMapping/>
+  </p:clrMapOvr>
+</p:sld>
+</file>
+
 <file path=ppt/theme/theme1.xml><?xml version="1.0" encoding="utf-8"?>
 <a:theme xmlns:a="http://schemas.openxmlformats.org/drawingml/2006/main" name="Office Theme">
   <a:themeElements>

</xml_diff>

<commit_message>
make images consistent colors
</commit_message>
<xml_diff>
--- a/paper/abstraction/figures/examples.pptx
+++ b/paper/abstraction/figures/examples.pptx
@@ -6896,7 +6896,7 @@
             <a:avLst/>
           </a:prstGeom>
           <a:solidFill>
-            <a:schemeClr val="bg2"/>
+            <a:schemeClr val="bg1"/>
           </a:solidFill>
           <a:ln>
             <a:solidFill>
@@ -7009,7 +7009,7 @@
               <a:avLst/>
             </a:prstGeom>
             <a:solidFill>
-              <a:schemeClr val="bg2"/>
+              <a:schemeClr val="bg1"/>
             </a:solidFill>
             <a:ln>
               <a:solidFill>
@@ -7054,7 +7054,7 @@
           </p:nvSpPr>
           <p:spPr>
             <a:xfrm>
-              <a:off x="6943095" y="1814084"/>
+              <a:off x="6977987" y="1814084"/>
               <a:ext cx="559769" cy="338554"/>
             </a:xfrm>
             <a:prstGeom prst="rect">
@@ -7085,10 +7085,10 @@
         </p:nvGrpSpPr>
         <p:grpSpPr>
           <a:xfrm>
-            <a:off x="6293595" y="2938753"/>
-            <a:ext cx="769404" cy="654703"/>
-            <a:chOff x="6870855" y="1656010"/>
-            <a:chExt cx="769404" cy="654703"/>
+            <a:off x="6296756" y="2938753"/>
+            <a:ext cx="766243" cy="654703"/>
+            <a:chOff x="6874016" y="1656010"/>
+            <a:chExt cx="766243" cy="654703"/>
           </a:xfrm>
         </p:grpSpPr>
         <p:sp>
@@ -7106,7 +7106,7 @@
               <a:avLst/>
             </a:prstGeom>
             <a:solidFill>
-              <a:schemeClr val="bg2"/>
+              <a:schemeClr val="bg1"/>
             </a:solidFill>
             <a:ln>
               <a:solidFill>
@@ -7151,7 +7151,7 @@
           </p:nvSpPr>
           <p:spPr>
             <a:xfrm>
-              <a:off x="6870855" y="1814084"/>
+              <a:off x="6927403" y="1814084"/>
               <a:ext cx="672043" cy="338554"/>
             </a:xfrm>
             <a:prstGeom prst="rect">
@@ -7182,10 +7182,10 @@
         </p:nvGrpSpPr>
         <p:grpSpPr>
           <a:xfrm>
-            <a:off x="4568880" y="2938754"/>
-            <a:ext cx="794118" cy="654703"/>
-            <a:chOff x="6846141" y="1656010"/>
-            <a:chExt cx="794118" cy="654703"/>
+            <a:off x="4596755" y="2938754"/>
+            <a:ext cx="766243" cy="654703"/>
+            <a:chOff x="6874016" y="1656010"/>
+            <a:chExt cx="766243" cy="654703"/>
           </a:xfrm>
         </p:grpSpPr>
         <p:sp>
@@ -7203,7 +7203,7 @@
               <a:avLst/>
             </a:prstGeom>
             <a:solidFill>
-              <a:schemeClr val="bg2"/>
+              <a:schemeClr val="bg1"/>
             </a:solidFill>
             <a:ln>
               <a:solidFill>
@@ -7248,7 +7248,7 @@
           </p:nvSpPr>
           <p:spPr>
             <a:xfrm>
-              <a:off x="6846141" y="1814084"/>
+              <a:off x="6903291" y="1814084"/>
               <a:ext cx="712246" cy="338554"/>
             </a:xfrm>
             <a:prstGeom prst="rect">
@@ -7340,7 +7340,7 @@
               <a:avLst/>
             </a:prstGeom>
             <a:solidFill>
-              <a:schemeClr val="bg2"/>
+              <a:schemeClr val="bg1"/>
             </a:solidFill>
             <a:ln>
               <a:solidFill>
@@ -7385,7 +7385,7 @@
           </p:nvSpPr>
           <p:spPr>
             <a:xfrm>
-              <a:off x="6882578" y="1814084"/>
+              <a:off x="6939728" y="1814084"/>
               <a:ext cx="652807" cy="338554"/>
             </a:xfrm>
             <a:prstGeom prst="rect">
@@ -7416,10 +7416,10 @@
         </p:nvGrpSpPr>
         <p:grpSpPr>
           <a:xfrm>
-            <a:off x="4581871" y="1828540"/>
-            <a:ext cx="781127" cy="654703"/>
-            <a:chOff x="6859132" y="1656010"/>
-            <a:chExt cx="781127" cy="654703"/>
+            <a:off x="4596755" y="1828540"/>
+            <a:ext cx="766243" cy="654703"/>
+            <a:chOff x="6874016" y="1656010"/>
+            <a:chExt cx="766243" cy="654703"/>
           </a:xfrm>
         </p:grpSpPr>
         <p:sp>
@@ -7437,7 +7437,7 @@
               <a:avLst/>
             </a:prstGeom>
             <a:solidFill>
-              <a:schemeClr val="bg2"/>
+              <a:schemeClr val="bg1"/>
             </a:solidFill>
             <a:ln>
               <a:solidFill>
@@ -7482,7 +7482,7 @@
           </p:nvSpPr>
           <p:spPr>
             <a:xfrm>
-              <a:off x="6859132" y="1814084"/>
+              <a:off x="6904852" y="1814084"/>
               <a:ext cx="688650" cy="338554"/>
             </a:xfrm>
             <a:prstGeom prst="rect">
@@ -7663,8 +7663,8 @@
           </a:fontRef>
         </p:style>
       </p:cxnSp>
-      <mc:AlternateContent xmlns:mc="http://schemas.openxmlformats.org/markup-compatibility/2006" xmlns:a14="http://schemas.microsoft.com/office/drawing/2010/main">
-        <mc:Choice Requires="a14">
+      <mc:AlternateContent xmlns:mc="http://schemas.openxmlformats.org/markup-compatibility/2006">
+        <mc:Choice xmlns:a14="http://schemas.microsoft.com/office/drawing/2010/main" Requires="a14">
           <p:sp>
             <p:nvSpPr>
               <p:cNvPr id="93" name="TextBox 92"/>
@@ -7673,7 +7673,7 @@
             </p:nvSpPr>
             <p:spPr>
               <a:xfrm>
-                <a:off x="2957390" y="2014761"/>
+                <a:off x="2909262" y="2014761"/>
                 <a:ext cx="1530997" cy="276999"/>
               </a:xfrm>
               <a:prstGeom prst="rect">
@@ -7764,7 +7764,7 @@
             </p:txBody>
           </p:sp>
         </mc:Choice>
-        <mc:Fallback xmlns="">
+        <mc:Fallback>
           <p:sp>
             <p:nvSpPr>
               <p:cNvPr id="93" name="TextBox 92"/>
@@ -7775,7 +7775,7 @@
             </p:nvSpPr>
             <p:spPr>
               <a:xfrm>
-                <a:off x="2957390" y="2014761"/>
+                <a:off x="2909262" y="2014761"/>
                 <a:ext cx="1530997" cy="276999"/>
               </a:xfrm>
               <a:prstGeom prst="rect">
@@ -7803,8 +7803,8 @@
           </p:sp>
         </mc:Fallback>
       </mc:AlternateContent>
-      <mc:AlternateContent xmlns:mc="http://schemas.openxmlformats.org/markup-compatibility/2006" xmlns:a14="http://schemas.microsoft.com/office/drawing/2010/main">
-        <mc:Choice Requires="a14">
+      <mc:AlternateContent xmlns:mc="http://schemas.openxmlformats.org/markup-compatibility/2006">
+        <mc:Choice xmlns:a14="http://schemas.microsoft.com/office/drawing/2010/main" Requires="a14">
           <p:sp>
             <p:nvSpPr>
               <p:cNvPr id="94" name="TextBox 93"/>
@@ -7813,7 +7813,7 @@
             </p:nvSpPr>
             <p:spPr>
               <a:xfrm>
-                <a:off x="2974420" y="3127604"/>
+                <a:off x="2926292" y="3127604"/>
                 <a:ext cx="1462708" cy="276999"/>
               </a:xfrm>
               <a:prstGeom prst="rect">
@@ -7904,7 +7904,7 @@
             </p:txBody>
           </p:sp>
         </mc:Choice>
-        <mc:Fallback xmlns="">
+        <mc:Fallback>
           <p:sp>
             <p:nvSpPr>
               <p:cNvPr id="94" name="TextBox 93"/>
@@ -7915,7 +7915,7 @@
             </p:nvSpPr>
             <p:spPr>
               <a:xfrm>
-                <a:off x="2974420" y="3127604"/>
+                <a:off x="2926292" y="3127604"/>
                 <a:ext cx="1462708" cy="276999"/>
               </a:xfrm>
               <a:prstGeom prst="rect">
@@ -7924,7 +7924,7 @@
               <a:blipFill rotWithShape="0">
                 <a:blip r:embed="rId4"/>
                 <a:stretch>
-                  <a:fillRect l="-3750" t="-146667" r="-5417" b="-182222"/>
+                  <a:fillRect l="-3333" t="-146667" r="-5417" b="-182222"/>
                 </a:stretch>
               </a:blipFill>
             </p:spPr>
@@ -7943,8 +7943,8 @@
           </p:sp>
         </mc:Fallback>
       </mc:AlternateContent>
-      <mc:AlternateContent xmlns:mc="http://schemas.openxmlformats.org/markup-compatibility/2006" xmlns:a14="http://schemas.microsoft.com/office/drawing/2010/main">
-        <mc:Choice Requires="a14">
+      <mc:AlternateContent xmlns:mc="http://schemas.openxmlformats.org/markup-compatibility/2006">
+        <mc:Choice xmlns:a14="http://schemas.microsoft.com/office/drawing/2010/main" Requires="a14">
           <p:sp>
             <p:nvSpPr>
               <p:cNvPr id="95" name="TextBox 94"/>
@@ -7978,7 +7978,13 @@
                         <a:rPr lang="en-US" b="0" i="1" smtClean="0">
                           <a:latin typeface="Cambria Math" charset="0"/>
                         </a:rPr>
-                        <m:t>5.  </m:t>
+                        <m:t>4</m:t>
+                      </m:r>
+                      <m:r>
+                        <a:rPr lang="en-US" b="0" i="1" smtClean="0">
+                          <a:latin typeface="Cambria Math" charset="0"/>
+                        </a:rPr>
+                        <m:t>.  </m:t>
                       </m:r>
                       <m:sSub>
                         <m:sSubPr>
@@ -8019,7 +8025,7 @@
             </p:txBody>
           </p:sp>
         </mc:Choice>
-        <mc:Fallback xmlns="">
+        <mc:Fallback>
           <p:sp>
             <p:nvSpPr>
               <p:cNvPr id="95" name="TextBox 94"/>
@@ -8039,7 +8045,7 @@
               <a:blipFill rotWithShape="0">
                 <a:blip r:embed="rId5"/>
                 <a:stretch>
-                  <a:fillRect l="-5000" t="-146667" r="-7778" b="-180000"/>
+                  <a:fillRect l="-4444" t="-146667" r="-7778" b="-180000"/>
                 </a:stretch>
               </a:blipFill>
             </p:spPr>
@@ -8066,7 +8072,7 @@
         </p:nvSpPr>
         <p:spPr>
           <a:xfrm>
-            <a:off x="2916569" y="2534614"/>
+            <a:off x="2868441" y="2534614"/>
             <a:ext cx="1868268" cy="369332"/>
           </a:xfrm>
           <a:prstGeom prst="rect">
@@ -8122,8 +8128,8 @@
           </a:p>
         </p:txBody>
       </p:sp>
-      <mc:AlternateContent xmlns:mc="http://schemas.openxmlformats.org/markup-compatibility/2006" xmlns:a14="http://schemas.microsoft.com/office/drawing/2010/main">
-        <mc:Choice Requires="a14">
+      <mc:AlternateContent xmlns:mc="http://schemas.openxmlformats.org/markup-compatibility/2006">
+        <mc:Choice xmlns:a14="http://schemas.microsoft.com/office/drawing/2010/main" Requires="a14">
           <p:sp>
             <p:nvSpPr>
               <p:cNvPr id="107" name="TextBox 106"/>
@@ -8157,7 +8163,13 @@
                         <a:rPr lang="en-US" b="0" i="1" smtClean="0">
                           <a:latin typeface="Cambria Math" charset="0"/>
                         </a:rPr>
-                        <m:t>4.  </m:t>
+                        <m:t>3</m:t>
+                      </m:r>
+                      <m:r>
+                        <a:rPr lang="en-US" b="0" i="1" smtClean="0">
+                          <a:latin typeface="Cambria Math" charset="0"/>
+                        </a:rPr>
+                        <m:t>.  </m:t>
                       </m:r>
                       <m:sSub>
                         <m:sSubPr>
@@ -8198,7 +8210,7 @@
             </p:txBody>
           </p:sp>
         </mc:Choice>
-        <mc:Fallback xmlns="">
+        <mc:Fallback>
           <p:sp>
             <p:nvSpPr>
               <p:cNvPr id="107" name="TextBox 106"/>
@@ -8882,7 +8894,7 @@
         </p:nvSpPr>
         <p:spPr>
           <a:xfrm>
-            <a:off x="4752606" y="4998590"/>
+            <a:off x="4786896" y="4987160"/>
             <a:ext cx="675185" cy="338554"/>
           </a:xfrm>
           <a:prstGeom prst="rect">
@@ -8897,12 +8909,8 @@
           <a:lstStyle/>
           <a:p>
             <a:r>
-              <a:rPr lang="en-US" sz="1600" smtClean="0"/>
-              <a:t>(P1,0</a:t>
-            </a:r>
-            <a:r>
               <a:rPr lang="en-US" sz="1600" dirty="0" smtClean="0"/>
-              <a:t>)</a:t>
+              <a:t>(P1,0)</a:t>
             </a:r>
             <a:endParaRPr lang="en-US" sz="1600" dirty="0"/>
           </a:p>
@@ -8916,7 +8924,7 @@
         </p:nvSpPr>
         <p:spPr>
           <a:xfrm>
-            <a:off x="6256596" y="4998590"/>
+            <a:off x="6336606" y="4987160"/>
             <a:ext cx="675185" cy="338554"/>
           </a:xfrm>
           <a:prstGeom prst="rect">
@@ -30887,7 +30895,9 @@
             <a:prstGeom prst="ellipse">
               <a:avLst/>
             </a:prstGeom>
-            <a:grpFill/>
+            <a:solidFill>
+              <a:schemeClr val="bg1"/>
+            </a:solidFill>
             <a:ln>
               <a:solidFill>
                 <a:schemeClr val="tx1"/>

</xml_diff>

<commit_message>
update templates to include bth incremental and concrete versions
</commit_message>
<xml_diff>
--- a/paper/abstraction/figures/examples.pptx
+++ b/paper/abstraction/figures/examples.pptx
@@ -9015,10 +9015,10 @@
         </p:nvGrpSpPr>
         <p:grpSpPr>
           <a:xfrm>
-            <a:off x="2285998" y="1231464"/>
-            <a:ext cx="5343101" cy="1803292"/>
-            <a:chOff x="2285998" y="1065209"/>
-            <a:chExt cx="5343101" cy="1803292"/>
+            <a:off x="2285999" y="1231464"/>
+            <a:ext cx="4320541" cy="1803292"/>
+            <a:chOff x="2285999" y="1065209"/>
+            <a:chExt cx="4320541" cy="1803292"/>
           </a:xfrm>
         </p:grpSpPr>
         <p:sp>
@@ -9029,8 +9029,8 @@
           </p:nvSpPr>
           <p:spPr>
             <a:xfrm>
-              <a:off x="2285998" y="1065209"/>
-              <a:ext cx="5343101" cy="1803292"/>
+              <a:off x="2285999" y="1065209"/>
+              <a:ext cx="4320541" cy="1803292"/>
             </a:xfrm>
             <a:prstGeom prst="rect">
               <a:avLst/>
@@ -9068,8 +9068,8 @@
             </a:p>
           </p:txBody>
         </p:sp>
-        <mc:AlternateContent xmlns:mc="http://schemas.openxmlformats.org/markup-compatibility/2006" xmlns:a14="http://schemas.microsoft.com/office/drawing/2010/main">
-          <mc:Choice Requires="a14">
+        <mc:AlternateContent xmlns:mc="http://schemas.openxmlformats.org/markup-compatibility/2006">
+          <mc:Choice xmlns:a14="http://schemas.microsoft.com/office/drawing/2010/main" Requires="a14">
             <p:sp>
               <p:nvSpPr>
                 <p:cNvPr id="7" name="TextBox 6"/>
@@ -9078,7 +9078,7 @@
               </p:nvSpPr>
               <p:spPr>
                 <a:xfrm>
-                  <a:off x="2557585" y="1407535"/>
+                  <a:off x="2489005" y="1407535"/>
                   <a:ext cx="2799356" cy="276999"/>
                 </a:xfrm>
                 <a:prstGeom prst="rect">
@@ -9162,7 +9162,7 @@
               </p:txBody>
             </p:sp>
           </mc:Choice>
-          <mc:Fallback xmlns="">
+          <mc:Fallback>
             <p:sp>
               <p:nvSpPr>
                 <p:cNvPr id="7" name="TextBox 6"/>
@@ -9173,7 +9173,7 @@
               </p:nvSpPr>
               <p:spPr>
                 <a:xfrm>
-                  <a:off x="2557585" y="1407535"/>
+                  <a:off x="2489005" y="1407535"/>
                   <a:ext cx="2799356" cy="276999"/>
                 </a:xfrm>
                 <a:prstGeom prst="rect">
@@ -9182,7 +9182,7 @@
                 <a:blipFill rotWithShape="0">
                   <a:blip r:embed="rId2"/>
                   <a:stretch>
-                    <a:fillRect l="-2179" t="-143478" r="-2614" b="-176087"/>
+                    <a:fillRect l="-2174" t="-143478" r="-2391" b="-176087"/>
                   </a:stretch>
                 </a:blipFill>
               </p:spPr>
@@ -9201,8 +9201,8 @@
             </p:sp>
           </mc:Fallback>
         </mc:AlternateContent>
-        <mc:AlternateContent xmlns:mc="http://schemas.openxmlformats.org/markup-compatibility/2006" xmlns:a14="http://schemas.microsoft.com/office/drawing/2010/main">
-          <mc:Choice Requires="a14">
+        <mc:AlternateContent xmlns:mc="http://schemas.openxmlformats.org/markup-compatibility/2006">
+          <mc:Choice xmlns:a14="http://schemas.microsoft.com/office/drawing/2010/main" Requires="a14">
             <p:sp>
               <p:nvSpPr>
                 <p:cNvPr id="13" name="TextBox 12"/>
@@ -9211,7 +9211,7 @@
               </p:nvSpPr>
               <p:spPr>
                 <a:xfrm>
-                  <a:off x="2517480" y="2057384"/>
+                  <a:off x="2448900" y="2057384"/>
                   <a:ext cx="3405868" cy="276999"/>
                 </a:xfrm>
                 <a:prstGeom prst="rect">
@@ -9318,7 +9318,7 @@
               </p:txBody>
             </p:sp>
           </mc:Choice>
-          <mc:Fallback xmlns="">
+          <mc:Fallback>
             <p:sp>
               <p:nvSpPr>
                 <p:cNvPr id="13" name="TextBox 12"/>
@@ -9329,7 +9329,7 @@
               </p:nvSpPr>
               <p:spPr>
                 <a:xfrm>
-                  <a:off x="2517480" y="2057384"/>
+                  <a:off x="2448900" y="2057384"/>
                   <a:ext cx="3405868" cy="276999"/>
                 </a:xfrm>
                 <a:prstGeom prst="rect">
@@ -9338,7 +9338,7 @@
                 <a:blipFill rotWithShape="0">
                   <a:blip r:embed="rId3"/>
                   <a:stretch>
-                    <a:fillRect l="-894" t="-146667" b="-180000"/>
+                    <a:fillRect l="-896" t="-146667" b="-180000"/>
                   </a:stretch>
                 </a:blipFill>
               </p:spPr>
@@ -9357,8 +9357,8 @@
             </p:sp>
           </mc:Fallback>
         </mc:AlternateContent>
-        <mc:AlternateContent xmlns:mc="http://schemas.openxmlformats.org/markup-compatibility/2006" xmlns:a14="http://schemas.microsoft.com/office/drawing/2010/main">
-          <mc:Choice Requires="a14">
+        <mc:AlternateContent xmlns:mc="http://schemas.openxmlformats.org/markup-compatibility/2006">
+          <mc:Choice xmlns:a14="http://schemas.microsoft.com/office/drawing/2010/main" Requires="a14">
             <p:sp>
               <p:nvSpPr>
                 <p:cNvPr id="14" name="TextBox 13"/>
@@ -9367,7 +9367,7 @@
               </p:nvSpPr>
               <p:spPr>
                 <a:xfrm>
-                  <a:off x="3345827" y="2376630"/>
+                  <a:off x="3277247" y="2376630"/>
                   <a:ext cx="2606547" cy="276999"/>
                 </a:xfrm>
                 <a:prstGeom prst="rect">
@@ -9468,7 +9468,7 @@
               </p:txBody>
             </p:sp>
           </mc:Choice>
-          <mc:Fallback xmlns="">
+          <mc:Fallback>
             <p:sp>
               <p:nvSpPr>
                 <p:cNvPr id="14" name="TextBox 13"/>
@@ -9479,7 +9479,7 @@
               </p:nvSpPr>
               <p:spPr>
                 <a:xfrm>
-                  <a:off x="3345827" y="2376630"/>
+                  <a:off x="3277247" y="2376630"/>
                   <a:ext cx="2606547" cy="276999"/>
                 </a:xfrm>
                 <a:prstGeom prst="rect">
@@ -9507,8 +9507,8 @@
             </p:sp>
           </mc:Fallback>
         </mc:AlternateContent>
-        <mc:AlternateContent xmlns:mc="http://schemas.openxmlformats.org/markup-compatibility/2006" xmlns:a14="http://schemas.microsoft.com/office/drawing/2010/main">
-          <mc:Choice Requires="a14">
+        <mc:AlternateContent xmlns:mc="http://schemas.openxmlformats.org/markup-compatibility/2006">
+          <mc:Choice xmlns:a14="http://schemas.microsoft.com/office/drawing/2010/main" Requires="a14">
             <p:sp>
               <p:nvSpPr>
                 <p:cNvPr id="17" name="TextBox 16"/>
@@ -9517,7 +9517,7 @@
               </p:nvSpPr>
               <p:spPr>
                 <a:xfrm>
-                  <a:off x="2577178" y="1735302"/>
+                  <a:off x="2508598" y="1735302"/>
                   <a:ext cx="3519553" cy="276999"/>
                 </a:xfrm>
                 <a:prstGeom prst="rect">
@@ -9625,7 +9625,7 @@
               </p:txBody>
             </p:sp>
           </mc:Choice>
-          <mc:Fallback xmlns="">
+          <mc:Fallback>
             <p:sp>
               <p:nvSpPr>
                 <p:cNvPr id="17" name="TextBox 16"/>
@@ -9636,7 +9636,7 @@
               </p:nvSpPr>
               <p:spPr>
                 <a:xfrm>
-                  <a:off x="2577178" y="1735302"/>
+                  <a:off x="2508598" y="1735302"/>
                   <a:ext cx="3519553" cy="276999"/>
                 </a:xfrm>
                 <a:prstGeom prst="rect">
@@ -9664,8 +9664,8 @@
             </p:sp>
           </mc:Fallback>
         </mc:AlternateContent>
-        <mc:AlternateContent xmlns:mc="http://schemas.openxmlformats.org/markup-compatibility/2006" xmlns:a14="http://schemas.microsoft.com/office/drawing/2010/main">
-          <mc:Choice Requires="a14">
+        <mc:AlternateContent xmlns:mc="http://schemas.openxmlformats.org/markup-compatibility/2006">
+          <mc:Choice xmlns:a14="http://schemas.microsoft.com/office/drawing/2010/main" Requires="a14">
             <p:sp>
               <p:nvSpPr>
                 <p:cNvPr id="18" name="TextBox 17"/>
@@ -9674,7 +9674,7 @@
               </p:nvSpPr>
               <p:spPr>
                 <a:xfrm>
-                  <a:off x="3381686" y="2544563"/>
+                  <a:off x="3313106" y="2544563"/>
                   <a:ext cx="226023" cy="276999"/>
                 </a:xfrm>
                 <a:prstGeom prst="rect">
@@ -9709,7 +9709,7 @@
               </p:txBody>
             </p:sp>
           </mc:Choice>
-          <mc:Fallback xmlns="">
+          <mc:Fallback>
             <p:sp>
               <p:nvSpPr>
                 <p:cNvPr id="18" name="TextBox 17"/>
@@ -9720,7 +9720,7 @@
               </p:nvSpPr>
               <p:spPr>
                 <a:xfrm>
-                  <a:off x="3381686" y="2544563"/>
+                  <a:off x="3313106" y="2544563"/>
                   <a:ext cx="226023" cy="276999"/>
                 </a:xfrm>
                 <a:prstGeom prst="rect">
@@ -9758,9 +9758,9 @@
         <p:grpSpPr>
           <a:xfrm>
             <a:off x="2285997" y="3134109"/>
-            <a:ext cx="5335667" cy="2866454"/>
+            <a:ext cx="4320543" cy="2866454"/>
             <a:chOff x="2285998" y="3281427"/>
-            <a:chExt cx="5335667" cy="2866454"/>
+            <a:chExt cx="4320543" cy="2866454"/>
           </a:xfrm>
         </p:grpSpPr>
         <p:sp>
@@ -9772,7 +9772,7 @@
           <p:spPr>
             <a:xfrm>
               <a:off x="2285998" y="3281427"/>
-              <a:ext cx="5335667" cy="2866454"/>
+              <a:ext cx="4320543" cy="2866454"/>
             </a:xfrm>
             <a:prstGeom prst="rect">
               <a:avLst/>
@@ -9810,8 +9810,8 @@
             </a:p>
           </p:txBody>
         </p:sp>
-        <mc:AlternateContent xmlns:mc="http://schemas.openxmlformats.org/markup-compatibility/2006" xmlns:a14="http://schemas.microsoft.com/office/drawing/2010/main">
-          <mc:Choice Requires="a14">
+        <mc:AlternateContent xmlns:mc="http://schemas.openxmlformats.org/markup-compatibility/2006">
+          <mc:Choice xmlns:a14="http://schemas.microsoft.com/office/drawing/2010/main" Requires="a14">
             <p:sp>
               <p:nvSpPr>
                 <p:cNvPr id="33" name="TextBox 32"/>
@@ -9820,8 +9820,8 @@
               </p:nvSpPr>
               <p:spPr>
                 <a:xfrm>
-                  <a:off x="2540335" y="3691354"/>
-                  <a:ext cx="3498585" cy="276999"/>
+                  <a:off x="2437465" y="3691354"/>
+                  <a:ext cx="3075394" cy="276999"/>
                 </a:xfrm>
                 <a:prstGeom prst="rect">
                   <a:avLst/>
@@ -9874,31 +9874,7 @@
                               <a:rPr lang="en-US" b="0" i="1" smtClean="0">
                                 <a:latin typeface="Cambria Math" charset="0"/>
                               </a:rPr>
-                              <m:t>1,</m:t>
-                            </m:r>
-                            <m:r>
-                              <a:rPr lang="en-US" b="0" i="1" smtClean="0">
-                                <a:latin typeface="Cambria Math" charset="0"/>
-                              </a:rPr>
-                              <m:t>𝐴</m:t>
-                            </m:r>
-                            <m:r>
-                              <a:rPr lang="en-US" b="0" i="1" smtClean="0">
-                                <a:latin typeface="Cambria Math" charset="0"/>
-                              </a:rPr>
-                              <m:t>2,</m:t>
-                            </m:r>
-                            <m:r>
-                              <a:rPr lang="en-US" b="0" i="1" smtClean="0">
-                                <a:latin typeface="Cambria Math" charset="0"/>
-                              </a:rPr>
-                              <m:t>𝐴</m:t>
-                            </m:r>
-                            <m:r>
-                              <a:rPr lang="en-US" b="0" i="1" smtClean="0">
-                                <a:latin typeface="Cambria Math" charset="0"/>
-                              </a:rPr>
-                              <m:t>3,</m:t>
+                              <m:t>1,…, </m:t>
                             </m:r>
                             <m:r>
                               <a:rPr lang="en-US" b="0" i="1" smtClean="0">
@@ -9928,7 +9904,7 @@
               </p:txBody>
             </p:sp>
           </mc:Choice>
-          <mc:Fallback xmlns="">
+          <mc:Fallback>
             <p:sp>
               <p:nvSpPr>
                 <p:cNvPr id="33" name="TextBox 32"/>
@@ -9939,8 +9915,8 @@
               </p:nvSpPr>
               <p:spPr>
                 <a:xfrm>
-                  <a:off x="2540335" y="3691354"/>
-                  <a:ext cx="3498585" cy="276999"/>
+                  <a:off x="2437465" y="3691354"/>
+                  <a:ext cx="3075394" cy="276999"/>
                 </a:xfrm>
                 <a:prstGeom prst="rect">
                   <a:avLst/>
@@ -9948,7 +9924,7 @@
                 <a:blipFill rotWithShape="0">
                   <a:blip r:embed="rId7"/>
                   <a:stretch>
-                    <a:fillRect l="-1220" t="-148889" r="-1916" b="-180000"/>
+                    <a:fillRect l="-1389" t="-143478" r="-2381" b="-176087"/>
                   </a:stretch>
                 </a:blipFill>
               </p:spPr>
@@ -9967,8 +9943,8 @@
             </p:sp>
           </mc:Fallback>
         </mc:AlternateContent>
-        <mc:AlternateContent xmlns:mc="http://schemas.openxmlformats.org/markup-compatibility/2006" xmlns:a14="http://schemas.microsoft.com/office/drawing/2010/main">
-          <mc:Choice Requires="a14">
+        <mc:AlternateContent xmlns:mc="http://schemas.openxmlformats.org/markup-compatibility/2006">
+          <mc:Choice xmlns:a14="http://schemas.microsoft.com/office/drawing/2010/main" Requires="a14">
             <p:sp>
               <p:nvSpPr>
                 <p:cNvPr id="34" name="TextBox 33"/>
@@ -9977,7 +9953,7 @@
               </p:nvSpPr>
               <p:spPr>
                 <a:xfrm>
-                  <a:off x="2512828" y="5330557"/>
+                  <a:off x="2409958" y="5330557"/>
                   <a:ext cx="3405868" cy="276999"/>
                 </a:xfrm>
                 <a:prstGeom prst="rect">
@@ -10084,7 +10060,7 @@
               </p:txBody>
             </p:sp>
           </mc:Choice>
-          <mc:Fallback xmlns="">
+          <mc:Fallback>
             <p:sp>
               <p:nvSpPr>
                 <p:cNvPr id="34" name="TextBox 33"/>
@@ -10095,7 +10071,7 @@
               </p:nvSpPr>
               <p:spPr>
                 <a:xfrm>
-                  <a:off x="2512828" y="5330557"/>
+                  <a:off x="2409958" y="5330557"/>
                   <a:ext cx="3405868" cy="276999"/>
                 </a:xfrm>
                 <a:prstGeom prst="rect">
@@ -10104,7 +10080,7 @@
                 <a:blipFill rotWithShape="0">
                   <a:blip r:embed="rId8"/>
                   <a:stretch>
-                    <a:fillRect l="-894" t="-148889" b="-180000"/>
+                    <a:fillRect l="-894" t="-143478" b="-176087"/>
                   </a:stretch>
                 </a:blipFill>
               </p:spPr>
@@ -10123,8 +10099,8 @@
             </p:sp>
           </mc:Fallback>
         </mc:AlternateContent>
-        <mc:AlternateContent xmlns:mc="http://schemas.openxmlformats.org/markup-compatibility/2006" xmlns:a14="http://schemas.microsoft.com/office/drawing/2010/main">
-          <mc:Choice Requires="a14">
+        <mc:AlternateContent xmlns:mc="http://schemas.openxmlformats.org/markup-compatibility/2006">
+          <mc:Choice xmlns:a14="http://schemas.microsoft.com/office/drawing/2010/main" Requires="a14">
             <p:sp>
               <p:nvSpPr>
                 <p:cNvPr id="35" name="TextBox 34"/>
@@ -10133,7 +10109,7 @@
               </p:nvSpPr>
               <p:spPr>
                 <a:xfrm>
-                  <a:off x="3341231" y="5649803"/>
+                  <a:off x="3238361" y="5649803"/>
                   <a:ext cx="2606547" cy="276999"/>
                 </a:xfrm>
                 <a:prstGeom prst="rect">
@@ -10234,7 +10210,7 @@
               </p:txBody>
             </p:sp>
           </mc:Choice>
-          <mc:Fallback xmlns="">
+          <mc:Fallback>
             <p:sp>
               <p:nvSpPr>
                 <p:cNvPr id="35" name="TextBox 34"/>
@@ -10245,7 +10221,7 @@
               </p:nvSpPr>
               <p:spPr>
                 <a:xfrm>
-                  <a:off x="3341231" y="5649803"/>
+                  <a:off x="3238361" y="5649803"/>
                   <a:ext cx="2606547" cy="276999"/>
                 </a:xfrm>
                 <a:prstGeom prst="rect">
@@ -10254,7 +10230,7 @@
                 <a:blipFill rotWithShape="0">
                   <a:blip r:embed="rId9"/>
                   <a:stretch>
-                    <a:fillRect l="-467" t="-146667" b="-182222"/>
+                    <a:fillRect l="-467" t="-148889" b="-180000"/>
                   </a:stretch>
                 </a:blipFill>
               </p:spPr>
@@ -10273,8 +10249,8 @@
             </p:sp>
           </mc:Fallback>
         </mc:AlternateContent>
-        <mc:AlternateContent xmlns:mc="http://schemas.openxmlformats.org/markup-compatibility/2006" xmlns:a14="http://schemas.microsoft.com/office/drawing/2010/main">
-          <mc:Choice Requires="a14">
+        <mc:AlternateContent xmlns:mc="http://schemas.openxmlformats.org/markup-compatibility/2006">
+          <mc:Choice xmlns:a14="http://schemas.microsoft.com/office/drawing/2010/main" Requires="a14">
             <p:sp>
               <p:nvSpPr>
                 <p:cNvPr id="36" name="TextBox 35"/>
@@ -10283,7 +10259,7 @@
               </p:nvSpPr>
               <p:spPr>
                 <a:xfrm>
-                  <a:off x="3381686" y="5820169"/>
+                  <a:off x="3278816" y="5820169"/>
                   <a:ext cx="226023" cy="276999"/>
                 </a:xfrm>
                 <a:prstGeom prst="rect">
@@ -10318,7 +10294,7 @@
               </p:txBody>
             </p:sp>
           </mc:Choice>
-          <mc:Fallback xmlns="">
+          <mc:Fallback>
             <p:sp>
               <p:nvSpPr>
                 <p:cNvPr id="36" name="TextBox 35"/>
@@ -10329,14 +10305,14 @@
               </p:nvSpPr>
               <p:spPr>
                 <a:xfrm>
-                  <a:off x="3381686" y="5820169"/>
+                  <a:off x="3278816" y="5820169"/>
                   <a:ext cx="226023" cy="276999"/>
                 </a:xfrm>
                 <a:prstGeom prst="rect">
                   <a:avLst/>
                 </a:prstGeom>
                 <a:blipFill rotWithShape="0">
-                  <a:blip r:embed="rId6"/>
+                  <a:blip r:embed="rId10"/>
                   <a:stretch>
                     <a:fillRect/>
                   </a:stretch>
@@ -10357,8 +10333,8 @@
             </p:sp>
           </mc:Fallback>
         </mc:AlternateContent>
-        <mc:AlternateContent xmlns:mc="http://schemas.openxmlformats.org/markup-compatibility/2006" xmlns:a14="http://schemas.microsoft.com/office/drawing/2010/main">
-          <mc:Choice Requires="a14">
+        <mc:AlternateContent xmlns:mc="http://schemas.openxmlformats.org/markup-compatibility/2006">
+          <mc:Choice xmlns:a14="http://schemas.microsoft.com/office/drawing/2010/main" Requires="a14">
             <p:sp>
               <p:nvSpPr>
                 <p:cNvPr id="37" name="TextBox 36"/>
@@ -10367,8 +10343,8 @@
               </p:nvSpPr>
               <p:spPr>
                 <a:xfrm>
-                  <a:off x="2538930" y="4060685"/>
-                  <a:ext cx="3498586" cy="276999"/>
+                  <a:off x="2436060" y="4060685"/>
+                  <a:ext cx="3075394" cy="276999"/>
                 </a:xfrm>
                 <a:prstGeom prst="rect">
                   <a:avLst/>
@@ -10421,31 +10397,7 @@
                               <a:rPr lang="en-US" i="1">
                                 <a:latin typeface="Cambria Math" charset="0"/>
                               </a:rPr>
-                              <m:t>1,</m:t>
-                            </m:r>
-                            <m:r>
-                              <a:rPr lang="en-US" i="1">
-                                <a:latin typeface="Cambria Math" charset="0"/>
-                              </a:rPr>
-                              <m:t>𝐴</m:t>
-                            </m:r>
-                            <m:r>
-                              <a:rPr lang="en-US" i="1">
-                                <a:latin typeface="Cambria Math" charset="0"/>
-                              </a:rPr>
-                              <m:t>2,</m:t>
-                            </m:r>
-                            <m:r>
-                              <a:rPr lang="en-US" i="1">
-                                <a:latin typeface="Cambria Math" charset="0"/>
-                              </a:rPr>
-                              <m:t>𝐴</m:t>
-                            </m:r>
-                            <m:r>
-                              <a:rPr lang="en-US" i="1">
-                                <a:latin typeface="Cambria Math" charset="0"/>
-                              </a:rPr>
-                              <m:t>3,</m:t>
+                              <m:t>1,…, </m:t>
                             </m:r>
                             <m:r>
                               <a:rPr lang="en-US" i="1">
@@ -10475,7 +10427,7 @@
               </p:txBody>
             </p:sp>
           </mc:Choice>
-          <mc:Fallback xmlns="">
+          <mc:Fallback>
             <p:sp>
               <p:nvSpPr>
                 <p:cNvPr id="37" name="TextBox 36"/>
@@ -10486,16 +10438,16 @@
               </p:nvSpPr>
               <p:spPr>
                 <a:xfrm>
-                  <a:off x="2538930" y="4060685"/>
-                  <a:ext cx="3498586" cy="276999"/>
+                  <a:off x="2436060" y="4060685"/>
+                  <a:ext cx="3075394" cy="276999"/>
                 </a:xfrm>
                 <a:prstGeom prst="rect">
                   <a:avLst/>
                 </a:prstGeom>
                 <a:blipFill rotWithShape="0">
-                  <a:blip r:embed="rId10"/>
+                  <a:blip r:embed="rId11"/>
                   <a:stretch>
-                    <a:fillRect l="-1045" t="-143478" r="-1916" b="-176087"/>
+                    <a:fillRect l="-1389" t="-146667" r="-2381" b="-182222"/>
                   </a:stretch>
                 </a:blipFill>
               </p:spPr>
@@ -10514,8 +10466,8 @@
             </p:sp>
           </mc:Fallback>
         </mc:AlternateContent>
-        <mc:AlternateContent xmlns:mc="http://schemas.openxmlformats.org/markup-compatibility/2006" xmlns:a14="http://schemas.microsoft.com/office/drawing/2010/main">
-          <mc:Choice Requires="a14">
+        <mc:AlternateContent xmlns:mc="http://schemas.openxmlformats.org/markup-compatibility/2006">
+          <mc:Choice xmlns:a14="http://schemas.microsoft.com/office/drawing/2010/main" Requires="a14">
             <p:sp>
               <p:nvSpPr>
                 <p:cNvPr id="38" name="TextBox 37"/>
@@ -10524,8 +10476,8 @@
               </p:nvSpPr>
               <p:spPr>
                 <a:xfrm>
-                  <a:off x="2560823" y="4545303"/>
-                  <a:ext cx="4912435" cy="276999"/>
+                  <a:off x="2457953" y="4545303"/>
+                  <a:ext cx="4066048" cy="276999"/>
                 </a:xfrm>
                 <a:prstGeom prst="rect">
                   <a:avLst/>
@@ -10578,31 +10530,7 @@
                               <a:rPr lang="en-US" i="1">
                                 <a:latin typeface="Cambria Math" charset="0"/>
                               </a:rPr>
-                              <m:t>1,</m:t>
-                            </m:r>
-                            <m:r>
-                              <a:rPr lang="en-US" i="1">
-                                <a:latin typeface="Cambria Math" charset="0"/>
-                              </a:rPr>
-                              <m:t>𝐴</m:t>
-                            </m:r>
-                            <m:r>
-                              <a:rPr lang="en-US" i="1">
-                                <a:latin typeface="Cambria Math" charset="0"/>
-                              </a:rPr>
-                              <m:t>2,</m:t>
-                            </m:r>
-                            <m:r>
-                              <a:rPr lang="en-US" i="1">
-                                <a:latin typeface="Cambria Math" charset="0"/>
-                              </a:rPr>
-                              <m:t>𝐴</m:t>
-                            </m:r>
-                            <m:r>
-                              <a:rPr lang="en-US" i="1">
-                                <a:latin typeface="Cambria Math" charset="0"/>
-                              </a:rPr>
-                              <m:t>3,</m:t>
+                              <m:t>1,…, </m:t>
                             </m:r>
                             <m:r>
                               <a:rPr lang="en-US" i="1">
@@ -10634,31 +10562,7 @@
                           <a:rPr lang="en-US" i="1">
                             <a:latin typeface="Cambria Math" charset="0"/>
                           </a:rPr>
-                          <m:t>1,</m:t>
-                        </m:r>
-                        <m:r>
-                          <a:rPr lang="en-US" i="1">
-                            <a:latin typeface="Cambria Math" charset="0"/>
-                          </a:rPr>
-                          <m:t>𝐴</m:t>
-                        </m:r>
-                        <m:r>
-                          <a:rPr lang="en-US" i="1">
-                            <a:latin typeface="Cambria Math" charset="0"/>
-                          </a:rPr>
-                          <m:t>2,</m:t>
-                        </m:r>
-                        <m:r>
-                          <a:rPr lang="en-US" i="1">
-                            <a:latin typeface="Cambria Math" charset="0"/>
-                          </a:rPr>
-                          <m:t>𝐴</m:t>
-                        </m:r>
-                        <m:r>
-                          <a:rPr lang="en-US" i="1">
-                            <a:latin typeface="Cambria Math" charset="0"/>
-                          </a:rPr>
-                          <m:t>3,</m:t>
+                          <m:t>1,…, </m:t>
                         </m:r>
                         <m:r>
                           <a:rPr lang="en-US" i="1">
@@ -10680,7 +10584,7 @@
               </p:txBody>
             </p:sp>
           </mc:Choice>
-          <mc:Fallback xmlns="">
+          <mc:Fallback>
             <p:sp>
               <p:nvSpPr>
                 <p:cNvPr id="38" name="TextBox 37"/>
@@ -10691,16 +10595,16 @@
               </p:nvSpPr>
               <p:spPr>
                 <a:xfrm>
-                  <a:off x="2560823" y="4545303"/>
-                  <a:ext cx="4912435" cy="276999"/>
+                  <a:off x="2457953" y="4545303"/>
+                  <a:ext cx="4066048" cy="276999"/>
                 </a:xfrm>
                 <a:prstGeom prst="rect">
                   <a:avLst/>
                 </a:prstGeom>
                 <a:blipFill rotWithShape="0">
-                  <a:blip r:embed="rId11"/>
+                  <a:blip r:embed="rId12"/>
                   <a:stretch>
-                    <a:fillRect l="-620" t="-4444" r="-1241" b="-35556"/>
+                    <a:fillRect l="-900" t="-2174" r="-1649" b="-32609"/>
                   </a:stretch>
                 </a:blipFill>
               </p:spPr>
@@ -10719,8 +10623,8 @@
             </p:sp>
           </mc:Fallback>
         </mc:AlternateContent>
-        <mc:AlternateContent xmlns:mc="http://schemas.openxmlformats.org/markup-compatibility/2006" xmlns:a14="http://schemas.microsoft.com/office/drawing/2010/main">
-          <mc:Choice Requires="a14">
+        <mc:AlternateContent xmlns:mc="http://schemas.openxmlformats.org/markup-compatibility/2006">
+          <mc:Choice xmlns:a14="http://schemas.microsoft.com/office/drawing/2010/main" Requires="a14">
             <p:sp>
               <p:nvSpPr>
                 <p:cNvPr id="39" name="TextBox 38"/>
@@ -10729,8 +10633,8 @@
               </p:nvSpPr>
               <p:spPr>
                 <a:xfrm>
-                  <a:off x="2560823" y="4864549"/>
-                  <a:ext cx="4912435" cy="276999"/>
+                  <a:off x="2457953" y="4864549"/>
+                  <a:ext cx="4066048" cy="276999"/>
                 </a:xfrm>
                 <a:prstGeom prst="rect">
                   <a:avLst/>
@@ -10783,31 +10687,7 @@
                               <a:rPr lang="en-US" i="1">
                                 <a:latin typeface="Cambria Math" charset="0"/>
                               </a:rPr>
-                              <m:t>1,</m:t>
-                            </m:r>
-                            <m:r>
-                              <a:rPr lang="en-US" i="1">
-                                <a:latin typeface="Cambria Math" charset="0"/>
-                              </a:rPr>
-                              <m:t>𝐴</m:t>
-                            </m:r>
-                            <m:r>
-                              <a:rPr lang="en-US" i="1">
-                                <a:latin typeface="Cambria Math" charset="0"/>
-                              </a:rPr>
-                              <m:t>2,</m:t>
-                            </m:r>
-                            <m:r>
-                              <a:rPr lang="en-US" i="1">
-                                <a:latin typeface="Cambria Math" charset="0"/>
-                              </a:rPr>
-                              <m:t>𝐴</m:t>
-                            </m:r>
-                            <m:r>
-                              <a:rPr lang="en-US" i="1">
-                                <a:latin typeface="Cambria Math" charset="0"/>
-                              </a:rPr>
-                              <m:t>3,</m:t>
+                              <m:t>1,…, </m:t>
                             </m:r>
                             <m:r>
                               <a:rPr lang="en-US" i="1">
@@ -10839,31 +10719,7 @@
                           <a:rPr lang="en-US" i="1">
                             <a:latin typeface="Cambria Math" charset="0"/>
                           </a:rPr>
-                          <m:t>1,</m:t>
-                        </m:r>
-                        <m:r>
-                          <a:rPr lang="en-US" i="1">
-                            <a:latin typeface="Cambria Math" charset="0"/>
-                          </a:rPr>
-                          <m:t>𝐴</m:t>
-                        </m:r>
-                        <m:r>
-                          <a:rPr lang="en-US" i="1">
-                            <a:latin typeface="Cambria Math" charset="0"/>
-                          </a:rPr>
-                          <m:t>2,</m:t>
-                        </m:r>
-                        <m:r>
-                          <a:rPr lang="en-US" i="1">
-                            <a:latin typeface="Cambria Math" charset="0"/>
-                          </a:rPr>
-                          <m:t>𝐴</m:t>
-                        </m:r>
-                        <m:r>
-                          <a:rPr lang="en-US" i="1">
-                            <a:latin typeface="Cambria Math" charset="0"/>
-                          </a:rPr>
-                          <m:t>3,</m:t>
+                          <m:t>1,…, </m:t>
                         </m:r>
                         <m:r>
                           <a:rPr lang="en-US" i="1">
@@ -10885,7 +10741,7 @@
               </p:txBody>
             </p:sp>
           </mc:Choice>
-          <mc:Fallback xmlns="">
+          <mc:Fallback>
             <p:sp>
               <p:nvSpPr>
                 <p:cNvPr id="39" name="TextBox 38"/>
@@ -10896,16 +10752,16 @@
               </p:nvSpPr>
               <p:spPr>
                 <a:xfrm>
-                  <a:off x="2560823" y="4864549"/>
-                  <a:ext cx="4912435" cy="276999"/>
+                  <a:off x="2457953" y="4864549"/>
+                  <a:ext cx="4066048" cy="276999"/>
                 </a:xfrm>
                 <a:prstGeom prst="rect">
                   <a:avLst/>
                 </a:prstGeom>
                 <a:blipFill rotWithShape="0">
-                  <a:blip r:embed="rId12"/>
+                  <a:blip r:embed="rId13"/>
                   <a:stretch>
-                    <a:fillRect l="-620" t="-2174" r="-1241" b="-32609"/>
+                    <a:fillRect l="-900" t="-2222" r="-1649" b="-35556"/>
                   </a:stretch>
                 </a:blipFill>
               </p:spPr>
@@ -10924,8 +10780,8 @@
             </p:sp>
           </mc:Fallback>
         </mc:AlternateContent>
-        <mc:AlternateContent xmlns:mc="http://schemas.openxmlformats.org/markup-compatibility/2006" xmlns:a14="http://schemas.microsoft.com/office/drawing/2010/main">
-          <mc:Choice Requires="a14">
+        <mc:AlternateContent xmlns:mc="http://schemas.openxmlformats.org/markup-compatibility/2006">
+          <mc:Choice xmlns:a14="http://schemas.microsoft.com/office/drawing/2010/main" Requires="a14">
             <p:sp>
               <p:nvSpPr>
                 <p:cNvPr id="40" name="TextBox 39"/>
@@ -10934,7 +10790,7 @@
               </p:nvSpPr>
               <p:spPr>
                 <a:xfrm>
-                  <a:off x="2577178" y="4240925"/>
+                  <a:off x="2474308" y="4240925"/>
                   <a:ext cx="226023" cy="276999"/>
                 </a:xfrm>
                 <a:prstGeom prst="rect">
@@ -10969,7 +10825,7 @@
               </p:txBody>
             </p:sp>
           </mc:Choice>
-          <mc:Fallback xmlns="">
+          <mc:Fallback>
             <p:sp>
               <p:nvSpPr>
                 <p:cNvPr id="40" name="TextBox 39"/>
@@ -10980,14 +10836,14 @@
               </p:nvSpPr>
               <p:spPr>
                 <a:xfrm>
-                  <a:off x="2577178" y="4240925"/>
+                  <a:off x="2474308" y="4240925"/>
                   <a:ext cx="226023" cy="276999"/>
                 </a:xfrm>
                 <a:prstGeom prst="rect">
                   <a:avLst/>
                 </a:prstGeom>
                 <a:blipFill rotWithShape="0">
-                  <a:blip r:embed="rId6"/>
+                  <a:blip r:embed="rId10"/>
                   <a:stretch>
                     <a:fillRect/>
                   </a:stretch>
@@ -11008,8 +10864,8 @@
             </p:sp>
           </mc:Fallback>
         </mc:AlternateContent>
-        <mc:AlternateContent xmlns:mc="http://schemas.openxmlformats.org/markup-compatibility/2006" xmlns:a14="http://schemas.microsoft.com/office/drawing/2010/main">
-          <mc:Choice Requires="a14">
+        <mc:AlternateContent xmlns:mc="http://schemas.openxmlformats.org/markup-compatibility/2006">
+          <mc:Choice xmlns:a14="http://schemas.microsoft.com/office/drawing/2010/main" Requires="a14">
             <p:sp>
               <p:nvSpPr>
                 <p:cNvPr id="41" name="TextBox 40"/>
@@ -11018,7 +10874,7 @@
               </p:nvSpPr>
               <p:spPr>
                 <a:xfrm>
-                  <a:off x="2577178" y="5047865"/>
+                  <a:off x="2474308" y="5047865"/>
                   <a:ext cx="226023" cy="276999"/>
                 </a:xfrm>
                 <a:prstGeom prst="rect">
@@ -11053,7 +10909,7 @@
               </p:txBody>
             </p:sp>
           </mc:Choice>
-          <mc:Fallback xmlns="">
+          <mc:Fallback>
             <p:sp>
               <p:nvSpPr>
                 <p:cNvPr id="41" name="TextBox 40"/>
@@ -11064,14 +10920,14 @@
               </p:nvSpPr>
               <p:spPr>
                 <a:xfrm>
-                  <a:off x="2577178" y="5047865"/>
+                  <a:off x="2474308" y="5047865"/>
                   <a:ext cx="226023" cy="276999"/>
                 </a:xfrm>
                 <a:prstGeom prst="rect">
                   <a:avLst/>
                 </a:prstGeom>
                 <a:blipFill rotWithShape="0">
-                  <a:blip r:embed="rId13"/>
+                  <a:blip r:embed="rId10"/>
                   <a:stretch>
                     <a:fillRect/>
                   </a:stretch>
@@ -11131,7 +10987,7 @@
         </p:nvSpPr>
         <p:spPr>
           <a:xfrm>
-            <a:off x="2342603" y="3139601"/>
+            <a:off x="2399753" y="3139601"/>
             <a:ext cx="2103396" cy="369332"/>
           </a:xfrm>
           <a:prstGeom prst="rect">
@@ -11148,6 +11004,1104 @@
             <a:r>
               <a:rPr lang="en-US" b="1" dirty="0" smtClean="0"/>
               <a:t>Configuration S1, S2</a:t>
+            </a:r>
+            <a:endParaRPr lang="en-US" b="1" dirty="0"/>
+          </a:p>
+        </p:txBody>
+      </p:sp>
+      <p:grpSp>
+        <p:nvGrpSpPr>
+          <p:cNvPr id="22" name="Group 21"/>
+          <p:cNvGrpSpPr/>
+          <p:nvPr/>
+        </p:nvGrpSpPr>
+        <p:grpSpPr>
+          <a:xfrm>
+            <a:off x="6696209" y="1231464"/>
+            <a:ext cx="4207724" cy="1803292"/>
+            <a:chOff x="2297429" y="1065209"/>
+            <a:chExt cx="4207724" cy="1803292"/>
+          </a:xfrm>
+        </p:grpSpPr>
+        <p:sp>
+          <p:nvSpPr>
+            <p:cNvPr id="23" name="Rectangle 22"/>
+            <p:cNvSpPr/>
+            <p:nvPr/>
+          </p:nvSpPr>
+          <p:spPr>
+            <a:xfrm>
+              <a:off x="2297429" y="1065209"/>
+              <a:ext cx="4207724" cy="1803292"/>
+            </a:xfrm>
+            <a:prstGeom prst="rect">
+              <a:avLst/>
+            </a:prstGeom>
+            <a:solidFill>
+              <a:schemeClr val="accent4">
+                <a:lumMod val="20000"/>
+                <a:lumOff val="80000"/>
+                <a:alpha val="51000"/>
+              </a:schemeClr>
+            </a:solidFill>
+          </p:spPr>
+          <p:style>
+            <a:lnRef idx="2">
+              <a:schemeClr val="accent1">
+                <a:shade val="50000"/>
+              </a:schemeClr>
+            </a:lnRef>
+            <a:fillRef idx="1">
+              <a:schemeClr val="accent1"/>
+            </a:fillRef>
+            <a:effectRef idx="0">
+              <a:schemeClr val="accent1"/>
+            </a:effectRef>
+            <a:fontRef idx="minor">
+              <a:schemeClr val="lt1"/>
+            </a:fontRef>
+          </p:style>
+          <p:txBody>
+            <a:bodyPr rtlCol="0" anchor="ctr"/>
+            <a:lstStyle/>
+            <a:p>
+              <a:pPr algn="ctr"/>
+              <a:endParaRPr lang="en-US" dirty="0"/>
+            </a:p>
+          </p:txBody>
+        </p:sp>
+        <mc:AlternateContent xmlns:mc="http://schemas.openxmlformats.org/markup-compatibility/2006">
+          <mc:Choice xmlns:a14="http://schemas.microsoft.com/office/drawing/2010/main" Requires="a14">
+            <p:sp>
+              <p:nvSpPr>
+                <p:cNvPr id="24" name="TextBox 23"/>
+                <p:cNvSpPr txBox="1"/>
+                <p:nvPr/>
+              </p:nvSpPr>
+              <p:spPr>
+                <a:xfrm>
+                  <a:off x="2386135" y="1407535"/>
+                  <a:ext cx="3356368" cy="276999"/>
+                </a:xfrm>
+                <a:prstGeom prst="rect">
+                  <a:avLst/>
+                </a:prstGeom>
+                <a:noFill/>
+              </p:spPr>
+              <p:txBody>
+                <a:bodyPr wrap="none" lIns="0" tIns="0" rIns="0" bIns="0" rtlCol="0">
+                  <a:spAutoFit/>
+                </a:bodyPr>
+                <a:lstStyle/>
+                <a:p>
+                  <a:pPr/>
+                  <a14:m>
+                    <m:oMathPara xmlns:m="http://schemas.openxmlformats.org/officeDocument/2006/math">
+                      <m:oMathParaPr>
+                        <m:jc m:val="centerGroup"/>
+                      </m:oMathParaPr>
+                      <m:oMath xmlns:m="http://schemas.openxmlformats.org/officeDocument/2006/math">
+                        <m:r>
+                          <a:rPr lang="en-US" b="0" i="1" smtClean="0">
+                            <a:latin typeface="Cambria Math" charset="0"/>
+                          </a:rPr>
+                          <m:t>𝑡𝑎𝑔</m:t>
+                        </m:r>
+                        <m:r>
+                          <a:rPr lang="en-US" b="0" i="1" smtClean="0">
+                            <a:latin typeface="Cambria Math" charset="0"/>
+                          </a:rPr>
+                          <m:t>($</m:t>
+                        </m:r>
+                        <m:r>
+                          <a:rPr lang="en-US" b="0" i="1" smtClean="0">
+                            <a:latin typeface="Cambria Math" charset="0"/>
+                          </a:rPr>
+                          <m:t>𝐺𝑃</m:t>
+                        </m:r>
+                        <m:r>
+                          <a:rPr lang="en-US" b="0" i="1" smtClean="0">
+                            <a:latin typeface="Cambria Math" charset="0"/>
+                          </a:rPr>
+                          <m:t>)</m:t>
+                        </m:r>
+                        <m:r>
+                          <a:rPr lang="en-US" b="0" i="1" smtClean="0">
+                            <a:latin typeface="Cambria Math" charset="0"/>
+                          </a:rPr>
+                          <m:t>⇒[100 :</m:t>
+                        </m:r>
+                        <m:d>
+                          <m:dPr>
+                            <m:begChr m:val="{"/>
+                            <m:endChr m:val="}"/>
+                            <m:ctrlPr>
+                              <a:rPr lang="en-US" b="0" i="1" smtClean="0">
+                                <a:latin typeface="Cambria Math" charset="0"/>
+                              </a:rPr>
+                            </m:ctrlPr>
+                          </m:dPr>
+                          <m:e>
+                            <m:r>
+                              <a:rPr lang="en-US" b="0" i="1" smtClean="0">
+                                <a:latin typeface="Cambria Math" charset="0"/>
+                              </a:rPr>
+                              <m:t>𝐴𝐺</m:t>
+                            </m:r>
+                            <m:r>
+                              <a:rPr lang="en-US" b="0" i="1" smtClean="0">
+                                <a:latin typeface="Cambria Math" charset="0"/>
+                              </a:rPr>
+                              <m:t>,</m:t>
+                            </m:r>
+                            <m:r>
+                              <a:rPr lang="en-US" b="0" i="1" smtClean="0">
+                                <a:latin typeface="Cambria Math" charset="0"/>
+                              </a:rPr>
+                              <m:t>𝐴𝐿</m:t>
+                            </m:r>
+                          </m:e>
+                        </m:d>
+                        <m:r>
+                          <a:rPr lang="en-US" b="0" i="1" smtClean="0">
+                            <a:latin typeface="Cambria Math" charset="0"/>
+                          </a:rPr>
+                          <m:t>→ ∗]</m:t>
+                        </m:r>
+                      </m:oMath>
+                    </m:oMathPara>
+                  </a14:m>
+                  <a:endParaRPr lang="en-US" dirty="0"/>
+                </a:p>
+              </p:txBody>
+            </p:sp>
+          </mc:Choice>
+          <mc:Fallback>
+            <p:sp>
+              <p:nvSpPr>
+                <p:cNvPr id="24" name="TextBox 23"/>
+                <p:cNvSpPr txBox="1">
+                  <a:spLocks noRot="1" noChangeAspect="1" noMove="1" noResize="1" noEditPoints="1" noAdjustHandles="1" noChangeArrowheads="1" noChangeShapeType="1" noTextEdit="1"/>
+                </p:cNvSpPr>
+                <p:nvPr/>
+              </p:nvSpPr>
+              <p:spPr>
+                <a:xfrm>
+                  <a:off x="2386135" y="1407535"/>
+                  <a:ext cx="3356368" cy="276999"/>
+                </a:xfrm>
+                <a:prstGeom prst="rect">
+                  <a:avLst/>
+                </a:prstGeom>
+                <a:blipFill rotWithShape="0">
+                  <a:blip r:embed="rId14"/>
+                  <a:stretch>
+                    <a:fillRect l="-1452" t="-143478" r="-1996" b="-176087"/>
+                  </a:stretch>
+                </a:blipFill>
+              </p:spPr>
+              <p:txBody>
+                <a:bodyPr/>
+                <a:lstStyle/>
+                <a:p>
+                  <a:r>
+                    <a:rPr lang="en-US">
+                      <a:noFill/>
+                    </a:rPr>
+                    <a:t> </a:t>
+                  </a:r>
+                </a:p>
+              </p:txBody>
+            </p:sp>
+          </mc:Fallback>
+        </mc:AlternateContent>
+        <mc:AlternateContent xmlns:mc="http://schemas.openxmlformats.org/markup-compatibility/2006">
+          <mc:Choice xmlns:a14="http://schemas.microsoft.com/office/drawing/2010/main" Requires="a14">
+            <p:sp>
+              <p:nvSpPr>
+                <p:cNvPr id="25" name="TextBox 24"/>
+                <p:cNvSpPr txBox="1"/>
+                <p:nvPr/>
+              </p:nvSpPr>
+              <p:spPr>
+                <a:xfrm>
+                  <a:off x="2894670" y="2057384"/>
+                  <a:ext cx="3405868" cy="276999"/>
+                </a:xfrm>
+                <a:prstGeom prst="rect">
+                  <a:avLst/>
+                </a:prstGeom>
+                <a:noFill/>
+              </p:spPr>
+              <p:txBody>
+                <a:bodyPr wrap="none" lIns="0" tIns="0" rIns="0" bIns="0" rtlCol="0">
+                  <a:spAutoFit/>
+                </a:bodyPr>
+                <a:lstStyle/>
+                <a:p>
+                  <a:pPr/>
+                  <a14:m>
+                    <m:oMathPara xmlns:m="http://schemas.openxmlformats.org/officeDocument/2006/math">
+                      <m:oMathParaPr>
+                        <m:jc m:val="centerGroup"/>
+                      </m:oMathParaPr>
+                      <m:oMath xmlns:m="http://schemas.openxmlformats.org/officeDocument/2006/math">
+                        <m:r>
+                          <a:rPr lang="en-US" b="0" i="1" smtClean="0">
+                            <a:latin typeface="Cambria Math" charset="0"/>
+                          </a:rPr>
+                          <m:t>𝑡𝑟𝑢𝑒</m:t>
+                        </m:r>
+                        <m:r>
+                          <a:rPr lang="en-US" b="0" i="1" smtClean="0">
+                            <a:latin typeface="Cambria Math" charset="0"/>
+                          </a:rPr>
+                          <m:t>⇒[110 :</m:t>
+                        </m:r>
+                        <m:d>
+                          <m:dPr>
+                            <m:begChr m:val="{"/>
+                            <m:endChr m:val="}"/>
+                            <m:ctrlPr>
+                              <a:rPr lang="en-US" b="0" i="1" smtClean="0">
+                                <a:latin typeface="Cambria Math" charset="0"/>
+                              </a:rPr>
+                            </m:ctrlPr>
+                          </m:dPr>
+                          <m:e>
+                            <m:r>
+                              <a:rPr lang="en-US" b="0" i="1" smtClean="0">
+                                <a:latin typeface="Cambria Math" charset="0"/>
+                              </a:rPr>
+                              <m:t>𝑁</m:t>
+                            </m:r>
+                            <m:r>
+                              <a:rPr lang="en-US" b="0" i="1" smtClean="0">
+                                <a:latin typeface="Cambria Math" charset="0"/>
+                              </a:rPr>
+                              <m:t>1</m:t>
+                            </m:r>
+                          </m:e>
+                        </m:d>
+                        <m:r>
+                          <a:rPr lang="en-US" b="0" i="1" smtClean="0">
+                            <a:latin typeface="Cambria Math" charset="0"/>
+                          </a:rPr>
+                          <m:t>→ ∗</m:t>
+                        </m:r>
+                        <m:r>
+                          <a:rPr lang="en-US" b="0" i="1" smtClean="0">
+                            <a:latin typeface="Cambria Math" charset="0"/>
+                          </a:rPr>
+                          <m:t>𝑡𝑎𝑔</m:t>
+                        </m:r>
+                        <m:r>
+                          <a:rPr lang="en-US" b="0" i="1" smtClean="0">
+                            <a:latin typeface="Cambria Math" charset="0"/>
+                          </a:rPr>
+                          <m:t> </m:t>
+                        </m:r>
+                        <m:d>
+                          <m:dPr>
+                            <m:ctrlPr>
+                              <a:rPr lang="en-US" b="0" i="1" smtClean="0">
+                                <a:latin typeface="Cambria Math" charset="0"/>
+                              </a:rPr>
+                            </m:ctrlPr>
+                          </m:dPr>
+                          <m:e>
+                            <m:r>
+                              <a:rPr lang="en-US" b="0" i="1" smtClean="0">
+                                <a:latin typeface="Cambria Math" charset="0"/>
+                              </a:rPr>
+                              <m:t>1,0</m:t>
+                            </m:r>
+                          </m:e>
+                        </m:d>
+                        <m:r>
+                          <a:rPr lang="en-US" b="0" i="1" smtClean="0">
+                            <a:latin typeface="Cambria Math" charset="0"/>
+                          </a:rPr>
+                          <m:t>,</m:t>
+                        </m:r>
+                      </m:oMath>
+                    </m:oMathPara>
+                  </a14:m>
+                  <a:endParaRPr lang="en-US" dirty="0"/>
+                </a:p>
+              </p:txBody>
+            </p:sp>
+          </mc:Choice>
+          <mc:Fallback>
+            <p:sp>
+              <p:nvSpPr>
+                <p:cNvPr id="25" name="TextBox 24"/>
+                <p:cNvSpPr txBox="1">
+                  <a:spLocks noRot="1" noChangeAspect="1" noMove="1" noResize="1" noEditPoints="1" noAdjustHandles="1" noChangeArrowheads="1" noChangeShapeType="1" noTextEdit="1"/>
+                </p:cNvSpPr>
+                <p:nvPr/>
+              </p:nvSpPr>
+              <p:spPr>
+                <a:xfrm>
+                  <a:off x="2894670" y="2057384"/>
+                  <a:ext cx="3405868" cy="276999"/>
+                </a:xfrm>
+                <a:prstGeom prst="rect">
+                  <a:avLst/>
+                </a:prstGeom>
+                <a:blipFill rotWithShape="0">
+                  <a:blip r:embed="rId15"/>
+                  <a:stretch>
+                    <a:fillRect l="-894" t="-146667" b="-180000"/>
+                  </a:stretch>
+                </a:blipFill>
+              </p:spPr>
+              <p:txBody>
+                <a:bodyPr/>
+                <a:lstStyle/>
+                <a:p>
+                  <a:r>
+                    <a:rPr lang="en-US">
+                      <a:noFill/>
+                    </a:rPr>
+                    <a:t> </a:t>
+                  </a:r>
+                </a:p>
+              </p:txBody>
+            </p:sp>
+          </mc:Fallback>
+        </mc:AlternateContent>
+        <mc:AlternateContent xmlns:mc="http://schemas.openxmlformats.org/markup-compatibility/2006">
+          <mc:Choice xmlns:a14="http://schemas.microsoft.com/office/drawing/2010/main" Requires="a14">
+            <p:sp>
+              <p:nvSpPr>
+                <p:cNvPr id="26" name="TextBox 25"/>
+                <p:cNvSpPr txBox="1"/>
+                <p:nvPr/>
+              </p:nvSpPr>
+              <p:spPr>
+                <a:xfrm>
+                  <a:off x="3723017" y="2376630"/>
+                  <a:ext cx="2606547" cy="276999"/>
+                </a:xfrm>
+                <a:prstGeom prst="rect">
+                  <a:avLst/>
+                </a:prstGeom>
+                <a:noFill/>
+              </p:spPr>
+              <p:txBody>
+                <a:bodyPr wrap="none" lIns="0" tIns="0" rIns="0" bIns="0" rtlCol="0">
+                  <a:spAutoFit/>
+                </a:bodyPr>
+                <a:lstStyle/>
+                <a:p>
+                  <a:pPr/>
+                  <a14:m>
+                    <m:oMathPara xmlns:m="http://schemas.openxmlformats.org/officeDocument/2006/math">
+                      <m:oMathParaPr>
+                        <m:jc m:val="centerGroup"/>
+                      </m:oMathParaPr>
+                      <m:oMath xmlns:m="http://schemas.openxmlformats.org/officeDocument/2006/math">
+                        <m:r>
+                          <a:rPr lang="en-US" b="0" i="1" smtClean="0">
+                            <a:latin typeface="Cambria Math" charset="0"/>
+                          </a:rPr>
+                          <m:t>100 :</m:t>
+                        </m:r>
+                        <m:d>
+                          <m:dPr>
+                            <m:begChr m:val="{"/>
+                            <m:endChr m:val="}"/>
+                            <m:ctrlPr>
+                              <a:rPr lang="en-US" b="0" i="1" smtClean="0">
+                                <a:latin typeface="Cambria Math" charset="0"/>
+                              </a:rPr>
+                            </m:ctrlPr>
+                          </m:dPr>
+                          <m:e>
+                            <m:r>
+                              <a:rPr lang="en-US" b="0" i="1" smtClean="0">
+                                <a:latin typeface="Cambria Math" charset="0"/>
+                              </a:rPr>
+                              <m:t>𝑁</m:t>
+                            </m:r>
+                            <m:r>
+                              <a:rPr lang="en-US" b="0" i="1" smtClean="0">
+                                <a:latin typeface="Cambria Math" charset="0"/>
+                              </a:rPr>
+                              <m:t>2</m:t>
+                            </m:r>
+                          </m:e>
+                        </m:d>
+                        <m:r>
+                          <a:rPr lang="en-US" b="0" i="1" smtClean="0">
+                            <a:latin typeface="Cambria Math" charset="0"/>
+                          </a:rPr>
+                          <m:t>→ ∗</m:t>
+                        </m:r>
+                        <m:r>
+                          <a:rPr lang="en-US" b="0" i="1" smtClean="0">
+                            <a:latin typeface="Cambria Math" charset="0"/>
+                          </a:rPr>
+                          <m:t>𝑡𝑎𝑔</m:t>
+                        </m:r>
+                        <m:r>
+                          <a:rPr lang="en-US" b="0" i="1" smtClean="0">
+                            <a:latin typeface="Cambria Math" charset="0"/>
+                          </a:rPr>
+                          <m:t> </m:t>
+                        </m:r>
+                        <m:d>
+                          <m:dPr>
+                            <m:ctrlPr>
+                              <a:rPr lang="en-US" b="0" i="1" smtClean="0">
+                                <a:latin typeface="Cambria Math" charset="0"/>
+                              </a:rPr>
+                            </m:ctrlPr>
+                          </m:dPr>
+                          <m:e>
+                            <m:r>
+                              <a:rPr lang="en-US" b="0" i="1" smtClean="0">
+                                <a:latin typeface="Cambria Math" charset="0"/>
+                              </a:rPr>
+                              <m:t>0,1</m:t>
+                            </m:r>
+                          </m:e>
+                        </m:d>
+                        <m:r>
+                          <a:rPr lang="en-US" b="0" i="1" smtClean="0">
+                            <a:latin typeface="Cambria Math" charset="0"/>
+                          </a:rPr>
+                          <m:t>,</m:t>
+                        </m:r>
+                      </m:oMath>
+                    </m:oMathPara>
+                  </a14:m>
+                  <a:endParaRPr lang="en-US" dirty="0"/>
+                </a:p>
+              </p:txBody>
+            </p:sp>
+          </mc:Choice>
+          <mc:Fallback>
+            <p:sp>
+              <p:nvSpPr>
+                <p:cNvPr id="26" name="TextBox 25"/>
+                <p:cNvSpPr txBox="1">
+                  <a:spLocks noRot="1" noChangeAspect="1" noMove="1" noResize="1" noEditPoints="1" noAdjustHandles="1" noChangeArrowheads="1" noChangeShapeType="1" noTextEdit="1"/>
+                </p:cNvSpPr>
+                <p:nvPr/>
+              </p:nvSpPr>
+              <p:spPr>
+                <a:xfrm>
+                  <a:off x="3723017" y="2376630"/>
+                  <a:ext cx="2606547" cy="276999"/>
+                </a:xfrm>
+                <a:prstGeom prst="rect">
+                  <a:avLst/>
+                </a:prstGeom>
+                <a:blipFill rotWithShape="0">
+                  <a:blip r:embed="rId16"/>
+                  <a:stretch>
+                    <a:fillRect l="-467" t="-143478" b="-176087"/>
+                  </a:stretch>
+                </a:blipFill>
+              </p:spPr>
+              <p:txBody>
+                <a:bodyPr/>
+                <a:lstStyle/>
+                <a:p>
+                  <a:r>
+                    <a:rPr lang="en-US">
+                      <a:noFill/>
+                    </a:rPr>
+                    <a:t> </a:t>
+                  </a:r>
+                </a:p>
+              </p:txBody>
+            </p:sp>
+          </mc:Fallback>
+        </mc:AlternateContent>
+        <mc:AlternateContent xmlns:mc="http://schemas.openxmlformats.org/markup-compatibility/2006">
+          <mc:Choice xmlns:a14="http://schemas.microsoft.com/office/drawing/2010/main" Requires="a14">
+            <p:sp>
+              <p:nvSpPr>
+                <p:cNvPr id="27" name="TextBox 26"/>
+                <p:cNvSpPr txBox="1"/>
+                <p:nvPr/>
+              </p:nvSpPr>
+              <p:spPr>
+                <a:xfrm>
+                  <a:off x="2405728" y="1735302"/>
+                  <a:ext cx="4076565" cy="276999"/>
+                </a:xfrm>
+                <a:prstGeom prst="rect">
+                  <a:avLst/>
+                </a:prstGeom>
+                <a:noFill/>
+              </p:spPr>
+              <p:txBody>
+                <a:bodyPr wrap="none" lIns="0" tIns="0" rIns="0" bIns="0" rtlCol="0">
+                  <a:spAutoFit/>
+                </a:bodyPr>
+                <a:lstStyle/>
+                <a:p>
+                  <a:pPr/>
+                  <a14:m>
+                    <m:oMathPara xmlns:m="http://schemas.openxmlformats.org/officeDocument/2006/math">
+                      <m:oMathParaPr>
+                        <m:jc m:val="centerGroup"/>
+                      </m:oMathParaPr>
+                      <m:oMath xmlns:m="http://schemas.openxmlformats.org/officeDocument/2006/math">
+                        <m:r>
+                          <a:rPr lang="en-US" b="0" i="1" smtClean="0">
+                            <a:latin typeface="Cambria Math" charset="0"/>
+                          </a:rPr>
+                          <m:t>𝑡𝑎𝑔</m:t>
+                        </m:r>
+                        <m:r>
+                          <a:rPr lang="en-US" b="0" i="1" smtClean="0">
+                            <a:latin typeface="Cambria Math" charset="0"/>
+                          </a:rPr>
+                          <m:t>($</m:t>
+                        </m:r>
+                        <m:r>
+                          <a:rPr lang="en-US" b="0" i="1" smtClean="0">
+                            <a:latin typeface="Cambria Math" charset="0"/>
+                          </a:rPr>
+                          <m:t>𝐿𝑃</m:t>
+                        </m:r>
+                        <m:r>
+                          <a:rPr lang="en-US" b="0" i="1" smtClean="0">
+                            <a:latin typeface="Cambria Math" charset="0"/>
+                          </a:rPr>
+                          <m:t>)</m:t>
+                        </m:r>
+                        <m:r>
+                          <a:rPr lang="en-US" b="0" i="1" smtClean="0">
+                            <a:latin typeface="Cambria Math" charset="0"/>
+                          </a:rPr>
+                          <m:t>⇒[100 :</m:t>
+                        </m:r>
+                        <m:d>
+                          <m:dPr>
+                            <m:begChr m:val="{"/>
+                            <m:endChr m:val="}"/>
+                            <m:ctrlPr>
+                              <a:rPr lang="en-US" b="0" i="1" smtClean="0">
+                                <a:latin typeface="Cambria Math" charset="0"/>
+                              </a:rPr>
+                            </m:ctrlPr>
+                          </m:dPr>
+                          <m:e>
+                            <m:r>
+                              <a:rPr lang="en-US" b="0" i="1" smtClean="0">
+                                <a:latin typeface="Cambria Math" charset="0"/>
+                              </a:rPr>
+                              <m:t>𝐴𝐺</m:t>
+                            </m:r>
+                            <m:r>
+                              <a:rPr lang="en-US" b="0" i="1" smtClean="0">
+                                <a:latin typeface="Cambria Math" charset="0"/>
+                              </a:rPr>
+                              <m:t>,</m:t>
+                            </m:r>
+                            <m:r>
+                              <a:rPr lang="en-US" b="0" i="1" smtClean="0">
+                                <a:latin typeface="Cambria Math" charset="0"/>
+                              </a:rPr>
+                              <m:t>𝐴𝐿</m:t>
+                            </m:r>
+                          </m:e>
+                        </m:d>
+                        <m:r>
+                          <a:rPr lang="en-US" b="0" i="1" smtClean="0">
+                            <a:latin typeface="Cambria Math" charset="0"/>
+                          </a:rPr>
+                          <m:t>→{</m:t>
+                        </m:r>
+                        <m:r>
+                          <a:rPr lang="en-US" b="0" i="1" smtClean="0">
+                            <a:latin typeface="Cambria Math" charset="0"/>
+                          </a:rPr>
+                          <m:t>𝐴𝐺</m:t>
+                        </m:r>
+                        <m:r>
+                          <a:rPr lang="en-US" b="0" i="1" smtClean="0">
+                            <a:latin typeface="Cambria Math" charset="0"/>
+                          </a:rPr>
+                          <m:t>,</m:t>
+                        </m:r>
+                        <m:r>
+                          <a:rPr lang="en-US" b="0" i="1" smtClean="0">
+                            <a:latin typeface="Cambria Math" charset="0"/>
+                          </a:rPr>
+                          <m:t>𝐴𝐿</m:t>
+                        </m:r>
+                        <m:r>
+                          <a:rPr lang="en-US" b="0" i="1" smtClean="0">
+                            <a:latin typeface="Cambria Math" charset="0"/>
+                          </a:rPr>
+                          <m:t>}]</m:t>
+                        </m:r>
+                      </m:oMath>
+                    </m:oMathPara>
+                  </a14:m>
+                  <a:endParaRPr lang="en-US" dirty="0"/>
+                </a:p>
+              </p:txBody>
+            </p:sp>
+          </mc:Choice>
+          <mc:Fallback>
+            <p:sp>
+              <p:nvSpPr>
+                <p:cNvPr id="27" name="TextBox 26"/>
+                <p:cNvSpPr txBox="1">
+                  <a:spLocks noRot="1" noChangeAspect="1" noMove="1" noResize="1" noEditPoints="1" noAdjustHandles="1" noChangeArrowheads="1" noChangeShapeType="1" noTextEdit="1"/>
+                </p:cNvSpPr>
+                <p:nvPr/>
+              </p:nvSpPr>
+              <p:spPr>
+                <a:xfrm>
+                  <a:off x="2405728" y="1735302"/>
+                  <a:ext cx="4076565" cy="276999"/>
+                </a:xfrm>
+                <a:prstGeom prst="rect">
+                  <a:avLst/>
+                </a:prstGeom>
+                <a:blipFill rotWithShape="0">
+                  <a:blip r:embed="rId17"/>
+                  <a:stretch>
+                    <a:fillRect l="-1196" t="-2222" r="-1495" b="-35556"/>
+                  </a:stretch>
+                </a:blipFill>
+              </p:spPr>
+              <p:txBody>
+                <a:bodyPr/>
+                <a:lstStyle/>
+                <a:p>
+                  <a:r>
+                    <a:rPr lang="en-US">
+                      <a:noFill/>
+                    </a:rPr>
+                    <a:t> </a:t>
+                  </a:r>
+                </a:p>
+              </p:txBody>
+            </p:sp>
+          </mc:Fallback>
+        </mc:AlternateContent>
+        <mc:AlternateContent xmlns:mc="http://schemas.openxmlformats.org/markup-compatibility/2006">
+          <mc:Choice xmlns:a14="http://schemas.microsoft.com/office/drawing/2010/main" Requires="a14">
+            <p:sp>
+              <p:nvSpPr>
+                <p:cNvPr id="28" name="TextBox 27"/>
+                <p:cNvSpPr txBox="1"/>
+                <p:nvPr/>
+              </p:nvSpPr>
+              <p:spPr>
+                <a:xfrm>
+                  <a:off x="3758876" y="2544563"/>
+                  <a:ext cx="226023" cy="276999"/>
+                </a:xfrm>
+                <a:prstGeom prst="rect">
+                  <a:avLst/>
+                </a:prstGeom>
+                <a:noFill/>
+              </p:spPr>
+              <p:txBody>
+                <a:bodyPr wrap="none" lIns="0" tIns="0" rIns="0" bIns="0" rtlCol="0">
+                  <a:spAutoFit/>
+                </a:bodyPr>
+                <a:lstStyle/>
+                <a:p>
+                  <a:pPr/>
+                  <a14:m>
+                    <m:oMathPara xmlns:m="http://schemas.openxmlformats.org/officeDocument/2006/math">
+                      <m:oMathParaPr>
+                        <m:jc m:val="centerGroup"/>
+                      </m:oMathParaPr>
+                      <m:oMath xmlns:m="http://schemas.openxmlformats.org/officeDocument/2006/math">
+                        <m:r>
+                          <a:rPr lang="en-US" b="0" i="1" smtClean="0">
+                            <a:latin typeface="Cambria Math" charset="0"/>
+                          </a:rPr>
+                          <m:t>…</m:t>
+                        </m:r>
+                      </m:oMath>
+                    </m:oMathPara>
+                  </a14:m>
+                  <a:endParaRPr lang="en-US" dirty="0"/>
+                </a:p>
+              </p:txBody>
+            </p:sp>
+          </mc:Choice>
+          <mc:Fallback>
+            <p:sp>
+              <p:nvSpPr>
+                <p:cNvPr id="28" name="TextBox 27"/>
+                <p:cNvSpPr txBox="1">
+                  <a:spLocks noRot="1" noChangeAspect="1" noMove="1" noResize="1" noEditPoints="1" noAdjustHandles="1" noChangeArrowheads="1" noChangeShapeType="1" noTextEdit="1"/>
+                </p:cNvSpPr>
+                <p:nvPr/>
+              </p:nvSpPr>
+              <p:spPr>
+                <a:xfrm>
+                  <a:off x="3758876" y="2544563"/>
+                  <a:ext cx="226023" cy="276999"/>
+                </a:xfrm>
+                <a:prstGeom prst="rect">
+                  <a:avLst/>
+                </a:prstGeom>
+                <a:blipFill rotWithShape="0">
+                  <a:blip r:embed="rId18"/>
+                  <a:stretch>
+                    <a:fillRect/>
+                  </a:stretch>
+                </a:blipFill>
+              </p:spPr>
+              <p:txBody>
+                <a:bodyPr/>
+                <a:lstStyle/>
+                <a:p>
+                  <a:r>
+                    <a:rPr lang="en-US">
+                      <a:noFill/>
+                    </a:rPr>
+                    <a:t> </a:t>
+                  </a:r>
+                </a:p>
+              </p:txBody>
+            </p:sp>
+          </mc:Fallback>
+        </mc:AlternateContent>
+      </p:grpSp>
+      <p:sp>
+        <p:nvSpPr>
+          <p:cNvPr id="29" name="TextBox 28"/>
+          <p:cNvSpPr txBox="1"/>
+          <p:nvPr/>
+        </p:nvSpPr>
+        <p:spPr>
+          <a:xfrm>
+            <a:off x="6728727" y="1220034"/>
+            <a:ext cx="2427972" cy="369332"/>
+          </a:xfrm>
+          <a:prstGeom prst="rect">
+            <a:avLst/>
+          </a:prstGeom>
+          <a:noFill/>
+        </p:spPr>
+        <p:txBody>
+          <a:bodyPr wrap="none" rtlCol="0">
+            <a:spAutoFit/>
+          </a:bodyPr>
+          <a:lstStyle/>
+          <a:p>
+            <a:r>
+              <a:rPr lang="en-US" b="1" dirty="0" smtClean="0"/>
+              <a:t>Incremental Template S</a:t>
+            </a:r>
+            <a:endParaRPr lang="en-US" b="1" dirty="0"/>
+          </a:p>
+        </p:txBody>
+      </p:sp>
+      <p:grpSp>
+        <p:nvGrpSpPr>
+          <p:cNvPr id="30" name="Group 29"/>
+          <p:cNvGrpSpPr/>
+          <p:nvPr/>
+        </p:nvGrpSpPr>
+        <p:grpSpPr>
+          <a:xfrm>
+            <a:off x="6696209" y="3134109"/>
+            <a:ext cx="4184864" cy="1838480"/>
+            <a:chOff x="2297429" y="1065209"/>
+            <a:chExt cx="4184864" cy="1838480"/>
+          </a:xfrm>
+        </p:grpSpPr>
+        <p:sp>
+          <p:nvSpPr>
+            <p:cNvPr id="31" name="Rectangle 30"/>
+            <p:cNvSpPr/>
+            <p:nvPr/>
+          </p:nvSpPr>
+          <p:spPr>
+            <a:xfrm>
+              <a:off x="2297429" y="1065209"/>
+              <a:ext cx="4184864" cy="1838480"/>
+            </a:xfrm>
+            <a:prstGeom prst="rect">
+              <a:avLst/>
+            </a:prstGeom>
+            <a:solidFill>
+              <a:schemeClr val="accent4">
+                <a:lumMod val="20000"/>
+                <a:lumOff val="80000"/>
+                <a:alpha val="51000"/>
+              </a:schemeClr>
+            </a:solidFill>
+          </p:spPr>
+          <p:style>
+            <a:lnRef idx="2">
+              <a:schemeClr val="accent1">
+                <a:shade val="50000"/>
+              </a:schemeClr>
+            </a:lnRef>
+            <a:fillRef idx="1">
+              <a:schemeClr val="accent1"/>
+            </a:fillRef>
+            <a:effectRef idx="0">
+              <a:schemeClr val="accent1"/>
+            </a:effectRef>
+            <a:fontRef idx="minor">
+              <a:schemeClr val="lt1"/>
+            </a:fontRef>
+          </p:style>
+          <p:txBody>
+            <a:bodyPr rtlCol="0" anchor="ctr"/>
+            <a:lstStyle/>
+            <a:p>
+              <a:pPr algn="ctr"/>
+              <a:endParaRPr lang="en-US" dirty="0"/>
+            </a:p>
+          </p:txBody>
+        </p:sp>
+        <mc:AlternateContent xmlns:mc="http://schemas.openxmlformats.org/markup-compatibility/2006">
+          <mc:Choice xmlns:a14="http://schemas.microsoft.com/office/drawing/2010/main" Requires="a14">
+            <p:sp>
+              <p:nvSpPr>
+                <p:cNvPr id="42" name="TextBox 41"/>
+                <p:cNvSpPr txBox="1"/>
+                <p:nvPr/>
+              </p:nvSpPr>
+              <p:spPr>
+                <a:xfrm>
+                  <a:off x="2454715" y="1430395"/>
+                  <a:ext cx="2527422" cy="276999"/>
+                </a:xfrm>
+                <a:prstGeom prst="rect">
+                  <a:avLst/>
+                </a:prstGeom>
+                <a:noFill/>
+              </p:spPr>
+              <p:txBody>
+                <a:bodyPr wrap="none" lIns="0" tIns="0" rIns="0" bIns="0" rtlCol="0">
+                  <a:spAutoFit/>
+                </a:bodyPr>
+                <a:lstStyle/>
+                <a:p>
+                  <a:pPr/>
+                  <a14:m>
+                    <m:oMathPara xmlns:m="http://schemas.openxmlformats.org/officeDocument/2006/math">
+                      <m:oMathParaPr>
+                        <m:jc m:val="centerGroup"/>
+                      </m:oMathParaPr>
+                      <m:oMath xmlns:m="http://schemas.openxmlformats.org/officeDocument/2006/math">
+                        <m:r>
+                          <a:rPr lang="en-US" b="0" i="1" smtClean="0">
+                            <a:latin typeface="Cambria Math" charset="0"/>
+                          </a:rPr>
+                          <m:t>𝑜𝑟𝑖𝑔𝑖𝑛𝑎𝑡𝑒</m:t>
+                        </m:r>
+                        <m:r>
+                          <a:rPr lang="en-US" b="0" i="1" smtClean="0">
+                            <a:latin typeface="Cambria Math" charset="0"/>
+                          </a:rPr>
+                          <m:t> $</m:t>
+                        </m:r>
+                        <m:r>
+                          <a:rPr lang="en-US" b="0" i="1" smtClean="0">
+                            <a:latin typeface="Cambria Math" charset="0"/>
+                          </a:rPr>
+                          <m:t>𝐺𝑃</m:t>
+                        </m:r>
+                        <m:r>
+                          <a:rPr lang="en-US" b="0" i="1" smtClean="0">
+                            <a:latin typeface="Cambria Math" charset="0"/>
+                          </a:rPr>
+                          <m:t> </m:t>
+                        </m:r>
+                        <m:r>
+                          <a:rPr lang="en-US" b="0" i="1" smtClean="0">
+                            <a:latin typeface="Cambria Math" charset="0"/>
+                          </a:rPr>
+                          <m:t>𝑡𝑎𝑔</m:t>
+                        </m:r>
+                        <m:r>
+                          <a:rPr lang="en-US" b="0" i="1" smtClean="0">
+                            <a:latin typeface="Cambria Math" charset="0"/>
+                          </a:rPr>
+                          <m:t>($</m:t>
+                        </m:r>
+                        <m:r>
+                          <a:rPr lang="en-US" b="0" i="1" smtClean="0">
+                            <a:latin typeface="Cambria Math" charset="0"/>
+                          </a:rPr>
+                          <m:t>𝐺𝑃</m:t>
+                        </m:r>
+                        <m:r>
+                          <a:rPr lang="en-US" b="0" i="1" smtClean="0">
+                            <a:latin typeface="Cambria Math" charset="0"/>
+                          </a:rPr>
+                          <m:t>)</m:t>
+                        </m:r>
+                      </m:oMath>
+                    </m:oMathPara>
+                  </a14:m>
+                  <a:endParaRPr lang="en-US" dirty="0"/>
+                </a:p>
+              </p:txBody>
+            </p:sp>
+          </mc:Choice>
+          <mc:Fallback>
+            <p:sp>
+              <p:nvSpPr>
+                <p:cNvPr id="42" name="TextBox 41"/>
+                <p:cNvSpPr txBox="1">
+                  <a:spLocks noRot="1" noChangeAspect="1" noMove="1" noResize="1" noEditPoints="1" noAdjustHandles="1" noChangeArrowheads="1" noChangeShapeType="1" noTextEdit="1"/>
+                </p:cNvSpPr>
+                <p:nvPr/>
+              </p:nvSpPr>
+              <p:spPr>
+                <a:xfrm>
+                  <a:off x="2454715" y="1430395"/>
+                  <a:ext cx="2527422" cy="276999"/>
+                </a:xfrm>
+                <a:prstGeom prst="rect">
+                  <a:avLst/>
+                </a:prstGeom>
+                <a:blipFill rotWithShape="0">
+                  <a:blip r:embed="rId19"/>
+                  <a:stretch>
+                    <a:fillRect l="-2651" t="-146667" r="-2892" b="-182222"/>
+                  </a:stretch>
+                </a:blipFill>
+              </p:spPr>
+              <p:txBody>
+                <a:bodyPr/>
+                <a:lstStyle/>
+                <a:p>
+                  <a:r>
+                    <a:rPr lang="en-US">
+                      <a:noFill/>
+                    </a:rPr>
+                    <a:t> </a:t>
+                  </a:r>
+                </a:p>
+              </p:txBody>
+            </p:sp>
+          </mc:Fallback>
+        </mc:AlternateContent>
+        <mc:AlternateContent xmlns:mc="http://schemas.openxmlformats.org/markup-compatibility/2006">
+          <mc:Choice xmlns:a14="http://schemas.microsoft.com/office/drawing/2010/main" Requires="a14">
+            <p:sp>
+              <p:nvSpPr>
+                <p:cNvPr id="50" name="TextBox 49"/>
+                <p:cNvSpPr txBox="1"/>
+                <p:nvPr/>
+              </p:nvSpPr>
+              <p:spPr>
+                <a:xfrm>
+                  <a:off x="2517147" y="1707394"/>
+                  <a:ext cx="226023" cy="276999"/>
+                </a:xfrm>
+                <a:prstGeom prst="rect">
+                  <a:avLst/>
+                </a:prstGeom>
+                <a:noFill/>
+              </p:spPr>
+              <p:txBody>
+                <a:bodyPr wrap="none" lIns="0" tIns="0" rIns="0" bIns="0" rtlCol="0">
+                  <a:spAutoFit/>
+                </a:bodyPr>
+                <a:lstStyle/>
+                <a:p>
+                  <a:pPr/>
+                  <a14:m>
+                    <m:oMathPara xmlns:m="http://schemas.openxmlformats.org/officeDocument/2006/math">
+                      <m:oMathParaPr>
+                        <m:jc m:val="centerGroup"/>
+                      </m:oMathParaPr>
+                      <m:oMath xmlns:m="http://schemas.openxmlformats.org/officeDocument/2006/math">
+                        <m:r>
+                          <a:rPr lang="en-US" b="0" i="1" smtClean="0">
+                            <a:latin typeface="Cambria Math" charset="0"/>
+                          </a:rPr>
+                          <m:t>…</m:t>
+                        </m:r>
+                      </m:oMath>
+                    </m:oMathPara>
+                  </a14:m>
+                  <a:endParaRPr lang="en-US" dirty="0"/>
+                </a:p>
+              </p:txBody>
+            </p:sp>
+          </mc:Choice>
+          <mc:Fallback>
+            <p:sp>
+              <p:nvSpPr>
+                <p:cNvPr id="50" name="TextBox 49"/>
+                <p:cNvSpPr txBox="1">
+                  <a:spLocks noRot="1" noChangeAspect="1" noMove="1" noResize="1" noEditPoints="1" noAdjustHandles="1" noChangeArrowheads="1" noChangeShapeType="1" noTextEdit="1"/>
+                </p:cNvSpPr>
+                <p:nvPr/>
+              </p:nvSpPr>
+              <p:spPr>
+                <a:xfrm>
+                  <a:off x="2517147" y="1707394"/>
+                  <a:ext cx="226023" cy="276999"/>
+                </a:xfrm>
+                <a:prstGeom prst="rect">
+                  <a:avLst/>
+                </a:prstGeom>
+                <a:blipFill rotWithShape="0">
+                  <a:blip r:embed="rId20"/>
+                  <a:stretch>
+                    <a:fillRect/>
+                  </a:stretch>
+                </a:blipFill>
+              </p:spPr>
+              <p:txBody>
+                <a:bodyPr/>
+                <a:lstStyle/>
+                <a:p>
+                  <a:r>
+                    <a:rPr lang="en-US">
+                      <a:noFill/>
+                    </a:rPr>
+                    <a:t> </a:t>
+                  </a:r>
+                </a:p>
+              </p:txBody>
+            </p:sp>
+          </mc:Fallback>
+        </mc:AlternateContent>
+      </p:grpSp>
+      <p:sp>
+        <p:nvSpPr>
+          <p:cNvPr id="51" name="TextBox 50"/>
+          <p:cNvSpPr txBox="1"/>
+          <p:nvPr/>
+        </p:nvSpPr>
+        <p:spPr>
+          <a:xfrm>
+            <a:off x="6751587" y="3122679"/>
+            <a:ext cx="2574038" cy="369332"/>
+          </a:xfrm>
+          <a:prstGeom prst="rect">
+            <a:avLst/>
+          </a:prstGeom>
+          <a:noFill/>
+        </p:spPr>
+        <p:txBody>
+          <a:bodyPr wrap="none" rtlCol="0">
+            <a:spAutoFit/>
+          </a:bodyPr>
+          <a:lstStyle/>
+          <a:p>
+            <a:r>
+              <a:rPr lang="en-US" b="1" dirty="0" smtClean="0"/>
+              <a:t>Incremental Template TG</a:t>
             </a:r>
             <a:endParaRPr lang="en-US" b="1" dirty="0"/>
           </a:p>

</xml_diff>

<commit_message>
separate analysis by all/some pairs. add valleyfree results
</commit_message>
<xml_diff>
--- a/paper/abstraction/figures/examples.pptx
+++ b/paper/abstraction/figures/examples.pptx
@@ -5,7 +5,7 @@
     <p:sldMasterId id="2147483648" r:id="rId1"/>
   </p:sldMasterIdLst>
   <p:notesMasterIdLst>
-    <p:notesMasterId r:id="rId17"/>
+    <p:notesMasterId r:id="rId16"/>
   </p:notesMasterIdLst>
   <p:sldIdLst>
     <p:sldId id="412" r:id="rId2"/>
@@ -21,8 +21,7 @@
     <p:sldId id="423" r:id="rId12"/>
     <p:sldId id="424" r:id="rId13"/>
     <p:sldId id="426" r:id="rId14"/>
-    <p:sldId id="429" r:id="rId15"/>
-    <p:sldId id="428" r:id="rId16"/>
+    <p:sldId id="428" r:id="rId15"/>
   </p:sldIdLst>
   <p:sldSz cx="12192000" cy="6858000"/>
   <p:notesSz cx="6858000" cy="9144000"/>
@@ -15270,8 +15269,8 @@
             <a:chExt cx="841256" cy="1578019"/>
           </a:xfrm>
         </p:grpSpPr>
-        <mc:AlternateContent xmlns:mc="http://schemas.openxmlformats.org/markup-compatibility/2006">
-          <mc:Choice xmlns:a14="http://schemas.microsoft.com/office/drawing/2010/main" Requires="a14">
+        <mc:AlternateContent xmlns:mc="http://schemas.openxmlformats.org/markup-compatibility/2006" xmlns:a14="http://schemas.microsoft.com/office/drawing/2010/main">
+          <mc:Choice Requires="a14">
             <p:sp>
               <p:nvSpPr>
                 <p:cNvPr id="51" name="TextBox 50"/>
@@ -15327,7 +15326,7 @@
               </p:txBody>
             </p:sp>
           </mc:Choice>
-          <mc:Fallback>
+          <mc:Fallback xmlns="">
             <p:sp>
               <p:nvSpPr>
                 <p:cNvPr id="51" name="TextBox 50"/>
@@ -15366,8 +15365,8 @@
             </p:sp>
           </mc:Fallback>
         </mc:AlternateContent>
-        <mc:AlternateContent xmlns:mc="http://schemas.openxmlformats.org/markup-compatibility/2006">
-          <mc:Choice xmlns:a14="http://schemas.microsoft.com/office/drawing/2010/main" Requires="a14">
+        <mc:AlternateContent xmlns:mc="http://schemas.openxmlformats.org/markup-compatibility/2006" xmlns:a14="http://schemas.microsoft.com/office/drawing/2010/main">
+          <mc:Choice Requires="a14">
             <p:sp>
               <p:nvSpPr>
                 <p:cNvPr id="52" name="TextBox 51"/>
@@ -15423,7 +15422,7 @@
               </p:txBody>
             </p:sp>
           </mc:Choice>
-          <mc:Fallback>
+          <mc:Fallback xmlns="">
             <p:sp>
               <p:nvSpPr>
                 <p:cNvPr id="52" name="TextBox 51"/>
@@ -15462,8 +15461,8 @@
             </p:sp>
           </mc:Fallback>
         </mc:AlternateContent>
-        <mc:AlternateContent xmlns:mc="http://schemas.openxmlformats.org/markup-compatibility/2006">
-          <mc:Choice xmlns:a14="http://schemas.microsoft.com/office/drawing/2010/main" Requires="a14">
+        <mc:AlternateContent xmlns:mc="http://schemas.openxmlformats.org/markup-compatibility/2006" xmlns:a14="http://schemas.microsoft.com/office/drawing/2010/main">
+          <mc:Choice Requires="a14">
             <p:sp>
               <p:nvSpPr>
                 <p:cNvPr id="53" name="TextBox 52"/>
@@ -15513,7 +15512,7 @@
               </p:txBody>
             </p:sp>
           </mc:Choice>
-          <mc:Fallback>
+          <mc:Fallback xmlns="">
             <p:sp>
               <p:nvSpPr>
                 <p:cNvPr id="53" name="TextBox 52"/>
@@ -15552,8 +15551,8 @@
             </p:sp>
           </mc:Fallback>
         </mc:AlternateContent>
-        <mc:AlternateContent xmlns:mc="http://schemas.openxmlformats.org/markup-compatibility/2006">
-          <mc:Choice xmlns:a14="http://schemas.microsoft.com/office/drawing/2010/main" Requires="a14">
+        <mc:AlternateContent xmlns:mc="http://schemas.openxmlformats.org/markup-compatibility/2006" xmlns:a14="http://schemas.microsoft.com/office/drawing/2010/main">
+          <mc:Choice Requires="a14">
             <p:sp>
               <p:nvSpPr>
                 <p:cNvPr id="54" name="TextBox 53"/>
@@ -15603,7 +15602,7 @@
               </p:txBody>
             </p:sp>
           </mc:Choice>
-          <mc:Fallback>
+          <mc:Fallback xmlns="">
             <p:sp>
               <p:nvSpPr>
                 <p:cNvPr id="54" name="TextBox 53"/>
@@ -15642,8 +15641,8 @@
             </p:sp>
           </mc:Fallback>
         </mc:AlternateContent>
-        <mc:AlternateContent xmlns:mc="http://schemas.openxmlformats.org/markup-compatibility/2006">
-          <mc:Choice xmlns:a14="http://schemas.microsoft.com/office/drawing/2010/main" Requires="a14">
+        <mc:AlternateContent xmlns:mc="http://schemas.openxmlformats.org/markup-compatibility/2006" xmlns:a14="http://schemas.microsoft.com/office/drawing/2010/main">
+          <mc:Choice Requires="a14">
             <p:sp>
               <p:nvSpPr>
                 <p:cNvPr id="55" name="TextBox 54"/>
@@ -15693,7 +15692,7 @@
               </p:txBody>
             </p:sp>
           </mc:Choice>
-          <mc:Fallback>
+          <mc:Fallback xmlns="">
             <p:sp>
               <p:nvSpPr>
                 <p:cNvPr id="55" name="TextBox 54"/>
@@ -15743,7 +15742,7 @@
             </p:nvSpPr>
             <p:spPr>
               <a:xfrm>
-                <a:off x="1709847" y="-272962"/>
+                <a:off x="1765969" y="-259582"/>
                 <a:ext cx="773866" cy="307777"/>
               </a:xfrm>
               <a:prstGeom prst="rect">
@@ -15814,7 +15813,7 @@
             </p:nvSpPr>
             <p:spPr>
               <a:xfrm>
-                <a:off x="1709847" y="-272962"/>
+                <a:off x="1765969" y="-259582"/>
                 <a:ext cx="773866" cy="307777"/>
               </a:xfrm>
               <a:prstGeom prst="rect">
@@ -15852,7 +15851,7 @@
             </p:nvSpPr>
             <p:spPr>
               <a:xfrm>
-                <a:off x="1707186" y="151378"/>
+                <a:off x="1759696" y="165306"/>
                 <a:ext cx="779829" cy="307777"/>
               </a:xfrm>
               <a:prstGeom prst="rect">
@@ -15923,7 +15922,7 @@
             </p:nvSpPr>
             <p:spPr>
               <a:xfrm>
-                <a:off x="1707186" y="151378"/>
+                <a:off x="1759696" y="165306"/>
                 <a:ext cx="779829" cy="307777"/>
               </a:xfrm>
               <a:prstGeom prst="rect">
@@ -15932,7 +15931,7 @@
               <a:blipFill rotWithShape="0">
                 <a:blip r:embed="rId11"/>
                 <a:stretch>
-                  <a:fillRect l="-7813" r="-7031" b="-16000"/>
+                  <a:fillRect l="-7813" r="-7031" b="-15686"/>
                 </a:stretch>
               </a:blipFill>
             </p:spPr>
@@ -15961,7 +15960,7 @@
             </p:nvSpPr>
             <p:spPr>
               <a:xfrm>
-                <a:off x="1707186" y="-644788"/>
+                <a:off x="1759696" y="-655072"/>
                 <a:ext cx="676724" cy="307777"/>
               </a:xfrm>
               <a:prstGeom prst="rect">
@@ -16013,7 +16012,7 @@
             </p:nvSpPr>
             <p:spPr>
               <a:xfrm>
-                <a:off x="1707186" y="-644788"/>
+                <a:off x="1759696" y="-655072"/>
                 <a:ext cx="676724" cy="307777"/>
               </a:xfrm>
               <a:prstGeom prst="rect">
@@ -16022,7 +16021,7 @@
               <a:blipFill rotWithShape="0">
                 <a:blip r:embed="rId12"/>
                 <a:stretch>
-                  <a:fillRect l="-8108" r="-9009" b="-5882"/>
+                  <a:fillRect l="-9009" r="-8108" b="-6000"/>
                 </a:stretch>
               </a:blipFill>
             </p:spPr>
@@ -16075,7 +16074,7 @@
         </p:nvSpPr>
         <p:spPr>
           <a:xfrm>
-            <a:off x="2781844" y="3377263"/>
+            <a:off x="3203879" y="3377263"/>
             <a:ext cx="504684" cy="326113"/>
           </a:xfrm>
           <a:prstGeom prst="rect">
@@ -16650,13 +16649,16 @@
       <p:cxnSp>
         <p:nvCxnSpPr>
           <p:cNvPr id="78" name="Straight Connector 77"/>
-          <p:cNvCxnSpPr/>
+          <p:cNvCxnSpPr>
+            <a:stCxn id="56" idx="2"/>
+            <a:endCxn id="59" idx="0"/>
+          </p:cNvCxnSpPr>
           <p:nvPr/>
         </p:nvCxnSpPr>
         <p:spPr>
           <a:xfrm flipH="1">
             <a:off x="2069137" y="3703376"/>
-            <a:ext cx="965049" cy="2245092"/>
+            <a:ext cx="1387084" cy="2245092"/>
           </a:xfrm>
           <a:prstGeom prst="line">
             <a:avLst/>
@@ -16693,7 +16695,7 @@
             <p:spPr>
               <a:xfrm>
                 <a:off x="1749747" y="4926144"/>
-                <a:ext cx="683777" cy="307777"/>
+                <a:ext cx="820866" cy="307777"/>
               </a:xfrm>
               <a:prstGeom prst="rect">
                 <a:avLst/>
@@ -16717,13 +16719,13 @@
                         <a:rPr lang="en-US" sz="2000" b="0" i="1" smtClean="0">
                           <a:latin typeface="Cambria Math" charset="0"/>
                         </a:rPr>
-                        <m:t>𝑘</m:t>
+                        <m:t>𝑙𝑒𝑣𝑒𝑙</m:t>
                       </m:r>
                       <m:r>
                         <a:rPr lang="en-US" sz="2000" b="0" i="1" smtClean="0">
                           <a:latin typeface="Cambria Math" charset="0"/>
                         </a:rPr>
-                        <m:t>=0</m:t>
+                        <m:t> 0</m:t>
                       </m:r>
                     </m:oMath>
                   </m:oMathPara>
@@ -16745,7 +16747,7 @@
             <p:spPr>
               <a:xfrm>
                 <a:off x="1749747" y="4926144"/>
-                <a:ext cx="683777" cy="307777"/>
+                <a:ext cx="820866" cy="307777"/>
               </a:xfrm>
               <a:prstGeom prst="rect">
                 <a:avLst/>
@@ -16753,7 +16755,7 @@
               <a:blipFill rotWithShape="0">
                 <a:blip r:embed="rId13"/>
                 <a:stretch>
-                  <a:fillRect l="-8929" r="-8929" b="-9804"/>
+                  <a:fillRect l="-7407" t="-143137" r="-6667" b="-174510"/>
                 </a:stretch>
               </a:blipFill>
             </p:spPr>
@@ -16782,8 +16784,8 @@
             </p:nvSpPr>
             <p:spPr>
               <a:xfrm>
-                <a:off x="1936401" y="3406285"/>
-                <a:ext cx="683777" cy="307777"/>
+                <a:off x="1763892" y="3375139"/>
+                <a:ext cx="820866" cy="307777"/>
               </a:xfrm>
               <a:prstGeom prst="rect">
                 <a:avLst/>
@@ -16807,13 +16809,13 @@
                         <a:rPr lang="en-US" sz="2000" b="0" i="1" smtClean="0">
                           <a:latin typeface="Cambria Math" charset="0"/>
                         </a:rPr>
-                        <m:t>𝑘</m:t>
+                        <m:t>𝑙𝑒𝑣𝑒𝑙</m:t>
                       </m:r>
                       <m:r>
                         <a:rPr lang="en-US" sz="2000" b="0" i="1" smtClean="0">
                           <a:latin typeface="Cambria Math" charset="0"/>
                         </a:rPr>
-                        <m:t>=1</m:t>
+                        <m:t> 1</m:t>
                       </m:r>
                     </m:oMath>
                   </m:oMathPara>
@@ -16834,8 +16836,8 @@
             </p:nvSpPr>
             <p:spPr>
               <a:xfrm>
-                <a:off x="1936401" y="3406285"/>
-                <a:ext cx="683777" cy="307777"/>
+                <a:off x="1763892" y="3375139"/>
+                <a:ext cx="820866" cy="307777"/>
               </a:xfrm>
               <a:prstGeom prst="rect">
                 <a:avLst/>
@@ -16843,7 +16845,7 @@
               <a:blipFill rotWithShape="0">
                 <a:blip r:embed="rId14"/>
                 <a:stretch>
-                  <a:fillRect l="-9821" r="-8036" b="-10000"/>
+                  <a:fillRect l="-7407" t="-146000" r="-6667" b="-180000"/>
                 </a:stretch>
               </a:blipFill>
             </p:spPr>
@@ -16930,8 +16932,8 @@
             <a:chExt cx="944883" cy="1253267"/>
           </a:xfrm>
         </p:grpSpPr>
-        <mc:AlternateContent xmlns:mc="http://schemas.openxmlformats.org/markup-compatibility/2006">
-          <mc:Choice xmlns:a14="http://schemas.microsoft.com/office/drawing/2010/main" Requires="a14">
+        <mc:AlternateContent xmlns:mc="http://schemas.openxmlformats.org/markup-compatibility/2006" xmlns:a14="http://schemas.microsoft.com/office/drawing/2010/main">
+          <mc:Choice Requires="a14">
             <p:sp>
               <p:nvSpPr>
                 <p:cNvPr id="85" name="TextBox 84"/>
@@ -17006,7 +17008,7 @@
               </p:txBody>
             </p:sp>
           </mc:Choice>
-          <mc:Fallback>
+          <mc:Fallback xmlns="">
             <p:sp>
               <p:nvSpPr>
                 <p:cNvPr id="85" name="TextBox 84"/>
@@ -17045,8 +17047,8 @@
             </p:sp>
           </mc:Fallback>
         </mc:AlternateContent>
-        <mc:AlternateContent xmlns:mc="http://schemas.openxmlformats.org/markup-compatibility/2006">
-          <mc:Choice xmlns:a14="http://schemas.microsoft.com/office/drawing/2010/main" Requires="a14">
+        <mc:AlternateContent xmlns:mc="http://schemas.openxmlformats.org/markup-compatibility/2006" xmlns:a14="http://schemas.microsoft.com/office/drawing/2010/main">
+          <mc:Choice Requires="a14">
             <p:sp>
               <p:nvSpPr>
                 <p:cNvPr id="88" name="TextBox 87"/>
@@ -17102,7 +17104,7 @@
               </p:txBody>
             </p:sp>
           </mc:Choice>
-          <mc:Fallback>
+          <mc:Fallback xmlns="">
             <p:sp>
               <p:nvSpPr>
                 <p:cNvPr id="88" name="TextBox 87"/>
@@ -17141,8 +17143,8 @@
             </p:sp>
           </mc:Fallback>
         </mc:AlternateContent>
-        <mc:AlternateContent xmlns:mc="http://schemas.openxmlformats.org/markup-compatibility/2006">
-          <mc:Choice xmlns:a14="http://schemas.microsoft.com/office/drawing/2010/main" Requires="a14">
+        <mc:AlternateContent xmlns:mc="http://schemas.openxmlformats.org/markup-compatibility/2006" xmlns:a14="http://schemas.microsoft.com/office/drawing/2010/main">
+          <mc:Choice Requires="a14">
             <p:sp>
               <p:nvSpPr>
                 <p:cNvPr id="89" name="TextBox 88"/>
@@ -17192,7 +17194,7 @@
               </p:txBody>
             </p:sp>
           </mc:Choice>
-          <mc:Fallback>
+          <mc:Fallback xmlns="">
             <p:sp>
               <p:nvSpPr>
                 <p:cNvPr id="89" name="TextBox 88"/>
@@ -17231,8 +17233,8 @@
             </p:sp>
           </mc:Fallback>
         </mc:AlternateContent>
-        <mc:AlternateContent xmlns:mc="http://schemas.openxmlformats.org/markup-compatibility/2006">
-          <mc:Choice xmlns:a14="http://schemas.microsoft.com/office/drawing/2010/main" Requires="a14">
+        <mc:AlternateContent xmlns:mc="http://schemas.openxmlformats.org/markup-compatibility/2006" xmlns:a14="http://schemas.microsoft.com/office/drawing/2010/main">
+          <mc:Choice Requires="a14">
             <p:sp>
               <p:nvSpPr>
                 <p:cNvPr id="91" name="TextBox 90"/>
@@ -17282,7 +17284,7 @@
               </p:txBody>
             </p:sp>
           </mc:Choice>
-          <mc:Fallback>
+          <mc:Fallback xmlns="">
             <p:sp>
               <p:nvSpPr>
                 <p:cNvPr id="91" name="TextBox 90"/>
@@ -18669,13 +18671,16 @@
       <p:cxnSp>
         <p:nvCxnSpPr>
           <p:cNvPr id="138" name="Straight Connector 137"/>
-          <p:cNvCxnSpPr/>
+          <p:cNvCxnSpPr>
+            <a:stCxn id="56" idx="2"/>
+            <a:endCxn id="122" idx="0"/>
+          </p:cNvCxnSpPr>
           <p:nvPr/>
         </p:nvCxnSpPr>
         <p:spPr>
           <a:xfrm>
-            <a:off x="3034186" y="3703376"/>
-            <a:ext cx="1416535" cy="2249982"/>
+            <a:off x="3456221" y="3703376"/>
+            <a:ext cx="994500" cy="2249982"/>
           </a:xfrm>
           <a:prstGeom prst="line">
             <a:avLst/>
@@ -18809,8 +18814,8 @@
         </p:nvCxnSpPr>
         <p:spPr>
           <a:xfrm>
-            <a:off x="3034186" y="3703376"/>
-            <a:ext cx="3933020" cy="1650917"/>
+            <a:off x="3456221" y="3703376"/>
+            <a:ext cx="3510985" cy="1650917"/>
           </a:xfrm>
           <a:prstGeom prst="line">
             <a:avLst/>
@@ -19209,2683 +19214,6 @@
 </file>
 
 <file path=ppt/slides/slide14.xml><?xml version="1.0" encoding="utf-8"?>
-<p:sld xmlns:a="http://schemas.openxmlformats.org/drawingml/2006/main" xmlns:r="http://schemas.openxmlformats.org/officeDocument/2006/relationships" xmlns:p="http://schemas.openxmlformats.org/presentationml/2006/main">
-  <p:cSld>
-    <p:spTree>
-      <p:nvGrpSpPr>
-        <p:cNvPr id="1" name=""/>
-        <p:cNvGrpSpPr/>
-        <p:nvPr/>
-      </p:nvGrpSpPr>
-      <p:grpSpPr>
-        <a:xfrm>
-          <a:off x="0" y="0"/>
-          <a:ext cx="0" cy="0"/>
-          <a:chOff x="0" y="0"/>
-          <a:chExt cx="0" cy="0"/>
-        </a:xfrm>
-      </p:grpSpPr>
-      <p:sp>
-        <p:nvSpPr>
-          <p:cNvPr id="32" name="Rectangle 31"/>
-          <p:cNvSpPr/>
-          <p:nvPr/>
-        </p:nvSpPr>
-        <p:spPr>
-          <a:xfrm>
-            <a:off x="4621005" y="3496963"/>
-            <a:ext cx="2060931" cy="1465330"/>
-          </a:xfrm>
-          <a:prstGeom prst="rect">
-            <a:avLst/>
-          </a:prstGeom>
-          <a:noFill/>
-          <a:ln>
-            <a:solidFill>
-              <a:schemeClr val="tx1"/>
-            </a:solidFill>
-            <a:prstDash val="dashDot"/>
-          </a:ln>
-        </p:spPr>
-        <p:style>
-          <a:lnRef idx="2">
-            <a:schemeClr val="accent1">
-              <a:shade val="50000"/>
-            </a:schemeClr>
-          </a:lnRef>
-          <a:fillRef idx="1">
-            <a:schemeClr val="accent1"/>
-          </a:fillRef>
-          <a:effectRef idx="0">
-            <a:schemeClr val="accent1"/>
-          </a:effectRef>
-          <a:fontRef idx="minor">
-            <a:schemeClr val="lt1"/>
-          </a:fontRef>
-        </p:style>
-        <p:txBody>
-          <a:bodyPr rtlCol="0" anchor="ctr"/>
-          <a:lstStyle/>
-          <a:p>
-            <a:pPr algn="ctr"/>
-            <a:endParaRPr lang="en-US" sz="1600"/>
-          </a:p>
-        </p:txBody>
-      </p:sp>
-      <p:sp>
-        <p:nvSpPr>
-          <p:cNvPr id="60" name="Rectangle 59"/>
-          <p:cNvSpPr/>
-          <p:nvPr/>
-        </p:nvSpPr>
-        <p:spPr>
-          <a:xfrm>
-            <a:off x="7101759" y="3059264"/>
-            <a:ext cx="2091916" cy="1903029"/>
-          </a:xfrm>
-          <a:prstGeom prst="rect">
-            <a:avLst/>
-          </a:prstGeom>
-          <a:noFill/>
-          <a:ln>
-            <a:solidFill>
-              <a:schemeClr val="tx1"/>
-            </a:solidFill>
-            <a:prstDash val="dashDot"/>
-          </a:ln>
-        </p:spPr>
-        <p:style>
-          <a:lnRef idx="2">
-            <a:schemeClr val="accent1">
-              <a:shade val="50000"/>
-            </a:schemeClr>
-          </a:lnRef>
-          <a:fillRef idx="1">
-            <a:schemeClr val="accent1"/>
-          </a:fillRef>
-          <a:effectRef idx="0">
-            <a:schemeClr val="accent1"/>
-          </a:effectRef>
-          <a:fontRef idx="minor">
-            <a:schemeClr val="lt1"/>
-          </a:fontRef>
-        </p:style>
-        <p:txBody>
-          <a:bodyPr rtlCol="0" anchor="ctr"/>
-          <a:lstStyle/>
-          <a:p>
-            <a:pPr algn="ctr"/>
-            <a:endParaRPr lang="en-US" sz="1600"/>
-          </a:p>
-        </p:txBody>
-      </p:sp>
-      <p:cxnSp>
-        <p:nvCxnSpPr>
-          <p:cNvPr id="71" name="Straight Connector 70"/>
-          <p:cNvCxnSpPr>
-            <a:stCxn id="117" idx="2"/>
-            <a:endCxn id="5" idx="0"/>
-          </p:cNvCxnSpPr>
-          <p:nvPr/>
-        </p:nvCxnSpPr>
-        <p:spPr>
-          <a:xfrm flipH="1">
-            <a:off x="2980603" y="2967954"/>
-            <a:ext cx="644456" cy="665079"/>
-          </a:xfrm>
-          <a:prstGeom prst="line">
-            <a:avLst/>
-          </a:prstGeom>
-          <a:ln w="19050">
-            <a:solidFill>
-              <a:schemeClr val="tx1"/>
-            </a:solidFill>
-          </a:ln>
-        </p:spPr>
-        <p:style>
-          <a:lnRef idx="1">
-            <a:schemeClr val="accent1"/>
-          </a:lnRef>
-          <a:fillRef idx="0">
-            <a:schemeClr val="accent1"/>
-          </a:fillRef>
-          <a:effectRef idx="0">
-            <a:schemeClr val="accent1"/>
-          </a:effectRef>
-          <a:fontRef idx="minor">
-            <a:schemeClr val="tx1"/>
-          </a:fontRef>
-        </p:style>
-      </p:cxnSp>
-      <p:grpSp>
-        <p:nvGrpSpPr>
-          <p:cNvPr id="106" name="Group 105"/>
-          <p:cNvGrpSpPr/>
-          <p:nvPr/>
-        </p:nvGrpSpPr>
-        <p:grpSpPr>
-          <a:xfrm>
-            <a:off x="2056096" y="3633033"/>
-            <a:ext cx="1764153" cy="1164616"/>
-            <a:chOff x="1333831" y="3288757"/>
-            <a:chExt cx="1764153" cy="1164616"/>
-          </a:xfrm>
-        </p:grpSpPr>
-        <p:sp>
-          <p:nvSpPr>
-            <p:cNvPr id="5" name="Rectangle 4"/>
-            <p:cNvSpPr/>
-            <p:nvPr/>
-          </p:nvSpPr>
-          <p:spPr>
-            <a:xfrm>
-              <a:off x="2005996" y="3288757"/>
-              <a:ext cx="504684" cy="326113"/>
-            </a:xfrm>
-            <a:prstGeom prst="rect">
-              <a:avLst/>
-            </a:prstGeom>
-            <a:solidFill>
-              <a:schemeClr val="bg2">
-                <a:lumMod val="90000"/>
-              </a:schemeClr>
-            </a:solidFill>
-            <a:ln>
-              <a:solidFill>
-                <a:schemeClr val="tx1"/>
-              </a:solidFill>
-            </a:ln>
-          </p:spPr>
-          <p:style>
-            <a:lnRef idx="2">
-              <a:schemeClr val="accent1">
-                <a:shade val="50000"/>
-              </a:schemeClr>
-            </a:lnRef>
-            <a:fillRef idx="1">
-              <a:schemeClr val="accent1"/>
-            </a:fillRef>
-            <a:effectRef idx="0">
-              <a:schemeClr val="accent1"/>
-            </a:effectRef>
-            <a:fontRef idx="minor">
-              <a:schemeClr val="lt1"/>
-            </a:fontRef>
-          </p:style>
-          <p:txBody>
-            <a:bodyPr rtlCol="0" anchor="ctr"/>
-            <a:lstStyle/>
-            <a:p>
-              <a:pPr algn="ctr"/>
-              <a:endParaRPr lang="en-US" sz="2000" dirty="0">
-                <a:solidFill>
-                  <a:schemeClr val="tx1"/>
-                </a:solidFill>
-              </a:endParaRPr>
-            </a:p>
-          </p:txBody>
-        </p:sp>
-        <p:cxnSp>
-          <p:nvCxnSpPr>
-            <p:cNvPr id="70" name="Straight Connector 69"/>
-            <p:cNvCxnSpPr>
-              <a:stCxn id="5" idx="2"/>
-              <a:endCxn id="86" idx="0"/>
-            </p:cNvCxnSpPr>
-            <p:nvPr/>
-          </p:nvCxnSpPr>
-          <p:spPr>
-            <a:xfrm flipH="1">
-              <a:off x="1586173" y="3614870"/>
-              <a:ext cx="672165" cy="512389"/>
-            </a:xfrm>
-            <a:prstGeom prst="line">
-              <a:avLst/>
-            </a:prstGeom>
-            <a:ln w="19050">
-              <a:solidFill>
-                <a:schemeClr val="tx1"/>
-              </a:solidFill>
-            </a:ln>
-          </p:spPr>
-          <p:style>
-            <a:lnRef idx="1">
-              <a:schemeClr val="accent1"/>
-            </a:lnRef>
-            <a:fillRef idx="0">
-              <a:schemeClr val="accent1"/>
-            </a:fillRef>
-            <a:effectRef idx="0">
-              <a:schemeClr val="accent1"/>
-            </a:effectRef>
-            <a:fontRef idx="minor">
-              <a:schemeClr val="tx1"/>
-            </a:fontRef>
-          </p:style>
-        </p:cxnSp>
-        <p:sp>
-          <p:nvSpPr>
-            <p:cNvPr id="86" name="Rectangle 85"/>
-            <p:cNvSpPr/>
-            <p:nvPr/>
-          </p:nvSpPr>
-          <p:spPr>
-            <a:xfrm>
-              <a:off x="1333831" y="4127259"/>
-              <a:ext cx="504684" cy="326113"/>
-            </a:xfrm>
-            <a:prstGeom prst="rect">
-              <a:avLst/>
-            </a:prstGeom>
-            <a:solidFill>
-              <a:schemeClr val="bg2">
-                <a:lumMod val="90000"/>
-              </a:schemeClr>
-            </a:solidFill>
-            <a:ln>
-              <a:solidFill>
-                <a:schemeClr val="tx1"/>
-              </a:solidFill>
-            </a:ln>
-          </p:spPr>
-          <p:style>
-            <a:lnRef idx="2">
-              <a:schemeClr val="accent1">
-                <a:shade val="50000"/>
-              </a:schemeClr>
-            </a:lnRef>
-            <a:fillRef idx="1">
-              <a:schemeClr val="accent1"/>
-            </a:fillRef>
-            <a:effectRef idx="0">
-              <a:schemeClr val="accent1"/>
-            </a:effectRef>
-            <a:fontRef idx="minor">
-              <a:schemeClr val="lt1"/>
-            </a:fontRef>
-          </p:style>
-          <p:txBody>
-            <a:bodyPr rtlCol="0" anchor="ctr"/>
-            <a:lstStyle/>
-            <a:p>
-              <a:pPr algn="ctr"/>
-              <a:endParaRPr lang="en-US" sz="2000" dirty="0">
-                <a:solidFill>
-                  <a:schemeClr val="tx1"/>
-                </a:solidFill>
-              </a:endParaRPr>
-            </a:p>
-          </p:txBody>
-        </p:sp>
-        <p:sp>
-          <p:nvSpPr>
-            <p:cNvPr id="87" name="Rectangle 86"/>
-            <p:cNvSpPr/>
-            <p:nvPr/>
-          </p:nvSpPr>
-          <p:spPr>
-            <a:xfrm>
-              <a:off x="2593300" y="4127260"/>
-              <a:ext cx="504684" cy="326113"/>
-            </a:xfrm>
-            <a:prstGeom prst="rect">
-              <a:avLst/>
-            </a:prstGeom>
-            <a:solidFill>
-              <a:schemeClr val="bg2">
-                <a:lumMod val="90000"/>
-              </a:schemeClr>
-            </a:solidFill>
-            <a:ln>
-              <a:solidFill>
-                <a:schemeClr val="tx1"/>
-              </a:solidFill>
-            </a:ln>
-          </p:spPr>
-          <p:style>
-            <a:lnRef idx="2">
-              <a:schemeClr val="accent1">
-                <a:shade val="50000"/>
-              </a:schemeClr>
-            </a:lnRef>
-            <a:fillRef idx="1">
-              <a:schemeClr val="accent1"/>
-            </a:fillRef>
-            <a:effectRef idx="0">
-              <a:schemeClr val="accent1"/>
-            </a:effectRef>
-            <a:fontRef idx="minor">
-              <a:schemeClr val="lt1"/>
-            </a:fontRef>
-          </p:style>
-          <p:txBody>
-            <a:bodyPr rtlCol="0" anchor="ctr"/>
-            <a:lstStyle/>
-            <a:p>
-              <a:pPr algn="ctr"/>
-              <a:endParaRPr lang="en-US" sz="2000" dirty="0">
-                <a:solidFill>
-                  <a:schemeClr val="tx1"/>
-                </a:solidFill>
-              </a:endParaRPr>
-            </a:p>
-          </p:txBody>
-        </p:sp>
-        <p:cxnSp>
-          <p:nvCxnSpPr>
-            <p:cNvPr id="90" name="Straight Connector 89"/>
-            <p:cNvCxnSpPr>
-              <a:stCxn id="5" idx="2"/>
-              <a:endCxn id="87" idx="0"/>
-            </p:cNvCxnSpPr>
-            <p:nvPr/>
-          </p:nvCxnSpPr>
-          <p:spPr>
-            <a:xfrm>
-              <a:off x="2258338" y="3614870"/>
-              <a:ext cx="587304" cy="512390"/>
-            </a:xfrm>
-            <a:prstGeom prst="line">
-              <a:avLst/>
-            </a:prstGeom>
-            <a:ln w="19050">
-              <a:solidFill>
-                <a:schemeClr val="tx1"/>
-              </a:solidFill>
-            </a:ln>
-          </p:spPr>
-          <p:style>
-            <a:lnRef idx="1">
-              <a:schemeClr val="accent1"/>
-            </a:lnRef>
-            <a:fillRef idx="0">
-              <a:schemeClr val="accent1"/>
-            </a:fillRef>
-            <a:effectRef idx="0">
-              <a:schemeClr val="accent1"/>
-            </a:effectRef>
-            <a:fontRef idx="minor">
-              <a:schemeClr val="tx1"/>
-            </a:fontRef>
-          </p:style>
-        </p:cxnSp>
-        <p:cxnSp>
-          <p:nvCxnSpPr>
-            <p:cNvPr id="93" name="Straight Connector 92"/>
-            <p:cNvCxnSpPr>
-              <a:stCxn id="86" idx="3"/>
-              <a:endCxn id="87" idx="1"/>
-            </p:cNvCxnSpPr>
-            <p:nvPr/>
-          </p:nvCxnSpPr>
-          <p:spPr>
-            <a:xfrm>
-              <a:off x="1838515" y="4290316"/>
-              <a:ext cx="754785" cy="1"/>
-            </a:xfrm>
-            <a:prstGeom prst="line">
-              <a:avLst/>
-            </a:prstGeom>
-            <a:ln w="19050">
-              <a:solidFill>
-                <a:schemeClr val="tx1"/>
-              </a:solidFill>
-            </a:ln>
-          </p:spPr>
-          <p:style>
-            <a:lnRef idx="1">
-              <a:schemeClr val="accent1"/>
-            </a:lnRef>
-            <a:fillRef idx="0">
-              <a:schemeClr val="accent1"/>
-            </a:fillRef>
-            <a:effectRef idx="0">
-              <a:schemeClr val="accent1"/>
-            </a:effectRef>
-            <a:fontRef idx="minor">
-              <a:schemeClr val="tx1"/>
-            </a:fontRef>
-          </p:style>
-        </p:cxnSp>
-      </p:grpSp>
-      <p:grpSp>
-        <p:nvGrpSpPr>
-          <p:cNvPr id="107" name="Group 106"/>
-          <p:cNvGrpSpPr/>
-          <p:nvPr/>
-        </p:nvGrpSpPr>
-        <p:grpSpPr>
-          <a:xfrm>
-            <a:off x="4748061" y="3647321"/>
-            <a:ext cx="1764153" cy="1164616"/>
-            <a:chOff x="1333831" y="3288757"/>
-            <a:chExt cx="1764153" cy="1164616"/>
-          </a:xfrm>
-        </p:grpSpPr>
-        <p:sp>
-          <p:nvSpPr>
-            <p:cNvPr id="108" name="Rectangle 107"/>
-            <p:cNvSpPr/>
-            <p:nvPr/>
-          </p:nvSpPr>
-          <p:spPr>
-            <a:xfrm>
-              <a:off x="2005996" y="3288757"/>
-              <a:ext cx="504684" cy="326113"/>
-            </a:xfrm>
-            <a:prstGeom prst="rect">
-              <a:avLst/>
-            </a:prstGeom>
-            <a:solidFill>
-              <a:schemeClr val="bg2">
-                <a:lumMod val="90000"/>
-              </a:schemeClr>
-            </a:solidFill>
-            <a:ln>
-              <a:solidFill>
-                <a:schemeClr val="tx1"/>
-              </a:solidFill>
-            </a:ln>
-          </p:spPr>
-          <p:style>
-            <a:lnRef idx="2">
-              <a:schemeClr val="accent1">
-                <a:shade val="50000"/>
-              </a:schemeClr>
-            </a:lnRef>
-            <a:fillRef idx="1">
-              <a:schemeClr val="accent1"/>
-            </a:fillRef>
-            <a:effectRef idx="0">
-              <a:schemeClr val="accent1"/>
-            </a:effectRef>
-            <a:fontRef idx="minor">
-              <a:schemeClr val="lt1"/>
-            </a:fontRef>
-          </p:style>
-          <p:txBody>
-            <a:bodyPr rtlCol="0" anchor="ctr"/>
-            <a:lstStyle/>
-            <a:p>
-              <a:pPr algn="ctr"/>
-              <a:endParaRPr lang="en-US" sz="2000" dirty="0">
-                <a:solidFill>
-                  <a:schemeClr val="tx1"/>
-                </a:solidFill>
-              </a:endParaRPr>
-            </a:p>
-          </p:txBody>
-        </p:sp>
-        <p:cxnSp>
-          <p:nvCxnSpPr>
-            <p:cNvPr id="109" name="Straight Connector 108"/>
-            <p:cNvCxnSpPr>
-              <a:stCxn id="110" idx="2"/>
-            </p:cNvCxnSpPr>
-            <p:nvPr/>
-          </p:nvCxnSpPr>
-          <p:spPr>
-            <a:xfrm flipH="1">
-              <a:off x="1586173" y="3614870"/>
-              <a:ext cx="672165" cy="512389"/>
-            </a:xfrm>
-            <a:prstGeom prst="line">
-              <a:avLst/>
-            </a:prstGeom>
-            <a:ln w="19050">
-              <a:solidFill>
-                <a:schemeClr val="tx1"/>
-              </a:solidFill>
-            </a:ln>
-          </p:spPr>
-          <p:style>
-            <a:lnRef idx="1">
-              <a:schemeClr val="accent1"/>
-            </a:lnRef>
-            <a:fillRef idx="0">
-              <a:schemeClr val="accent1"/>
-            </a:fillRef>
-            <a:effectRef idx="0">
-              <a:schemeClr val="accent1"/>
-            </a:effectRef>
-            <a:fontRef idx="minor">
-              <a:schemeClr val="tx1"/>
-            </a:fontRef>
-          </p:style>
-        </p:cxnSp>
-        <p:sp>
-          <p:nvSpPr>
-            <p:cNvPr id="110" name="Rectangle 109"/>
-            <p:cNvSpPr/>
-            <p:nvPr/>
-          </p:nvSpPr>
-          <p:spPr>
-            <a:xfrm>
-              <a:off x="1333831" y="4127259"/>
-              <a:ext cx="504684" cy="326113"/>
-            </a:xfrm>
-            <a:prstGeom prst="rect">
-              <a:avLst/>
-            </a:prstGeom>
-            <a:solidFill>
-              <a:schemeClr val="bg2">
-                <a:lumMod val="90000"/>
-              </a:schemeClr>
-            </a:solidFill>
-            <a:ln>
-              <a:solidFill>
-                <a:schemeClr val="tx1"/>
-              </a:solidFill>
-            </a:ln>
-          </p:spPr>
-          <p:style>
-            <a:lnRef idx="2">
-              <a:schemeClr val="accent1">
-                <a:shade val="50000"/>
-              </a:schemeClr>
-            </a:lnRef>
-            <a:fillRef idx="1">
-              <a:schemeClr val="accent1"/>
-            </a:fillRef>
-            <a:effectRef idx="0">
-              <a:schemeClr val="accent1"/>
-            </a:effectRef>
-            <a:fontRef idx="minor">
-              <a:schemeClr val="lt1"/>
-            </a:fontRef>
-          </p:style>
-          <p:txBody>
-            <a:bodyPr rtlCol="0" anchor="ctr"/>
-            <a:lstStyle/>
-            <a:p>
-              <a:pPr algn="ctr"/>
-              <a:endParaRPr lang="en-US" sz="2000" dirty="0">
-                <a:solidFill>
-                  <a:schemeClr val="tx1"/>
-                </a:solidFill>
-              </a:endParaRPr>
-            </a:p>
-          </p:txBody>
-        </p:sp>
-        <p:sp>
-          <p:nvSpPr>
-            <p:cNvPr id="111" name="Rectangle 110"/>
-            <p:cNvSpPr/>
-            <p:nvPr/>
-          </p:nvSpPr>
-          <p:spPr>
-            <a:xfrm>
-              <a:off x="2593300" y="4127260"/>
-              <a:ext cx="504684" cy="326113"/>
-            </a:xfrm>
-            <a:prstGeom prst="rect">
-              <a:avLst/>
-            </a:prstGeom>
-            <a:solidFill>
-              <a:schemeClr val="bg2">
-                <a:lumMod val="90000"/>
-              </a:schemeClr>
-            </a:solidFill>
-            <a:ln>
-              <a:solidFill>
-                <a:schemeClr val="tx1"/>
-              </a:solidFill>
-            </a:ln>
-          </p:spPr>
-          <p:style>
-            <a:lnRef idx="2">
-              <a:schemeClr val="accent1">
-                <a:shade val="50000"/>
-              </a:schemeClr>
-            </a:lnRef>
-            <a:fillRef idx="1">
-              <a:schemeClr val="accent1"/>
-            </a:fillRef>
-            <a:effectRef idx="0">
-              <a:schemeClr val="accent1"/>
-            </a:effectRef>
-            <a:fontRef idx="minor">
-              <a:schemeClr val="lt1"/>
-            </a:fontRef>
-          </p:style>
-          <p:txBody>
-            <a:bodyPr rtlCol="0" anchor="ctr"/>
-            <a:lstStyle/>
-            <a:p>
-              <a:pPr algn="ctr"/>
-              <a:endParaRPr lang="en-US" sz="2000" dirty="0">
-                <a:solidFill>
-                  <a:schemeClr val="tx1"/>
-                </a:solidFill>
-              </a:endParaRPr>
-            </a:p>
-          </p:txBody>
-        </p:sp>
-        <p:cxnSp>
-          <p:nvCxnSpPr>
-            <p:cNvPr id="112" name="Straight Connector 111"/>
-            <p:cNvCxnSpPr>
-              <a:stCxn id="110" idx="2"/>
-            </p:cNvCxnSpPr>
-            <p:nvPr/>
-          </p:nvCxnSpPr>
-          <p:spPr>
-            <a:xfrm>
-              <a:off x="2258338" y="3614870"/>
-              <a:ext cx="587304" cy="512390"/>
-            </a:xfrm>
-            <a:prstGeom prst="line">
-              <a:avLst/>
-            </a:prstGeom>
-            <a:ln w="19050">
-              <a:solidFill>
-                <a:schemeClr val="tx1"/>
-              </a:solidFill>
-            </a:ln>
-          </p:spPr>
-          <p:style>
-            <a:lnRef idx="1">
-              <a:schemeClr val="accent1"/>
-            </a:lnRef>
-            <a:fillRef idx="0">
-              <a:schemeClr val="accent1"/>
-            </a:fillRef>
-            <a:effectRef idx="0">
-              <a:schemeClr val="accent1"/>
-            </a:effectRef>
-            <a:fontRef idx="minor">
-              <a:schemeClr val="tx1"/>
-            </a:fontRef>
-          </p:style>
-        </p:cxnSp>
-        <p:cxnSp>
-          <p:nvCxnSpPr>
-            <p:cNvPr id="113" name="Straight Connector 112"/>
-            <p:cNvCxnSpPr/>
-            <p:nvPr/>
-          </p:nvCxnSpPr>
-          <p:spPr>
-            <a:xfrm>
-              <a:off x="1838515" y="4290316"/>
-              <a:ext cx="754785" cy="1"/>
-            </a:xfrm>
-            <a:prstGeom prst="line">
-              <a:avLst/>
-            </a:prstGeom>
-            <a:ln w="19050">
-              <a:solidFill>
-                <a:schemeClr val="tx1"/>
-              </a:solidFill>
-            </a:ln>
-          </p:spPr>
-          <p:style>
-            <a:lnRef idx="1">
-              <a:schemeClr val="accent1"/>
-            </a:lnRef>
-            <a:fillRef idx="0">
-              <a:schemeClr val="accent1"/>
-            </a:fillRef>
-            <a:effectRef idx="0">
-              <a:schemeClr val="accent1"/>
-            </a:effectRef>
-            <a:fontRef idx="minor">
-              <a:schemeClr val="tx1"/>
-            </a:fontRef>
-          </p:style>
-        </p:cxnSp>
-      </p:grpSp>
-      <p:grpSp>
-        <p:nvGrpSpPr>
-          <p:cNvPr id="114" name="Group 113"/>
-          <p:cNvGrpSpPr/>
-          <p:nvPr/>
-        </p:nvGrpSpPr>
-        <p:grpSpPr>
-          <a:xfrm>
-            <a:off x="3372717" y="1803339"/>
-            <a:ext cx="1764153" cy="1164616"/>
-            <a:chOff x="1333831" y="3288757"/>
-            <a:chExt cx="1764153" cy="1164616"/>
-          </a:xfrm>
-        </p:grpSpPr>
-        <p:sp>
-          <p:nvSpPr>
-            <p:cNvPr id="115" name="Rectangle 114"/>
-            <p:cNvSpPr/>
-            <p:nvPr/>
-          </p:nvSpPr>
-          <p:spPr>
-            <a:xfrm>
-              <a:off x="2005996" y="3288757"/>
-              <a:ext cx="504684" cy="326113"/>
-            </a:xfrm>
-            <a:prstGeom prst="rect">
-              <a:avLst/>
-            </a:prstGeom>
-            <a:solidFill>
-              <a:schemeClr val="bg2">
-                <a:lumMod val="90000"/>
-              </a:schemeClr>
-            </a:solidFill>
-            <a:ln>
-              <a:solidFill>
-                <a:schemeClr val="tx1"/>
-              </a:solidFill>
-            </a:ln>
-          </p:spPr>
-          <p:style>
-            <a:lnRef idx="2">
-              <a:schemeClr val="accent1">
-                <a:shade val="50000"/>
-              </a:schemeClr>
-            </a:lnRef>
-            <a:fillRef idx="1">
-              <a:schemeClr val="accent1"/>
-            </a:fillRef>
-            <a:effectRef idx="0">
-              <a:schemeClr val="accent1"/>
-            </a:effectRef>
-            <a:fontRef idx="minor">
-              <a:schemeClr val="lt1"/>
-            </a:fontRef>
-          </p:style>
-          <p:txBody>
-            <a:bodyPr rtlCol="0" anchor="ctr"/>
-            <a:lstStyle/>
-            <a:p>
-              <a:pPr algn="ctr"/>
-              <a:endParaRPr lang="en-US" sz="2000" dirty="0">
-                <a:solidFill>
-                  <a:schemeClr val="tx1"/>
-                </a:solidFill>
-              </a:endParaRPr>
-            </a:p>
-          </p:txBody>
-        </p:sp>
-        <p:cxnSp>
-          <p:nvCxnSpPr>
-            <p:cNvPr id="116" name="Straight Connector 115"/>
-            <p:cNvCxnSpPr/>
-            <p:nvPr/>
-          </p:nvCxnSpPr>
-          <p:spPr>
-            <a:xfrm flipH="1">
-              <a:off x="1586173" y="3614870"/>
-              <a:ext cx="672165" cy="512389"/>
-            </a:xfrm>
-            <a:prstGeom prst="line">
-              <a:avLst/>
-            </a:prstGeom>
-            <a:ln w="19050">
-              <a:solidFill>
-                <a:schemeClr val="tx1"/>
-              </a:solidFill>
-            </a:ln>
-          </p:spPr>
-          <p:style>
-            <a:lnRef idx="1">
-              <a:schemeClr val="accent1"/>
-            </a:lnRef>
-            <a:fillRef idx="0">
-              <a:schemeClr val="accent1"/>
-            </a:fillRef>
-            <a:effectRef idx="0">
-              <a:schemeClr val="accent1"/>
-            </a:effectRef>
-            <a:fontRef idx="minor">
-              <a:schemeClr val="tx1"/>
-            </a:fontRef>
-          </p:style>
-        </p:cxnSp>
-        <p:sp>
-          <p:nvSpPr>
-            <p:cNvPr id="117" name="Rectangle 116"/>
-            <p:cNvSpPr/>
-            <p:nvPr/>
-          </p:nvSpPr>
-          <p:spPr>
-            <a:xfrm>
-              <a:off x="1333831" y="4127259"/>
-              <a:ext cx="504684" cy="326113"/>
-            </a:xfrm>
-            <a:prstGeom prst="rect">
-              <a:avLst/>
-            </a:prstGeom>
-            <a:solidFill>
-              <a:schemeClr val="bg2">
-                <a:lumMod val="90000"/>
-              </a:schemeClr>
-            </a:solidFill>
-            <a:ln>
-              <a:solidFill>
-                <a:schemeClr val="tx1"/>
-              </a:solidFill>
-            </a:ln>
-          </p:spPr>
-          <p:style>
-            <a:lnRef idx="2">
-              <a:schemeClr val="accent1">
-                <a:shade val="50000"/>
-              </a:schemeClr>
-            </a:lnRef>
-            <a:fillRef idx="1">
-              <a:schemeClr val="accent1"/>
-            </a:fillRef>
-            <a:effectRef idx="0">
-              <a:schemeClr val="accent1"/>
-            </a:effectRef>
-            <a:fontRef idx="minor">
-              <a:schemeClr val="lt1"/>
-            </a:fontRef>
-          </p:style>
-          <p:txBody>
-            <a:bodyPr rtlCol="0" anchor="ctr"/>
-            <a:lstStyle/>
-            <a:p>
-              <a:pPr algn="ctr"/>
-              <a:endParaRPr lang="en-US" sz="2000" dirty="0">
-                <a:solidFill>
-                  <a:schemeClr val="tx1"/>
-                </a:solidFill>
-              </a:endParaRPr>
-            </a:p>
-          </p:txBody>
-        </p:sp>
-        <p:sp>
-          <p:nvSpPr>
-            <p:cNvPr id="118" name="Rectangle 117"/>
-            <p:cNvSpPr/>
-            <p:nvPr/>
-          </p:nvSpPr>
-          <p:spPr>
-            <a:xfrm>
-              <a:off x="2593300" y="4127260"/>
-              <a:ext cx="504684" cy="326113"/>
-            </a:xfrm>
-            <a:prstGeom prst="rect">
-              <a:avLst/>
-            </a:prstGeom>
-            <a:solidFill>
-              <a:schemeClr val="bg2">
-                <a:lumMod val="90000"/>
-              </a:schemeClr>
-            </a:solidFill>
-            <a:ln>
-              <a:solidFill>
-                <a:schemeClr val="tx1"/>
-              </a:solidFill>
-            </a:ln>
-          </p:spPr>
-          <p:style>
-            <a:lnRef idx="2">
-              <a:schemeClr val="accent1">
-                <a:shade val="50000"/>
-              </a:schemeClr>
-            </a:lnRef>
-            <a:fillRef idx="1">
-              <a:schemeClr val="accent1"/>
-            </a:fillRef>
-            <a:effectRef idx="0">
-              <a:schemeClr val="accent1"/>
-            </a:effectRef>
-            <a:fontRef idx="minor">
-              <a:schemeClr val="lt1"/>
-            </a:fontRef>
-          </p:style>
-          <p:txBody>
-            <a:bodyPr rtlCol="0" anchor="ctr"/>
-            <a:lstStyle/>
-            <a:p>
-              <a:pPr algn="ctr"/>
-              <a:endParaRPr lang="en-US" sz="2000" dirty="0">
-                <a:solidFill>
-                  <a:schemeClr val="tx1"/>
-                </a:solidFill>
-              </a:endParaRPr>
-            </a:p>
-          </p:txBody>
-        </p:sp>
-        <p:cxnSp>
-          <p:nvCxnSpPr>
-            <p:cNvPr id="119" name="Straight Connector 118"/>
-            <p:cNvCxnSpPr/>
-            <p:nvPr/>
-          </p:nvCxnSpPr>
-          <p:spPr>
-            <a:xfrm>
-              <a:off x="2258338" y="3614870"/>
-              <a:ext cx="587304" cy="512390"/>
-            </a:xfrm>
-            <a:prstGeom prst="line">
-              <a:avLst/>
-            </a:prstGeom>
-            <a:ln w="19050">
-              <a:solidFill>
-                <a:schemeClr val="tx1"/>
-              </a:solidFill>
-            </a:ln>
-          </p:spPr>
-          <p:style>
-            <a:lnRef idx="1">
-              <a:schemeClr val="accent1"/>
-            </a:lnRef>
-            <a:fillRef idx="0">
-              <a:schemeClr val="accent1"/>
-            </a:fillRef>
-            <a:effectRef idx="0">
-              <a:schemeClr val="accent1"/>
-            </a:effectRef>
-            <a:fontRef idx="minor">
-              <a:schemeClr val="tx1"/>
-            </a:fontRef>
-          </p:style>
-        </p:cxnSp>
-        <p:cxnSp>
-          <p:nvCxnSpPr>
-            <p:cNvPr id="120" name="Straight Connector 119"/>
-            <p:cNvCxnSpPr/>
-            <p:nvPr/>
-          </p:nvCxnSpPr>
-          <p:spPr>
-            <a:xfrm>
-              <a:off x="1838515" y="4290316"/>
-              <a:ext cx="754785" cy="1"/>
-            </a:xfrm>
-            <a:prstGeom prst="line">
-              <a:avLst/>
-            </a:prstGeom>
-            <a:ln w="19050">
-              <a:solidFill>
-                <a:schemeClr val="tx1"/>
-              </a:solidFill>
-            </a:ln>
-          </p:spPr>
-          <p:style>
-            <a:lnRef idx="1">
-              <a:schemeClr val="accent1"/>
-            </a:lnRef>
-            <a:fillRef idx="0">
-              <a:schemeClr val="accent1"/>
-            </a:fillRef>
-            <a:effectRef idx="0">
-              <a:schemeClr val="accent1"/>
-            </a:effectRef>
-            <a:fontRef idx="minor">
-              <a:schemeClr val="tx1"/>
-            </a:fontRef>
-          </p:style>
-        </p:cxnSp>
-      </p:grpSp>
-      <p:cxnSp>
-        <p:nvCxnSpPr>
-          <p:cNvPr id="123" name="Straight Connector 122"/>
-          <p:cNvCxnSpPr>
-            <a:stCxn id="118" idx="2"/>
-            <a:endCxn id="108" idx="0"/>
-          </p:cNvCxnSpPr>
-          <p:nvPr/>
-        </p:nvCxnSpPr>
-        <p:spPr>
-          <a:xfrm>
-            <a:off x="4884528" y="2967955"/>
-            <a:ext cx="788040" cy="679366"/>
-          </a:xfrm>
-          <a:prstGeom prst="line">
-            <a:avLst/>
-          </a:prstGeom>
-          <a:ln w="19050">
-            <a:solidFill>
-              <a:schemeClr val="tx1"/>
-            </a:solidFill>
-          </a:ln>
-        </p:spPr>
-        <p:style>
-          <a:lnRef idx="1">
-            <a:schemeClr val="accent1"/>
-          </a:lnRef>
-          <a:fillRef idx="0">
-            <a:schemeClr val="accent1"/>
-          </a:fillRef>
-          <a:effectRef idx="0">
-            <a:schemeClr val="accent1"/>
-          </a:effectRef>
-          <a:fontRef idx="minor">
-            <a:schemeClr val="tx1"/>
-          </a:fontRef>
-        </p:style>
-      </p:cxnSp>
-      <p:cxnSp>
-        <p:nvCxnSpPr>
-          <p:cNvPr id="126" name="Straight Connector 125"/>
-          <p:cNvCxnSpPr>
-            <a:stCxn id="87" idx="3"/>
-            <a:endCxn id="110" idx="1"/>
-          </p:cNvCxnSpPr>
-          <p:nvPr/>
-        </p:nvCxnSpPr>
-        <p:spPr>
-          <a:xfrm>
-            <a:off x="3820249" y="4634593"/>
-            <a:ext cx="927812" cy="14287"/>
-          </a:xfrm>
-          <a:prstGeom prst="line">
-            <a:avLst/>
-          </a:prstGeom>
-          <a:ln w="19050">
-            <a:solidFill>
-              <a:schemeClr val="tx1"/>
-            </a:solidFill>
-          </a:ln>
-        </p:spPr>
-        <p:style>
-          <a:lnRef idx="1">
-            <a:schemeClr val="accent1"/>
-          </a:lnRef>
-          <a:fillRef idx="0">
-            <a:schemeClr val="accent1"/>
-          </a:fillRef>
-          <a:effectRef idx="0">
-            <a:schemeClr val="accent1"/>
-          </a:effectRef>
-          <a:fontRef idx="minor">
-            <a:schemeClr val="tx1"/>
-          </a:fontRef>
-        </p:style>
-      </p:cxnSp>
-      <p:sp>
-        <p:nvSpPr>
-          <p:cNvPr id="131" name="Rectangle 130"/>
-          <p:cNvSpPr/>
-          <p:nvPr/>
-        </p:nvSpPr>
-        <p:spPr>
-          <a:xfrm>
-            <a:off x="1926798" y="3482675"/>
-            <a:ext cx="2060931" cy="1465330"/>
-          </a:xfrm>
-          <a:prstGeom prst="rect">
-            <a:avLst/>
-          </a:prstGeom>
-          <a:noFill/>
-          <a:ln>
-            <a:solidFill>
-              <a:schemeClr val="tx1"/>
-            </a:solidFill>
-            <a:prstDash val="dashDot"/>
-          </a:ln>
-        </p:spPr>
-        <p:style>
-          <a:lnRef idx="2">
-            <a:schemeClr val="accent1">
-              <a:shade val="50000"/>
-            </a:schemeClr>
-          </a:lnRef>
-          <a:fillRef idx="1">
-            <a:schemeClr val="accent1"/>
-          </a:fillRef>
-          <a:effectRef idx="0">
-            <a:schemeClr val="accent1"/>
-          </a:effectRef>
-          <a:fontRef idx="minor">
-            <a:schemeClr val="lt1"/>
-          </a:fontRef>
-        </p:style>
-        <p:txBody>
-          <a:bodyPr rtlCol="0" anchor="ctr"/>
-          <a:lstStyle/>
-          <a:p>
-            <a:pPr algn="ctr"/>
-            <a:endParaRPr lang="en-US" sz="1600"/>
-          </a:p>
-        </p:txBody>
-      </p:sp>
-      <p:sp>
-        <p:nvSpPr>
-          <p:cNvPr id="132" name="Rectangle 131"/>
-          <p:cNvSpPr/>
-          <p:nvPr/>
-        </p:nvSpPr>
-        <p:spPr>
-          <a:xfrm>
-            <a:off x="3234447" y="1652981"/>
-            <a:ext cx="2060931" cy="1465330"/>
-          </a:xfrm>
-          <a:prstGeom prst="rect">
-            <a:avLst/>
-          </a:prstGeom>
-          <a:noFill/>
-          <a:ln>
-            <a:solidFill>
-              <a:schemeClr val="tx1"/>
-            </a:solidFill>
-            <a:prstDash val="dashDot"/>
-          </a:ln>
-        </p:spPr>
-        <p:style>
-          <a:lnRef idx="2">
-            <a:schemeClr val="accent1">
-              <a:shade val="50000"/>
-            </a:schemeClr>
-          </a:lnRef>
-          <a:fillRef idx="1">
-            <a:schemeClr val="accent1"/>
-          </a:fillRef>
-          <a:effectRef idx="0">
-            <a:schemeClr val="accent1"/>
-          </a:effectRef>
-          <a:fontRef idx="minor">
-            <a:schemeClr val="lt1"/>
-          </a:fontRef>
-        </p:style>
-        <p:txBody>
-          <a:bodyPr rtlCol="0" anchor="ctr"/>
-          <a:lstStyle/>
-          <a:p>
-            <a:pPr algn="ctr"/>
-            <a:endParaRPr lang="en-US" sz="1600"/>
-          </a:p>
-        </p:txBody>
-      </p:sp>
-      <p:cxnSp>
-        <p:nvCxnSpPr>
-          <p:cNvPr id="136" name="Curved Connector 135"/>
-          <p:cNvCxnSpPr>
-            <a:stCxn id="86" idx="2"/>
-            <a:endCxn id="111" idx="2"/>
-          </p:cNvCxnSpPr>
-          <p:nvPr/>
-        </p:nvCxnSpPr>
-        <p:spPr>
-          <a:xfrm rot="16200000" flipH="1">
-            <a:off x="4277011" y="2829075"/>
-            <a:ext cx="14289" cy="3951434"/>
-          </a:xfrm>
-          <a:prstGeom prst="curvedConnector3">
-            <a:avLst>
-              <a:gd name="adj1" fmla="val 1699832"/>
-            </a:avLst>
-          </a:prstGeom>
-          <a:ln w="19050">
-            <a:solidFill>
-              <a:schemeClr val="tx1"/>
-            </a:solidFill>
-          </a:ln>
-        </p:spPr>
-        <p:style>
-          <a:lnRef idx="1">
-            <a:schemeClr val="accent1"/>
-          </a:lnRef>
-          <a:fillRef idx="0">
-            <a:schemeClr val="accent1"/>
-          </a:fillRef>
-          <a:effectRef idx="0">
-            <a:schemeClr val="accent1"/>
-          </a:effectRef>
-          <a:fontRef idx="minor">
-            <a:schemeClr val="tx1"/>
-          </a:fontRef>
-        </p:style>
-      </p:cxnSp>
-      <p:cxnSp>
-        <p:nvCxnSpPr>
-          <p:cNvPr id="143" name="Curved Connector 142"/>
-          <p:cNvCxnSpPr>
-            <a:stCxn id="86" idx="0"/>
-            <a:endCxn id="115" idx="1"/>
-          </p:cNvCxnSpPr>
-          <p:nvPr/>
-        </p:nvCxnSpPr>
-        <p:spPr>
-          <a:xfrm rot="5400000" flipH="1" flipV="1">
-            <a:off x="1924091" y="2350744"/>
-            <a:ext cx="2505139" cy="1736444"/>
-          </a:xfrm>
-          <a:prstGeom prst="curvedConnector2">
-            <a:avLst/>
-          </a:prstGeom>
-          <a:ln w="19050">
-            <a:solidFill>
-              <a:schemeClr val="tx1"/>
-            </a:solidFill>
-          </a:ln>
-        </p:spPr>
-        <p:style>
-          <a:lnRef idx="1">
-            <a:schemeClr val="accent1"/>
-          </a:lnRef>
-          <a:fillRef idx="0">
-            <a:schemeClr val="accent1"/>
-          </a:fillRef>
-          <a:effectRef idx="0">
-            <a:schemeClr val="accent1"/>
-          </a:effectRef>
-          <a:fontRef idx="minor">
-            <a:schemeClr val="tx1"/>
-          </a:fontRef>
-        </p:style>
-      </p:cxnSp>
-      <p:cxnSp>
-        <p:nvCxnSpPr>
-          <p:cNvPr id="146" name="Curved Connector 145"/>
-          <p:cNvCxnSpPr>
-            <a:stCxn id="111" idx="0"/>
-            <a:endCxn id="115" idx="3"/>
-          </p:cNvCxnSpPr>
-          <p:nvPr/>
-        </p:nvCxnSpPr>
-        <p:spPr>
-          <a:xfrm rot="16200000" flipV="1">
-            <a:off x="4145005" y="2370957"/>
-            <a:ext cx="2519428" cy="1710306"/>
-          </a:xfrm>
-          <a:prstGeom prst="curvedConnector2">
-            <a:avLst/>
-          </a:prstGeom>
-          <a:ln w="19050">
-            <a:solidFill>
-              <a:schemeClr val="tx1"/>
-            </a:solidFill>
-          </a:ln>
-        </p:spPr>
-        <p:style>
-          <a:lnRef idx="1">
-            <a:schemeClr val="accent1"/>
-          </a:lnRef>
-          <a:fillRef idx="0">
-            <a:schemeClr val="accent1"/>
-          </a:fillRef>
-          <a:effectRef idx="0">
-            <a:schemeClr val="accent1"/>
-          </a:effectRef>
-          <a:fontRef idx="minor">
-            <a:schemeClr val="tx1"/>
-          </a:fontRef>
-        </p:style>
-      </p:cxnSp>
-      <p:cxnSp>
-        <p:nvCxnSpPr>
-          <p:cNvPr id="149" name="Straight Connector 148"/>
-          <p:cNvCxnSpPr>
-            <a:stCxn id="5" idx="3"/>
-            <a:endCxn id="108" idx="1"/>
-          </p:cNvCxnSpPr>
-          <p:nvPr/>
-        </p:nvCxnSpPr>
-        <p:spPr>
-          <a:xfrm>
-            <a:off x="3232945" y="3796090"/>
-            <a:ext cx="2187281" cy="14288"/>
-          </a:xfrm>
-          <a:prstGeom prst="line">
-            <a:avLst/>
-          </a:prstGeom>
-          <a:ln w="19050">
-            <a:solidFill>
-              <a:schemeClr val="tx1"/>
-            </a:solidFill>
-          </a:ln>
-        </p:spPr>
-        <p:style>
-          <a:lnRef idx="1">
-            <a:schemeClr val="accent1"/>
-          </a:lnRef>
-          <a:fillRef idx="0">
-            <a:schemeClr val="accent1"/>
-          </a:fillRef>
-          <a:effectRef idx="0">
-            <a:schemeClr val="accent1"/>
-          </a:effectRef>
-          <a:fontRef idx="minor">
-            <a:schemeClr val="tx1"/>
-          </a:fontRef>
-        </p:style>
-      </p:cxnSp>
-      <p:cxnSp>
-        <p:nvCxnSpPr>
-          <p:cNvPr id="154" name="Straight Connector 153"/>
-          <p:cNvCxnSpPr>
-            <a:stCxn id="117" idx="2"/>
-            <a:endCxn id="110" idx="0"/>
-          </p:cNvCxnSpPr>
-          <p:nvPr/>
-        </p:nvCxnSpPr>
-        <p:spPr>
-          <a:xfrm>
-            <a:off x="3625059" y="2967954"/>
-            <a:ext cx="1375344" cy="1517869"/>
-          </a:xfrm>
-          <a:prstGeom prst="line">
-            <a:avLst/>
-          </a:prstGeom>
-          <a:ln w="19050">
-            <a:solidFill>
-              <a:schemeClr val="tx1"/>
-            </a:solidFill>
-          </a:ln>
-        </p:spPr>
-        <p:style>
-          <a:lnRef idx="1">
-            <a:schemeClr val="accent1"/>
-          </a:lnRef>
-          <a:fillRef idx="0">
-            <a:schemeClr val="accent1"/>
-          </a:fillRef>
-          <a:effectRef idx="0">
-            <a:schemeClr val="accent1"/>
-          </a:effectRef>
-          <a:fontRef idx="minor">
-            <a:schemeClr val="tx1"/>
-          </a:fontRef>
-        </p:style>
-      </p:cxnSp>
-      <p:cxnSp>
-        <p:nvCxnSpPr>
-          <p:cNvPr id="157" name="Straight Connector 156"/>
-          <p:cNvCxnSpPr>
-            <a:stCxn id="118" idx="2"/>
-            <a:endCxn id="87" idx="0"/>
-          </p:cNvCxnSpPr>
-          <p:nvPr/>
-        </p:nvCxnSpPr>
-        <p:spPr>
-          <a:xfrm flipH="1">
-            <a:off x="3567907" y="2967955"/>
-            <a:ext cx="1316621" cy="1503581"/>
-          </a:xfrm>
-          <a:prstGeom prst="line">
-            <a:avLst/>
-          </a:prstGeom>
-          <a:ln w="19050">
-            <a:solidFill>
-              <a:schemeClr val="tx1"/>
-            </a:solidFill>
-          </a:ln>
-        </p:spPr>
-        <p:style>
-          <a:lnRef idx="1">
-            <a:schemeClr val="accent1"/>
-          </a:lnRef>
-          <a:fillRef idx="0">
-            <a:schemeClr val="accent1"/>
-          </a:fillRef>
-          <a:effectRef idx="0">
-            <a:schemeClr val="accent1"/>
-          </a:effectRef>
-          <a:fontRef idx="minor">
-            <a:schemeClr val="tx1"/>
-          </a:fontRef>
-        </p:style>
-      </p:cxnSp>
-      <p:sp>
-        <p:nvSpPr>
-          <p:cNvPr id="160" name="Arc 159"/>
-          <p:cNvSpPr/>
-          <p:nvPr/>
-        </p:nvSpPr>
-        <p:spPr>
-          <a:xfrm rot="10800000">
-            <a:off x="8063254" y="3319177"/>
-            <a:ext cx="393198" cy="742633"/>
-          </a:xfrm>
-          <a:prstGeom prst="arc">
-            <a:avLst>
-              <a:gd name="adj1" fmla="val 20544871"/>
-              <a:gd name="adj2" fmla="val 11255835"/>
-            </a:avLst>
-          </a:prstGeom>
-          <a:ln w="25400">
-            <a:solidFill>
-              <a:schemeClr val="tx1"/>
-            </a:solidFill>
-            <a:headEnd w="lg" len="lg"/>
-            <a:tailEnd type="none"/>
-          </a:ln>
-        </p:spPr>
-        <p:style>
-          <a:lnRef idx="1">
-            <a:schemeClr val="accent1"/>
-          </a:lnRef>
-          <a:fillRef idx="0">
-            <a:schemeClr val="accent1"/>
-          </a:fillRef>
-          <a:effectRef idx="0">
-            <a:schemeClr val="accent1"/>
-          </a:effectRef>
-          <a:fontRef idx="minor">
-            <a:schemeClr val="tx1"/>
-          </a:fontRef>
-        </p:style>
-        <p:txBody>
-          <a:bodyPr rtlCol="0" anchor="ctr"/>
-          <a:lstStyle/>
-          <a:p>
-            <a:pPr algn="ctr"/>
-            <a:endParaRPr lang="en-US"/>
-          </a:p>
-        </p:txBody>
-      </p:sp>
-      <p:sp>
-        <p:nvSpPr>
-          <p:cNvPr id="161" name="Arc 160"/>
-          <p:cNvSpPr/>
-          <p:nvPr/>
-        </p:nvSpPr>
-        <p:spPr>
-          <a:xfrm rot="10800000">
-            <a:off x="7714716" y="2565584"/>
-            <a:ext cx="1123284" cy="2211861"/>
-          </a:xfrm>
-          <a:prstGeom prst="arc">
-            <a:avLst>
-              <a:gd name="adj1" fmla="val 20544871"/>
-              <a:gd name="adj2" fmla="val 11255835"/>
-            </a:avLst>
-          </a:prstGeom>
-          <a:ln w="25400">
-            <a:solidFill>
-              <a:schemeClr val="tx1"/>
-            </a:solidFill>
-            <a:headEnd w="lg" len="lg"/>
-            <a:tailEnd type="none"/>
-          </a:ln>
-        </p:spPr>
-        <p:style>
-          <a:lnRef idx="1">
-            <a:schemeClr val="accent1"/>
-          </a:lnRef>
-          <a:fillRef idx="0">
-            <a:schemeClr val="accent1"/>
-          </a:fillRef>
-          <a:effectRef idx="0">
-            <a:schemeClr val="accent1"/>
-          </a:effectRef>
-          <a:fontRef idx="minor">
-            <a:schemeClr val="tx1"/>
-          </a:fontRef>
-        </p:style>
-        <p:txBody>
-          <a:bodyPr rtlCol="0" anchor="ctr"/>
-          <a:lstStyle/>
-          <a:p>
-            <a:pPr algn="ctr"/>
-            <a:endParaRPr lang="en-US"/>
-          </a:p>
-        </p:txBody>
-      </p:sp>
-      <mc:AlternateContent xmlns:mc="http://schemas.openxmlformats.org/markup-compatibility/2006">
-        <mc:Choice xmlns:a14="http://schemas.microsoft.com/office/drawing/2010/main" Requires="a14">
-          <p:sp>
-            <p:nvSpPr>
-              <p:cNvPr id="163" name="TextBox 162"/>
-              <p:cNvSpPr txBox="1"/>
-              <p:nvPr/>
-            </p:nvSpPr>
-            <p:spPr>
-              <a:xfrm>
-                <a:off x="7352008" y="3423131"/>
-                <a:ext cx="359593" cy="276999"/>
-              </a:xfrm>
-              <a:prstGeom prst="rect">
-                <a:avLst/>
-              </a:prstGeom>
-              <a:noFill/>
-            </p:spPr>
-            <p:txBody>
-              <a:bodyPr wrap="square" lIns="0" tIns="0" rIns="0" bIns="0" rtlCol="0">
-                <a:spAutoFit/>
-              </a:bodyPr>
-              <a:lstStyle/>
-              <a:p>
-                <a:pPr/>
-                <a14:m>
-                  <m:oMathPara xmlns:m="http://schemas.openxmlformats.org/officeDocument/2006/math">
-                    <m:oMathParaPr>
-                      <m:jc m:val="centerGroup"/>
-                    </m:oMathParaPr>
-                    <m:oMath xmlns:m="http://schemas.openxmlformats.org/officeDocument/2006/math">
-                      <m:r>
-                        <a:rPr lang="en-US" b="0" i="1" smtClean="0">
-                          <a:latin typeface="Cambria Math" charset="0"/>
-                        </a:rPr>
-                        <m:t>𝑒</m:t>
-                      </m:r>
-                      <m:r>
-                        <a:rPr lang="en-US" b="0" i="1" smtClean="0">
-                          <a:latin typeface="Cambria Math" charset="0"/>
-                        </a:rPr>
-                        <m:t>2</m:t>
-                      </m:r>
-                    </m:oMath>
-                  </m:oMathPara>
-                </a14:m>
-                <a:endParaRPr lang="en-US" dirty="0" smtClean="0"/>
-              </a:p>
-            </p:txBody>
-          </p:sp>
-        </mc:Choice>
-        <mc:Fallback>
-          <p:sp>
-            <p:nvSpPr>
-              <p:cNvPr id="163" name="TextBox 162"/>
-              <p:cNvSpPr txBox="1">
-                <a:spLocks noRot="1" noChangeAspect="1" noMove="1" noResize="1" noEditPoints="1" noAdjustHandles="1" noChangeArrowheads="1" noChangeShapeType="1" noTextEdit="1"/>
-              </p:cNvSpPr>
-              <p:nvPr/>
-            </p:nvSpPr>
-            <p:spPr>
-              <a:xfrm>
-                <a:off x="7352008" y="3423131"/>
-                <a:ext cx="359593" cy="276999"/>
-              </a:xfrm>
-              <a:prstGeom prst="rect">
-                <a:avLst/>
-              </a:prstGeom>
-              <a:blipFill rotWithShape="0">
-                <a:blip r:embed="rId2"/>
-                <a:stretch>
-                  <a:fillRect l="-5085" r="-8475" b="-6667"/>
-                </a:stretch>
-              </a:blipFill>
-            </p:spPr>
-            <p:txBody>
-              <a:bodyPr/>
-              <a:lstStyle/>
-              <a:p>
-                <a:r>
-                  <a:rPr lang="en-US">
-                    <a:noFill/>
-                  </a:rPr>
-                  <a:t> </a:t>
-                </a:r>
-              </a:p>
-            </p:txBody>
-          </p:sp>
-        </mc:Fallback>
-      </mc:AlternateContent>
-      <mc:AlternateContent xmlns:mc="http://schemas.openxmlformats.org/markup-compatibility/2006">
-        <mc:Choice xmlns:a14="http://schemas.microsoft.com/office/drawing/2010/main" Requires="a14">
-          <p:sp>
-            <p:nvSpPr>
-              <p:cNvPr id="164" name="TextBox 163"/>
-              <p:cNvSpPr txBox="1"/>
-              <p:nvPr/>
-            </p:nvSpPr>
-            <p:spPr>
-              <a:xfrm>
-                <a:off x="7773042" y="3418535"/>
-                <a:ext cx="294953" cy="276999"/>
-              </a:xfrm>
-              <a:prstGeom prst="rect">
-                <a:avLst/>
-              </a:prstGeom>
-              <a:noFill/>
-            </p:spPr>
-            <p:txBody>
-              <a:bodyPr wrap="none" lIns="0" tIns="0" rIns="0" bIns="0" rtlCol="0">
-                <a:spAutoFit/>
-              </a:bodyPr>
-              <a:lstStyle/>
-              <a:p>
-                <a:pPr/>
-                <a14:m>
-                  <m:oMathPara xmlns:m="http://schemas.openxmlformats.org/officeDocument/2006/math">
-                    <m:oMathParaPr>
-                      <m:jc m:val="centerGroup"/>
-                    </m:oMathParaPr>
-                    <m:oMath xmlns:m="http://schemas.openxmlformats.org/officeDocument/2006/math">
-                      <m:r>
-                        <a:rPr lang="en-US" b="0" i="1" smtClean="0">
-                          <a:latin typeface="Cambria Math" charset="0"/>
-                        </a:rPr>
-                        <m:t>𝑒</m:t>
-                      </m:r>
-                      <m:r>
-                        <a:rPr lang="en-US" b="0" i="1" smtClean="0">
-                          <a:latin typeface="Cambria Math" charset="0"/>
-                        </a:rPr>
-                        <m:t>1</m:t>
-                      </m:r>
-                    </m:oMath>
-                  </m:oMathPara>
-                </a14:m>
-                <a:endParaRPr lang="en-US" dirty="0" smtClean="0"/>
-              </a:p>
-            </p:txBody>
-          </p:sp>
-        </mc:Choice>
-        <mc:Fallback>
-          <p:sp>
-            <p:nvSpPr>
-              <p:cNvPr id="164" name="TextBox 163"/>
-              <p:cNvSpPr txBox="1">
-                <a:spLocks noRot="1" noChangeAspect="1" noMove="1" noResize="1" noEditPoints="1" noAdjustHandles="1" noChangeArrowheads="1" noChangeShapeType="1" noTextEdit="1"/>
-              </p:cNvSpPr>
-              <p:nvPr/>
-            </p:nvSpPr>
-            <p:spPr>
-              <a:xfrm>
-                <a:off x="7773042" y="3418535"/>
-                <a:ext cx="294953" cy="276999"/>
-              </a:xfrm>
-              <a:prstGeom prst="rect">
-                <a:avLst/>
-              </a:prstGeom>
-              <a:blipFill rotWithShape="0">
-                <a:blip r:embed="rId3"/>
-                <a:stretch>
-                  <a:fillRect l="-18750" r="-20833" b="-6667"/>
-                </a:stretch>
-              </a:blipFill>
-            </p:spPr>
-            <p:txBody>
-              <a:bodyPr/>
-              <a:lstStyle/>
-              <a:p>
-                <a:r>
-                  <a:rPr lang="en-US">
-                    <a:noFill/>
-                  </a:rPr>
-                  <a:t> </a:t>
-                </a:r>
-              </a:p>
-            </p:txBody>
-          </p:sp>
-        </mc:Fallback>
-      </mc:AlternateContent>
-      <p:sp>
-        <p:nvSpPr>
-          <p:cNvPr id="180" name="TextBox 179"/>
-          <p:cNvSpPr txBox="1"/>
-          <p:nvPr/>
-        </p:nvSpPr>
-        <p:spPr>
-          <a:xfrm>
-            <a:off x="6989829" y="3057567"/>
-            <a:ext cx="703121" cy="523220"/>
-          </a:xfrm>
-          <a:prstGeom prst="rect">
-            <a:avLst/>
-          </a:prstGeom>
-          <a:noFill/>
-        </p:spPr>
-        <p:txBody>
-          <a:bodyPr wrap="square" rtlCol="0">
-            <a:spAutoFit/>
-          </a:bodyPr>
-          <a:lstStyle/>
-          <a:p>
-            <a:pPr algn="ctr"/>
-            <a:r>
-              <a:rPr lang="en-US" sz="2800" dirty="0" smtClean="0"/>
-              <a:t>P</a:t>
-            </a:r>
-            <a:endParaRPr lang="en-US" sz="2800" baseline="-25000" dirty="0"/>
-          </a:p>
-        </p:txBody>
-      </p:sp>
-      <p:sp>
-        <p:nvSpPr>
-          <p:cNvPr id="181" name="Rectangle 180"/>
-          <p:cNvSpPr/>
-          <p:nvPr/>
-        </p:nvSpPr>
-        <p:spPr>
-          <a:xfrm>
-            <a:off x="7577322" y="3677063"/>
-            <a:ext cx="1364197" cy="1005481"/>
-          </a:xfrm>
-          <a:prstGeom prst="rect">
-            <a:avLst/>
-          </a:prstGeom>
-          <a:solidFill>
-            <a:schemeClr val="bg2">
-              <a:lumMod val="90000"/>
-            </a:schemeClr>
-          </a:solidFill>
-          <a:ln>
-            <a:solidFill>
-              <a:schemeClr val="tx1"/>
-            </a:solidFill>
-          </a:ln>
-        </p:spPr>
-        <p:style>
-          <a:lnRef idx="2">
-            <a:schemeClr val="accent1">
-              <a:shade val="50000"/>
-            </a:schemeClr>
-          </a:lnRef>
-          <a:fillRef idx="1">
-            <a:schemeClr val="accent1"/>
-          </a:fillRef>
-          <a:effectRef idx="0">
-            <a:schemeClr val="accent1"/>
-          </a:effectRef>
-          <a:fontRef idx="minor">
-            <a:schemeClr val="lt1"/>
-          </a:fontRef>
-        </p:style>
-        <p:txBody>
-          <a:bodyPr rtlCol="0" anchor="ctr"/>
-          <a:lstStyle/>
-          <a:p>
-            <a:pPr algn="ctr"/>
-            <a:endParaRPr lang="en-US" sz="2000" dirty="0">
-              <a:solidFill>
-                <a:schemeClr val="tx1"/>
-              </a:solidFill>
-            </a:endParaRPr>
-          </a:p>
-        </p:txBody>
-      </p:sp>
-      <mc:AlternateContent xmlns:mc="http://schemas.openxmlformats.org/markup-compatibility/2006">
-        <mc:Choice xmlns:a14="http://schemas.microsoft.com/office/drawing/2010/main" Requires="a14">
-          <p:sp>
-            <p:nvSpPr>
-              <p:cNvPr id="182" name="TextBox 181"/>
-              <p:cNvSpPr txBox="1"/>
-              <p:nvPr/>
-            </p:nvSpPr>
-            <p:spPr>
-              <a:xfrm>
-                <a:off x="8116781" y="3970873"/>
-                <a:ext cx="321370" cy="430887"/>
-              </a:xfrm>
-              <a:prstGeom prst="rect">
-                <a:avLst/>
-              </a:prstGeom>
-              <a:noFill/>
-            </p:spPr>
-            <p:txBody>
-              <a:bodyPr wrap="none" lIns="0" tIns="0" rIns="0" bIns="0" rtlCol="0">
-                <a:spAutoFit/>
-              </a:bodyPr>
-              <a:lstStyle/>
-              <a:p>
-                <a:pPr/>
-                <a14:m>
-                  <m:oMathPara xmlns:m="http://schemas.openxmlformats.org/officeDocument/2006/math">
-                    <m:oMathParaPr>
-                      <m:jc m:val="centerGroup"/>
-                    </m:oMathParaPr>
-                    <m:oMath xmlns:m="http://schemas.openxmlformats.org/officeDocument/2006/math">
-                      <m:r>
-                        <a:rPr lang="en-US" sz="2800" b="0" i="1" smtClean="0">
-                          <a:latin typeface="Cambria Math" charset="0"/>
-                        </a:rPr>
-                        <m:t>𝑋</m:t>
-                      </m:r>
-                    </m:oMath>
-                  </m:oMathPara>
-                </a14:m>
-                <a:endParaRPr lang="en-US" sz="2800" dirty="0" smtClean="0"/>
-              </a:p>
-            </p:txBody>
-          </p:sp>
-        </mc:Choice>
-        <mc:Fallback>
-          <p:sp>
-            <p:nvSpPr>
-              <p:cNvPr id="182" name="TextBox 181"/>
-              <p:cNvSpPr txBox="1">
-                <a:spLocks noRot="1" noChangeAspect="1" noMove="1" noResize="1" noEditPoints="1" noAdjustHandles="1" noChangeArrowheads="1" noChangeShapeType="1" noTextEdit="1"/>
-              </p:cNvSpPr>
-              <p:nvPr/>
-            </p:nvSpPr>
-            <p:spPr>
-              <a:xfrm>
-                <a:off x="8116781" y="3970873"/>
-                <a:ext cx="321370" cy="430887"/>
-              </a:xfrm>
-              <a:prstGeom prst="rect">
-                <a:avLst/>
-              </a:prstGeom>
-              <a:blipFill rotWithShape="0">
-                <a:blip r:embed="rId4"/>
-                <a:stretch>
-                  <a:fillRect/>
-                </a:stretch>
-              </a:blipFill>
-            </p:spPr>
-            <p:txBody>
-              <a:bodyPr/>
-              <a:lstStyle/>
-              <a:p>
-                <a:r>
-                  <a:rPr lang="en-US">
-                    <a:noFill/>
-                  </a:rPr>
-                  <a:t> </a:t>
-                </a:r>
-              </a:p>
-            </p:txBody>
-          </p:sp>
-        </mc:Fallback>
-      </mc:AlternateContent>
-      <p:grpSp>
-        <p:nvGrpSpPr>
-          <p:cNvPr id="2" name="Group 1"/>
-          <p:cNvGrpSpPr/>
-          <p:nvPr/>
-        </p:nvGrpSpPr>
-        <p:grpSpPr>
-          <a:xfrm>
-            <a:off x="9302924" y="3328067"/>
-            <a:ext cx="759054" cy="1547241"/>
-            <a:chOff x="9223209" y="2450253"/>
-            <a:chExt cx="759054" cy="1547241"/>
-          </a:xfrm>
-        </p:grpSpPr>
-        <mc:AlternateContent xmlns:mc="http://schemas.openxmlformats.org/markup-compatibility/2006" xmlns:a14="http://schemas.microsoft.com/office/drawing/2010/main">
-          <mc:Choice Requires="a14">
-            <p:sp>
-              <p:nvSpPr>
-                <p:cNvPr id="51" name="TextBox 50"/>
-                <p:cNvSpPr txBox="1"/>
-                <p:nvPr/>
-              </p:nvSpPr>
-              <p:spPr>
-                <a:xfrm>
-                  <a:off x="9223209" y="2450253"/>
-                  <a:ext cx="751039" cy="276999"/>
-                </a:xfrm>
-                <a:prstGeom prst="rect">
-                  <a:avLst/>
-                </a:prstGeom>
-                <a:noFill/>
-              </p:spPr>
-              <p:txBody>
-                <a:bodyPr wrap="none" lIns="0" tIns="0" rIns="0" bIns="0" rtlCol="0">
-                  <a:spAutoFit/>
-                </a:bodyPr>
-                <a:lstStyle/>
-                <a:p>
-                  <a:pPr/>
-                  <a14:m>
-                    <m:oMathPara xmlns:m="http://schemas.openxmlformats.org/officeDocument/2006/math">
-                      <m:oMathParaPr>
-                        <m:jc m:val="centerGroup"/>
-                      </m:oMathParaPr>
-                      <m:oMath xmlns:m="http://schemas.openxmlformats.org/officeDocument/2006/math">
-                        <m:r>
-                          <a:rPr lang="en-US" b="0" i="1" smtClean="0">
-                            <a:latin typeface="Cambria Math" charset="0"/>
-                          </a:rPr>
-                          <m:t>𝑒</m:t>
-                        </m:r>
-                        <m:r>
-                          <a:rPr lang="en-US" b="0" i="1" smtClean="0">
-                            <a:latin typeface="Cambria Math" charset="0"/>
-                          </a:rPr>
-                          <m:t>1=</m:t>
-                        </m:r>
-                        <m:r>
-                          <a:rPr lang="en-US" b="0" i="1" smtClean="0">
-                            <a:latin typeface="Cambria Math" charset="0"/>
-                          </a:rPr>
-                          <m:t>𝑋</m:t>
-                        </m:r>
-                      </m:oMath>
-                    </m:oMathPara>
-                  </a14:m>
-                  <a:endParaRPr lang="en-US" dirty="0" smtClean="0"/>
-                </a:p>
-              </p:txBody>
-            </p:sp>
-          </mc:Choice>
-          <mc:Fallback xmlns="">
-            <p:sp>
-              <p:nvSpPr>
-                <p:cNvPr id="51" name="TextBox 50"/>
-                <p:cNvSpPr txBox="1">
-                  <a:spLocks noRot="1" noChangeAspect="1" noMove="1" noResize="1" noEditPoints="1" noAdjustHandles="1" noChangeArrowheads="1" noChangeShapeType="1" noTextEdit="1"/>
-                </p:cNvSpPr>
-                <p:nvPr/>
-              </p:nvSpPr>
-              <p:spPr>
-                <a:xfrm>
-                  <a:off x="9223209" y="2450253"/>
-                  <a:ext cx="751039" cy="276999"/>
-                </a:xfrm>
-                <a:prstGeom prst="rect">
-                  <a:avLst/>
-                </a:prstGeom>
-                <a:blipFill rotWithShape="0">
-                  <a:blip r:embed="rId5"/>
-                  <a:stretch>
-                    <a:fillRect l="-6504" r="-6504" b="-6667"/>
-                  </a:stretch>
-                </a:blipFill>
-              </p:spPr>
-              <p:txBody>
-                <a:bodyPr/>
-                <a:lstStyle/>
-                <a:p>
-                  <a:r>
-                    <a:rPr lang="en-US">
-                      <a:noFill/>
-                    </a:rPr>
-                    <a:t> </a:t>
-                  </a:r>
-                </a:p>
-              </p:txBody>
-            </p:sp>
-          </mc:Fallback>
-        </mc:AlternateContent>
-        <mc:AlternateContent xmlns:mc="http://schemas.openxmlformats.org/markup-compatibility/2006" xmlns:a14="http://schemas.microsoft.com/office/drawing/2010/main">
-          <mc:Choice Requires="a14">
-            <p:sp>
-              <p:nvSpPr>
-                <p:cNvPr id="52" name="TextBox 51"/>
-                <p:cNvSpPr txBox="1"/>
-                <p:nvPr/>
-              </p:nvSpPr>
-              <p:spPr>
-                <a:xfrm>
-                  <a:off x="9231224" y="2750877"/>
-                  <a:ext cx="751039" cy="276999"/>
-                </a:xfrm>
-                <a:prstGeom prst="rect">
-                  <a:avLst/>
-                </a:prstGeom>
-                <a:noFill/>
-              </p:spPr>
-              <p:txBody>
-                <a:bodyPr wrap="none" lIns="0" tIns="0" rIns="0" bIns="0" rtlCol="0">
-                  <a:spAutoFit/>
-                </a:bodyPr>
-                <a:lstStyle/>
-                <a:p>
-                  <a:pPr/>
-                  <a14:m>
-                    <m:oMathPara xmlns:m="http://schemas.openxmlformats.org/officeDocument/2006/math">
-                      <m:oMathParaPr>
-                        <m:jc m:val="centerGroup"/>
-                      </m:oMathParaPr>
-                      <m:oMath xmlns:m="http://schemas.openxmlformats.org/officeDocument/2006/math">
-                        <m:r>
-                          <a:rPr lang="en-US" b="0" i="1" smtClean="0">
-                            <a:latin typeface="Cambria Math" charset="0"/>
-                          </a:rPr>
-                          <m:t>𝑒</m:t>
-                        </m:r>
-                        <m:r>
-                          <a:rPr lang="en-US" b="0" i="1" smtClean="0">
-                            <a:latin typeface="Cambria Math" charset="0"/>
-                          </a:rPr>
-                          <m:t>2=</m:t>
-                        </m:r>
-                        <m:r>
-                          <a:rPr lang="en-US" b="0" i="1" smtClean="0">
-                            <a:latin typeface="Cambria Math" charset="0"/>
-                          </a:rPr>
-                          <m:t>𝑋</m:t>
-                        </m:r>
-                      </m:oMath>
-                    </m:oMathPara>
-                  </a14:m>
-                  <a:endParaRPr lang="en-US" dirty="0" smtClean="0"/>
-                </a:p>
-              </p:txBody>
-            </p:sp>
-          </mc:Choice>
-          <mc:Fallback xmlns="">
-            <p:sp>
-              <p:nvSpPr>
-                <p:cNvPr id="52" name="TextBox 51"/>
-                <p:cNvSpPr txBox="1">
-                  <a:spLocks noRot="1" noChangeAspect="1" noMove="1" noResize="1" noEditPoints="1" noAdjustHandles="1" noChangeArrowheads="1" noChangeShapeType="1" noTextEdit="1"/>
-                </p:cNvSpPr>
-                <p:nvPr/>
-              </p:nvSpPr>
-              <p:spPr>
-                <a:xfrm>
-                  <a:off x="9231224" y="2750877"/>
-                  <a:ext cx="751039" cy="276999"/>
-                </a:xfrm>
-                <a:prstGeom prst="rect">
-                  <a:avLst/>
-                </a:prstGeom>
-                <a:blipFill rotWithShape="0">
-                  <a:blip r:embed="rId6"/>
-                  <a:stretch>
-                    <a:fillRect l="-7317" r="-6504" b="-6667"/>
-                  </a:stretch>
-                </a:blipFill>
-              </p:spPr>
-              <p:txBody>
-                <a:bodyPr/>
-                <a:lstStyle/>
-                <a:p>
-                  <a:r>
-                    <a:rPr lang="en-US">
-                      <a:noFill/>
-                    </a:rPr>
-                    <a:t> </a:t>
-                  </a:r>
-                </a:p>
-              </p:txBody>
-            </p:sp>
-          </mc:Fallback>
-        </mc:AlternateContent>
-        <mc:AlternateContent xmlns:mc="http://schemas.openxmlformats.org/markup-compatibility/2006" xmlns:a14="http://schemas.microsoft.com/office/drawing/2010/main">
-          <mc:Choice Requires="a14">
-            <p:sp>
-              <p:nvSpPr>
-                <p:cNvPr id="53" name="TextBox 52"/>
-                <p:cNvSpPr txBox="1"/>
-                <p:nvPr/>
-              </p:nvSpPr>
-              <p:spPr>
-                <a:xfrm>
-                  <a:off x="9223209" y="3070991"/>
-                  <a:ext cx="724557" cy="276999"/>
-                </a:xfrm>
-                <a:prstGeom prst="rect">
-                  <a:avLst/>
-                </a:prstGeom>
-                <a:noFill/>
-              </p:spPr>
-              <p:txBody>
-                <a:bodyPr wrap="none" lIns="0" tIns="0" rIns="0" bIns="0" rtlCol="0">
-                  <a:spAutoFit/>
-                </a:bodyPr>
-                <a:lstStyle/>
-                <a:p>
-                  <a:pPr/>
-                  <a14:m>
-                    <m:oMathPara xmlns:m="http://schemas.openxmlformats.org/officeDocument/2006/math">
-                      <m:oMathParaPr>
-                        <m:jc m:val="centerGroup"/>
-                      </m:oMathParaPr>
-                      <m:oMath xmlns:m="http://schemas.openxmlformats.org/officeDocument/2006/math">
-                        <m:r>
-                          <a:rPr lang="en-US" b="0" i="1" smtClean="0">
-                            <a:latin typeface="Cambria Math" charset="0"/>
-                          </a:rPr>
-                          <m:t>𝑒</m:t>
-                        </m:r>
-                        <m:r>
-                          <a:rPr lang="en-US" b="0" i="1" smtClean="0">
-                            <a:latin typeface="Cambria Math" charset="0"/>
-                          </a:rPr>
-                          <m:t>1=1</m:t>
-                        </m:r>
-                      </m:oMath>
-                    </m:oMathPara>
-                  </a14:m>
-                  <a:endParaRPr lang="en-US" dirty="0" smtClean="0"/>
-                </a:p>
-              </p:txBody>
-            </p:sp>
-          </mc:Choice>
-          <mc:Fallback xmlns="">
-            <p:sp>
-              <p:nvSpPr>
-                <p:cNvPr id="53" name="TextBox 52"/>
-                <p:cNvSpPr txBox="1">
-                  <a:spLocks noRot="1" noChangeAspect="1" noMove="1" noResize="1" noEditPoints="1" noAdjustHandles="1" noChangeArrowheads="1" noChangeShapeType="1" noTextEdit="1"/>
-                </p:cNvSpPr>
-                <p:nvPr/>
-              </p:nvSpPr>
-              <p:spPr>
-                <a:xfrm>
-                  <a:off x="9223209" y="3070991"/>
-                  <a:ext cx="724557" cy="276999"/>
-                </a:xfrm>
-                <a:prstGeom prst="rect">
-                  <a:avLst/>
-                </a:prstGeom>
-                <a:blipFill rotWithShape="0">
-                  <a:blip r:embed="rId7"/>
-                  <a:stretch>
-                    <a:fillRect l="-6723" r="-7563" b="-6522"/>
-                  </a:stretch>
-                </a:blipFill>
-              </p:spPr>
-              <p:txBody>
-                <a:bodyPr/>
-                <a:lstStyle/>
-                <a:p>
-                  <a:r>
-                    <a:rPr lang="en-US">
-                      <a:noFill/>
-                    </a:rPr>
-                    <a:t> </a:t>
-                  </a:r>
-                </a:p>
-              </p:txBody>
-            </p:sp>
-          </mc:Fallback>
-        </mc:AlternateContent>
-        <mc:AlternateContent xmlns:mc="http://schemas.openxmlformats.org/markup-compatibility/2006" xmlns:a14="http://schemas.microsoft.com/office/drawing/2010/main">
-          <mc:Choice Requires="a14">
-            <p:sp>
-              <p:nvSpPr>
-                <p:cNvPr id="54" name="TextBox 53"/>
-                <p:cNvSpPr txBox="1"/>
-                <p:nvPr/>
-              </p:nvSpPr>
-              <p:spPr>
-                <a:xfrm>
-                  <a:off x="9223209" y="3395743"/>
-                  <a:ext cx="724557" cy="276999"/>
-                </a:xfrm>
-                <a:prstGeom prst="rect">
-                  <a:avLst/>
-                </a:prstGeom>
-                <a:noFill/>
-              </p:spPr>
-              <p:txBody>
-                <a:bodyPr wrap="none" lIns="0" tIns="0" rIns="0" bIns="0" rtlCol="0">
-                  <a:spAutoFit/>
-                </a:bodyPr>
-                <a:lstStyle/>
-                <a:p>
-                  <a:pPr/>
-                  <a14:m>
-                    <m:oMathPara xmlns:m="http://schemas.openxmlformats.org/officeDocument/2006/math">
-                      <m:oMathParaPr>
-                        <m:jc m:val="centerGroup"/>
-                      </m:oMathParaPr>
-                      <m:oMath xmlns:m="http://schemas.openxmlformats.org/officeDocument/2006/math">
-                        <m:r>
-                          <a:rPr lang="en-US" b="0" i="1" smtClean="0">
-                            <a:latin typeface="Cambria Math" charset="0"/>
-                          </a:rPr>
-                          <m:t>𝑒</m:t>
-                        </m:r>
-                        <m:r>
-                          <a:rPr lang="en-US" b="0" i="1" smtClean="0">
-                            <a:latin typeface="Cambria Math" charset="0"/>
-                          </a:rPr>
-                          <m:t>2=1</m:t>
-                        </m:r>
-                      </m:oMath>
-                    </m:oMathPara>
-                  </a14:m>
-                  <a:endParaRPr lang="en-US" dirty="0" smtClean="0"/>
-                </a:p>
-              </p:txBody>
-            </p:sp>
-          </mc:Choice>
-          <mc:Fallback xmlns="">
-            <p:sp>
-              <p:nvSpPr>
-                <p:cNvPr id="54" name="TextBox 53"/>
-                <p:cNvSpPr txBox="1">
-                  <a:spLocks noRot="1" noChangeAspect="1" noMove="1" noResize="1" noEditPoints="1" noAdjustHandles="1" noChangeArrowheads="1" noChangeShapeType="1" noTextEdit="1"/>
-                </p:cNvSpPr>
-                <p:nvPr/>
-              </p:nvSpPr>
-              <p:spPr>
-                <a:xfrm>
-                  <a:off x="9223209" y="3395743"/>
-                  <a:ext cx="724557" cy="276999"/>
-                </a:xfrm>
-                <a:prstGeom prst="rect">
-                  <a:avLst/>
-                </a:prstGeom>
-                <a:blipFill rotWithShape="0">
-                  <a:blip r:embed="rId8"/>
-                  <a:stretch>
-                    <a:fillRect l="-6723" r="-7563" b="-6667"/>
-                  </a:stretch>
-                </a:blipFill>
-              </p:spPr>
-              <p:txBody>
-                <a:bodyPr/>
-                <a:lstStyle/>
-                <a:p>
-                  <a:r>
-                    <a:rPr lang="en-US">
-                      <a:noFill/>
-                    </a:rPr>
-                    <a:t> </a:t>
-                  </a:r>
-                </a:p>
-              </p:txBody>
-            </p:sp>
-          </mc:Fallback>
-        </mc:AlternateContent>
-        <mc:AlternateContent xmlns:mc="http://schemas.openxmlformats.org/markup-compatibility/2006" xmlns:a14="http://schemas.microsoft.com/office/drawing/2010/main">
-          <mc:Choice Requires="a14">
-            <p:sp>
-              <p:nvSpPr>
-                <p:cNvPr id="55" name="TextBox 54"/>
-                <p:cNvSpPr txBox="1"/>
-                <p:nvPr/>
-              </p:nvSpPr>
-              <p:spPr>
-                <a:xfrm>
-                  <a:off x="9231224" y="3720495"/>
-                  <a:ext cx="637226" cy="276999"/>
-                </a:xfrm>
-                <a:prstGeom prst="rect">
-                  <a:avLst/>
-                </a:prstGeom>
-                <a:noFill/>
-              </p:spPr>
-              <p:txBody>
-                <a:bodyPr wrap="none" lIns="0" tIns="0" rIns="0" bIns="0" rtlCol="0">
-                  <a:spAutoFit/>
-                </a:bodyPr>
-                <a:lstStyle/>
-                <a:p>
-                  <a:pPr/>
-                  <a14:m>
-                    <m:oMathPara xmlns:m="http://schemas.openxmlformats.org/officeDocument/2006/math">
-                      <m:oMathParaPr>
-                        <m:jc m:val="centerGroup"/>
-                      </m:oMathParaPr>
-                      <m:oMath xmlns:m="http://schemas.openxmlformats.org/officeDocument/2006/math">
-                        <m:r>
-                          <a:rPr lang="en-US" b="0" i="1" smtClean="0">
-                            <a:latin typeface="Cambria Math" charset="0"/>
-                          </a:rPr>
-                          <m:t>𝑋</m:t>
-                        </m:r>
-                        <m:r>
-                          <a:rPr lang="en-US" b="0" i="1" smtClean="0">
-                            <a:latin typeface="Cambria Math" charset="0"/>
-                          </a:rPr>
-                          <m:t>≥1</m:t>
-                        </m:r>
-                      </m:oMath>
-                    </m:oMathPara>
-                  </a14:m>
-                  <a:endParaRPr lang="en-US" dirty="0" smtClean="0"/>
-                </a:p>
-              </p:txBody>
-            </p:sp>
-          </mc:Choice>
-          <mc:Fallback xmlns="">
-            <p:sp>
-              <p:nvSpPr>
-                <p:cNvPr id="55" name="TextBox 54"/>
-                <p:cNvSpPr txBox="1">
-                  <a:spLocks noRot="1" noChangeAspect="1" noMove="1" noResize="1" noEditPoints="1" noAdjustHandles="1" noChangeArrowheads="1" noChangeShapeType="1" noTextEdit="1"/>
-                </p:cNvSpPr>
-                <p:nvPr/>
-              </p:nvSpPr>
-              <p:spPr>
-                <a:xfrm>
-                  <a:off x="9231224" y="3720495"/>
-                  <a:ext cx="637226" cy="276999"/>
-                </a:xfrm>
-                <a:prstGeom prst="rect">
-                  <a:avLst/>
-                </a:prstGeom>
-                <a:blipFill rotWithShape="0">
-                  <a:blip r:embed="rId9"/>
-                  <a:stretch>
-                    <a:fillRect l="-7692" r="-8654" b="-11111"/>
-                  </a:stretch>
-                </a:blipFill>
-              </p:spPr>
-              <p:txBody>
-                <a:bodyPr/>
-                <a:lstStyle/>
-                <a:p>
-                  <a:r>
-                    <a:rPr lang="en-US">
-                      <a:noFill/>
-                    </a:rPr>
-                    <a:t> </a:t>
-                  </a:r>
-                </a:p>
-              </p:txBody>
-            </p:sp>
-          </mc:Fallback>
-        </mc:AlternateContent>
-      </p:grpSp>
-      <mc:AlternateContent xmlns:mc="http://schemas.openxmlformats.org/markup-compatibility/2006">
-        <mc:Choice xmlns:a14="http://schemas.microsoft.com/office/drawing/2010/main" Requires="a14">
-          <p:sp>
-            <p:nvSpPr>
-              <p:cNvPr id="61" name="TextBox 60"/>
-              <p:cNvSpPr txBox="1"/>
-              <p:nvPr/>
-            </p:nvSpPr>
-            <p:spPr>
-              <a:xfrm>
-                <a:off x="1742504" y="2372266"/>
-                <a:ext cx="696216" cy="276999"/>
-              </a:xfrm>
-              <a:prstGeom prst="rect">
-                <a:avLst/>
-              </a:prstGeom>
-              <a:noFill/>
-            </p:spPr>
-            <p:txBody>
-              <a:bodyPr wrap="none" lIns="0" tIns="0" rIns="0" bIns="0" rtlCol="0">
-                <a:spAutoFit/>
-              </a:bodyPr>
-              <a:lstStyle/>
-              <a:p>
-                <a:pPr/>
-                <a14:m>
-                  <m:oMathPara xmlns:m="http://schemas.openxmlformats.org/officeDocument/2006/math">
-                    <m:oMathParaPr>
-                      <m:jc m:val="centerGroup"/>
-                    </m:oMathParaPr>
-                    <m:oMath xmlns:m="http://schemas.openxmlformats.org/officeDocument/2006/math">
-                      <m:sSub>
-                        <m:sSubPr>
-                          <m:ctrlPr>
-                            <a:rPr lang="en-US" b="0" i="1" smtClean="0">
-                              <a:latin typeface="Cambria Math" charset="0"/>
-                            </a:rPr>
-                          </m:ctrlPr>
-                        </m:sSubPr>
-                        <m:e>
-                          <m:r>
-                            <a:rPr lang="en-US" b="0" i="1" smtClean="0">
-                              <a:latin typeface="Cambria Math" charset="0"/>
-                            </a:rPr>
-                            <m:t>𝑆</m:t>
-                          </m:r>
-                        </m:e>
-                        <m:sub>
-                          <m:r>
-                            <a:rPr lang="en-US" b="0" i="1" smtClean="0">
-                              <a:latin typeface="Cambria Math" charset="0"/>
-                            </a:rPr>
-                            <m:t>1</m:t>
-                          </m:r>
-                        </m:sub>
-                      </m:sSub>
-                      <m:r>
-                        <a:rPr lang="en-US" b="0" i="1" smtClean="0">
-                          <a:latin typeface="Cambria Math" charset="0"/>
-                        </a:rPr>
-                        <m:t>=3</m:t>
-                      </m:r>
-                    </m:oMath>
-                  </m:oMathPara>
-                </a14:m>
-                <a:endParaRPr lang="en-US" dirty="0" smtClean="0"/>
-              </a:p>
-            </p:txBody>
-          </p:sp>
-        </mc:Choice>
-        <mc:Fallback>
-          <p:sp>
-            <p:nvSpPr>
-              <p:cNvPr id="61" name="TextBox 60"/>
-              <p:cNvSpPr txBox="1">
-                <a:spLocks noRot="1" noChangeAspect="1" noMove="1" noResize="1" noEditPoints="1" noAdjustHandles="1" noChangeArrowheads="1" noChangeShapeType="1" noTextEdit="1"/>
-              </p:cNvSpPr>
-              <p:nvPr/>
-            </p:nvSpPr>
-            <p:spPr>
-              <a:xfrm>
-                <a:off x="1742504" y="2372266"/>
-                <a:ext cx="696216" cy="276999"/>
-              </a:xfrm>
-              <a:prstGeom prst="rect">
-                <a:avLst/>
-              </a:prstGeom>
-              <a:blipFill rotWithShape="0">
-                <a:blip r:embed="rId10"/>
-                <a:stretch>
-                  <a:fillRect l="-7895" r="-7018" b="-15217"/>
-                </a:stretch>
-              </a:blipFill>
-            </p:spPr>
-            <p:txBody>
-              <a:bodyPr/>
-              <a:lstStyle/>
-              <a:p>
-                <a:r>
-                  <a:rPr lang="en-US">
-                    <a:noFill/>
-                  </a:rPr>
-                  <a:t> </a:t>
-                </a:r>
-              </a:p>
-            </p:txBody>
-          </p:sp>
-        </mc:Fallback>
-      </mc:AlternateContent>
-      <mc:AlternateContent xmlns:mc="http://schemas.openxmlformats.org/markup-compatibility/2006">
-        <mc:Choice xmlns:a14="http://schemas.microsoft.com/office/drawing/2010/main" Requires="a14">
-          <p:sp>
-            <p:nvSpPr>
-              <p:cNvPr id="62" name="TextBox 61"/>
-              <p:cNvSpPr txBox="1"/>
-              <p:nvPr/>
-            </p:nvSpPr>
-            <p:spPr>
-              <a:xfrm>
-                <a:off x="1739843" y="2796606"/>
-                <a:ext cx="701538" cy="276999"/>
-              </a:xfrm>
-              <a:prstGeom prst="rect">
-                <a:avLst/>
-              </a:prstGeom>
-              <a:noFill/>
-            </p:spPr>
-            <p:txBody>
-              <a:bodyPr wrap="none" lIns="0" tIns="0" rIns="0" bIns="0" rtlCol="0">
-                <a:spAutoFit/>
-              </a:bodyPr>
-              <a:lstStyle/>
-              <a:p>
-                <a:pPr/>
-                <a14:m>
-                  <m:oMathPara xmlns:m="http://schemas.openxmlformats.org/officeDocument/2006/math">
-                    <m:oMathParaPr>
-                      <m:jc m:val="centerGroup"/>
-                    </m:oMathParaPr>
-                    <m:oMath xmlns:m="http://schemas.openxmlformats.org/officeDocument/2006/math">
-                      <m:sSub>
-                        <m:sSubPr>
-                          <m:ctrlPr>
-                            <a:rPr lang="en-US" b="0" i="1" smtClean="0">
-                              <a:latin typeface="Cambria Math" charset="0"/>
-                            </a:rPr>
-                          </m:ctrlPr>
-                        </m:sSubPr>
-                        <m:e>
-                          <m:r>
-                            <a:rPr lang="en-US" b="0" i="1" smtClean="0">
-                              <a:latin typeface="Cambria Math" charset="0"/>
-                            </a:rPr>
-                            <m:t>𝑆</m:t>
-                          </m:r>
-                        </m:e>
-                        <m:sub>
-                          <m:r>
-                            <a:rPr lang="en-US" b="0" i="1" smtClean="0">
-                              <a:latin typeface="Cambria Math" charset="0"/>
-                            </a:rPr>
-                            <m:t>2</m:t>
-                          </m:r>
-                        </m:sub>
-                      </m:sSub>
-                      <m:r>
-                        <a:rPr lang="en-US" b="0" i="1" smtClean="0">
-                          <a:latin typeface="Cambria Math" charset="0"/>
-                        </a:rPr>
-                        <m:t>=3</m:t>
-                      </m:r>
-                    </m:oMath>
-                  </m:oMathPara>
-                </a14:m>
-                <a:endParaRPr lang="en-US" dirty="0" smtClean="0"/>
-              </a:p>
-            </p:txBody>
-          </p:sp>
-        </mc:Choice>
-        <mc:Fallback>
-          <p:sp>
-            <p:nvSpPr>
-              <p:cNvPr id="62" name="TextBox 61"/>
-              <p:cNvSpPr txBox="1">
-                <a:spLocks noRot="1" noChangeAspect="1" noMove="1" noResize="1" noEditPoints="1" noAdjustHandles="1" noChangeArrowheads="1" noChangeShapeType="1" noTextEdit="1"/>
-              </p:cNvSpPr>
-              <p:nvPr/>
-            </p:nvSpPr>
-            <p:spPr>
-              <a:xfrm>
-                <a:off x="1739843" y="2796606"/>
-                <a:ext cx="701538" cy="276999"/>
-              </a:xfrm>
-              <a:prstGeom prst="rect">
-                <a:avLst/>
-              </a:prstGeom>
-              <a:blipFill rotWithShape="0">
-                <a:blip r:embed="rId11"/>
-                <a:stretch>
-                  <a:fillRect l="-6957" r="-7826" b="-15556"/>
-                </a:stretch>
-              </a:blipFill>
-            </p:spPr>
-            <p:txBody>
-              <a:bodyPr/>
-              <a:lstStyle/>
-              <a:p>
-                <a:r>
-                  <a:rPr lang="en-US">
-                    <a:noFill/>
-                  </a:rPr>
-                  <a:t> </a:t>
-                </a:r>
-              </a:p>
-            </p:txBody>
-          </p:sp>
-        </mc:Fallback>
-      </mc:AlternateContent>
-      <mc:AlternateContent xmlns:mc="http://schemas.openxmlformats.org/markup-compatibility/2006">
-        <mc:Choice xmlns:a14="http://schemas.microsoft.com/office/drawing/2010/main" Requires="a14">
-          <p:sp>
-            <p:nvSpPr>
-              <p:cNvPr id="63" name="TextBox 62"/>
-              <p:cNvSpPr txBox="1"/>
-              <p:nvPr/>
-            </p:nvSpPr>
-            <p:spPr>
-              <a:xfrm>
-                <a:off x="1739843" y="2000440"/>
-                <a:ext cx="610680" cy="276999"/>
-              </a:xfrm>
-              <a:prstGeom prst="rect">
-                <a:avLst/>
-              </a:prstGeom>
-              <a:noFill/>
-            </p:spPr>
-            <p:txBody>
-              <a:bodyPr wrap="none" lIns="0" tIns="0" rIns="0" bIns="0" rtlCol="0">
-                <a:spAutoFit/>
-              </a:bodyPr>
-              <a:lstStyle/>
-              <a:p>
-                <a:pPr/>
-                <a14:m>
-                  <m:oMathPara xmlns:m="http://schemas.openxmlformats.org/officeDocument/2006/math">
-                    <m:oMathParaPr>
-                      <m:jc m:val="centerGroup"/>
-                    </m:oMathParaPr>
-                    <m:oMath xmlns:m="http://schemas.openxmlformats.org/officeDocument/2006/math">
-                      <m:r>
-                        <a:rPr lang="en-US" i="1">
-                          <a:latin typeface="Cambria Math" charset="0"/>
-                        </a:rPr>
-                        <m:t>𝐿</m:t>
-                      </m:r>
-                      <m:r>
-                        <a:rPr lang="en-US" i="1">
-                          <a:latin typeface="Cambria Math" charset="0"/>
-                        </a:rPr>
-                        <m:t>=2</m:t>
-                      </m:r>
-                    </m:oMath>
-                  </m:oMathPara>
-                </a14:m>
-                <a:endParaRPr lang="en-US" dirty="0"/>
-              </a:p>
-            </p:txBody>
-          </p:sp>
-        </mc:Choice>
-        <mc:Fallback>
-          <p:sp>
-            <p:nvSpPr>
-              <p:cNvPr id="63" name="TextBox 62"/>
-              <p:cNvSpPr txBox="1">
-                <a:spLocks noRot="1" noChangeAspect="1" noMove="1" noResize="1" noEditPoints="1" noAdjustHandles="1" noChangeArrowheads="1" noChangeShapeType="1" noTextEdit="1"/>
-              </p:cNvSpPr>
-              <p:nvPr/>
-            </p:nvSpPr>
-            <p:spPr>
-              <a:xfrm>
-                <a:off x="1739843" y="2000440"/>
-                <a:ext cx="610680" cy="276999"/>
-              </a:xfrm>
-              <a:prstGeom prst="rect">
-                <a:avLst/>
-              </a:prstGeom>
-              <a:blipFill rotWithShape="0">
-                <a:blip r:embed="rId12"/>
-                <a:stretch>
-                  <a:fillRect l="-7921" r="-7921" b="-6522"/>
-                </a:stretch>
-              </a:blipFill>
-            </p:spPr>
-            <p:txBody>
-              <a:bodyPr/>
-              <a:lstStyle/>
-              <a:p>
-                <a:r>
-                  <a:rPr lang="en-US">
-                    <a:noFill/>
-                  </a:rPr>
-                  <a:t> </a:t>
-                </a:r>
-              </a:p>
-            </p:txBody>
-          </p:sp>
-        </mc:Fallback>
-      </mc:AlternateContent>
-      <p:sp>
-        <p:nvSpPr>
-          <p:cNvPr id="3" name="TextBox 2"/>
-          <p:cNvSpPr txBox="1"/>
-          <p:nvPr/>
-        </p:nvSpPr>
-        <p:spPr>
-          <a:xfrm>
-            <a:off x="-472440" y="-472440"/>
-            <a:ext cx="184731" cy="369332"/>
-          </a:xfrm>
-          <a:prstGeom prst="rect">
-            <a:avLst/>
-          </a:prstGeom>
-          <a:noFill/>
-        </p:spPr>
-        <p:txBody>
-          <a:bodyPr wrap="none" rtlCol="0">
-            <a:spAutoFit/>
-          </a:bodyPr>
-          <a:lstStyle/>
-          <a:p>
-            <a:endParaRPr lang="en-US"/>
-          </a:p>
-        </p:txBody>
-      </p:sp>
-    </p:spTree>
-    <p:extLst>
-      <p:ext uri="{BB962C8B-B14F-4D97-AF65-F5344CB8AC3E}">
-        <p14:creationId xmlns:p14="http://schemas.microsoft.com/office/powerpoint/2010/main" val="175133456"/>
-      </p:ext>
-    </p:extLst>
-  </p:cSld>
-  <p:clrMapOvr>
-    <a:masterClrMapping/>
-  </p:clrMapOvr>
-</p:sld>
-</file>
-
-<file path=ppt/slides/slide15.xml><?xml version="1.0" encoding="utf-8"?>
 <p:sld xmlns:a="http://schemas.openxmlformats.org/drawingml/2006/main" xmlns:r="http://schemas.openxmlformats.org/officeDocument/2006/relationships" xmlns:p="http://schemas.openxmlformats.org/presentationml/2006/main">
   <p:cSld>
     <p:spTree>

</xml_diff>

<commit_message>
more edits to section 7. Remove paragraph widows
</commit_message>
<xml_diff>
--- a/paper/abstraction/figures/examples.pptx
+++ b/paper/abstraction/figures/examples.pptx
@@ -211,7 +211,7 @@
           <a:p>
             <a:fld id="{0CCB65A4-74BE-2E49-B697-B48CA3DADDCF}" type="datetimeFigureOut">
               <a:rPr lang="en-US" smtClean="0"/>
-              <a:t>11/13/16</a:t>
+              <a:t>3/12/17</a:t>
             </a:fld>
             <a:endParaRPr lang="en-US" dirty="0"/>
           </a:p>
@@ -946,7 +946,7 @@
           <a:p>
             <a:fld id="{D1C2FE12-02FD-40D2-9E73-08CF8D46514A}" type="datetimeFigureOut">
               <a:rPr lang="en-US" smtClean="0"/>
-              <a:t>11/13/16</a:t>
+              <a:t>3/12/17</a:t>
             </a:fld>
             <a:endParaRPr lang="en-US" dirty="0"/>
           </a:p>
@@ -1116,7 +1116,7 @@
           <a:p>
             <a:fld id="{D1C2FE12-02FD-40D2-9E73-08CF8D46514A}" type="datetimeFigureOut">
               <a:rPr lang="en-US" smtClean="0"/>
-              <a:t>11/13/16</a:t>
+              <a:t>3/12/17</a:t>
             </a:fld>
             <a:endParaRPr lang="en-US" dirty="0"/>
           </a:p>
@@ -1296,7 +1296,7 @@
           <a:p>
             <a:fld id="{D1C2FE12-02FD-40D2-9E73-08CF8D46514A}" type="datetimeFigureOut">
               <a:rPr lang="en-US" smtClean="0"/>
-              <a:t>11/13/16</a:t>
+              <a:t>3/12/17</a:t>
             </a:fld>
             <a:endParaRPr lang="en-US" dirty="0"/>
           </a:p>
@@ -1466,7 +1466,7 @@
           <a:p>
             <a:fld id="{D1C2FE12-02FD-40D2-9E73-08CF8D46514A}" type="datetimeFigureOut">
               <a:rPr lang="en-US" smtClean="0"/>
-              <a:t>11/13/16</a:t>
+              <a:t>3/12/17</a:t>
             </a:fld>
             <a:endParaRPr lang="en-US" dirty="0"/>
           </a:p>
@@ -1712,7 +1712,7 @@
           <a:p>
             <a:fld id="{D1C2FE12-02FD-40D2-9E73-08CF8D46514A}" type="datetimeFigureOut">
               <a:rPr lang="en-US" smtClean="0"/>
-              <a:t>11/13/16</a:t>
+              <a:t>3/12/17</a:t>
             </a:fld>
             <a:endParaRPr lang="en-US" dirty="0"/>
           </a:p>
@@ -1944,7 +1944,7 @@
           <a:p>
             <a:fld id="{D1C2FE12-02FD-40D2-9E73-08CF8D46514A}" type="datetimeFigureOut">
               <a:rPr lang="en-US" smtClean="0"/>
-              <a:t>11/13/16</a:t>
+              <a:t>3/12/17</a:t>
             </a:fld>
             <a:endParaRPr lang="en-US" dirty="0"/>
           </a:p>
@@ -2311,7 +2311,7 @@
           <a:p>
             <a:fld id="{D1C2FE12-02FD-40D2-9E73-08CF8D46514A}" type="datetimeFigureOut">
               <a:rPr lang="en-US" smtClean="0"/>
-              <a:t>11/13/16</a:t>
+              <a:t>3/12/17</a:t>
             </a:fld>
             <a:endParaRPr lang="en-US" dirty="0"/>
           </a:p>
@@ -2429,7 +2429,7 @@
           <a:p>
             <a:fld id="{D1C2FE12-02FD-40D2-9E73-08CF8D46514A}" type="datetimeFigureOut">
               <a:rPr lang="en-US" smtClean="0"/>
-              <a:t>11/13/16</a:t>
+              <a:t>3/12/17</a:t>
             </a:fld>
             <a:endParaRPr lang="en-US" dirty="0"/>
           </a:p>
@@ -2524,7 +2524,7 @@
           <a:p>
             <a:fld id="{D1C2FE12-02FD-40D2-9E73-08CF8D46514A}" type="datetimeFigureOut">
               <a:rPr lang="en-US" smtClean="0"/>
-              <a:t>11/13/16</a:t>
+              <a:t>3/12/17</a:t>
             </a:fld>
             <a:endParaRPr lang="en-US" dirty="0"/>
           </a:p>
@@ -2801,7 +2801,7 @@
           <a:p>
             <a:fld id="{D1C2FE12-02FD-40D2-9E73-08CF8D46514A}" type="datetimeFigureOut">
               <a:rPr lang="en-US" smtClean="0"/>
-              <a:t>11/13/16</a:t>
+              <a:t>3/12/17</a:t>
             </a:fld>
             <a:endParaRPr lang="en-US" dirty="0"/>
           </a:p>
@@ -3054,7 +3054,7 @@
           <a:p>
             <a:fld id="{D1C2FE12-02FD-40D2-9E73-08CF8D46514A}" type="datetimeFigureOut">
               <a:rPr lang="en-US" smtClean="0"/>
-              <a:t>11/13/16</a:t>
+              <a:t>3/12/17</a:t>
             </a:fld>
             <a:endParaRPr lang="en-US" dirty="0"/>
           </a:p>
@@ -3267,7 +3267,7 @@
           <a:p>
             <a:fld id="{D1C2FE12-02FD-40D2-9E73-08CF8D46514A}" type="datetimeFigureOut">
               <a:rPr lang="en-US" smtClean="0"/>
-              <a:t>11/13/16</a:t>
+              <a:t>3/12/17</a:t>
             </a:fld>
             <a:endParaRPr lang="en-US" dirty="0"/>
           </a:p>
@@ -9281,8 +9281,8 @@
             </p:sp>
           </mc:Fallback>
         </mc:AlternateContent>
-        <mc:AlternateContent xmlns:mc="http://schemas.openxmlformats.org/markup-compatibility/2006" xmlns:a14="http://schemas.microsoft.com/office/drawing/2010/main">
-          <mc:Choice Requires="a14">
+        <mc:AlternateContent xmlns:mc="http://schemas.openxmlformats.org/markup-compatibility/2006">
+          <mc:Choice xmlns:a14="http://schemas.microsoft.com/office/drawing/2010/main" Requires="a14">
             <p:sp>
               <p:nvSpPr>
                 <p:cNvPr id="13" name="TextBox 12"/>
@@ -9292,7 +9292,7 @@
               <p:spPr>
                 <a:xfrm>
                   <a:off x="2448900" y="2057384"/>
-                  <a:ext cx="3405868" cy="276999"/>
+                  <a:ext cx="3230372" cy="276999"/>
                 </a:xfrm>
                 <a:prstGeom prst="rect">
                   <a:avLst/>
@@ -9353,13 +9353,25 @@
                           <a:rPr lang="en-US" b="0" i="1" smtClean="0">
                             <a:latin typeface="Cambria Math" charset="0"/>
                           </a:rPr>
-                          <m:t>→ ∗</m:t>
+                          <m:t>→</m:t>
                         </m:r>
                         <m:r>
                           <a:rPr lang="en-US" b="0" i="1" smtClean="0">
                             <a:latin typeface="Cambria Math" charset="0"/>
                           </a:rPr>
-                          <m:t>𝑡𝑎𝑔</m:t>
+                          <m:t>(</m:t>
+                        </m:r>
+                        <m:r>
+                          <a:rPr lang="en-US" b="0" i="1" smtClean="0">
+                            <a:latin typeface="Cambria Math" charset="0"/>
+                          </a:rPr>
+                          <m:t>∗</m:t>
+                        </m:r>
+                        <m:r>
+                          <a:rPr lang="en-US" b="0" i="1" smtClean="0">
+                            <a:latin typeface="Cambria Math" charset="0"/>
+                          </a:rPr>
+                          <m:t>,</m:t>
                         </m:r>
                         <m:r>
                           <a:rPr lang="en-US" b="0" i="1" smtClean="0">
@@ -9388,6 +9400,12 @@
                           <a:rPr lang="en-US" b="0" i="1" smtClean="0">
                             <a:latin typeface="Cambria Math" charset="0"/>
                           </a:rPr>
+                          <m:t>)</m:t>
+                        </m:r>
+                        <m:r>
+                          <a:rPr lang="en-US" b="0" i="1" smtClean="0">
+                            <a:latin typeface="Cambria Math" charset="0"/>
+                          </a:rPr>
                           <m:t>,</m:t>
                         </m:r>
                       </m:oMath>
@@ -9398,7 +9416,7 @@
               </p:txBody>
             </p:sp>
           </mc:Choice>
-          <mc:Fallback xmlns="">
+          <mc:Fallback>
             <p:sp>
               <p:nvSpPr>
                 <p:cNvPr id="13" name="TextBox 12"/>
@@ -9410,7 +9428,7 @@
               <p:spPr>
                 <a:xfrm>
                   <a:off x="2448900" y="2057384"/>
-                  <a:ext cx="3405868" cy="276999"/>
+                  <a:ext cx="3230372" cy="276999"/>
                 </a:xfrm>
                 <a:prstGeom prst="rect">
                   <a:avLst/>
@@ -9418,7 +9436,7 @@
                 <a:blipFill rotWithShape="0">
                   <a:blip r:embed="rId3"/>
                   <a:stretch>
-                    <a:fillRect l="-896" t="-146667" b="-180000"/>
+                    <a:fillRect l="-943" t="-2222" r="-755" b="-35556"/>
                   </a:stretch>
                 </a:blipFill>
               </p:spPr>
@@ -9437,8 +9455,8 @@
             </p:sp>
           </mc:Fallback>
         </mc:AlternateContent>
-        <mc:AlternateContent xmlns:mc="http://schemas.openxmlformats.org/markup-compatibility/2006" xmlns:a14="http://schemas.microsoft.com/office/drawing/2010/main">
-          <mc:Choice Requires="a14">
+        <mc:AlternateContent xmlns:mc="http://schemas.openxmlformats.org/markup-compatibility/2006">
+          <mc:Choice xmlns:a14="http://schemas.microsoft.com/office/drawing/2010/main" Requires="a14">
             <p:sp>
               <p:nvSpPr>
                 <p:cNvPr id="14" name="TextBox 13"/>
@@ -9447,8 +9465,8 @@
               </p:nvSpPr>
               <p:spPr>
                 <a:xfrm>
-                  <a:off x="3277247" y="2376630"/>
-                  <a:ext cx="2606547" cy="276999"/>
+                  <a:off x="3302186" y="2376630"/>
+                  <a:ext cx="2369303" cy="276999"/>
                 </a:xfrm>
                 <a:prstGeom prst="rect">
                   <a:avLst/>
@@ -9503,19 +9521,25 @@
                           <a:rPr lang="en-US" b="0" i="1" smtClean="0">
                             <a:latin typeface="Cambria Math" charset="0"/>
                           </a:rPr>
-                          <m:t>→ ∗</m:t>
+                          <m:t>→</m:t>
                         </m:r>
                         <m:r>
                           <a:rPr lang="en-US" b="0" i="1" smtClean="0">
                             <a:latin typeface="Cambria Math" charset="0"/>
                           </a:rPr>
-                          <m:t>𝑡𝑎𝑔</m:t>
+                          <m:t>(</m:t>
                         </m:r>
                         <m:r>
                           <a:rPr lang="en-US" b="0" i="1" smtClean="0">
                             <a:latin typeface="Cambria Math" charset="0"/>
                           </a:rPr>
-                          <m:t> </m:t>
+                          <m:t>∗</m:t>
+                        </m:r>
+                        <m:r>
+                          <a:rPr lang="en-US" b="0" i="1" smtClean="0">
+                            <a:latin typeface="Cambria Math" charset="0"/>
+                          </a:rPr>
+                          <m:t>, </m:t>
                         </m:r>
                         <m:d>
                           <m:dPr>
@@ -9538,6 +9562,12 @@
                           <a:rPr lang="en-US" b="0" i="1" smtClean="0">
                             <a:latin typeface="Cambria Math" charset="0"/>
                           </a:rPr>
+                          <m:t>)</m:t>
+                        </m:r>
+                        <m:r>
+                          <a:rPr lang="en-US" b="0" i="1" smtClean="0">
+                            <a:latin typeface="Cambria Math" charset="0"/>
+                          </a:rPr>
                           <m:t>,</m:t>
                         </m:r>
                       </m:oMath>
@@ -9548,7 +9578,7 @@
               </p:txBody>
             </p:sp>
           </mc:Choice>
-          <mc:Fallback xmlns="">
+          <mc:Fallback>
             <p:sp>
               <p:nvSpPr>
                 <p:cNvPr id="14" name="TextBox 13"/>
@@ -9559,8 +9589,8 @@
               </p:nvSpPr>
               <p:spPr>
                 <a:xfrm>
-                  <a:off x="3277247" y="2376630"/>
-                  <a:ext cx="2606547" cy="276999"/>
+                  <a:off x="3302186" y="2376630"/>
+                  <a:ext cx="2369303" cy="276999"/>
                 </a:xfrm>
                 <a:prstGeom prst="rect">
                   <a:avLst/>
@@ -9568,7 +9598,7 @@
                 <a:blipFill rotWithShape="0">
                   <a:blip r:embed="rId4"/>
                   <a:stretch>
-                    <a:fillRect l="-703" t="-143478" b="-176087"/>
+                    <a:fillRect l="-2062" t="-2174" r="-1546" b="-32609"/>
                   </a:stretch>
                 </a:blipFill>
               </p:spPr>
@@ -10023,8 +10053,8 @@
             </p:sp>
           </mc:Fallback>
         </mc:AlternateContent>
-        <mc:AlternateContent xmlns:mc="http://schemas.openxmlformats.org/markup-compatibility/2006" xmlns:a14="http://schemas.microsoft.com/office/drawing/2010/main">
-          <mc:Choice Requires="a14">
+        <mc:AlternateContent xmlns:mc="http://schemas.openxmlformats.org/markup-compatibility/2006">
+          <mc:Choice xmlns:a14="http://schemas.microsoft.com/office/drawing/2010/main" Requires="a14">
             <p:sp>
               <p:nvSpPr>
                 <p:cNvPr id="34" name="TextBox 33"/>
@@ -10034,7 +10064,7 @@
               <p:spPr>
                 <a:xfrm>
                   <a:off x="2409958" y="5330557"/>
-                  <a:ext cx="3405868" cy="276999"/>
+                  <a:ext cx="3230372" cy="276999"/>
                 </a:xfrm>
                 <a:prstGeom prst="rect">
                   <a:avLst/>
@@ -10095,19 +10125,25 @@
                           <a:rPr lang="en-US" b="0" i="1" smtClean="0">
                             <a:latin typeface="Cambria Math" charset="0"/>
                           </a:rPr>
-                          <m:t>→ ∗</m:t>
+                          <m:t>→</m:t>
                         </m:r>
                         <m:r>
                           <a:rPr lang="en-US" b="0" i="1" smtClean="0">
                             <a:latin typeface="Cambria Math" charset="0"/>
                           </a:rPr>
-                          <m:t>𝑡𝑎𝑔</m:t>
+                          <m:t>(</m:t>
                         </m:r>
                         <m:r>
                           <a:rPr lang="en-US" b="0" i="1" smtClean="0">
                             <a:latin typeface="Cambria Math" charset="0"/>
                           </a:rPr>
-                          <m:t> </m:t>
+                          <m:t>∗</m:t>
+                        </m:r>
+                        <m:r>
+                          <a:rPr lang="en-US" b="0" i="1" smtClean="0">
+                            <a:latin typeface="Cambria Math" charset="0"/>
+                          </a:rPr>
+                          <m:t>,</m:t>
                         </m:r>
                         <m:d>
                           <m:dPr>
@@ -10130,6 +10166,12 @@
                           <a:rPr lang="en-US" b="0" i="1" smtClean="0">
                             <a:latin typeface="Cambria Math" charset="0"/>
                           </a:rPr>
+                          <m:t>)</m:t>
+                        </m:r>
+                        <m:r>
+                          <a:rPr lang="en-US" b="0" i="1" smtClean="0">
+                            <a:latin typeface="Cambria Math" charset="0"/>
+                          </a:rPr>
                           <m:t>,</m:t>
                         </m:r>
                       </m:oMath>
@@ -10140,7 +10182,7 @@
               </p:txBody>
             </p:sp>
           </mc:Choice>
-          <mc:Fallback xmlns="">
+          <mc:Fallback>
             <p:sp>
               <p:nvSpPr>
                 <p:cNvPr id="34" name="TextBox 33"/>
@@ -10152,7 +10194,7 @@
               <p:spPr>
                 <a:xfrm>
                   <a:off x="2409958" y="5330557"/>
-                  <a:ext cx="3405868" cy="276999"/>
+                  <a:ext cx="3230372" cy="276999"/>
                 </a:xfrm>
                 <a:prstGeom prst="rect">
                   <a:avLst/>
@@ -10160,7 +10202,7 @@
                 <a:blipFill rotWithShape="0">
                   <a:blip r:embed="rId8"/>
                   <a:stretch>
-                    <a:fillRect l="-894" t="-143478" b="-176087"/>
+                    <a:fillRect l="-943" t="-2174" r="-755" b="-32609"/>
                   </a:stretch>
                 </a:blipFill>
               </p:spPr>
@@ -10179,8 +10221,8 @@
             </p:sp>
           </mc:Fallback>
         </mc:AlternateContent>
-        <mc:AlternateContent xmlns:mc="http://schemas.openxmlformats.org/markup-compatibility/2006" xmlns:a14="http://schemas.microsoft.com/office/drawing/2010/main">
-          <mc:Choice Requires="a14">
+        <mc:AlternateContent xmlns:mc="http://schemas.openxmlformats.org/markup-compatibility/2006">
+          <mc:Choice xmlns:a14="http://schemas.microsoft.com/office/drawing/2010/main" Requires="a14">
             <p:sp>
               <p:nvSpPr>
                 <p:cNvPr id="35" name="TextBox 34"/>
@@ -10189,8 +10231,8 @@
               </p:nvSpPr>
               <p:spPr>
                 <a:xfrm>
-                  <a:off x="3238361" y="5649803"/>
-                  <a:ext cx="2606547" cy="276999"/>
+                  <a:off x="3263300" y="5649803"/>
+                  <a:ext cx="2369303" cy="276999"/>
                 </a:xfrm>
                 <a:prstGeom prst="rect">
                   <a:avLst/>
@@ -10245,19 +10287,25 @@
                           <a:rPr lang="en-US" b="0" i="1" smtClean="0">
                             <a:latin typeface="Cambria Math" charset="0"/>
                           </a:rPr>
-                          <m:t>→ ∗</m:t>
+                          <m:t>→</m:t>
                         </m:r>
                         <m:r>
                           <a:rPr lang="en-US" b="0" i="1" smtClean="0">
                             <a:latin typeface="Cambria Math" charset="0"/>
                           </a:rPr>
-                          <m:t>𝑡𝑎𝑔</m:t>
+                          <m:t>(</m:t>
                         </m:r>
                         <m:r>
                           <a:rPr lang="en-US" b="0" i="1" smtClean="0">
                             <a:latin typeface="Cambria Math" charset="0"/>
                           </a:rPr>
-                          <m:t> </m:t>
+                          <m:t>∗</m:t>
+                        </m:r>
+                        <m:r>
+                          <a:rPr lang="en-US" b="0" i="1" smtClean="0">
+                            <a:latin typeface="Cambria Math" charset="0"/>
+                          </a:rPr>
+                          <m:t>,</m:t>
                         </m:r>
                         <m:d>
                           <m:dPr>
@@ -10280,6 +10328,12 @@
                           <a:rPr lang="en-US" b="0" i="1" smtClean="0">
                             <a:latin typeface="Cambria Math" charset="0"/>
                           </a:rPr>
+                          <m:t>)</m:t>
+                        </m:r>
+                        <m:r>
+                          <a:rPr lang="en-US" b="0" i="1" smtClean="0">
+                            <a:latin typeface="Cambria Math" charset="0"/>
+                          </a:rPr>
                           <m:t>,</m:t>
                         </m:r>
                       </m:oMath>
@@ -10290,7 +10344,7 @@
               </p:txBody>
             </p:sp>
           </mc:Choice>
-          <mc:Fallback xmlns="">
+          <mc:Fallback>
             <p:sp>
               <p:nvSpPr>
                 <p:cNvPr id="35" name="TextBox 34"/>
@@ -10301,8 +10355,8 @@
               </p:nvSpPr>
               <p:spPr>
                 <a:xfrm>
-                  <a:off x="3238361" y="5649803"/>
-                  <a:ext cx="2606547" cy="276999"/>
+                  <a:off x="3263300" y="5649803"/>
+                  <a:ext cx="2369303" cy="276999"/>
                 </a:xfrm>
                 <a:prstGeom prst="rect">
                   <a:avLst/>
@@ -10310,7 +10364,7 @@
                 <a:blipFill rotWithShape="0">
                   <a:blip r:embed="rId9"/>
                   <a:stretch>
-                    <a:fillRect l="-467" t="-148889" b="-180000"/>
+                    <a:fillRect l="-1799" t="-4444" r="-1285" b="-35556"/>
                   </a:stretch>
                 </a:blipFill>
               </p:spPr>
@@ -11150,8 +11204,8 @@
             </a:p>
           </p:txBody>
         </p:sp>
-        <mc:AlternateContent xmlns:mc="http://schemas.openxmlformats.org/markup-compatibility/2006" xmlns:a14="http://schemas.microsoft.com/office/drawing/2010/main">
-          <mc:Choice Requires="a14">
+        <mc:AlternateContent xmlns:mc="http://schemas.openxmlformats.org/markup-compatibility/2006">
+          <mc:Choice xmlns:a14="http://schemas.microsoft.com/office/drawing/2010/main" Requires="a14">
             <p:sp>
               <p:nvSpPr>
                 <p:cNvPr id="24" name="TextBox 23"/>
@@ -11250,7 +11304,7 @@
               </p:txBody>
             </p:sp>
           </mc:Choice>
-          <mc:Fallback xmlns="">
+          <mc:Fallback>
             <p:sp>
               <p:nvSpPr>
                 <p:cNvPr id="24" name="TextBox 23"/>
@@ -11289,8 +11343,8 @@
             </p:sp>
           </mc:Fallback>
         </mc:AlternateContent>
-        <mc:AlternateContent xmlns:mc="http://schemas.openxmlformats.org/markup-compatibility/2006" xmlns:a14="http://schemas.microsoft.com/office/drawing/2010/main">
-          <mc:Choice Requires="a14">
+        <mc:AlternateContent xmlns:mc="http://schemas.openxmlformats.org/markup-compatibility/2006">
+          <mc:Choice xmlns:a14="http://schemas.microsoft.com/office/drawing/2010/main" Requires="a14">
             <p:sp>
               <p:nvSpPr>
                 <p:cNvPr id="25" name="TextBox 24"/>
@@ -11300,7 +11354,7 @@
               <p:spPr>
                 <a:xfrm>
                   <a:off x="2894670" y="2057384"/>
-                  <a:ext cx="3405868" cy="276999"/>
+                  <a:ext cx="3230372" cy="276999"/>
                 </a:xfrm>
                 <a:prstGeom prst="rect">
                   <a:avLst/>
@@ -11361,13 +11415,25 @@
                           <a:rPr lang="en-US" b="0" i="1" smtClean="0">
                             <a:latin typeface="Cambria Math" charset="0"/>
                           </a:rPr>
-                          <m:t>→ ∗</m:t>
+                          <m:t>→</m:t>
                         </m:r>
                         <m:r>
                           <a:rPr lang="en-US" b="0" i="1" smtClean="0">
                             <a:latin typeface="Cambria Math" charset="0"/>
                           </a:rPr>
-                          <m:t>𝑡𝑎𝑔</m:t>
+                          <m:t>(</m:t>
+                        </m:r>
+                        <m:r>
+                          <a:rPr lang="en-US" b="0" i="1" smtClean="0">
+                            <a:latin typeface="Cambria Math" charset="0"/>
+                          </a:rPr>
+                          <m:t>∗</m:t>
+                        </m:r>
+                        <m:r>
+                          <a:rPr lang="en-US" b="0" i="1" smtClean="0">
+                            <a:latin typeface="Cambria Math" charset="0"/>
+                          </a:rPr>
+                          <m:t>,</m:t>
                         </m:r>
                         <m:r>
                           <a:rPr lang="en-US" b="0" i="1" smtClean="0">
@@ -11396,6 +11462,12 @@
                           <a:rPr lang="en-US" b="0" i="1" smtClean="0">
                             <a:latin typeface="Cambria Math" charset="0"/>
                           </a:rPr>
+                          <m:t>)</m:t>
+                        </m:r>
+                        <m:r>
+                          <a:rPr lang="en-US" b="0" i="1" smtClean="0">
+                            <a:latin typeface="Cambria Math" charset="0"/>
+                          </a:rPr>
                           <m:t>,</m:t>
                         </m:r>
                       </m:oMath>
@@ -11406,7 +11478,7 @@
               </p:txBody>
             </p:sp>
           </mc:Choice>
-          <mc:Fallback xmlns="">
+          <mc:Fallback>
             <p:sp>
               <p:nvSpPr>
                 <p:cNvPr id="25" name="TextBox 24"/>
@@ -11418,7 +11490,7 @@
               <p:spPr>
                 <a:xfrm>
                   <a:off x="2894670" y="2057384"/>
-                  <a:ext cx="3405868" cy="276999"/>
+                  <a:ext cx="3230372" cy="276999"/>
                 </a:xfrm>
                 <a:prstGeom prst="rect">
                   <a:avLst/>
@@ -11426,7 +11498,7 @@
                 <a:blipFill rotWithShape="0">
                   <a:blip r:embed="rId15"/>
                   <a:stretch>
-                    <a:fillRect l="-894" t="-146667" b="-180000"/>
+                    <a:fillRect l="-943" t="-2222" r="-755" b="-35556"/>
                   </a:stretch>
                 </a:blipFill>
               </p:spPr>
@@ -11445,8 +11517,8 @@
             </p:sp>
           </mc:Fallback>
         </mc:AlternateContent>
-        <mc:AlternateContent xmlns:mc="http://schemas.openxmlformats.org/markup-compatibility/2006" xmlns:a14="http://schemas.microsoft.com/office/drawing/2010/main">
-          <mc:Choice Requires="a14">
+        <mc:AlternateContent xmlns:mc="http://schemas.openxmlformats.org/markup-compatibility/2006">
+          <mc:Choice xmlns:a14="http://schemas.microsoft.com/office/drawing/2010/main" Requires="a14">
             <p:sp>
               <p:nvSpPr>
                 <p:cNvPr id="26" name="TextBox 25"/>
@@ -11455,8 +11527,8 @@
               </p:nvSpPr>
               <p:spPr>
                 <a:xfrm>
-                  <a:off x="3723017" y="2376630"/>
-                  <a:ext cx="2606547" cy="276999"/>
+                  <a:off x="3747956" y="2376630"/>
+                  <a:ext cx="2369303" cy="276999"/>
                 </a:xfrm>
                 <a:prstGeom prst="rect">
                   <a:avLst/>
@@ -11511,19 +11583,25 @@
                           <a:rPr lang="en-US" b="0" i="1" smtClean="0">
                             <a:latin typeface="Cambria Math" charset="0"/>
                           </a:rPr>
-                          <m:t>→ ∗</m:t>
+                          <m:t>→</m:t>
                         </m:r>
                         <m:r>
                           <a:rPr lang="en-US" b="0" i="1" smtClean="0">
                             <a:latin typeface="Cambria Math" charset="0"/>
                           </a:rPr>
-                          <m:t>𝑡𝑎𝑔</m:t>
+                          <m:t>(</m:t>
                         </m:r>
                         <m:r>
                           <a:rPr lang="en-US" b="0" i="1" smtClean="0">
                             <a:latin typeface="Cambria Math" charset="0"/>
                           </a:rPr>
-                          <m:t> </m:t>
+                          <m:t>∗</m:t>
+                        </m:r>
+                        <m:r>
+                          <a:rPr lang="en-US" b="0" i="1" smtClean="0">
+                            <a:latin typeface="Cambria Math" charset="0"/>
+                          </a:rPr>
+                          <m:t>,</m:t>
                         </m:r>
                         <m:d>
                           <m:dPr>
@@ -11546,6 +11624,12 @@
                           <a:rPr lang="en-US" b="0" i="1" smtClean="0">
                             <a:latin typeface="Cambria Math" charset="0"/>
                           </a:rPr>
+                          <m:t>)</m:t>
+                        </m:r>
+                        <m:r>
+                          <a:rPr lang="en-US" b="0" i="1" smtClean="0">
+                            <a:latin typeface="Cambria Math" charset="0"/>
+                          </a:rPr>
                           <m:t>,</m:t>
                         </m:r>
                       </m:oMath>
@@ -11556,7 +11640,7 @@
               </p:txBody>
             </p:sp>
           </mc:Choice>
-          <mc:Fallback xmlns="">
+          <mc:Fallback>
             <p:sp>
               <p:nvSpPr>
                 <p:cNvPr id="26" name="TextBox 25"/>
@@ -11567,8 +11651,8 @@
               </p:nvSpPr>
               <p:spPr>
                 <a:xfrm>
-                  <a:off x="3723017" y="2376630"/>
-                  <a:ext cx="2606547" cy="276999"/>
+                  <a:off x="3747956" y="2376630"/>
+                  <a:ext cx="2369303" cy="276999"/>
                 </a:xfrm>
                 <a:prstGeom prst="rect">
                   <a:avLst/>
@@ -11576,7 +11660,7 @@
                 <a:blipFill rotWithShape="0">
                   <a:blip r:embed="rId16"/>
                   <a:stretch>
-                    <a:fillRect l="-467" t="-143478" b="-176087"/>
+                    <a:fillRect l="-1799" t="-2174" r="-1285" b="-32609"/>
                   </a:stretch>
                 </a:blipFill>
               </p:spPr>
@@ -11882,7 +11966,7 @@
         <p:grpSpPr>
           <a:xfrm>
             <a:off x="6696209" y="3134109"/>
-            <a:ext cx="4184864" cy="1838480"/>
+            <a:ext cx="4207724" cy="1838480"/>
             <a:chOff x="2297429" y="1065209"/>
             <a:chExt cx="4184864" cy="1838480"/>
           </a:xfrm>
@@ -11934,134 +12018,8 @@
             </a:p>
           </p:txBody>
         </p:sp>
-        <mc:AlternateContent xmlns:mc="http://schemas.openxmlformats.org/markup-compatibility/2006" xmlns:a14="http://schemas.microsoft.com/office/drawing/2010/main">
-          <mc:Choice Requires="a14">
-            <p:sp>
-              <p:nvSpPr>
-                <p:cNvPr id="42" name="TextBox 41"/>
-                <p:cNvSpPr txBox="1"/>
-                <p:nvPr/>
-              </p:nvSpPr>
-              <p:spPr>
-                <a:xfrm>
-                  <a:off x="2454715" y="1430395"/>
-                  <a:ext cx="2527422" cy="276999"/>
-                </a:xfrm>
-                <a:prstGeom prst="rect">
-                  <a:avLst/>
-                </a:prstGeom>
-                <a:noFill/>
-              </p:spPr>
-              <p:txBody>
-                <a:bodyPr wrap="none" lIns="0" tIns="0" rIns="0" bIns="0" rtlCol="0">
-                  <a:spAutoFit/>
-                </a:bodyPr>
-                <a:lstStyle/>
-                <a:p>
-                  <a:pPr/>
-                  <a14:m>
-                    <m:oMathPara xmlns:m="http://schemas.openxmlformats.org/officeDocument/2006/math">
-                      <m:oMathParaPr>
-                        <m:jc m:val="centerGroup"/>
-                      </m:oMathParaPr>
-                      <m:oMath xmlns:m="http://schemas.openxmlformats.org/officeDocument/2006/math">
-                        <m:r>
-                          <a:rPr lang="en-US" b="0" i="1" smtClean="0">
-                            <a:latin typeface="Cambria Math" charset="0"/>
-                          </a:rPr>
-                          <m:t>𝑜𝑟𝑖𝑔𝑖𝑛𝑎𝑡𝑒</m:t>
-                        </m:r>
-                        <m:r>
-                          <a:rPr lang="en-US" b="0" i="1" smtClean="0">
-                            <a:latin typeface="Cambria Math" charset="0"/>
-                          </a:rPr>
-                          <m:t> $</m:t>
-                        </m:r>
-                        <m:r>
-                          <a:rPr lang="en-US" b="0" i="1" smtClean="0">
-                            <a:latin typeface="Cambria Math" charset="0"/>
-                          </a:rPr>
-                          <m:t>𝐺𝑃</m:t>
-                        </m:r>
-                        <m:r>
-                          <a:rPr lang="en-US" b="0" i="1" smtClean="0">
-                            <a:latin typeface="Cambria Math" charset="0"/>
-                          </a:rPr>
-                          <m:t> </m:t>
-                        </m:r>
-                        <m:r>
-                          <a:rPr lang="en-US" b="0" i="1" smtClean="0">
-                            <a:latin typeface="Cambria Math" charset="0"/>
-                          </a:rPr>
-                          <m:t>𝑡𝑎𝑔</m:t>
-                        </m:r>
-                        <m:r>
-                          <a:rPr lang="en-US" b="0" i="1" smtClean="0">
-                            <a:latin typeface="Cambria Math" charset="0"/>
-                          </a:rPr>
-                          <m:t>($</m:t>
-                        </m:r>
-                        <m:r>
-                          <a:rPr lang="en-US" b="0" i="1" smtClean="0">
-                            <a:latin typeface="Cambria Math" charset="0"/>
-                          </a:rPr>
-                          <m:t>𝐺𝑃</m:t>
-                        </m:r>
-                        <m:r>
-                          <a:rPr lang="en-US" b="0" i="1" smtClean="0">
-                            <a:latin typeface="Cambria Math" charset="0"/>
-                          </a:rPr>
-                          <m:t>)</m:t>
-                        </m:r>
-                      </m:oMath>
-                    </m:oMathPara>
-                  </a14:m>
-                  <a:endParaRPr lang="en-US" dirty="0"/>
-                </a:p>
-              </p:txBody>
-            </p:sp>
-          </mc:Choice>
-          <mc:Fallback xmlns="">
-            <p:sp>
-              <p:nvSpPr>
-                <p:cNvPr id="42" name="TextBox 41"/>
-                <p:cNvSpPr txBox="1">
-                  <a:spLocks noRot="1" noChangeAspect="1" noMove="1" noResize="1" noEditPoints="1" noAdjustHandles="1" noChangeArrowheads="1" noChangeShapeType="1" noTextEdit="1"/>
-                </p:cNvSpPr>
-                <p:nvPr/>
-              </p:nvSpPr>
-              <p:spPr>
-                <a:xfrm>
-                  <a:off x="2454715" y="1430395"/>
-                  <a:ext cx="2527422" cy="276999"/>
-                </a:xfrm>
-                <a:prstGeom prst="rect">
-                  <a:avLst/>
-                </a:prstGeom>
-                <a:blipFill rotWithShape="0">
-                  <a:blip r:embed="rId19"/>
-                  <a:stretch>
-                    <a:fillRect l="-2651" t="-146667" r="-2892" b="-182222"/>
-                  </a:stretch>
-                </a:blipFill>
-              </p:spPr>
-              <p:txBody>
-                <a:bodyPr/>
-                <a:lstStyle/>
-                <a:p>
-                  <a:r>
-                    <a:rPr lang="en-US">
-                      <a:noFill/>
-                    </a:rPr>
-                    <a:t> </a:t>
-                  </a:r>
-                </a:p>
-              </p:txBody>
-            </p:sp>
-          </mc:Fallback>
-        </mc:AlternateContent>
-        <mc:AlternateContent xmlns:mc="http://schemas.openxmlformats.org/markup-compatibility/2006" xmlns:a14="http://schemas.microsoft.com/office/drawing/2010/main">
-          <mc:Choice Requires="a14">
+        <mc:AlternateContent xmlns:mc="http://schemas.openxmlformats.org/markup-compatibility/2006">
+          <mc:Choice xmlns:a14="http://schemas.microsoft.com/office/drawing/2010/main" Requires="a14">
             <p:sp>
               <p:nvSpPr>
                 <p:cNvPr id="50" name="TextBox 49"/>
@@ -12070,7 +12028,7 @@
               </p:nvSpPr>
               <p:spPr>
                 <a:xfrm>
-                  <a:off x="2517147" y="1707394"/>
+                  <a:off x="2483895" y="1707394"/>
                   <a:ext cx="226023" cy="276999"/>
                 </a:xfrm>
                 <a:prstGeom prst="rect">
@@ -12105,7 +12063,7 @@
               </p:txBody>
             </p:sp>
           </mc:Choice>
-          <mc:Fallback xmlns="">
+          <mc:Fallback>
             <p:sp>
               <p:nvSpPr>
                 <p:cNvPr id="50" name="TextBox 49"/>
@@ -12116,14 +12074,14 @@
               </p:nvSpPr>
               <p:spPr>
                 <a:xfrm>
-                  <a:off x="2517147" y="1707394"/>
+                  <a:off x="2483895" y="1707394"/>
                   <a:ext cx="226023" cy="276999"/>
                 </a:xfrm>
                 <a:prstGeom prst="rect">
                   <a:avLst/>
                 </a:prstGeom>
                 <a:blipFill rotWithShape="0">
-                  <a:blip r:embed="rId20"/>
+                  <a:blip r:embed="rId19"/>
                   <a:stretch>
                     <a:fillRect/>
                   </a:stretch>
@@ -12175,6 +12133,143 @@
           </a:p>
         </p:txBody>
       </p:sp>
+      <mc:AlternateContent xmlns:mc="http://schemas.openxmlformats.org/markup-compatibility/2006">
+        <mc:Choice xmlns:a14="http://schemas.microsoft.com/office/drawing/2010/main" Requires="a14">
+          <p:sp>
+            <p:nvSpPr>
+              <p:cNvPr id="47" name="TextBox 46"/>
+              <p:cNvSpPr txBox="1"/>
+              <p:nvPr/>
+            </p:nvSpPr>
+            <p:spPr>
+              <a:xfrm>
+                <a:off x="6826839" y="3527847"/>
+                <a:ext cx="3396827" cy="276999"/>
+              </a:xfrm>
+              <a:prstGeom prst="rect">
+                <a:avLst/>
+              </a:prstGeom>
+              <a:noFill/>
+            </p:spPr>
+            <p:txBody>
+              <a:bodyPr wrap="none" lIns="0" tIns="0" rIns="0" bIns="0" rtlCol="0">
+                <a:spAutoFit/>
+              </a:bodyPr>
+              <a:lstStyle/>
+              <a:p>
+                <a:pPr/>
+                <a14:m>
+                  <m:oMathPara xmlns:m="http://schemas.openxmlformats.org/officeDocument/2006/math">
+                    <m:oMathParaPr>
+                      <m:jc m:val="centerGroup"/>
+                    </m:oMathParaPr>
+                    <m:oMath xmlns:m="http://schemas.openxmlformats.org/officeDocument/2006/math">
+                      <m:r>
+                        <a:rPr lang="en-US" b="0" i="1" smtClean="0">
+                          <a:latin typeface="Cambria Math" charset="0"/>
+                        </a:rPr>
+                        <m:t>$</m:t>
+                      </m:r>
+                      <m:r>
+                        <a:rPr lang="en-US" b="0" i="1" smtClean="0">
+                          <a:latin typeface="Cambria Math" charset="0"/>
+                        </a:rPr>
+                        <m:t>𝐺𝑃</m:t>
+                      </m:r>
+                      <m:r>
+                        <a:rPr lang="en-US" b="0" i="1" smtClean="0">
+                          <a:latin typeface="Cambria Math" charset="0"/>
+                        </a:rPr>
+                        <m:t>⇒[100 :{}→(∗, </m:t>
+                      </m:r>
+                      <m:r>
+                        <a:rPr lang="en-US" b="0" i="1" smtClean="0">
+                          <a:latin typeface="Cambria Math" charset="0"/>
+                        </a:rPr>
+                        <m:t>𝑡𝑎𝑔</m:t>
+                      </m:r>
+                      <m:d>
+                        <m:dPr>
+                          <m:ctrlPr>
+                            <a:rPr lang="en-US" b="0" i="1" smtClean="0">
+                              <a:latin typeface="Cambria Math" charset="0"/>
+                            </a:rPr>
+                          </m:ctrlPr>
+                        </m:dPr>
+                        <m:e>
+                          <m:r>
+                            <a:rPr lang="en-US" b="0" i="1" smtClean="0">
+                              <a:latin typeface="Cambria Math" charset="0"/>
+                            </a:rPr>
+                            <m:t>$</m:t>
+                          </m:r>
+                          <m:r>
+                            <a:rPr lang="en-US" b="0" i="1" smtClean="0">
+                              <a:latin typeface="Cambria Math" charset="0"/>
+                            </a:rPr>
+                            <m:t>𝐺𝑃</m:t>
+                          </m:r>
+                        </m:e>
+                      </m:d>
+                      <m:r>
+                        <a:rPr lang="en-US" b="0" i="1" smtClean="0">
+                          <a:latin typeface="Cambria Math" charset="0"/>
+                        </a:rPr>
+                        <m:t>)</m:t>
+                      </m:r>
+                      <m:r>
+                        <a:rPr lang="en-US" b="0" i="1" smtClean="0">
+                          <a:latin typeface="Cambria Math" charset="0"/>
+                        </a:rPr>
+                        <m:t>]</m:t>
+                      </m:r>
+                    </m:oMath>
+                  </m:oMathPara>
+                </a14:m>
+                <a:endParaRPr lang="en-US" dirty="0"/>
+              </a:p>
+            </p:txBody>
+          </p:sp>
+        </mc:Choice>
+        <mc:Fallback>
+          <p:sp>
+            <p:nvSpPr>
+              <p:cNvPr id="47" name="TextBox 46"/>
+              <p:cNvSpPr txBox="1">
+                <a:spLocks noRot="1" noChangeAspect="1" noMove="1" noResize="1" noEditPoints="1" noAdjustHandles="1" noChangeArrowheads="1" noChangeShapeType="1" noTextEdit="1"/>
+              </p:cNvSpPr>
+              <p:nvPr/>
+            </p:nvSpPr>
+            <p:spPr>
+              <a:xfrm>
+                <a:off x="6826839" y="3527847"/>
+                <a:ext cx="3396827" cy="276999"/>
+              </a:xfrm>
+              <a:prstGeom prst="rect">
+                <a:avLst/>
+              </a:prstGeom>
+              <a:blipFill rotWithShape="0">
+                <a:blip r:embed="rId20"/>
+                <a:stretch>
+                  <a:fillRect l="-1616" t="-4444" r="-2154" b="-35556"/>
+                </a:stretch>
+              </a:blipFill>
+            </p:spPr>
+            <p:txBody>
+              <a:bodyPr/>
+              <a:lstStyle/>
+              <a:p>
+                <a:r>
+                  <a:rPr lang="en-US">
+                    <a:noFill/>
+                  </a:rPr>
+                  <a:t> </a:t>
+                </a:r>
+              </a:p>
+            </p:txBody>
+          </p:sp>
+        </mc:Fallback>
+      </mc:AlternateContent>
     </p:spTree>
     <p:extLst>
       <p:ext uri="{BB962C8B-B14F-4D97-AF65-F5344CB8AC3E}">

</xml_diff>

<commit_message>
add legend to figure 3
</commit_message>
<xml_diff>
--- a/paper/abstraction/figures/examples.pptx
+++ b/paper/abstraction/figures/examples.pptx
@@ -7752,8 +7752,8 @@
           </a:fontRef>
         </p:style>
       </p:cxnSp>
-      <mc:AlternateContent xmlns:mc="http://schemas.openxmlformats.org/markup-compatibility/2006">
-        <mc:Choice xmlns:a14="http://schemas.microsoft.com/office/drawing/2010/main" Requires="a14">
+      <mc:AlternateContent xmlns:mc="http://schemas.openxmlformats.org/markup-compatibility/2006" xmlns:a14="http://schemas.microsoft.com/office/drawing/2010/main">
+        <mc:Choice Requires="a14">
           <p:sp>
             <p:nvSpPr>
               <p:cNvPr id="93" name="TextBox 92"/>
@@ -7853,7 +7853,7 @@
             </p:txBody>
           </p:sp>
         </mc:Choice>
-        <mc:Fallback>
+        <mc:Fallback xmlns="">
           <p:sp>
             <p:nvSpPr>
               <p:cNvPr id="93" name="TextBox 92"/>
@@ -7892,8 +7892,8 @@
           </p:sp>
         </mc:Fallback>
       </mc:AlternateContent>
-      <mc:AlternateContent xmlns:mc="http://schemas.openxmlformats.org/markup-compatibility/2006">
-        <mc:Choice xmlns:a14="http://schemas.microsoft.com/office/drawing/2010/main" Requires="a14">
+      <mc:AlternateContent xmlns:mc="http://schemas.openxmlformats.org/markup-compatibility/2006" xmlns:a14="http://schemas.microsoft.com/office/drawing/2010/main">
+        <mc:Choice Requires="a14">
           <p:sp>
             <p:nvSpPr>
               <p:cNvPr id="94" name="TextBox 93"/>
@@ -7993,7 +7993,7 @@
             </p:txBody>
           </p:sp>
         </mc:Choice>
-        <mc:Fallback>
+        <mc:Fallback xmlns="">
           <p:sp>
             <p:nvSpPr>
               <p:cNvPr id="94" name="TextBox 93"/>
@@ -8032,8 +8032,8 @@
           </p:sp>
         </mc:Fallback>
       </mc:AlternateContent>
-      <mc:AlternateContent xmlns:mc="http://schemas.openxmlformats.org/markup-compatibility/2006">
-        <mc:Choice xmlns:a14="http://schemas.microsoft.com/office/drawing/2010/main" Requires="a14">
+      <mc:AlternateContent xmlns:mc="http://schemas.openxmlformats.org/markup-compatibility/2006" xmlns:a14="http://schemas.microsoft.com/office/drawing/2010/main">
+        <mc:Choice Requires="a14">
           <p:sp>
             <p:nvSpPr>
               <p:cNvPr id="95" name="TextBox 94"/>
@@ -8108,7 +8108,7 @@
             </p:txBody>
           </p:sp>
         </mc:Choice>
-        <mc:Fallback>
+        <mc:Fallback xmlns="">
           <p:sp>
             <p:nvSpPr>
               <p:cNvPr id="95" name="TextBox 94"/>
@@ -8207,8 +8207,8 @@
           </a:p>
         </p:txBody>
       </p:sp>
-      <mc:AlternateContent xmlns:mc="http://schemas.openxmlformats.org/markup-compatibility/2006">
-        <mc:Choice xmlns:a14="http://schemas.microsoft.com/office/drawing/2010/main" Requires="a14">
+      <mc:AlternateContent xmlns:mc="http://schemas.openxmlformats.org/markup-compatibility/2006" xmlns:a14="http://schemas.microsoft.com/office/drawing/2010/main">
+        <mc:Choice Requires="a14">
           <p:sp>
             <p:nvSpPr>
               <p:cNvPr id="107" name="TextBox 106"/>
@@ -8283,7 +8283,7 @@
             </p:txBody>
           </p:sp>
         </mc:Choice>
-        <mc:Fallback>
+        <mc:Fallback xmlns="">
           <p:sp>
             <p:nvSpPr>
               <p:cNvPr id="107" name="TextBox 106"/>
@@ -8322,8 +8322,8 @@
           </p:sp>
         </mc:Fallback>
       </mc:AlternateContent>
-      <mc:AlternateContent xmlns:mc="http://schemas.openxmlformats.org/markup-compatibility/2006">
-        <mc:Choice xmlns:a14="http://schemas.microsoft.com/office/drawing/2010/main" Requires="a14">
+      <mc:AlternateContent xmlns:mc="http://schemas.openxmlformats.org/markup-compatibility/2006" xmlns:a14="http://schemas.microsoft.com/office/drawing/2010/main">
+        <mc:Choice Requires="a14">
           <p:sp>
             <p:nvSpPr>
               <p:cNvPr id="30" name="TextBox 29"/>
@@ -8423,7 +8423,7 @@
             </p:txBody>
           </p:sp>
         </mc:Choice>
-        <mc:Fallback>
+        <mc:Fallback xmlns="">
           <p:sp>
             <p:nvSpPr>
               <p:cNvPr id="30" name="TextBox 29"/>
@@ -8462,8 +8462,8 @@
           </p:sp>
         </mc:Fallback>
       </mc:AlternateContent>
-      <mc:AlternateContent xmlns:mc="http://schemas.openxmlformats.org/markup-compatibility/2006">
-        <mc:Choice xmlns:a14="http://schemas.microsoft.com/office/drawing/2010/main" Requires="a14">
+      <mc:AlternateContent xmlns:mc="http://schemas.openxmlformats.org/markup-compatibility/2006" xmlns:a14="http://schemas.microsoft.com/office/drawing/2010/main">
+        <mc:Choice Requires="a14">
           <p:sp>
             <p:nvSpPr>
               <p:cNvPr id="31" name="TextBox 30"/>
@@ -8563,7 +8563,7 @@
             </p:txBody>
           </p:sp>
         </mc:Choice>
-        <mc:Fallback>
+        <mc:Fallback xmlns="">
           <p:sp>
             <p:nvSpPr>
               <p:cNvPr id="31" name="TextBox 30"/>
@@ -37004,7 +37004,7 @@
         </p:nvGrpSpPr>
         <p:grpSpPr>
           <a:xfrm>
-            <a:off x="7951150" y="2274766"/>
+            <a:off x="7951150" y="2571946"/>
             <a:ext cx="2748944" cy="1925417"/>
             <a:chOff x="8006240" y="1952431"/>
             <a:chExt cx="2748944" cy="1925417"/>
@@ -38181,6 +38181,69 @@
           </mc:Fallback>
         </mc:AlternateContent>
       </p:grpSp>
+      <p:sp>
+        <p:nvSpPr>
+          <p:cNvPr id="64" name="TextBox 63"/>
+          <p:cNvSpPr txBox="1"/>
+          <p:nvPr/>
+        </p:nvSpPr>
+        <p:spPr>
+          <a:xfrm>
+            <a:off x="7885066" y="896250"/>
+            <a:ext cx="2782167" cy="1400383"/>
+          </a:xfrm>
+          <a:prstGeom prst="rect">
+            <a:avLst/>
+          </a:prstGeom>
+          <a:noFill/>
+          <a:ln w="19050">
+            <a:solidFill>
+              <a:schemeClr val="tx1"/>
+            </a:solidFill>
+          </a:ln>
+        </p:spPr>
+        <p:txBody>
+          <a:bodyPr wrap="square" rtlCol="0">
+            <a:spAutoFit/>
+          </a:bodyPr>
+          <a:lstStyle/>
+          <a:p>
+            <a:r>
+              <a:rPr lang="en-US" sz="1700" dirty="0" smtClean="0"/>
+              <a:t>S: 	Spine</a:t>
+            </a:r>
+          </a:p>
+          <a:p>
+            <a:r>
+              <a:rPr lang="en-US" sz="1700" dirty="0"/>
+              <a:t>TG: 	Global ToR</a:t>
+            </a:r>
+          </a:p>
+          <a:p>
+            <a:r>
+              <a:rPr lang="en-US" sz="1700" dirty="0"/>
+              <a:t>TL: 	Local </a:t>
+            </a:r>
+            <a:r>
+              <a:rPr lang="en-US" sz="1700" smtClean="0"/>
+              <a:t>ToR</a:t>
+            </a:r>
+            <a:endParaRPr lang="en-US" sz="1700" dirty="0" smtClean="0"/>
+          </a:p>
+          <a:p>
+            <a:r>
+              <a:rPr lang="en-US" sz="1700" dirty="0" smtClean="0"/>
+              <a:t>AG: 	Global Aggregation</a:t>
+            </a:r>
+          </a:p>
+          <a:p>
+            <a:r>
+              <a:rPr lang="en-US" sz="1700" dirty="0" smtClean="0"/>
+              <a:t>AL: 	Local Aggregation</a:t>
+            </a:r>
+          </a:p>
+        </p:txBody>
+      </p:sp>
     </p:spTree>
     <p:extLst>
       <p:ext uri="{BB962C8B-B14F-4D97-AF65-F5344CB8AC3E}">

</xml_diff>

<commit_message>
describe list comprehension syntax in paper
</commit_message>
<xml_diff>
--- a/paper/abstraction/figures/examples.pptx
+++ b/paper/abstraction/figures/examples.pptx
@@ -12146,8 +12146,8 @@
         </p:nvSpPr>
         <p:spPr>
           <a:xfrm>
-            <a:off x="1995853" y="548640"/>
-            <a:ext cx="3907403" cy="5939899"/>
+            <a:off x="1995853" y="548641"/>
+            <a:ext cx="3907403" cy="5662900"/>
           </a:xfrm>
           <a:prstGeom prst="rect">
             <a:avLst/>
@@ -12194,7 +12194,7 @@
         <p:spPr>
           <a:xfrm>
             <a:off x="2023989" y="579229"/>
-            <a:ext cx="3898568" cy="5909310"/>
+            <a:ext cx="3898568" cy="5632311"/>
           </a:xfrm>
           <a:prstGeom prst="rect">
             <a:avLst/>
@@ -12262,17 +12262,11 @@
           <a:p>
             <a:r>
               <a:rPr lang="en-US" dirty="0" smtClean="0"/>
-              <a:t>    no auto-summary</a:t>
-            </a:r>
-          </a:p>
-          <a:p>
-            <a:r>
-              <a:rPr lang="en-US" dirty="0" smtClean="0"/>
-              <a:t>    </a:t>
+              <a:t>    bgp </a:t>
             </a:r>
             <a:r>
               <a:rPr lang="en-US" dirty="0"/>
-              <a:t>bgp router-id </a:t>
+              <a:t>router-id </a:t>
             </a:r>
             <a:r>
               <a:rPr lang="en-US" b="1" dirty="0" smtClean="0"/>
@@ -12433,7 +12427,7 @@
         <p:spPr>
           <a:xfrm>
             <a:off x="5945460" y="548639"/>
-            <a:ext cx="3873968" cy="5939899"/>
+            <a:ext cx="3873968" cy="5662901"/>
           </a:xfrm>
           <a:prstGeom prst="rect">
             <a:avLst/>
@@ -12480,7 +12474,7 @@
         <p:spPr>
           <a:xfrm>
             <a:off x="5945460" y="565162"/>
-            <a:ext cx="3943772" cy="5909310"/>
+            <a:ext cx="3943772" cy="5632311"/>
           </a:xfrm>
           <a:prstGeom prst="rect">
             <a:avLst/>
@@ -12662,13 +12656,6 @@
             <a:r>
               <a:rPr lang="is-IS" dirty="0" smtClean="0"/>
               <a:t>64512:3201</a:t>
-            </a:r>
-            <a:endParaRPr lang="en-US" dirty="0" smtClean="0"/>
-          </a:p>
-          <a:p>
-            <a:r>
-              <a:rPr lang="en-US" dirty="0" smtClean="0"/>
-              <a:t>!</a:t>
             </a:r>
           </a:p>
         </p:txBody>
@@ -13918,7 +13905,7 @@
         </p:nvSpPr>
         <p:spPr>
           <a:xfrm>
-            <a:off x="4588348" y="851735"/>
+            <a:off x="4486748" y="1588335"/>
             <a:ext cx="2060931" cy="1465330"/>
           </a:xfrm>
           <a:prstGeom prst="rect">
@@ -13965,7 +13952,7 @@
         </p:nvSpPr>
         <p:spPr>
           <a:xfrm>
-            <a:off x="7069102" y="414036"/>
+            <a:off x="7069102" y="1150636"/>
             <a:ext cx="2091916" cy="1903029"/>
           </a:xfrm>
           <a:prstGeom prst="rect">
@@ -14015,8 +14002,8 @@
         </p:nvCxnSpPr>
         <p:spPr>
           <a:xfrm flipH="1">
-            <a:off x="2947946" y="322726"/>
-            <a:ext cx="644456" cy="665079"/>
+            <a:off x="3113046" y="1211726"/>
+            <a:ext cx="479356" cy="525379"/>
           </a:xfrm>
           <a:prstGeom prst="line">
             <a:avLst/>
@@ -14050,7 +14037,7 @@
         </p:nvGrpSpPr>
         <p:grpSpPr>
           <a:xfrm>
-            <a:off x="2023439" y="987805"/>
+            <a:off x="2188539" y="1737105"/>
             <a:ext cx="1764153" cy="1164616"/>
             <a:chOff x="1333831" y="3288757"/>
             <a:chExt cx="1764153" cy="1164616"/>
@@ -14341,7 +14328,7 @@
         </p:nvGrpSpPr>
         <p:grpSpPr>
           <a:xfrm>
-            <a:off x="4715404" y="1002093"/>
+            <a:off x="4613804" y="1738693"/>
             <a:ext cx="1764153" cy="1164616"/>
             <a:chOff x="1333831" y="3288757"/>
             <a:chExt cx="1764153" cy="1164616"/>
@@ -14627,7 +14614,7 @@
         </p:nvGrpSpPr>
         <p:grpSpPr>
           <a:xfrm>
-            <a:off x="3340060" y="-841889"/>
+            <a:off x="3340060" y="47111"/>
             <a:ext cx="1764153" cy="1164616"/>
             <a:chOff x="1333831" y="3288757"/>
             <a:chExt cx="1764153" cy="1164616"/>
@@ -14912,8 +14899,8 @@
         </p:nvCxnSpPr>
         <p:spPr>
           <a:xfrm>
-            <a:off x="4851871" y="322727"/>
-            <a:ext cx="788040" cy="679366"/>
+            <a:off x="4851871" y="1211727"/>
+            <a:ext cx="686440" cy="526966"/>
           </a:xfrm>
           <a:prstGeom prst="line">
             <a:avLst/>
@@ -14950,8 +14937,8 @@
         </p:nvCxnSpPr>
         <p:spPr>
           <a:xfrm>
-            <a:off x="3787592" y="1989365"/>
-            <a:ext cx="927812" cy="14287"/>
+            <a:off x="3952692" y="2738665"/>
+            <a:ext cx="661112" cy="1587"/>
           </a:xfrm>
           <a:prstGeom prst="line">
             <a:avLst/>
@@ -14985,7 +14972,7 @@
         </p:nvSpPr>
         <p:spPr>
           <a:xfrm>
-            <a:off x="1894141" y="837447"/>
+            <a:off x="2059241" y="1586747"/>
             <a:ext cx="2060931" cy="1465330"/>
           </a:xfrm>
           <a:prstGeom prst="rect">
@@ -15032,7 +15019,7 @@
         </p:nvSpPr>
         <p:spPr>
           <a:xfrm>
-            <a:off x="3201790" y="-992247"/>
+            <a:off x="3201790" y="-103247"/>
             <a:ext cx="2060931" cy="1465330"/>
           </a:xfrm>
           <a:prstGeom prst="rect">
@@ -15082,12 +15069,12 @@
         </p:nvCxnSpPr>
         <p:spPr>
           <a:xfrm rot="16200000" flipH="1">
-            <a:off x="4244354" y="183847"/>
-            <a:ext cx="14289" cy="3951434"/>
+            <a:off x="4282454" y="1060147"/>
+            <a:ext cx="1589" cy="3684734"/>
           </a:xfrm>
           <a:prstGeom prst="curvedConnector3">
             <a:avLst>
-              <a:gd name="adj1" fmla="val 1699832"/>
+              <a:gd name="adj1" fmla="val 14486407"/>
             </a:avLst>
           </a:prstGeom>
           <a:ln w="19050">
@@ -15122,8 +15109,8 @@
         </p:nvCxnSpPr>
         <p:spPr>
           <a:xfrm rot="5400000" flipH="1" flipV="1">
-            <a:off x="1891434" y="-294484"/>
-            <a:ext cx="2505139" cy="1736444"/>
+            <a:off x="2043834" y="607216"/>
+            <a:ext cx="2365439" cy="1571344"/>
           </a:xfrm>
           <a:prstGeom prst="curvedConnector2">
             <a:avLst/>
@@ -15160,8 +15147,8 @@
         </p:nvCxnSpPr>
         <p:spPr>
           <a:xfrm rot="16200000" flipV="1">
-            <a:off x="4112348" y="-274271"/>
-            <a:ext cx="2519428" cy="1710306"/>
+            <a:off x="4137748" y="589329"/>
+            <a:ext cx="2367028" cy="1608706"/>
           </a:xfrm>
           <a:prstGeom prst="curvedConnector2">
             <a:avLst/>
@@ -15198,8 +15185,8 @@
         </p:nvCxnSpPr>
         <p:spPr>
           <a:xfrm>
-            <a:off x="3200288" y="1150862"/>
-            <a:ext cx="2187281" cy="14288"/>
+            <a:off x="3365388" y="1900162"/>
+            <a:ext cx="1920581" cy="1588"/>
           </a:xfrm>
           <a:prstGeom prst="line">
             <a:avLst/>
@@ -15236,8 +15223,8 @@
         </p:nvCxnSpPr>
         <p:spPr>
           <a:xfrm>
-            <a:off x="3592402" y="322726"/>
-            <a:ext cx="1375344" cy="1517869"/>
+            <a:off x="3592402" y="1211726"/>
+            <a:ext cx="1273744" cy="1365469"/>
           </a:xfrm>
           <a:prstGeom prst="line">
             <a:avLst/>
@@ -15274,8 +15261,8 @@
         </p:nvCxnSpPr>
         <p:spPr>
           <a:xfrm flipH="1">
-            <a:off x="3535250" y="322727"/>
-            <a:ext cx="1316621" cy="1503581"/>
+            <a:off x="3700350" y="1211727"/>
+            <a:ext cx="1151521" cy="1363881"/>
           </a:xfrm>
           <a:prstGeom prst="line">
             <a:avLst/>
@@ -15309,7 +15296,7 @@
         </p:nvSpPr>
         <p:spPr>
           <a:xfrm rot="10800000">
-            <a:off x="8030597" y="673949"/>
+            <a:off x="8030597" y="1410549"/>
             <a:ext cx="393198" cy="742633"/>
           </a:xfrm>
           <a:prstGeom prst="arc">
@@ -15357,7 +15344,7 @@
         </p:nvSpPr>
         <p:spPr>
           <a:xfrm rot="10800000">
-            <a:off x="7682059" y="-79644"/>
+            <a:off x="7682059" y="656956"/>
             <a:ext cx="1123284" cy="2211861"/>
           </a:xfrm>
           <a:prstGeom prst="arc">
@@ -15397,8 +15384,8 @@
           </a:p>
         </p:txBody>
       </p:sp>
-      <mc:AlternateContent xmlns:mc="http://schemas.openxmlformats.org/markup-compatibility/2006" xmlns:a14="http://schemas.microsoft.com/office/drawing/2010/main">
-        <mc:Choice Requires="a14">
+      <mc:AlternateContent xmlns:mc="http://schemas.openxmlformats.org/markup-compatibility/2006">
+        <mc:Choice xmlns:a14="http://schemas.microsoft.com/office/drawing/2010/main" Requires="a14">
           <p:sp>
             <p:nvSpPr>
               <p:cNvPr id="163" name="TextBox 162"/>
@@ -15407,7 +15394,7 @@
             </p:nvSpPr>
             <p:spPr>
               <a:xfrm>
-                <a:off x="7319351" y="747423"/>
+                <a:off x="7319351" y="1484023"/>
                 <a:ext cx="359593" cy="307777"/>
               </a:xfrm>
               <a:prstGeom prst="rect">
@@ -15448,7 +15435,7 @@
             </p:txBody>
           </p:sp>
         </mc:Choice>
-        <mc:Fallback xmlns="">
+        <mc:Fallback>
           <p:sp>
             <p:nvSpPr>
               <p:cNvPr id="163" name="TextBox 162"/>
@@ -15459,7 +15446,7 @@
             </p:nvSpPr>
             <p:spPr>
               <a:xfrm>
-                <a:off x="7319351" y="747423"/>
+                <a:off x="7319351" y="1484023"/>
                 <a:ext cx="359593" cy="307777"/>
               </a:xfrm>
               <a:prstGeom prst="rect">
@@ -15468,7 +15455,7 @@
               <a:blipFill rotWithShape="0">
                 <a:blip r:embed="rId2"/>
                 <a:stretch>
-                  <a:fillRect l="-11864" r="-11864" b="-6000"/>
+                  <a:fillRect l="-11864" r="-11864" b="-5882"/>
                 </a:stretch>
               </a:blipFill>
             </p:spPr>
@@ -15487,8 +15474,8 @@
           </p:sp>
         </mc:Fallback>
       </mc:AlternateContent>
-      <mc:AlternateContent xmlns:mc="http://schemas.openxmlformats.org/markup-compatibility/2006" xmlns:a14="http://schemas.microsoft.com/office/drawing/2010/main">
-        <mc:Choice Requires="a14">
+      <mc:AlternateContent xmlns:mc="http://schemas.openxmlformats.org/markup-compatibility/2006">
+        <mc:Choice xmlns:a14="http://schemas.microsoft.com/office/drawing/2010/main" Requires="a14">
           <p:sp>
             <p:nvSpPr>
               <p:cNvPr id="164" name="TextBox 163"/>
@@ -15497,7 +15484,7 @@
             </p:nvSpPr>
             <p:spPr>
               <a:xfrm>
-                <a:off x="7740385" y="742827"/>
+                <a:off x="7740385" y="1479427"/>
                 <a:ext cx="327013" cy="307777"/>
               </a:xfrm>
               <a:prstGeom prst="rect">
@@ -15538,7 +15525,7 @@
             </p:txBody>
           </p:sp>
         </mc:Choice>
-        <mc:Fallback xmlns="">
+        <mc:Fallback>
           <p:sp>
             <p:nvSpPr>
               <p:cNvPr id="164" name="TextBox 163"/>
@@ -15549,7 +15536,7 @@
             </p:nvSpPr>
             <p:spPr>
               <a:xfrm>
-                <a:off x="7740385" y="742827"/>
+                <a:off x="7740385" y="1479427"/>
                 <a:ext cx="327013" cy="307777"/>
               </a:xfrm>
               <a:prstGeom prst="rect">
@@ -15585,7 +15572,7 @@
         </p:nvSpPr>
         <p:spPr>
           <a:xfrm>
-            <a:off x="6926692" y="381859"/>
+            <a:off x="6926692" y="1118459"/>
             <a:ext cx="703121" cy="523220"/>
           </a:xfrm>
           <a:prstGeom prst="rect">
@@ -15616,7 +15603,7 @@
         </p:nvSpPr>
         <p:spPr>
           <a:xfrm>
-            <a:off x="7544665" y="1031835"/>
+            <a:off x="7544665" y="1768435"/>
             <a:ext cx="1364197" cy="1005481"/>
           </a:xfrm>
           <a:prstGeom prst="rect">
@@ -15662,8 +15649,8 @@
           </a:p>
         </p:txBody>
       </p:sp>
-      <mc:AlternateContent xmlns:mc="http://schemas.openxmlformats.org/markup-compatibility/2006" xmlns:a14="http://schemas.microsoft.com/office/drawing/2010/main">
-        <mc:Choice Requires="a14">
+      <mc:AlternateContent xmlns:mc="http://schemas.openxmlformats.org/markup-compatibility/2006">
+        <mc:Choice xmlns:a14="http://schemas.microsoft.com/office/drawing/2010/main" Requires="a14">
           <p:sp>
             <p:nvSpPr>
               <p:cNvPr id="182" name="TextBox 181"/>
@@ -15672,7 +15659,7 @@
             </p:nvSpPr>
             <p:spPr>
               <a:xfrm>
-                <a:off x="8084124" y="1325645"/>
+                <a:off x="8084124" y="2062245"/>
                 <a:ext cx="321370" cy="430887"/>
               </a:xfrm>
               <a:prstGeom prst="rect">
@@ -15707,7 +15694,7 @@
             </p:txBody>
           </p:sp>
         </mc:Choice>
-        <mc:Fallback xmlns="">
+        <mc:Fallback>
           <p:sp>
             <p:nvSpPr>
               <p:cNvPr id="182" name="TextBox 181"/>
@@ -15718,7 +15705,7 @@
             </p:nvSpPr>
             <p:spPr>
               <a:xfrm>
-                <a:off x="8084124" y="1325645"/>
+                <a:off x="8084124" y="2062245"/>
                 <a:ext cx="321370" cy="430887"/>
               </a:xfrm>
               <a:prstGeom prst="rect">
@@ -15754,7 +15741,7 @@
         </p:nvGrpSpPr>
         <p:grpSpPr>
           <a:xfrm>
-            <a:off x="9270267" y="884717"/>
+            <a:off x="9270267" y="1621317"/>
             <a:ext cx="841256" cy="1126754"/>
             <a:chOff x="9223209" y="2652131"/>
             <a:chExt cx="841256" cy="1126754"/>
@@ -16043,8 +16030,8 @@
           </mc:Fallback>
         </mc:AlternateContent>
       </p:grpSp>
-      <mc:AlternateContent xmlns:mc="http://schemas.openxmlformats.org/markup-compatibility/2006" xmlns:a14="http://schemas.microsoft.com/office/drawing/2010/main">
-        <mc:Choice Requires="a14">
+      <mc:AlternateContent xmlns:mc="http://schemas.openxmlformats.org/markup-compatibility/2006">
+        <mc:Choice xmlns:a14="http://schemas.microsoft.com/office/drawing/2010/main" Requires="a14">
           <p:sp>
             <p:nvSpPr>
               <p:cNvPr id="61" name="TextBox 60"/>
@@ -16053,7 +16040,7 @@
             </p:nvSpPr>
             <p:spPr>
               <a:xfrm>
-                <a:off x="1765969" y="-259582"/>
+                <a:off x="1765969" y="477018"/>
                 <a:ext cx="773866" cy="307777"/>
               </a:xfrm>
               <a:prstGeom prst="rect">
@@ -16113,7 +16100,7 @@
             </p:txBody>
           </p:sp>
         </mc:Choice>
-        <mc:Fallback xmlns="">
+        <mc:Fallback>
           <p:sp>
             <p:nvSpPr>
               <p:cNvPr id="61" name="TextBox 60"/>
@@ -16124,7 +16111,7 @@
             </p:nvSpPr>
             <p:spPr>
               <a:xfrm>
-                <a:off x="1765969" y="-259582"/>
+                <a:off x="1765969" y="477018"/>
                 <a:ext cx="773866" cy="307777"/>
               </a:xfrm>
               <a:prstGeom prst="rect">
@@ -16152,8 +16139,8 @@
           </p:sp>
         </mc:Fallback>
       </mc:AlternateContent>
-      <mc:AlternateContent xmlns:mc="http://schemas.openxmlformats.org/markup-compatibility/2006" xmlns:a14="http://schemas.microsoft.com/office/drawing/2010/main">
-        <mc:Choice Requires="a14">
+      <mc:AlternateContent xmlns:mc="http://schemas.openxmlformats.org/markup-compatibility/2006">
+        <mc:Choice xmlns:a14="http://schemas.microsoft.com/office/drawing/2010/main" Requires="a14">
           <p:sp>
             <p:nvSpPr>
               <p:cNvPr id="62" name="TextBox 61"/>
@@ -16162,7 +16149,7 @@
             </p:nvSpPr>
             <p:spPr>
               <a:xfrm>
-                <a:off x="1759696" y="165306"/>
+                <a:off x="1759696" y="901906"/>
                 <a:ext cx="779829" cy="307777"/>
               </a:xfrm>
               <a:prstGeom prst="rect">
@@ -16222,7 +16209,7 @@
             </p:txBody>
           </p:sp>
         </mc:Choice>
-        <mc:Fallback xmlns="">
+        <mc:Fallback>
           <p:sp>
             <p:nvSpPr>
               <p:cNvPr id="62" name="TextBox 61"/>
@@ -16233,7 +16220,7 @@
             </p:nvSpPr>
             <p:spPr>
               <a:xfrm>
-                <a:off x="1759696" y="165306"/>
+                <a:off x="1759696" y="901906"/>
                 <a:ext cx="779829" cy="307777"/>
               </a:xfrm>
               <a:prstGeom prst="rect">
@@ -16242,7 +16229,7 @@
               <a:blipFill rotWithShape="0">
                 <a:blip r:embed="rId9"/>
                 <a:stretch>
-                  <a:fillRect l="-7813" r="-7031" b="-15686"/>
+                  <a:fillRect l="-7813" r="-7031" b="-16000"/>
                 </a:stretch>
               </a:blipFill>
             </p:spPr>
@@ -16261,8 +16248,8 @@
           </p:sp>
         </mc:Fallback>
       </mc:AlternateContent>
-      <mc:AlternateContent xmlns:mc="http://schemas.openxmlformats.org/markup-compatibility/2006" xmlns:a14="http://schemas.microsoft.com/office/drawing/2010/main">
-        <mc:Choice Requires="a14">
+      <mc:AlternateContent xmlns:mc="http://schemas.openxmlformats.org/markup-compatibility/2006">
+        <mc:Choice xmlns:a14="http://schemas.microsoft.com/office/drawing/2010/main" Requires="a14">
           <p:sp>
             <p:nvSpPr>
               <p:cNvPr id="63" name="TextBox 62"/>
@@ -16271,7 +16258,7 @@
             </p:nvSpPr>
             <p:spPr>
               <a:xfrm>
-                <a:off x="1759696" y="-655072"/>
+                <a:off x="1759696" y="81528"/>
                 <a:ext cx="676724" cy="307777"/>
               </a:xfrm>
               <a:prstGeom prst="rect">
@@ -16312,7 +16299,7 @@
             </p:txBody>
           </p:sp>
         </mc:Choice>
-        <mc:Fallback xmlns="">
+        <mc:Fallback>
           <p:sp>
             <p:nvSpPr>
               <p:cNvPr id="63" name="TextBox 62"/>
@@ -16323,7 +16310,7 @@
             </p:nvSpPr>
             <p:spPr>
               <a:xfrm>
-                <a:off x="1759696" y="-655072"/>
+                <a:off x="1759696" y="81528"/>
                 <a:ext cx="676724" cy="307777"/>
               </a:xfrm>
               <a:prstGeom prst="rect">
@@ -16332,7 +16319,7 @@
               <a:blipFill rotWithShape="0">
                 <a:blip r:embed="rId10"/>
                 <a:stretch>
-                  <a:fillRect l="-9009" r="-8108" b="-6000"/>
+                  <a:fillRect l="-9009" r="-8108" b="-5882"/>
                 </a:stretch>
               </a:blipFill>
             </p:spPr>
@@ -16385,7 +16372,7 @@
         </p:nvSpPr>
         <p:spPr>
           <a:xfrm>
-            <a:off x="3203879" y="3377263"/>
+            <a:off x="3051479" y="3758263"/>
             <a:ext cx="504684" cy="326113"/>
           </a:xfrm>
           <a:prstGeom prst="rect">
@@ -16911,7 +16898,7 @@
         </p:nvSpPr>
         <p:spPr>
           <a:xfrm>
-            <a:off x="4732064" y="3377263"/>
+            <a:off x="4579664" y="3758263"/>
             <a:ext cx="504684" cy="326113"/>
           </a:xfrm>
           <a:prstGeom prst="rect">
@@ -16968,8 +16955,8 @@
         </p:nvCxnSpPr>
         <p:spPr>
           <a:xfrm flipH="1">
-            <a:off x="2069137" y="3703376"/>
-            <a:ext cx="1387084" cy="2245092"/>
+            <a:off x="2069137" y="4084376"/>
+            <a:ext cx="1234684" cy="1864092"/>
           </a:xfrm>
           <a:prstGeom prst="line">
             <a:avLst/>
@@ -16995,8 +16982,8 @@
           </a:fontRef>
         </p:style>
       </p:cxnSp>
-      <mc:AlternateContent xmlns:mc="http://schemas.openxmlformats.org/markup-compatibility/2006" xmlns:a14="http://schemas.microsoft.com/office/drawing/2010/main">
-        <mc:Choice Requires="a14">
+      <mc:AlternateContent xmlns:mc="http://schemas.openxmlformats.org/markup-compatibility/2006">
+        <mc:Choice xmlns:a14="http://schemas.microsoft.com/office/drawing/2010/main" Requires="a14">
           <p:sp>
             <p:nvSpPr>
               <p:cNvPr id="79" name="TextBox 78"/>
@@ -17046,7 +17033,7 @@
             </p:txBody>
           </p:sp>
         </mc:Choice>
-        <mc:Fallback xmlns="">
+        <mc:Fallback>
           <p:sp>
             <p:nvSpPr>
               <p:cNvPr id="79" name="TextBox 78"/>
@@ -17064,7 +17051,7 @@
                 <a:avLst/>
               </a:prstGeom>
               <a:blipFill rotWithShape="0">
-                <a:blip r:embed="rId13"/>
+                <a:blip r:embed="rId11"/>
                 <a:stretch>
                   <a:fillRect l="-7407" t="-143137" r="-6667" b="-174510"/>
                 </a:stretch>
@@ -17085,8 +17072,8 @@
           </p:sp>
         </mc:Fallback>
       </mc:AlternateContent>
-      <mc:AlternateContent xmlns:mc="http://schemas.openxmlformats.org/markup-compatibility/2006" xmlns:a14="http://schemas.microsoft.com/office/drawing/2010/main">
-        <mc:Choice Requires="a14">
+      <mc:AlternateContent xmlns:mc="http://schemas.openxmlformats.org/markup-compatibility/2006">
+        <mc:Choice xmlns:a14="http://schemas.microsoft.com/office/drawing/2010/main" Requires="a14">
           <p:sp>
             <p:nvSpPr>
               <p:cNvPr id="80" name="TextBox 79"/>
@@ -17095,7 +17082,7 @@
             </p:nvSpPr>
             <p:spPr>
               <a:xfrm>
-                <a:off x="1763892" y="3375139"/>
+                <a:off x="1749747" y="3780130"/>
                 <a:ext cx="820866" cy="307777"/>
               </a:xfrm>
               <a:prstGeom prst="rect">
@@ -17136,7 +17123,7 @@
             </p:txBody>
           </p:sp>
         </mc:Choice>
-        <mc:Fallback xmlns="">
+        <mc:Fallback>
           <p:sp>
             <p:nvSpPr>
               <p:cNvPr id="80" name="TextBox 79"/>
@@ -17147,16 +17134,16 @@
             </p:nvSpPr>
             <p:spPr>
               <a:xfrm>
-                <a:off x="1763892" y="3375139"/>
+                <a:off x="1749747" y="3780130"/>
                 <a:ext cx="820866" cy="307777"/>
               </a:xfrm>
               <a:prstGeom prst="rect">
                 <a:avLst/>
               </a:prstGeom>
               <a:blipFill rotWithShape="0">
-                <a:blip r:embed="rId14"/>
+                <a:blip r:embed="rId12"/>
                 <a:stretch>
-                  <a:fillRect l="-7407" t="-146000" r="-6667" b="-180000"/>
+                  <a:fillRect l="-7407" t="-143137" r="-6667" b="-174510"/>
                 </a:stretch>
               </a:blipFill>
             </p:spPr>
@@ -17635,8 +17622,8 @@
           </mc:Fallback>
         </mc:AlternateContent>
       </p:grpSp>
-      <mc:AlternateContent xmlns:mc="http://schemas.openxmlformats.org/markup-compatibility/2006" xmlns:a14="http://schemas.microsoft.com/office/drawing/2010/main">
-        <mc:Choice Requires="a14">
+      <mc:AlternateContent xmlns:mc="http://schemas.openxmlformats.org/markup-compatibility/2006">
+        <mc:Choice xmlns:a14="http://schemas.microsoft.com/office/drawing/2010/main" Requires="a14">
           <p:sp>
             <p:nvSpPr>
               <p:cNvPr id="92" name="TextBox 91"/>
@@ -17705,7 +17692,7 @@
             </p:txBody>
           </p:sp>
         </mc:Choice>
-        <mc:Fallback xmlns="">
+        <mc:Fallback>
           <p:sp>
             <p:nvSpPr>
               <p:cNvPr id="92" name="TextBox 91"/>
@@ -17822,8 +17809,8 @@
           </a:p>
         </p:txBody>
       </p:sp>
-      <mc:AlternateContent xmlns:mc="http://schemas.openxmlformats.org/markup-compatibility/2006" xmlns:a14="http://schemas.microsoft.com/office/drawing/2010/main">
-        <mc:Choice Requires="a14">
+      <mc:AlternateContent xmlns:mc="http://schemas.openxmlformats.org/markup-compatibility/2006">
+        <mc:Choice xmlns:a14="http://schemas.microsoft.com/office/drawing/2010/main" Requires="a14">
           <p:sp>
             <p:nvSpPr>
               <p:cNvPr id="96" name="TextBox 95"/>
@@ -17873,7 +17860,7 @@
             </p:txBody>
           </p:sp>
         </mc:Choice>
-        <mc:Fallback xmlns="">
+        <mc:Fallback>
           <p:sp>
             <p:nvSpPr>
               <p:cNvPr id="96" name="TextBox 95"/>
@@ -17891,7 +17878,7 @@
                 <a:avLst/>
               </a:prstGeom>
               <a:blipFill rotWithShape="0">
-                <a:blip r:embed="rId20"/>
+                <a:blip r:embed="rId3"/>
                 <a:stretch>
                   <a:fillRect l="-12069" r="-13793" b="-6000"/>
                 </a:stretch>
@@ -17912,8 +17899,8 @@
           </p:sp>
         </mc:Fallback>
       </mc:AlternateContent>
-      <mc:AlternateContent xmlns:mc="http://schemas.openxmlformats.org/markup-compatibility/2006" xmlns:a14="http://schemas.microsoft.com/office/drawing/2010/main">
-        <mc:Choice Requires="a14">
+      <mc:AlternateContent xmlns:mc="http://schemas.openxmlformats.org/markup-compatibility/2006">
+        <mc:Choice xmlns:a14="http://schemas.microsoft.com/office/drawing/2010/main" Requires="a14">
           <p:sp>
             <p:nvSpPr>
               <p:cNvPr id="97" name="TextBox 96"/>
@@ -17963,7 +17950,7 @@
             </p:txBody>
           </p:sp>
         </mc:Choice>
-        <mc:Fallback xmlns="">
+        <mc:Fallback>
           <p:sp>
             <p:nvSpPr>
               <p:cNvPr id="97" name="TextBox 96"/>
@@ -17981,7 +17968,7 @@
                 <a:avLst/>
               </a:prstGeom>
               <a:blipFill rotWithShape="0">
-                <a:blip r:embed="rId21"/>
+                <a:blip r:embed="rId2"/>
                 <a:stretch>
                   <a:fillRect l="-11864" r="-11864" b="-5882"/>
                 </a:stretch>
@@ -18002,8 +17989,8 @@
           </p:sp>
         </mc:Fallback>
       </mc:AlternateContent>
-      <mc:AlternateContent xmlns:mc="http://schemas.openxmlformats.org/markup-compatibility/2006" xmlns:a14="http://schemas.microsoft.com/office/drawing/2010/main">
-        <mc:Choice Requires="a14">
+      <mc:AlternateContent xmlns:mc="http://schemas.openxmlformats.org/markup-compatibility/2006">
+        <mc:Choice xmlns:a14="http://schemas.microsoft.com/office/drawing/2010/main" Requires="a14">
           <p:sp>
             <p:nvSpPr>
               <p:cNvPr id="98" name="TextBox 97"/>
@@ -18053,7 +18040,7 @@
             </p:txBody>
           </p:sp>
         </mc:Choice>
-        <mc:Fallback xmlns="">
+        <mc:Fallback>
           <p:sp>
             <p:nvSpPr>
               <p:cNvPr id="98" name="TextBox 97"/>
@@ -18071,7 +18058,7 @@
                 <a:avLst/>
               </a:prstGeom>
               <a:blipFill rotWithShape="0">
-                <a:blip r:embed="rId22"/>
+                <a:blip r:embed="rId20"/>
                 <a:stretch>
                   <a:fillRect l="-11864" r="-13559" b="-10000"/>
                 </a:stretch>
@@ -18092,8 +18079,8 @@
           </p:sp>
         </mc:Fallback>
       </mc:AlternateContent>
-      <mc:AlternateContent xmlns:mc="http://schemas.openxmlformats.org/markup-compatibility/2006" xmlns:a14="http://schemas.microsoft.com/office/drawing/2010/main">
-        <mc:Choice Requires="a14">
+      <mc:AlternateContent xmlns:mc="http://schemas.openxmlformats.org/markup-compatibility/2006">
+        <mc:Choice xmlns:a14="http://schemas.microsoft.com/office/drawing/2010/main" Requires="a14">
           <p:sp>
             <p:nvSpPr>
               <p:cNvPr id="99" name="TextBox 98"/>
@@ -18102,8 +18089,8 @@
             </p:nvSpPr>
             <p:spPr>
               <a:xfrm>
-                <a:off x="8366750" y="3824004"/>
-                <a:ext cx="359593" cy="307777"/>
+                <a:off x="8327249" y="4051105"/>
+                <a:ext cx="438593" cy="307777"/>
               </a:xfrm>
               <a:prstGeom prst="rect">
                 <a:avLst/>
@@ -18143,7 +18130,7 @@
             </p:txBody>
           </p:sp>
         </mc:Choice>
-        <mc:Fallback xmlns="">
+        <mc:Fallback>
           <p:sp>
             <p:nvSpPr>
               <p:cNvPr id="99" name="TextBox 98"/>
@@ -18154,16 +18141,16 @@
             </p:nvSpPr>
             <p:spPr>
               <a:xfrm>
-                <a:off x="8366750" y="3824004"/>
-                <a:ext cx="359593" cy="307777"/>
+                <a:off x="8327249" y="4051105"/>
+                <a:ext cx="438593" cy="307777"/>
               </a:xfrm>
               <a:prstGeom prst="rect">
                 <a:avLst/>
               </a:prstGeom>
               <a:blipFill rotWithShape="0">
-                <a:blip r:embed="rId23"/>
+                <a:blip r:embed="rId21"/>
                 <a:stretch>
-                  <a:fillRect l="-10169" r="-13559" b="-5882"/>
+                  <a:fillRect r="-1389" b="-6000"/>
                 </a:stretch>
               </a:blipFill>
             </p:spPr>
@@ -18182,8 +18169,8 @@
           </p:sp>
         </mc:Fallback>
       </mc:AlternateContent>
-      <mc:AlternateContent xmlns:mc="http://schemas.openxmlformats.org/markup-compatibility/2006" xmlns:a14="http://schemas.microsoft.com/office/drawing/2010/main">
-        <mc:Choice Requires="a14">
+      <mc:AlternateContent xmlns:mc="http://schemas.openxmlformats.org/markup-compatibility/2006">
+        <mc:Choice xmlns:a14="http://schemas.microsoft.com/office/drawing/2010/main" Requires="a14">
           <p:sp>
             <p:nvSpPr>
               <p:cNvPr id="101" name="TextBox 100"/>
@@ -18246,7 +18233,7 @@
             </p:txBody>
           </p:sp>
         </mc:Choice>
-        <mc:Fallback xmlns="">
+        <mc:Fallback>
           <p:sp>
             <p:nvSpPr>
               <p:cNvPr id="101" name="TextBox 100"/>
@@ -18264,7 +18251,7 @@
                 <a:avLst/>
               </a:prstGeom>
               <a:blipFill rotWithShape="0">
-                <a:blip r:embed="rId24"/>
+                <a:blip r:embed="rId22"/>
                 <a:stretch>
                   <a:fillRect l="-13559" r="-3390" b="-15686"/>
                 </a:stretch>
@@ -18296,12 +18283,12 @@
         </p:nvCxnSpPr>
         <p:spPr>
           <a:xfrm flipH="1" flipV="1">
-            <a:off x="8588754" y="3576790"/>
-            <a:ext cx="3876" cy="2494790"/>
+            <a:off x="8547353" y="3882179"/>
+            <a:ext cx="45277" cy="2189401"/>
           </a:xfrm>
           <a:prstGeom prst="curvedConnector3">
             <a:avLst>
-              <a:gd name="adj1" fmla="val -5897833"/>
+              <a:gd name="adj1" fmla="val -504892"/>
             </a:avLst>
           </a:prstGeom>
           <a:ln w="19050">
@@ -18325,8 +18312,8 @@
           </a:fontRef>
         </p:style>
       </p:cxnSp>
-      <mc:AlternateContent xmlns:mc="http://schemas.openxmlformats.org/markup-compatibility/2006" xmlns:a14="http://schemas.microsoft.com/office/drawing/2010/main">
-        <mc:Choice Requires="a14">
+      <mc:AlternateContent xmlns:mc="http://schemas.openxmlformats.org/markup-compatibility/2006">
+        <mc:Choice xmlns:a14="http://schemas.microsoft.com/office/drawing/2010/main" Requires="a14">
           <p:sp>
             <p:nvSpPr>
               <p:cNvPr id="104" name="TextBox 103"/>
@@ -18395,7 +18382,7 @@
             </p:txBody>
           </p:sp>
         </mc:Choice>
-        <mc:Fallback xmlns="">
+        <mc:Fallback>
           <p:sp>
             <p:nvSpPr>
               <p:cNvPr id="104" name="TextBox 103"/>
@@ -18413,7 +18400,7 @@
                 <a:avLst/>
               </a:prstGeom>
               <a:blipFill rotWithShape="0">
-                <a:blip r:embed="rId25"/>
+                <a:blip r:embed="rId23"/>
                 <a:stretch>
                   <a:fillRect l="-6716" r="-6716" b="-15686"/>
                 </a:stretch>
@@ -18947,13 +18934,15 @@
       <p:cxnSp>
         <p:nvCxnSpPr>
           <p:cNvPr id="137" name="Straight Connector 136"/>
-          <p:cNvCxnSpPr/>
+          <p:cNvCxnSpPr>
+            <a:stCxn id="75" idx="2"/>
+          </p:cNvCxnSpPr>
           <p:nvPr/>
         </p:nvCxnSpPr>
         <p:spPr>
           <a:xfrm flipH="1">
-            <a:off x="2630417" y="3703376"/>
-            <a:ext cx="2353989" cy="2245092"/>
+            <a:off x="2630418" y="4084376"/>
+            <a:ext cx="2201588" cy="1864092"/>
           </a:xfrm>
           <a:prstGeom prst="line">
             <a:avLst/>
@@ -18990,8 +18979,8 @@
         </p:nvCxnSpPr>
         <p:spPr>
           <a:xfrm>
-            <a:off x="3456221" y="3703376"/>
-            <a:ext cx="994500" cy="2249982"/>
+            <a:off x="3303821" y="4084376"/>
+            <a:ext cx="1146900" cy="1868982"/>
           </a:xfrm>
           <a:prstGeom prst="line">
             <a:avLst/>
@@ -19020,13 +19009,15 @@
       <p:cxnSp>
         <p:nvCxnSpPr>
           <p:cNvPr id="139" name="Straight Connector 138"/>
-          <p:cNvCxnSpPr/>
+          <p:cNvCxnSpPr>
+            <a:stCxn id="75" idx="2"/>
+          </p:cNvCxnSpPr>
           <p:nvPr/>
         </p:nvCxnSpPr>
         <p:spPr>
           <a:xfrm>
-            <a:off x="4984406" y="3703376"/>
-            <a:ext cx="27595" cy="2249982"/>
+            <a:off x="4832006" y="4084376"/>
+            <a:ext cx="179995" cy="1868982"/>
           </a:xfrm>
           <a:prstGeom prst="line">
             <a:avLst/>
@@ -19060,7 +19051,7 @@
         </p:nvSpPr>
         <p:spPr>
           <a:xfrm>
-            <a:off x="5485309" y="3202784"/>
+            <a:off x="5421874" y="3586022"/>
             <a:ext cx="703121" cy="523220"/>
           </a:xfrm>
           <a:prstGeom prst="rect">
@@ -19125,8 +19116,8 @@
         </p:nvCxnSpPr>
         <p:spPr>
           <a:xfrm>
-            <a:off x="3456221" y="3703376"/>
-            <a:ext cx="3510985" cy="1650917"/>
+            <a:off x="3303821" y="4084376"/>
+            <a:ext cx="3663385" cy="1269917"/>
           </a:xfrm>
           <a:prstGeom prst="line">
             <a:avLst/>
@@ -19163,8 +19154,8 @@
         </p:nvCxnSpPr>
         <p:spPr>
           <a:xfrm>
-            <a:off x="4984406" y="3703376"/>
-            <a:ext cx="1982800" cy="1650917"/>
+            <a:off x="4832006" y="4084376"/>
+            <a:ext cx="2135200" cy="1269917"/>
           </a:xfrm>
           <a:prstGeom prst="line">
             <a:avLst/>
@@ -19244,8 +19235,8 @@
           </a:p>
         </p:txBody>
       </p:sp>
-      <mc:AlternateContent xmlns:mc="http://schemas.openxmlformats.org/markup-compatibility/2006" xmlns:a14="http://schemas.microsoft.com/office/drawing/2010/main">
-        <mc:Choice Requires="a14">
+      <mc:AlternateContent xmlns:mc="http://schemas.openxmlformats.org/markup-compatibility/2006">
+        <mc:Choice xmlns:a14="http://schemas.microsoft.com/office/drawing/2010/main" Requires="a14">
           <p:sp>
             <p:nvSpPr>
               <p:cNvPr id="151" name="TextBox 150"/>
@@ -19289,7 +19280,7 @@
             </p:txBody>
           </p:sp>
         </mc:Choice>
-        <mc:Fallback xmlns="">
+        <mc:Fallback>
           <p:sp>
             <p:nvSpPr>
               <p:cNvPr id="151" name="TextBox 150"/>
@@ -19307,7 +19298,7 @@
                 <a:avLst/>
               </a:prstGeom>
               <a:blipFill rotWithShape="0">
-                <a:blip r:embed="rId26"/>
+                <a:blip r:embed="rId24"/>
                 <a:stretch>
                   <a:fillRect b="-7843"/>
                 </a:stretch>
@@ -19336,7 +19327,7 @@
         </p:nvSpPr>
         <p:spPr>
           <a:xfrm>
-            <a:off x="7974513" y="3375139"/>
+            <a:off x="7933112" y="3680528"/>
             <a:ext cx="614241" cy="403301"/>
           </a:xfrm>
           <a:prstGeom prst="rect">
@@ -19382,8 +19373,8 @@
           </a:p>
         </p:txBody>
       </p:sp>
-      <mc:AlternateContent xmlns:mc="http://schemas.openxmlformats.org/markup-compatibility/2006" xmlns:a14="http://schemas.microsoft.com/office/drawing/2010/main">
-        <mc:Choice Requires="a14">
+      <mc:AlternateContent xmlns:mc="http://schemas.openxmlformats.org/markup-compatibility/2006">
+        <mc:Choice xmlns:a14="http://schemas.microsoft.com/office/drawing/2010/main" Requires="a14">
           <p:sp>
             <p:nvSpPr>
               <p:cNvPr id="153" name="TextBox 152"/>
@@ -19392,7 +19383,7 @@
             </p:nvSpPr>
             <p:spPr>
               <a:xfrm>
-                <a:off x="8112616" y="3426825"/>
+                <a:off x="8071215" y="3732214"/>
                 <a:ext cx="359593" cy="307777"/>
               </a:xfrm>
               <a:prstGeom prst="rect">
@@ -19446,7 +19437,7 @@
             </p:txBody>
           </p:sp>
         </mc:Choice>
-        <mc:Fallback xmlns="">
+        <mc:Fallback>
           <p:sp>
             <p:nvSpPr>
               <p:cNvPr id="153" name="TextBox 152"/>
@@ -19457,16 +19448,16 @@
             </p:nvSpPr>
             <p:spPr>
               <a:xfrm>
-                <a:off x="8112616" y="3426825"/>
+                <a:off x="8071215" y="3732214"/>
                 <a:ext cx="359593" cy="307777"/>
               </a:xfrm>
               <a:prstGeom prst="rect">
                 <a:avLst/>
               </a:prstGeom>
               <a:blipFill rotWithShape="0">
-                <a:blip r:embed="rId27"/>
+                <a:blip r:embed="rId25"/>
                 <a:stretch>
-                  <a:fillRect l="-13559" r="-1695" b="-13725"/>
+                  <a:fillRect l="-11864" r="-1695" b="-13725"/>
                 </a:stretch>
               </a:blipFill>
             </p:spPr>
@@ -19485,32 +19476,6 @@
           </p:sp>
         </mc:Fallback>
       </mc:AlternateContent>
-      <p:sp>
-        <p:nvSpPr>
-          <p:cNvPr id="4" name="TextBox 3"/>
-          <p:cNvSpPr txBox="1"/>
-          <p:nvPr/>
-        </p:nvSpPr>
-        <p:spPr>
-          <a:xfrm>
-            <a:off x="1364566" y="2546252"/>
-            <a:ext cx="184731" cy="369332"/>
-          </a:xfrm>
-          <a:prstGeom prst="rect">
-            <a:avLst/>
-          </a:prstGeom>
-          <a:noFill/>
-        </p:spPr>
-        <p:txBody>
-          <a:bodyPr wrap="none" rtlCol="0">
-            <a:spAutoFit/>
-          </a:bodyPr>
-          <a:lstStyle/>
-          <a:p>
-            <a:endParaRPr lang="en-US" dirty="0"/>
-          </a:p>
-        </p:txBody>
-      </p:sp>
     </p:spTree>
     <p:extLst>
       <p:ext uri="{BB962C8B-B14F-4D97-AF65-F5344CB8AC3E}">

</xml_diff>